<commit_message>
test file location adjustment from CEE4540_DC
</commit_message>
<xml_diff>
--- a/Summary Sheets/Diagrams.pptx
+++ b/Summary Sheets/Diagrams.pptx
@@ -9,8 +9,9 @@
     <p:sldId id="257" r:id="rId3"/>
     <p:sldId id="258" r:id="rId4"/>
     <p:sldId id="259" r:id="rId5"/>
-    <p:sldId id="261" r:id="rId6"/>
-    <p:sldId id="262" r:id="rId7"/>
+    <p:sldId id="263" r:id="rId6"/>
+    <p:sldId id="261" r:id="rId7"/>
+    <p:sldId id="262" r:id="rId8"/>
   </p:sldIdLst>
   <p:sldSz cx="12192000" cy="6858000"/>
   <p:notesSz cx="6858000" cy="9144000"/>
@@ -275,7 +276,7 @@
           <a:p>
             <a:fld id="{21D1E3DE-262E-49AD-8F92-4417FBCF3DA3}" type="datetimeFigureOut">
               <a:rPr lang="en-US" smtClean="0"/>
-              <a:t>4/15/2018</a:t>
+              <a:t>4/23/2018</a:t>
             </a:fld>
             <a:endParaRPr lang="en-US"/>
           </a:p>
@@ -473,7 +474,7 @@
           <a:p>
             <a:fld id="{21D1E3DE-262E-49AD-8F92-4417FBCF3DA3}" type="datetimeFigureOut">
               <a:rPr lang="en-US" smtClean="0"/>
-              <a:t>4/15/2018</a:t>
+              <a:t>4/23/2018</a:t>
             </a:fld>
             <a:endParaRPr lang="en-US"/>
           </a:p>
@@ -681,7 +682,7 @@
           <a:p>
             <a:fld id="{21D1E3DE-262E-49AD-8F92-4417FBCF3DA3}" type="datetimeFigureOut">
               <a:rPr lang="en-US" smtClean="0"/>
-              <a:t>4/15/2018</a:t>
+              <a:t>4/23/2018</a:t>
             </a:fld>
             <a:endParaRPr lang="en-US"/>
           </a:p>
@@ -879,7 +880,7 @@
           <a:p>
             <a:fld id="{21D1E3DE-262E-49AD-8F92-4417FBCF3DA3}" type="datetimeFigureOut">
               <a:rPr lang="en-US" smtClean="0"/>
-              <a:t>4/15/2018</a:t>
+              <a:t>4/23/2018</a:t>
             </a:fld>
             <a:endParaRPr lang="en-US"/>
           </a:p>
@@ -1154,7 +1155,7 @@
           <a:p>
             <a:fld id="{21D1E3DE-262E-49AD-8F92-4417FBCF3DA3}" type="datetimeFigureOut">
               <a:rPr lang="en-US" smtClean="0"/>
-              <a:t>4/15/2018</a:t>
+              <a:t>4/23/2018</a:t>
             </a:fld>
             <a:endParaRPr lang="en-US"/>
           </a:p>
@@ -1419,7 +1420,7 @@
           <a:p>
             <a:fld id="{21D1E3DE-262E-49AD-8F92-4417FBCF3DA3}" type="datetimeFigureOut">
               <a:rPr lang="en-US" smtClean="0"/>
-              <a:t>4/15/2018</a:t>
+              <a:t>4/23/2018</a:t>
             </a:fld>
             <a:endParaRPr lang="en-US"/>
           </a:p>
@@ -1831,7 +1832,7 @@
           <a:p>
             <a:fld id="{21D1E3DE-262E-49AD-8F92-4417FBCF3DA3}" type="datetimeFigureOut">
               <a:rPr lang="en-US" smtClean="0"/>
-              <a:t>4/15/2018</a:t>
+              <a:t>4/23/2018</a:t>
             </a:fld>
             <a:endParaRPr lang="en-US"/>
           </a:p>
@@ -1972,7 +1973,7 @@
           <a:p>
             <a:fld id="{21D1E3DE-262E-49AD-8F92-4417FBCF3DA3}" type="datetimeFigureOut">
               <a:rPr lang="en-US" smtClean="0"/>
-              <a:t>4/15/2018</a:t>
+              <a:t>4/23/2018</a:t>
             </a:fld>
             <a:endParaRPr lang="en-US"/>
           </a:p>
@@ -2085,7 +2086,7 @@
           <a:p>
             <a:fld id="{21D1E3DE-262E-49AD-8F92-4417FBCF3DA3}" type="datetimeFigureOut">
               <a:rPr lang="en-US" smtClean="0"/>
-              <a:t>4/15/2018</a:t>
+              <a:t>4/23/2018</a:t>
             </a:fld>
             <a:endParaRPr lang="en-US"/>
           </a:p>
@@ -2396,7 +2397,7 @@
           <a:p>
             <a:fld id="{21D1E3DE-262E-49AD-8F92-4417FBCF3DA3}" type="datetimeFigureOut">
               <a:rPr lang="en-US" smtClean="0"/>
-              <a:t>4/15/2018</a:t>
+              <a:t>4/23/2018</a:t>
             </a:fld>
             <a:endParaRPr lang="en-US"/>
           </a:p>
@@ -2684,7 +2685,7 @@
           <a:p>
             <a:fld id="{21D1E3DE-262E-49AD-8F92-4417FBCF3DA3}" type="datetimeFigureOut">
               <a:rPr lang="en-US" smtClean="0"/>
-              <a:t>4/15/2018</a:t>
+              <a:t>4/23/2018</a:t>
             </a:fld>
             <a:endParaRPr lang="en-US"/>
           </a:p>
@@ -2925,7 +2926,7 @@
           <a:p>
             <a:fld id="{21D1E3DE-262E-49AD-8F92-4417FBCF3DA3}" type="datetimeFigureOut">
               <a:rPr lang="en-US" smtClean="0"/>
-              <a:t>4/15/2018</a:t>
+              <a:t>4/23/2018</a:t>
             </a:fld>
             <a:endParaRPr lang="en-US"/>
           </a:p>
@@ -9027,7 +9028,7 @@
             <a:lstStyle/>
             <a:p>
               <a:pPr algn="ctr"/>
-              <a:endParaRPr lang="en-US"/>
+              <a:endParaRPr lang="en-US" dirty="0"/>
             </a:p>
           </p:txBody>
         </p:sp>
@@ -9443,6 +9444,1720 @@
 </file>
 
 <file path=ppt/slides/slide5.xml><?xml version="1.0" encoding="utf-8"?>
+<p:sld xmlns:a="http://schemas.openxmlformats.org/drawingml/2006/main" xmlns:r="http://schemas.openxmlformats.org/officeDocument/2006/relationships" xmlns:p="http://schemas.openxmlformats.org/presentationml/2006/main">
+  <p:cSld>
+    <p:spTree>
+      <p:nvGrpSpPr>
+        <p:cNvPr id="1" name=""/>
+        <p:cNvGrpSpPr/>
+        <p:nvPr/>
+      </p:nvGrpSpPr>
+      <p:grpSpPr>
+        <a:xfrm>
+          <a:off x="0" y="0"/>
+          <a:ext cx="0" cy="0"/>
+          <a:chOff x="0" y="0"/>
+          <a:chExt cx="0" cy="0"/>
+        </a:xfrm>
+      </p:grpSpPr>
+      <p:grpSp>
+        <p:nvGrpSpPr>
+          <p:cNvPr id="105" name="Group 104">
+            <a:extLst>
+              <a:ext uri="{FF2B5EF4-FFF2-40B4-BE49-F238E27FC236}">
+                <a16:creationId xmlns:a16="http://schemas.microsoft.com/office/drawing/2014/main" id="{7B98496F-2218-43C9-AD47-E570F766DA4C}"/>
+              </a:ext>
+            </a:extLst>
+          </p:cNvPr>
+          <p:cNvGrpSpPr/>
+          <p:nvPr/>
+        </p:nvGrpSpPr>
+        <p:grpSpPr>
+          <a:xfrm>
+            <a:off x="555898" y="743331"/>
+            <a:ext cx="8025059" cy="4548752"/>
+            <a:chOff x="555898" y="743331"/>
+            <a:chExt cx="8025059" cy="4548752"/>
+          </a:xfrm>
+        </p:grpSpPr>
+        <p:grpSp>
+          <p:nvGrpSpPr>
+            <p:cNvPr id="20" name="Group 19">
+              <a:extLst>
+                <a:ext uri="{FF2B5EF4-FFF2-40B4-BE49-F238E27FC236}">
+                  <a16:creationId xmlns:a16="http://schemas.microsoft.com/office/drawing/2014/main" id="{7241BC69-5D4F-4425-BD63-1FC2FB66291A}"/>
+                </a:ext>
+              </a:extLst>
+            </p:cNvPr>
+            <p:cNvGrpSpPr/>
+            <p:nvPr/>
+          </p:nvGrpSpPr>
+          <p:grpSpPr>
+            <a:xfrm>
+              <a:off x="555898" y="1237572"/>
+              <a:ext cx="3643288" cy="3952907"/>
+              <a:chOff x="555898" y="1237572"/>
+              <a:chExt cx="3643288" cy="3952907"/>
+            </a:xfrm>
+          </p:grpSpPr>
+          <p:sp>
+            <p:nvSpPr>
+              <p:cNvPr id="4" name="Freeform 6">
+                <a:extLst>
+                  <a:ext uri="{FF2B5EF4-FFF2-40B4-BE49-F238E27FC236}">
+                    <a16:creationId xmlns:a16="http://schemas.microsoft.com/office/drawing/2014/main" id="{57C7CB09-8C87-4DA8-BFE7-4720504CA68C}"/>
+                  </a:ext>
+                </a:extLst>
+              </p:cNvPr>
+              <p:cNvSpPr>
+                <a:spLocks/>
+              </p:cNvSpPr>
+              <p:nvPr/>
+            </p:nvSpPr>
+            <p:spPr bwMode="auto">
+              <a:xfrm>
+                <a:off x="838200" y="1447800"/>
+                <a:ext cx="2971800" cy="2971800"/>
+              </a:xfrm>
+              <a:custGeom>
+                <a:avLst/>
+                <a:gdLst/>
+                <a:ahLst/>
+                <a:cxnLst>
+                  <a:cxn ang="0">
+                    <a:pos x="0" y="0"/>
+                  </a:cxn>
+                  <a:cxn ang="0">
+                    <a:pos x="0" y="528"/>
+                  </a:cxn>
+                  <a:cxn ang="0">
+                    <a:pos x="3216" y="528"/>
+                  </a:cxn>
+                  <a:cxn ang="0">
+                    <a:pos x="3216" y="0"/>
+                  </a:cxn>
+                </a:cxnLst>
+                <a:rect l="0" t="0" r="r" b="b"/>
+                <a:pathLst>
+                  <a:path w="3216" h="528">
+                    <a:moveTo>
+                      <a:pt x="0" y="0"/>
+                    </a:moveTo>
+                    <a:lnTo>
+                      <a:pt x="0" y="528"/>
+                    </a:lnTo>
+                    <a:lnTo>
+                      <a:pt x="3216" y="528"/>
+                    </a:lnTo>
+                    <a:lnTo>
+                      <a:pt x="3216" y="0"/>
+                    </a:lnTo>
+                  </a:path>
+                </a:pathLst>
+              </a:custGeom>
+              <a:solidFill>
+                <a:schemeClr val="hlink"/>
+              </a:solidFill>
+              <a:ln w="57150" cap="flat" cmpd="sng">
+                <a:solidFill>
+                  <a:schemeClr val="tx1"/>
+                </a:solidFill>
+                <a:prstDash val="solid"/>
+                <a:round/>
+                <a:headEnd type="none" w="lg" len="med"/>
+                <a:tailEnd type="none" w="lg" len="med"/>
+              </a:ln>
+              <a:effectLst/>
+            </p:spPr>
+            <p:txBody>
+              <a:bodyPr wrap="square" anchor="ctr">
+                <a:spAutoFit/>
+              </a:bodyPr>
+              <a:lstStyle/>
+              <a:p>
+                <a:endParaRPr lang="en-US"/>
+              </a:p>
+            </p:txBody>
+          </p:sp>
+          <p:grpSp>
+            <p:nvGrpSpPr>
+              <p:cNvPr id="13" name="Group 12">
+                <a:extLst>
+                  <a:ext uri="{FF2B5EF4-FFF2-40B4-BE49-F238E27FC236}">
+                    <a16:creationId xmlns:a16="http://schemas.microsoft.com/office/drawing/2014/main" id="{EA9E03FD-BCAA-462D-A6C4-B19647011DF4}"/>
+                  </a:ext>
+                </a:extLst>
+              </p:cNvPr>
+              <p:cNvGrpSpPr/>
+              <p:nvPr/>
+            </p:nvGrpSpPr>
+            <p:grpSpPr>
+              <a:xfrm>
+                <a:off x="1100471" y="1237572"/>
+                <a:ext cx="482269" cy="420455"/>
+                <a:chOff x="4446109" y="2103464"/>
+                <a:chExt cx="482269" cy="420455"/>
+              </a:xfrm>
+            </p:grpSpPr>
+            <p:sp>
+              <p:nvSpPr>
+                <p:cNvPr id="14" name="AutoShape 174">
+                  <a:extLst>
+                    <a:ext uri="{FF2B5EF4-FFF2-40B4-BE49-F238E27FC236}">
+                      <a16:creationId xmlns:a16="http://schemas.microsoft.com/office/drawing/2014/main" id="{56EFD6BF-292F-40DF-B258-F43A90D892CB}"/>
+                    </a:ext>
+                  </a:extLst>
+                </p:cNvPr>
+                <p:cNvSpPr>
+                  <a:spLocks noChangeArrowheads="1"/>
+                </p:cNvSpPr>
+                <p:nvPr/>
+              </p:nvSpPr>
+              <p:spPr bwMode="auto">
+                <a:xfrm flipV="1">
+                  <a:off x="4506392" y="2103464"/>
+                  <a:ext cx="361702" cy="228043"/>
+                </a:xfrm>
+                <a:prstGeom prst="triangle">
+                  <a:avLst>
+                    <a:gd name="adj" fmla="val 50000"/>
+                  </a:avLst>
+                </a:prstGeom>
+                <a:noFill/>
+                <a:ln w="12700">
+                  <a:solidFill>
+                    <a:schemeClr val="tx1"/>
+                  </a:solidFill>
+                  <a:miter lim="800000"/>
+                  <a:headEnd type="none" w="lg" len="med"/>
+                  <a:tailEnd type="none" w="lg" len="med"/>
+                </a:ln>
+                <a:effectLst/>
+              </p:spPr>
+              <p:txBody>
+                <a:bodyPr anchor="ctr">
+                  <a:spAutoFit/>
+                </a:bodyPr>
+                <a:lstStyle/>
+                <a:p>
+                  <a:endParaRPr lang="en-US" dirty="0"/>
+                </a:p>
+              </p:txBody>
+            </p:sp>
+            <p:sp>
+              <p:nvSpPr>
+                <p:cNvPr id="15" name="Line 175">
+                  <a:extLst>
+                    <a:ext uri="{FF2B5EF4-FFF2-40B4-BE49-F238E27FC236}">
+                      <a16:creationId xmlns:a16="http://schemas.microsoft.com/office/drawing/2014/main" id="{D3B90883-7651-4669-9F16-25B26B0C4AB5}"/>
+                    </a:ext>
+                  </a:extLst>
+                </p:cNvPr>
+                <p:cNvSpPr>
+                  <a:spLocks noChangeShapeType="1"/>
+                </p:cNvSpPr>
+                <p:nvPr/>
+              </p:nvSpPr>
+              <p:spPr bwMode="auto">
+                <a:xfrm>
+                  <a:off x="4446109" y="2395643"/>
+                  <a:ext cx="482269" cy="0"/>
+                </a:xfrm>
+                <a:prstGeom prst="line">
+                  <a:avLst/>
+                </a:prstGeom>
+                <a:noFill/>
+                <a:ln w="12700">
+                  <a:solidFill>
+                    <a:schemeClr val="tx1"/>
+                  </a:solidFill>
+                  <a:round/>
+                  <a:headEnd type="none" w="lg" len="med"/>
+                  <a:tailEnd type="none" w="lg" len="med"/>
+                </a:ln>
+                <a:effectLst/>
+              </p:spPr>
+              <p:txBody>
+                <a:bodyPr anchor="ctr">
+                  <a:spAutoFit/>
+                </a:bodyPr>
+                <a:lstStyle/>
+                <a:p>
+                  <a:endParaRPr lang="en-US"/>
+                </a:p>
+              </p:txBody>
+            </p:sp>
+            <p:sp>
+              <p:nvSpPr>
+                <p:cNvPr id="16" name="Line 176">
+                  <a:extLst>
+                    <a:ext uri="{FF2B5EF4-FFF2-40B4-BE49-F238E27FC236}">
+                      <a16:creationId xmlns:a16="http://schemas.microsoft.com/office/drawing/2014/main" id="{01FA9449-E78B-4BF7-B218-7190FC3DED7C}"/>
+                    </a:ext>
+                  </a:extLst>
+                </p:cNvPr>
+                <p:cNvSpPr>
+                  <a:spLocks noChangeShapeType="1"/>
+                </p:cNvSpPr>
+                <p:nvPr/>
+              </p:nvSpPr>
+              <p:spPr bwMode="auto">
+                <a:xfrm>
+                  <a:off x="4506392" y="2459782"/>
+                  <a:ext cx="361702" cy="0"/>
+                </a:xfrm>
+                <a:prstGeom prst="line">
+                  <a:avLst/>
+                </a:prstGeom>
+                <a:noFill/>
+                <a:ln w="12700">
+                  <a:solidFill>
+                    <a:schemeClr val="tx1"/>
+                  </a:solidFill>
+                  <a:round/>
+                  <a:headEnd type="none" w="lg" len="med"/>
+                  <a:tailEnd type="none" w="lg" len="med"/>
+                </a:ln>
+                <a:effectLst/>
+              </p:spPr>
+              <p:txBody>
+                <a:bodyPr anchor="ctr">
+                  <a:spAutoFit/>
+                </a:bodyPr>
+                <a:lstStyle/>
+                <a:p>
+                  <a:endParaRPr lang="en-US"/>
+                </a:p>
+              </p:txBody>
+            </p:sp>
+            <p:sp>
+              <p:nvSpPr>
+                <p:cNvPr id="17" name="Line 177">
+                  <a:extLst>
+                    <a:ext uri="{FF2B5EF4-FFF2-40B4-BE49-F238E27FC236}">
+                      <a16:creationId xmlns:a16="http://schemas.microsoft.com/office/drawing/2014/main" id="{BE0340DA-996F-4A74-B664-787686F309E6}"/>
+                    </a:ext>
+                  </a:extLst>
+                </p:cNvPr>
+                <p:cNvSpPr>
+                  <a:spLocks noChangeShapeType="1"/>
+                </p:cNvSpPr>
+                <p:nvPr/>
+              </p:nvSpPr>
+              <p:spPr bwMode="auto">
+                <a:xfrm>
+                  <a:off x="4576723" y="2523919"/>
+                  <a:ext cx="218529" cy="0"/>
+                </a:xfrm>
+                <a:prstGeom prst="line">
+                  <a:avLst/>
+                </a:prstGeom>
+                <a:noFill/>
+                <a:ln w="12700">
+                  <a:solidFill>
+                    <a:schemeClr val="tx1"/>
+                  </a:solidFill>
+                  <a:round/>
+                  <a:headEnd type="none" w="lg" len="med"/>
+                  <a:tailEnd type="none" w="lg" len="med"/>
+                </a:ln>
+                <a:effectLst/>
+              </p:spPr>
+              <p:txBody>
+                <a:bodyPr anchor="ctr">
+                  <a:spAutoFit/>
+                </a:bodyPr>
+                <a:lstStyle/>
+                <a:p>
+                  <a:endParaRPr lang="en-US"/>
+                </a:p>
+              </p:txBody>
+            </p:sp>
+          </p:grpSp>
+          <p:sp>
+            <p:nvSpPr>
+              <p:cNvPr id="73" name="Freeform: Shape 72">
+                <a:extLst>
+                  <a:ext uri="{FF2B5EF4-FFF2-40B4-BE49-F238E27FC236}">
+                    <a16:creationId xmlns:a16="http://schemas.microsoft.com/office/drawing/2014/main" id="{FDB7BD84-8132-4086-957B-E575587CE082}"/>
+                  </a:ext>
+                </a:extLst>
+              </p:cNvPr>
+              <p:cNvSpPr/>
+              <p:nvPr/>
+            </p:nvSpPr>
+            <p:spPr>
+              <a:xfrm rot="10800000">
+                <a:off x="2202943" y="4857704"/>
+                <a:ext cx="337768" cy="332771"/>
+              </a:xfrm>
+              <a:custGeom>
+                <a:avLst/>
+                <a:gdLst>
+                  <a:gd name="connsiteX0" fmla="*/ 0 w 1607820"/>
+                  <a:gd name="connsiteY0" fmla="*/ 0 h 1651977"/>
+                  <a:gd name="connsiteX1" fmla="*/ 1607820 w 1607820"/>
+                  <a:gd name="connsiteY1" fmla="*/ 1651977 h 1651977"/>
+                  <a:gd name="connsiteX2" fmla="*/ 0 w 1607820"/>
+                  <a:gd name="connsiteY2" fmla="*/ 1651977 h 1651977"/>
+                </a:gdLst>
+                <a:ahLst/>
+                <a:cxnLst>
+                  <a:cxn ang="0">
+                    <a:pos x="connsiteX0" y="connsiteY0"/>
+                  </a:cxn>
+                  <a:cxn ang="0">
+                    <a:pos x="connsiteX1" y="connsiteY1"/>
+                  </a:cxn>
+                  <a:cxn ang="0">
+                    <a:pos x="connsiteX2" y="connsiteY2"/>
+                  </a:cxn>
+                </a:cxnLst>
+                <a:rect l="l" t="t" r="r" b="b"/>
+                <a:pathLst>
+                  <a:path w="1607820" h="1651977">
+                    <a:moveTo>
+                      <a:pt x="0" y="0"/>
+                    </a:moveTo>
+                    <a:cubicBezTo>
+                      <a:pt x="887974" y="0"/>
+                      <a:pt x="1607820" y="739615"/>
+                      <a:pt x="1607820" y="1651977"/>
+                    </a:cubicBezTo>
+                    <a:lnTo>
+                      <a:pt x="0" y="1651977"/>
+                    </a:lnTo>
+                    <a:close/>
+                  </a:path>
+                </a:pathLst>
+              </a:custGeom>
+              <a:solidFill>
+                <a:srgbClr val="0563C1"/>
+              </a:solidFill>
+              <a:ln w="57150">
+                <a:solidFill>
+                  <a:schemeClr val="tx1"/>
+                </a:solidFill>
+              </a:ln>
+            </p:spPr>
+            <p:style>
+              <a:lnRef idx="2">
+                <a:schemeClr val="accent1">
+                  <a:shade val="50000"/>
+                </a:schemeClr>
+              </a:lnRef>
+              <a:fillRef idx="1">
+                <a:schemeClr val="accent1"/>
+              </a:fillRef>
+              <a:effectRef idx="0">
+                <a:schemeClr val="accent1"/>
+              </a:effectRef>
+              <a:fontRef idx="minor">
+                <a:schemeClr val="lt1"/>
+              </a:fontRef>
+            </p:style>
+            <p:txBody>
+              <a:bodyPr rtlCol="0" anchor="ctr"/>
+              <a:lstStyle/>
+              <a:p>
+                <a:pPr algn="ctr"/>
+                <a:endParaRPr lang="en-US" dirty="0"/>
+              </a:p>
+            </p:txBody>
+          </p:sp>
+          <p:sp>
+            <p:nvSpPr>
+              <p:cNvPr id="81" name="Freeform 6">
+                <a:extLst>
+                  <a:ext uri="{FF2B5EF4-FFF2-40B4-BE49-F238E27FC236}">
+                    <a16:creationId xmlns:a16="http://schemas.microsoft.com/office/drawing/2014/main" id="{7B751F98-52F3-4976-A046-ECC629A487C1}"/>
+                  </a:ext>
+                </a:extLst>
+              </p:cNvPr>
+              <p:cNvSpPr>
+                <a:spLocks/>
+              </p:cNvSpPr>
+              <p:nvPr/>
+            </p:nvSpPr>
+            <p:spPr bwMode="auto">
+              <a:xfrm rot="10800000">
+                <a:off x="2202945" y="4100496"/>
+                <a:ext cx="337765" cy="805524"/>
+              </a:xfrm>
+              <a:custGeom>
+                <a:avLst/>
+                <a:gdLst/>
+                <a:ahLst/>
+                <a:cxnLst>
+                  <a:cxn ang="0">
+                    <a:pos x="0" y="0"/>
+                  </a:cxn>
+                  <a:cxn ang="0">
+                    <a:pos x="0" y="528"/>
+                  </a:cxn>
+                  <a:cxn ang="0">
+                    <a:pos x="3216" y="528"/>
+                  </a:cxn>
+                  <a:cxn ang="0">
+                    <a:pos x="3216" y="0"/>
+                  </a:cxn>
+                </a:cxnLst>
+                <a:rect l="0" t="0" r="r" b="b"/>
+                <a:pathLst>
+                  <a:path w="3216" h="528">
+                    <a:moveTo>
+                      <a:pt x="0" y="0"/>
+                    </a:moveTo>
+                    <a:lnTo>
+                      <a:pt x="0" y="528"/>
+                    </a:lnTo>
+                    <a:lnTo>
+                      <a:pt x="3216" y="528"/>
+                    </a:lnTo>
+                    <a:lnTo>
+                      <a:pt x="3216" y="0"/>
+                    </a:lnTo>
+                  </a:path>
+                </a:pathLst>
+              </a:custGeom>
+              <a:solidFill>
+                <a:schemeClr val="hlink"/>
+              </a:solidFill>
+              <a:ln w="57150" cap="flat" cmpd="sng">
+                <a:solidFill>
+                  <a:schemeClr val="tx1"/>
+                </a:solidFill>
+                <a:prstDash val="solid"/>
+                <a:round/>
+                <a:headEnd type="none" w="lg" len="med"/>
+                <a:tailEnd type="none" w="lg" len="med"/>
+              </a:ln>
+              <a:effectLst/>
+            </p:spPr>
+            <p:txBody>
+              <a:bodyPr wrap="square" anchor="ctr">
+                <a:noAutofit/>
+              </a:bodyPr>
+              <a:lstStyle/>
+              <a:p>
+                <a:endParaRPr lang="en-US" dirty="0"/>
+              </a:p>
+            </p:txBody>
+          </p:sp>
+          <p:sp>
+            <p:nvSpPr>
+              <p:cNvPr id="82" name="Freeform 6">
+                <a:extLst>
+                  <a:ext uri="{FF2B5EF4-FFF2-40B4-BE49-F238E27FC236}">
+                    <a16:creationId xmlns:a16="http://schemas.microsoft.com/office/drawing/2014/main" id="{9A71CA6B-FF7B-493E-98E3-C91CEFB37913}"/>
+                  </a:ext>
+                </a:extLst>
+              </p:cNvPr>
+              <p:cNvSpPr>
+                <a:spLocks/>
+              </p:cNvSpPr>
+              <p:nvPr/>
+            </p:nvSpPr>
+            <p:spPr bwMode="auto">
+              <a:xfrm rot="16200000">
+                <a:off x="2874558" y="4486679"/>
+                <a:ext cx="337765" cy="1069835"/>
+              </a:xfrm>
+              <a:custGeom>
+                <a:avLst/>
+                <a:gdLst/>
+                <a:ahLst/>
+                <a:cxnLst>
+                  <a:cxn ang="0">
+                    <a:pos x="0" y="0"/>
+                  </a:cxn>
+                  <a:cxn ang="0">
+                    <a:pos x="0" y="528"/>
+                  </a:cxn>
+                  <a:cxn ang="0">
+                    <a:pos x="3216" y="528"/>
+                  </a:cxn>
+                  <a:cxn ang="0">
+                    <a:pos x="3216" y="0"/>
+                  </a:cxn>
+                </a:cxnLst>
+                <a:rect l="0" t="0" r="r" b="b"/>
+                <a:pathLst>
+                  <a:path w="3216" h="528">
+                    <a:moveTo>
+                      <a:pt x="0" y="0"/>
+                    </a:moveTo>
+                    <a:lnTo>
+                      <a:pt x="0" y="528"/>
+                    </a:lnTo>
+                    <a:lnTo>
+                      <a:pt x="3216" y="528"/>
+                    </a:lnTo>
+                    <a:lnTo>
+                      <a:pt x="3216" y="0"/>
+                    </a:lnTo>
+                  </a:path>
+                </a:pathLst>
+              </a:custGeom>
+              <a:solidFill>
+                <a:schemeClr val="hlink"/>
+              </a:solidFill>
+              <a:ln w="57150" cap="flat" cmpd="sng">
+                <a:solidFill>
+                  <a:schemeClr val="tx1"/>
+                </a:solidFill>
+                <a:prstDash val="solid"/>
+                <a:round/>
+                <a:headEnd type="none" w="lg" len="med"/>
+                <a:tailEnd type="none" w="lg" len="med"/>
+              </a:ln>
+              <a:effectLst/>
+            </p:spPr>
+            <p:txBody>
+              <a:bodyPr wrap="square" anchor="ctr">
+                <a:spAutoFit/>
+              </a:bodyPr>
+              <a:lstStyle/>
+              <a:p>
+                <a:endParaRPr lang="en-US"/>
+              </a:p>
+            </p:txBody>
+          </p:sp>
+          <p:sp>
+            <p:nvSpPr>
+              <p:cNvPr id="83" name="Freeform 6">
+                <a:extLst>
+                  <a:ext uri="{FF2B5EF4-FFF2-40B4-BE49-F238E27FC236}">
+                    <a16:creationId xmlns:a16="http://schemas.microsoft.com/office/drawing/2014/main" id="{F32E82B1-F14B-4EDA-8218-D6B73A05EEBF}"/>
+                  </a:ext>
+                </a:extLst>
+              </p:cNvPr>
+              <p:cNvSpPr>
+                <a:spLocks/>
+              </p:cNvSpPr>
+              <p:nvPr/>
+            </p:nvSpPr>
+            <p:spPr bwMode="auto">
+              <a:xfrm>
+                <a:off x="2233428" y="4021455"/>
+                <a:ext cx="289901" cy="864870"/>
+              </a:xfrm>
+              <a:custGeom>
+                <a:avLst/>
+                <a:gdLst/>
+                <a:ahLst/>
+                <a:cxnLst>
+                  <a:cxn ang="0">
+                    <a:pos x="0" y="0"/>
+                  </a:cxn>
+                  <a:cxn ang="0">
+                    <a:pos x="0" y="528"/>
+                  </a:cxn>
+                  <a:cxn ang="0">
+                    <a:pos x="3216" y="528"/>
+                  </a:cxn>
+                  <a:cxn ang="0">
+                    <a:pos x="3216" y="0"/>
+                  </a:cxn>
+                </a:cxnLst>
+                <a:rect l="0" t="0" r="r" b="b"/>
+                <a:pathLst>
+                  <a:path w="3216" h="528">
+                    <a:moveTo>
+                      <a:pt x="0" y="0"/>
+                    </a:moveTo>
+                    <a:lnTo>
+                      <a:pt x="0" y="528"/>
+                    </a:lnTo>
+                    <a:lnTo>
+                      <a:pt x="3216" y="528"/>
+                    </a:lnTo>
+                    <a:lnTo>
+                      <a:pt x="3216" y="0"/>
+                    </a:lnTo>
+                  </a:path>
+                </a:pathLst>
+              </a:custGeom>
+              <a:solidFill>
+                <a:schemeClr val="hlink"/>
+              </a:solidFill>
+              <a:ln w="57150" cap="flat" cmpd="sng">
+                <a:noFill/>
+                <a:prstDash val="solid"/>
+                <a:round/>
+                <a:headEnd type="none" w="lg" len="med"/>
+                <a:tailEnd type="none" w="lg" len="med"/>
+              </a:ln>
+              <a:effectLst/>
+            </p:spPr>
+            <p:txBody>
+              <a:bodyPr wrap="square" anchor="ctr">
+                <a:noAutofit/>
+              </a:bodyPr>
+              <a:lstStyle/>
+              <a:p>
+                <a:endParaRPr lang="en-US" dirty="0"/>
+              </a:p>
+            </p:txBody>
+          </p:sp>
+          <p:sp>
+            <p:nvSpPr>
+              <p:cNvPr id="12" name="Arc 11">
+                <a:extLst>
+                  <a:ext uri="{FF2B5EF4-FFF2-40B4-BE49-F238E27FC236}">
+                    <a16:creationId xmlns:a16="http://schemas.microsoft.com/office/drawing/2014/main" id="{C6451BFB-CAA6-456A-8990-C897C6436C7F}"/>
+                  </a:ext>
+                </a:extLst>
+              </p:cNvPr>
+              <p:cNvSpPr/>
+              <p:nvPr/>
+            </p:nvSpPr>
+            <p:spPr>
+              <a:xfrm flipH="1">
+                <a:off x="2443538" y="3669480"/>
+                <a:ext cx="1755648" cy="1163421"/>
+              </a:xfrm>
+              <a:prstGeom prst="arc">
+                <a:avLst/>
+              </a:prstGeom>
+              <a:ln w="38100">
+                <a:solidFill>
+                  <a:schemeClr val="tx1"/>
+                </a:solidFill>
+                <a:headEnd type="none"/>
+                <a:tailEnd type="triangle"/>
+              </a:ln>
+            </p:spPr>
+            <p:style>
+              <a:lnRef idx="1">
+                <a:schemeClr val="accent1"/>
+              </a:lnRef>
+              <a:fillRef idx="0">
+                <a:schemeClr val="accent1"/>
+              </a:fillRef>
+              <a:effectRef idx="0">
+                <a:schemeClr val="accent1"/>
+              </a:effectRef>
+              <a:fontRef idx="minor">
+                <a:schemeClr val="tx1"/>
+              </a:fontRef>
+            </p:style>
+            <p:txBody>
+              <a:bodyPr rtlCol="0" anchor="ctr"/>
+              <a:lstStyle/>
+              <a:p>
+                <a:pPr algn="ctr"/>
+                <a:endParaRPr lang="en-US"/>
+              </a:p>
+            </p:txBody>
+          </p:sp>
+          <p:sp>
+            <p:nvSpPr>
+              <p:cNvPr id="84" name="Arc 83">
+                <a:extLst>
+                  <a:ext uri="{FF2B5EF4-FFF2-40B4-BE49-F238E27FC236}">
+                    <a16:creationId xmlns:a16="http://schemas.microsoft.com/office/drawing/2014/main" id="{71DF734D-5A0F-4A39-80B0-153C18B99726}"/>
+                  </a:ext>
+                </a:extLst>
+              </p:cNvPr>
+              <p:cNvSpPr/>
+              <p:nvPr/>
+            </p:nvSpPr>
+            <p:spPr>
+              <a:xfrm>
+                <a:off x="555898" y="3665999"/>
+                <a:ext cx="1750978" cy="1163421"/>
+              </a:xfrm>
+              <a:prstGeom prst="arc">
+                <a:avLst/>
+              </a:prstGeom>
+              <a:ln w="38100">
+                <a:solidFill>
+                  <a:schemeClr val="tx1"/>
+                </a:solidFill>
+                <a:headEnd type="none"/>
+                <a:tailEnd type="triangle"/>
+              </a:ln>
+            </p:spPr>
+            <p:style>
+              <a:lnRef idx="1">
+                <a:schemeClr val="accent1"/>
+              </a:lnRef>
+              <a:fillRef idx="0">
+                <a:schemeClr val="accent1"/>
+              </a:fillRef>
+              <a:effectRef idx="0">
+                <a:schemeClr val="accent1"/>
+              </a:effectRef>
+              <a:fontRef idx="minor">
+                <a:schemeClr val="tx1"/>
+              </a:fontRef>
+            </p:style>
+            <p:txBody>
+              <a:bodyPr rtlCol="0" anchor="ctr"/>
+              <a:lstStyle/>
+              <a:p>
+                <a:pPr algn="ctr"/>
+                <a:endParaRPr lang="en-US"/>
+              </a:p>
+            </p:txBody>
+          </p:sp>
+        </p:grpSp>
+        <p:grpSp>
+          <p:nvGrpSpPr>
+            <p:cNvPr id="85" name="Group 84">
+              <a:extLst>
+                <a:ext uri="{FF2B5EF4-FFF2-40B4-BE49-F238E27FC236}">
+                  <a16:creationId xmlns:a16="http://schemas.microsoft.com/office/drawing/2014/main" id="{D06EF90B-2C25-4D69-9449-019C0BD35A85}"/>
+                </a:ext>
+              </a:extLst>
+            </p:cNvPr>
+            <p:cNvGrpSpPr/>
+            <p:nvPr/>
+          </p:nvGrpSpPr>
+          <p:grpSpPr>
+            <a:xfrm>
+              <a:off x="5025246" y="1237572"/>
+              <a:ext cx="2971800" cy="3952907"/>
+              <a:chOff x="838200" y="1237572"/>
+              <a:chExt cx="2971800" cy="3952907"/>
+            </a:xfrm>
+          </p:grpSpPr>
+          <p:sp>
+            <p:nvSpPr>
+              <p:cNvPr id="86" name="Freeform 6">
+                <a:extLst>
+                  <a:ext uri="{FF2B5EF4-FFF2-40B4-BE49-F238E27FC236}">
+                    <a16:creationId xmlns:a16="http://schemas.microsoft.com/office/drawing/2014/main" id="{63CD7D0A-761A-4A7E-B4F4-46AE9D6A5FE1}"/>
+                  </a:ext>
+                </a:extLst>
+              </p:cNvPr>
+              <p:cNvSpPr>
+                <a:spLocks/>
+              </p:cNvSpPr>
+              <p:nvPr/>
+            </p:nvSpPr>
+            <p:spPr bwMode="auto">
+              <a:xfrm>
+                <a:off x="838200" y="1447800"/>
+                <a:ext cx="2971800" cy="2971800"/>
+              </a:xfrm>
+              <a:custGeom>
+                <a:avLst/>
+                <a:gdLst/>
+                <a:ahLst/>
+                <a:cxnLst>
+                  <a:cxn ang="0">
+                    <a:pos x="0" y="0"/>
+                  </a:cxn>
+                  <a:cxn ang="0">
+                    <a:pos x="0" y="528"/>
+                  </a:cxn>
+                  <a:cxn ang="0">
+                    <a:pos x="3216" y="528"/>
+                  </a:cxn>
+                  <a:cxn ang="0">
+                    <a:pos x="3216" y="0"/>
+                  </a:cxn>
+                </a:cxnLst>
+                <a:rect l="0" t="0" r="r" b="b"/>
+                <a:pathLst>
+                  <a:path w="3216" h="528">
+                    <a:moveTo>
+                      <a:pt x="0" y="0"/>
+                    </a:moveTo>
+                    <a:lnTo>
+                      <a:pt x="0" y="528"/>
+                    </a:lnTo>
+                    <a:lnTo>
+                      <a:pt x="3216" y="528"/>
+                    </a:lnTo>
+                    <a:lnTo>
+                      <a:pt x="3216" y="0"/>
+                    </a:lnTo>
+                  </a:path>
+                </a:pathLst>
+              </a:custGeom>
+              <a:solidFill>
+                <a:schemeClr val="hlink"/>
+              </a:solidFill>
+              <a:ln w="57150" cap="flat" cmpd="sng">
+                <a:solidFill>
+                  <a:schemeClr val="tx1"/>
+                </a:solidFill>
+                <a:prstDash val="solid"/>
+                <a:round/>
+                <a:headEnd type="none" w="lg" len="med"/>
+                <a:tailEnd type="none" w="lg" len="med"/>
+              </a:ln>
+              <a:effectLst/>
+            </p:spPr>
+            <p:txBody>
+              <a:bodyPr wrap="square" anchor="ctr">
+                <a:spAutoFit/>
+              </a:bodyPr>
+              <a:lstStyle/>
+              <a:p>
+                <a:endParaRPr lang="en-US"/>
+              </a:p>
+            </p:txBody>
+          </p:sp>
+          <p:grpSp>
+            <p:nvGrpSpPr>
+              <p:cNvPr id="87" name="Group 86">
+                <a:extLst>
+                  <a:ext uri="{FF2B5EF4-FFF2-40B4-BE49-F238E27FC236}">
+                    <a16:creationId xmlns:a16="http://schemas.microsoft.com/office/drawing/2014/main" id="{929B1060-9895-4E6D-9B2F-6D401D0AEFEF}"/>
+                  </a:ext>
+                </a:extLst>
+              </p:cNvPr>
+              <p:cNvGrpSpPr/>
+              <p:nvPr/>
+            </p:nvGrpSpPr>
+            <p:grpSpPr>
+              <a:xfrm>
+                <a:off x="1100471" y="1237572"/>
+                <a:ext cx="482269" cy="420455"/>
+                <a:chOff x="4446109" y="2103464"/>
+                <a:chExt cx="482269" cy="420455"/>
+              </a:xfrm>
+            </p:grpSpPr>
+            <p:sp>
+              <p:nvSpPr>
+                <p:cNvPr id="94" name="AutoShape 174">
+                  <a:extLst>
+                    <a:ext uri="{FF2B5EF4-FFF2-40B4-BE49-F238E27FC236}">
+                      <a16:creationId xmlns:a16="http://schemas.microsoft.com/office/drawing/2014/main" id="{23FB582D-21B0-4157-A485-1456DC2A6345}"/>
+                    </a:ext>
+                  </a:extLst>
+                </p:cNvPr>
+                <p:cNvSpPr>
+                  <a:spLocks noChangeArrowheads="1"/>
+                </p:cNvSpPr>
+                <p:nvPr/>
+              </p:nvSpPr>
+              <p:spPr bwMode="auto">
+                <a:xfrm flipV="1">
+                  <a:off x="4506392" y="2103464"/>
+                  <a:ext cx="361702" cy="228043"/>
+                </a:xfrm>
+                <a:prstGeom prst="triangle">
+                  <a:avLst>
+                    <a:gd name="adj" fmla="val 50000"/>
+                  </a:avLst>
+                </a:prstGeom>
+                <a:noFill/>
+                <a:ln w="12700">
+                  <a:solidFill>
+                    <a:schemeClr val="tx1"/>
+                  </a:solidFill>
+                  <a:miter lim="800000"/>
+                  <a:headEnd type="none" w="lg" len="med"/>
+                  <a:tailEnd type="none" w="lg" len="med"/>
+                </a:ln>
+                <a:effectLst/>
+              </p:spPr>
+              <p:txBody>
+                <a:bodyPr anchor="ctr">
+                  <a:spAutoFit/>
+                </a:bodyPr>
+                <a:lstStyle/>
+                <a:p>
+                  <a:endParaRPr lang="en-US" dirty="0"/>
+                </a:p>
+              </p:txBody>
+            </p:sp>
+            <p:sp>
+              <p:nvSpPr>
+                <p:cNvPr id="95" name="Line 175">
+                  <a:extLst>
+                    <a:ext uri="{FF2B5EF4-FFF2-40B4-BE49-F238E27FC236}">
+                      <a16:creationId xmlns:a16="http://schemas.microsoft.com/office/drawing/2014/main" id="{7A1233CF-8AA0-49F0-85DA-2679D0A9C660}"/>
+                    </a:ext>
+                  </a:extLst>
+                </p:cNvPr>
+                <p:cNvSpPr>
+                  <a:spLocks noChangeShapeType="1"/>
+                </p:cNvSpPr>
+                <p:nvPr/>
+              </p:nvSpPr>
+              <p:spPr bwMode="auto">
+                <a:xfrm>
+                  <a:off x="4446109" y="2395643"/>
+                  <a:ext cx="482269" cy="0"/>
+                </a:xfrm>
+                <a:prstGeom prst="line">
+                  <a:avLst/>
+                </a:prstGeom>
+                <a:noFill/>
+                <a:ln w="12700">
+                  <a:solidFill>
+                    <a:schemeClr val="tx1"/>
+                  </a:solidFill>
+                  <a:round/>
+                  <a:headEnd type="none" w="lg" len="med"/>
+                  <a:tailEnd type="none" w="lg" len="med"/>
+                </a:ln>
+                <a:effectLst/>
+              </p:spPr>
+              <p:txBody>
+                <a:bodyPr anchor="ctr">
+                  <a:spAutoFit/>
+                </a:bodyPr>
+                <a:lstStyle/>
+                <a:p>
+                  <a:endParaRPr lang="en-US"/>
+                </a:p>
+              </p:txBody>
+            </p:sp>
+            <p:sp>
+              <p:nvSpPr>
+                <p:cNvPr id="96" name="Line 176">
+                  <a:extLst>
+                    <a:ext uri="{FF2B5EF4-FFF2-40B4-BE49-F238E27FC236}">
+                      <a16:creationId xmlns:a16="http://schemas.microsoft.com/office/drawing/2014/main" id="{59CAEBE5-A3F1-4203-AF84-96C94A0323FD}"/>
+                    </a:ext>
+                  </a:extLst>
+                </p:cNvPr>
+                <p:cNvSpPr>
+                  <a:spLocks noChangeShapeType="1"/>
+                </p:cNvSpPr>
+                <p:nvPr/>
+              </p:nvSpPr>
+              <p:spPr bwMode="auto">
+                <a:xfrm>
+                  <a:off x="4506392" y="2459782"/>
+                  <a:ext cx="361702" cy="0"/>
+                </a:xfrm>
+                <a:prstGeom prst="line">
+                  <a:avLst/>
+                </a:prstGeom>
+                <a:noFill/>
+                <a:ln w="12700">
+                  <a:solidFill>
+                    <a:schemeClr val="tx1"/>
+                  </a:solidFill>
+                  <a:round/>
+                  <a:headEnd type="none" w="lg" len="med"/>
+                  <a:tailEnd type="none" w="lg" len="med"/>
+                </a:ln>
+                <a:effectLst/>
+              </p:spPr>
+              <p:txBody>
+                <a:bodyPr anchor="ctr">
+                  <a:spAutoFit/>
+                </a:bodyPr>
+                <a:lstStyle/>
+                <a:p>
+                  <a:endParaRPr lang="en-US"/>
+                </a:p>
+              </p:txBody>
+            </p:sp>
+            <p:sp>
+              <p:nvSpPr>
+                <p:cNvPr id="97" name="Line 177">
+                  <a:extLst>
+                    <a:ext uri="{FF2B5EF4-FFF2-40B4-BE49-F238E27FC236}">
+                      <a16:creationId xmlns:a16="http://schemas.microsoft.com/office/drawing/2014/main" id="{8EA50985-6C5E-4008-9BD0-16FB1E983D3C}"/>
+                    </a:ext>
+                  </a:extLst>
+                </p:cNvPr>
+                <p:cNvSpPr>
+                  <a:spLocks noChangeShapeType="1"/>
+                </p:cNvSpPr>
+                <p:nvPr/>
+              </p:nvSpPr>
+              <p:spPr bwMode="auto">
+                <a:xfrm>
+                  <a:off x="4576723" y="2523919"/>
+                  <a:ext cx="218529" cy="0"/>
+                </a:xfrm>
+                <a:prstGeom prst="line">
+                  <a:avLst/>
+                </a:prstGeom>
+                <a:noFill/>
+                <a:ln w="12700">
+                  <a:solidFill>
+                    <a:schemeClr val="tx1"/>
+                  </a:solidFill>
+                  <a:round/>
+                  <a:headEnd type="none" w="lg" len="med"/>
+                  <a:tailEnd type="none" w="lg" len="med"/>
+                </a:ln>
+                <a:effectLst/>
+              </p:spPr>
+              <p:txBody>
+                <a:bodyPr anchor="ctr">
+                  <a:spAutoFit/>
+                </a:bodyPr>
+                <a:lstStyle/>
+                <a:p>
+                  <a:endParaRPr lang="en-US"/>
+                </a:p>
+              </p:txBody>
+            </p:sp>
+          </p:grpSp>
+          <p:sp>
+            <p:nvSpPr>
+              <p:cNvPr id="88" name="Freeform: Shape 87">
+                <a:extLst>
+                  <a:ext uri="{FF2B5EF4-FFF2-40B4-BE49-F238E27FC236}">
+                    <a16:creationId xmlns:a16="http://schemas.microsoft.com/office/drawing/2014/main" id="{72A777ED-A07D-4B34-87F5-D5B53E8C675E}"/>
+                  </a:ext>
+                </a:extLst>
+              </p:cNvPr>
+              <p:cNvSpPr/>
+              <p:nvPr/>
+            </p:nvSpPr>
+            <p:spPr>
+              <a:xfrm rot="10800000">
+                <a:off x="2202943" y="4857704"/>
+                <a:ext cx="337768" cy="332771"/>
+              </a:xfrm>
+              <a:custGeom>
+                <a:avLst/>
+                <a:gdLst>
+                  <a:gd name="connsiteX0" fmla="*/ 0 w 1607820"/>
+                  <a:gd name="connsiteY0" fmla="*/ 0 h 1651977"/>
+                  <a:gd name="connsiteX1" fmla="*/ 1607820 w 1607820"/>
+                  <a:gd name="connsiteY1" fmla="*/ 1651977 h 1651977"/>
+                  <a:gd name="connsiteX2" fmla="*/ 0 w 1607820"/>
+                  <a:gd name="connsiteY2" fmla="*/ 1651977 h 1651977"/>
+                </a:gdLst>
+                <a:ahLst/>
+                <a:cxnLst>
+                  <a:cxn ang="0">
+                    <a:pos x="connsiteX0" y="connsiteY0"/>
+                  </a:cxn>
+                  <a:cxn ang="0">
+                    <a:pos x="connsiteX1" y="connsiteY1"/>
+                  </a:cxn>
+                  <a:cxn ang="0">
+                    <a:pos x="connsiteX2" y="connsiteY2"/>
+                  </a:cxn>
+                </a:cxnLst>
+                <a:rect l="l" t="t" r="r" b="b"/>
+                <a:pathLst>
+                  <a:path w="1607820" h="1651977">
+                    <a:moveTo>
+                      <a:pt x="0" y="0"/>
+                    </a:moveTo>
+                    <a:cubicBezTo>
+                      <a:pt x="887974" y="0"/>
+                      <a:pt x="1607820" y="739615"/>
+                      <a:pt x="1607820" y="1651977"/>
+                    </a:cubicBezTo>
+                    <a:lnTo>
+                      <a:pt x="0" y="1651977"/>
+                    </a:lnTo>
+                    <a:close/>
+                  </a:path>
+                </a:pathLst>
+              </a:custGeom>
+              <a:solidFill>
+                <a:schemeClr val="bg1"/>
+              </a:solidFill>
+              <a:ln w="57150">
+                <a:solidFill>
+                  <a:schemeClr val="tx1"/>
+                </a:solidFill>
+              </a:ln>
+            </p:spPr>
+            <p:style>
+              <a:lnRef idx="2">
+                <a:schemeClr val="accent1">
+                  <a:shade val="50000"/>
+                </a:schemeClr>
+              </a:lnRef>
+              <a:fillRef idx="1">
+                <a:schemeClr val="accent1"/>
+              </a:fillRef>
+              <a:effectRef idx="0">
+                <a:schemeClr val="accent1"/>
+              </a:effectRef>
+              <a:fontRef idx="minor">
+                <a:schemeClr val="lt1"/>
+              </a:fontRef>
+            </p:style>
+            <p:txBody>
+              <a:bodyPr rtlCol="0" anchor="ctr"/>
+              <a:lstStyle/>
+              <a:p>
+                <a:pPr algn="ctr"/>
+                <a:endParaRPr lang="en-US" dirty="0"/>
+              </a:p>
+            </p:txBody>
+          </p:sp>
+          <p:sp>
+            <p:nvSpPr>
+              <p:cNvPr id="89" name="Freeform 6">
+                <a:extLst>
+                  <a:ext uri="{FF2B5EF4-FFF2-40B4-BE49-F238E27FC236}">
+                    <a16:creationId xmlns:a16="http://schemas.microsoft.com/office/drawing/2014/main" id="{8CFC8880-E90E-4FAC-85FF-870A9B020C8E}"/>
+                  </a:ext>
+                </a:extLst>
+              </p:cNvPr>
+              <p:cNvSpPr>
+                <a:spLocks/>
+              </p:cNvSpPr>
+              <p:nvPr/>
+            </p:nvSpPr>
+            <p:spPr bwMode="auto">
+              <a:xfrm rot="10800000">
+                <a:off x="2202944" y="4100493"/>
+                <a:ext cx="337765" cy="805525"/>
+              </a:xfrm>
+              <a:custGeom>
+                <a:avLst/>
+                <a:gdLst/>
+                <a:ahLst/>
+                <a:cxnLst>
+                  <a:cxn ang="0">
+                    <a:pos x="0" y="0"/>
+                  </a:cxn>
+                  <a:cxn ang="0">
+                    <a:pos x="0" y="528"/>
+                  </a:cxn>
+                  <a:cxn ang="0">
+                    <a:pos x="3216" y="528"/>
+                  </a:cxn>
+                  <a:cxn ang="0">
+                    <a:pos x="3216" y="0"/>
+                  </a:cxn>
+                </a:cxnLst>
+                <a:rect l="0" t="0" r="r" b="b"/>
+                <a:pathLst>
+                  <a:path w="3216" h="528">
+                    <a:moveTo>
+                      <a:pt x="0" y="0"/>
+                    </a:moveTo>
+                    <a:lnTo>
+                      <a:pt x="0" y="528"/>
+                    </a:lnTo>
+                    <a:lnTo>
+                      <a:pt x="3216" y="528"/>
+                    </a:lnTo>
+                    <a:lnTo>
+                      <a:pt x="3216" y="0"/>
+                    </a:lnTo>
+                  </a:path>
+                </a:pathLst>
+              </a:custGeom>
+              <a:solidFill>
+                <a:schemeClr val="bg1"/>
+              </a:solidFill>
+              <a:ln w="57150" cap="flat" cmpd="sng">
+                <a:solidFill>
+                  <a:schemeClr val="tx1"/>
+                </a:solidFill>
+                <a:prstDash val="solid"/>
+                <a:round/>
+                <a:headEnd type="none" w="lg" len="med"/>
+                <a:tailEnd type="none" w="lg" len="med"/>
+              </a:ln>
+              <a:effectLst/>
+            </p:spPr>
+            <p:txBody>
+              <a:bodyPr wrap="square" anchor="ctr">
+                <a:noAutofit/>
+              </a:bodyPr>
+              <a:lstStyle/>
+              <a:p>
+                <a:endParaRPr lang="en-US" dirty="0"/>
+              </a:p>
+            </p:txBody>
+          </p:sp>
+          <p:sp>
+            <p:nvSpPr>
+              <p:cNvPr id="90" name="Freeform 6">
+                <a:extLst>
+                  <a:ext uri="{FF2B5EF4-FFF2-40B4-BE49-F238E27FC236}">
+                    <a16:creationId xmlns:a16="http://schemas.microsoft.com/office/drawing/2014/main" id="{139D53E3-273F-4D4E-A5E4-B1418A0779EA}"/>
+                  </a:ext>
+                </a:extLst>
+              </p:cNvPr>
+              <p:cNvSpPr>
+                <a:spLocks/>
+              </p:cNvSpPr>
+              <p:nvPr/>
+            </p:nvSpPr>
+            <p:spPr bwMode="auto">
+              <a:xfrm rot="16200000">
+                <a:off x="2874558" y="4486679"/>
+                <a:ext cx="337765" cy="1069835"/>
+              </a:xfrm>
+              <a:custGeom>
+                <a:avLst/>
+                <a:gdLst/>
+                <a:ahLst/>
+                <a:cxnLst>
+                  <a:cxn ang="0">
+                    <a:pos x="0" y="0"/>
+                  </a:cxn>
+                  <a:cxn ang="0">
+                    <a:pos x="0" y="528"/>
+                  </a:cxn>
+                  <a:cxn ang="0">
+                    <a:pos x="3216" y="528"/>
+                  </a:cxn>
+                  <a:cxn ang="0">
+                    <a:pos x="3216" y="0"/>
+                  </a:cxn>
+                </a:cxnLst>
+                <a:rect l="0" t="0" r="r" b="b"/>
+                <a:pathLst>
+                  <a:path w="3216" h="528">
+                    <a:moveTo>
+                      <a:pt x="0" y="0"/>
+                    </a:moveTo>
+                    <a:lnTo>
+                      <a:pt x="0" y="528"/>
+                    </a:lnTo>
+                    <a:lnTo>
+                      <a:pt x="3216" y="528"/>
+                    </a:lnTo>
+                    <a:lnTo>
+                      <a:pt x="3216" y="0"/>
+                    </a:lnTo>
+                  </a:path>
+                </a:pathLst>
+              </a:custGeom>
+              <a:solidFill>
+                <a:schemeClr val="bg1"/>
+              </a:solidFill>
+              <a:ln w="57150" cap="flat" cmpd="sng">
+                <a:solidFill>
+                  <a:schemeClr val="tx1"/>
+                </a:solidFill>
+                <a:prstDash val="solid"/>
+                <a:round/>
+                <a:headEnd type="none" w="lg" len="med"/>
+                <a:tailEnd type="none" w="lg" len="med"/>
+              </a:ln>
+              <a:effectLst/>
+            </p:spPr>
+            <p:txBody>
+              <a:bodyPr wrap="square" anchor="ctr">
+                <a:spAutoFit/>
+              </a:bodyPr>
+              <a:lstStyle/>
+              <a:p>
+                <a:endParaRPr lang="en-US"/>
+              </a:p>
+            </p:txBody>
+          </p:sp>
+        </p:grpSp>
+        <p:sp>
+          <p:nvSpPr>
+            <p:cNvPr id="98" name="Rectangle 97">
+              <a:extLst>
+                <a:ext uri="{FF2B5EF4-FFF2-40B4-BE49-F238E27FC236}">
+                  <a16:creationId xmlns:a16="http://schemas.microsoft.com/office/drawing/2014/main" id="{969FC2D8-0390-48FB-A375-EB9B58BAA77D}"/>
+                </a:ext>
+              </a:extLst>
+            </p:cNvPr>
+            <p:cNvSpPr/>
+            <p:nvPr/>
+          </p:nvSpPr>
+          <p:spPr bwMode="auto">
+            <a:xfrm rot="5400000">
+              <a:off x="7631100" y="4974910"/>
+              <a:ext cx="268607" cy="91440"/>
+            </a:xfrm>
+            <a:prstGeom prst="rect">
+              <a:avLst/>
+            </a:prstGeom>
+            <a:solidFill>
+              <a:schemeClr val="bg1"/>
+            </a:solidFill>
+            <a:ln w="12700">
+              <a:solidFill>
+                <a:schemeClr val="bg1"/>
+              </a:solidFill>
+              <a:miter lim="800000"/>
+              <a:headEnd type="none" w="lg" len="med"/>
+              <a:tailEnd type="none" w="lg" len="med"/>
+            </a:ln>
+            <a:effectLst/>
+          </p:spPr>
+          <p:txBody>
+            <a:bodyPr rtlCol="0" anchor="ctr">
+              <a:noAutofit/>
+            </a:bodyPr>
+            <a:lstStyle/>
+            <a:p>
+              <a:pPr algn="l"/>
+              <a:endParaRPr lang="en-US" dirty="0"/>
+            </a:p>
+          </p:txBody>
+        </p:sp>
+        <p:sp>
+          <p:nvSpPr>
+            <p:cNvPr id="99" name="Freeform 6">
+              <a:extLst>
+                <a:ext uri="{FF2B5EF4-FFF2-40B4-BE49-F238E27FC236}">
+                  <a16:creationId xmlns:a16="http://schemas.microsoft.com/office/drawing/2014/main" id="{D1AE7EA1-56B1-486B-BEF5-11432587E4A7}"/>
+                </a:ext>
+              </a:extLst>
+            </p:cNvPr>
+            <p:cNvSpPr>
+              <a:spLocks/>
+            </p:cNvSpPr>
+            <p:nvPr/>
+          </p:nvSpPr>
+          <p:spPr bwMode="auto">
+            <a:xfrm rot="10800000">
+              <a:off x="6413248" y="774198"/>
+              <a:ext cx="290826" cy="3497133"/>
+            </a:xfrm>
+            <a:custGeom>
+              <a:avLst/>
+              <a:gdLst/>
+              <a:ahLst/>
+              <a:cxnLst>
+                <a:cxn ang="0">
+                  <a:pos x="0" y="0"/>
+                </a:cxn>
+                <a:cxn ang="0">
+                  <a:pos x="0" y="528"/>
+                </a:cxn>
+                <a:cxn ang="0">
+                  <a:pos x="3216" y="528"/>
+                </a:cxn>
+                <a:cxn ang="0">
+                  <a:pos x="3216" y="0"/>
+                </a:cxn>
+              </a:cxnLst>
+              <a:rect l="0" t="0" r="r" b="b"/>
+              <a:pathLst>
+                <a:path w="3216" h="528">
+                  <a:moveTo>
+                    <a:pt x="0" y="0"/>
+                  </a:moveTo>
+                  <a:lnTo>
+                    <a:pt x="0" y="528"/>
+                  </a:lnTo>
+                  <a:lnTo>
+                    <a:pt x="3216" y="528"/>
+                  </a:lnTo>
+                  <a:lnTo>
+                    <a:pt x="3216" y="0"/>
+                  </a:lnTo>
+                </a:path>
+              </a:pathLst>
+            </a:custGeom>
+            <a:solidFill>
+              <a:schemeClr val="bg1"/>
+            </a:solidFill>
+            <a:ln w="57150" cap="flat" cmpd="sng">
+              <a:solidFill>
+                <a:schemeClr val="tx1"/>
+              </a:solidFill>
+              <a:prstDash val="solid"/>
+              <a:round/>
+              <a:headEnd type="none" w="lg" len="med"/>
+              <a:tailEnd type="none" w="lg" len="med"/>
+            </a:ln>
+            <a:effectLst/>
+          </p:spPr>
+          <p:txBody>
+            <a:bodyPr wrap="square" anchor="ctr">
+              <a:noAutofit/>
+            </a:bodyPr>
+            <a:lstStyle/>
+            <a:p>
+              <a:endParaRPr lang="en-US" dirty="0"/>
+            </a:p>
+          </p:txBody>
+        </p:sp>
+        <p:sp>
+          <p:nvSpPr>
+            <p:cNvPr id="21" name="Rectangle 20">
+              <a:extLst>
+                <a:ext uri="{FF2B5EF4-FFF2-40B4-BE49-F238E27FC236}">
+                  <a16:creationId xmlns:a16="http://schemas.microsoft.com/office/drawing/2014/main" id="{EB3E037F-588D-4F2C-ADBF-A524E0847950}"/>
+                </a:ext>
+              </a:extLst>
+            </p:cNvPr>
+            <p:cNvSpPr/>
+            <p:nvPr/>
+          </p:nvSpPr>
+          <p:spPr bwMode="auto">
+            <a:xfrm>
+              <a:off x="6448425" y="743331"/>
+              <a:ext cx="219075" cy="91440"/>
+            </a:xfrm>
+            <a:prstGeom prst="rect">
+              <a:avLst/>
+            </a:prstGeom>
+            <a:solidFill>
+              <a:schemeClr val="bg1"/>
+            </a:solidFill>
+            <a:ln w="12700">
+              <a:solidFill>
+                <a:schemeClr val="bg1"/>
+              </a:solidFill>
+              <a:miter lim="800000"/>
+              <a:headEnd type="none" w="lg" len="med"/>
+              <a:tailEnd type="none" w="lg" len="med"/>
+            </a:ln>
+            <a:effectLst/>
+          </p:spPr>
+          <p:txBody>
+            <a:bodyPr rtlCol="0" anchor="ctr">
+              <a:noAutofit/>
+            </a:bodyPr>
+            <a:lstStyle/>
+            <a:p>
+              <a:pPr algn="l"/>
+              <a:endParaRPr lang="en-US" dirty="0"/>
+            </a:p>
+          </p:txBody>
+        </p:sp>
+        <p:sp>
+          <p:nvSpPr>
+            <p:cNvPr id="24" name="Arrow: Right 23">
+              <a:extLst>
+                <a:ext uri="{FF2B5EF4-FFF2-40B4-BE49-F238E27FC236}">
+                  <a16:creationId xmlns:a16="http://schemas.microsoft.com/office/drawing/2014/main" id="{8C092474-DAC6-4CEB-A137-36BC6FB4AC79}"/>
+                </a:ext>
+              </a:extLst>
+            </p:cNvPr>
+            <p:cNvSpPr/>
+            <p:nvPr/>
+          </p:nvSpPr>
+          <p:spPr bwMode="auto">
+            <a:xfrm>
+              <a:off x="3544637" y="4749167"/>
+              <a:ext cx="620057" cy="542916"/>
+            </a:xfrm>
+            <a:prstGeom prst="rightArrow">
+              <a:avLst>
+                <a:gd name="adj1" fmla="val 50000"/>
+                <a:gd name="adj2" fmla="val 55594"/>
+              </a:avLst>
+            </a:prstGeom>
+            <a:solidFill>
+              <a:srgbClr val="0563C1"/>
+            </a:solidFill>
+            <a:ln w="12700">
+              <a:solidFill>
+                <a:srgbClr val="0563C1"/>
+              </a:solidFill>
+              <a:miter lim="800000"/>
+              <a:headEnd type="none" w="lg" len="med"/>
+              <a:tailEnd type="none" w="lg" len="med"/>
+            </a:ln>
+            <a:effectLst/>
+          </p:spPr>
+          <p:txBody>
+            <a:bodyPr rtlCol="0" anchor="ctr">
+              <a:noAutofit/>
+            </a:bodyPr>
+            <a:lstStyle/>
+            <a:p>
+              <a:pPr algn="l"/>
+              <a:endParaRPr lang="en-US" dirty="0"/>
+            </a:p>
+          </p:txBody>
+        </p:sp>
+        <p:sp>
+          <p:nvSpPr>
+            <p:cNvPr id="101" name="Left Brace 100">
+              <a:extLst>
+                <a:ext uri="{FF2B5EF4-FFF2-40B4-BE49-F238E27FC236}">
+                  <a16:creationId xmlns:a16="http://schemas.microsoft.com/office/drawing/2014/main" id="{02177F7C-3FD9-4342-9167-329B031E6D16}"/>
+                </a:ext>
+              </a:extLst>
+            </p:cNvPr>
+            <p:cNvSpPr/>
+            <p:nvPr/>
+          </p:nvSpPr>
+          <p:spPr>
+            <a:xfrm rot="10800000">
+              <a:off x="6767123" y="743331"/>
+              <a:ext cx="337767" cy="3504378"/>
+            </a:xfrm>
+            <a:prstGeom prst="leftBrace">
+              <a:avLst>
+                <a:gd name="adj1" fmla="val 32109"/>
+                <a:gd name="adj2" fmla="val 90328"/>
+              </a:avLst>
+            </a:prstGeom>
+            <a:ln w="28575">
+              <a:solidFill>
+                <a:schemeClr val="tx1"/>
+              </a:solidFill>
+            </a:ln>
+          </p:spPr>
+          <p:style>
+            <a:lnRef idx="1">
+              <a:schemeClr val="accent1"/>
+            </a:lnRef>
+            <a:fillRef idx="0">
+              <a:schemeClr val="accent1"/>
+            </a:fillRef>
+            <a:effectRef idx="0">
+              <a:schemeClr val="accent1"/>
+            </a:effectRef>
+            <a:fontRef idx="minor">
+              <a:schemeClr val="tx1"/>
+            </a:fontRef>
+          </p:style>
+          <p:txBody>
+            <a:bodyPr rtlCol="0" anchor="ctr"/>
+            <a:lstStyle/>
+            <a:p>
+              <a:pPr algn="ctr"/>
+              <a:endParaRPr lang="en-US" dirty="0"/>
+            </a:p>
+          </p:txBody>
+        </p:sp>
+        <p:sp>
+          <p:nvSpPr>
+            <p:cNvPr id="102" name="TextBox 101">
+              <a:extLst>
+                <a:ext uri="{FF2B5EF4-FFF2-40B4-BE49-F238E27FC236}">
+                  <a16:creationId xmlns:a16="http://schemas.microsoft.com/office/drawing/2014/main" id="{BF1C4079-2A4C-4750-BC9B-53C87B87BBC4}"/>
+                </a:ext>
+              </a:extLst>
+            </p:cNvPr>
+            <p:cNvSpPr txBox="1"/>
+            <p:nvPr/>
+          </p:nvSpPr>
+          <p:spPr>
+            <a:xfrm>
+              <a:off x="7144911" y="834771"/>
+              <a:ext cx="1436046" cy="477054"/>
+            </a:xfrm>
+            <a:prstGeom prst="rect">
+              <a:avLst/>
+            </a:prstGeom>
+            <a:noFill/>
+          </p:spPr>
+          <p:txBody>
+            <a:bodyPr wrap="square" rtlCol="0">
+              <a:spAutoFit/>
+            </a:bodyPr>
+            <a:lstStyle/>
+            <a:p>
+              <a:pPr algn="ctr"/>
+              <a:r>
+                <a:rPr lang="en-US" sz="2500" dirty="0">
+                  <a:latin typeface="Times New Roman" panose="02020603050405020304" pitchFamily="18" charset="0"/>
+                  <a:cs typeface="Times New Roman" panose="02020603050405020304" pitchFamily="18" charset="0"/>
+                </a:rPr>
+                <a:t>Pipe stub</a:t>
+              </a:r>
+            </a:p>
+          </p:txBody>
+        </p:sp>
+        <p:sp>
+          <p:nvSpPr>
+            <p:cNvPr id="103" name="Left Brace 102">
+              <a:extLst>
+                <a:ext uri="{FF2B5EF4-FFF2-40B4-BE49-F238E27FC236}">
+                  <a16:creationId xmlns:a16="http://schemas.microsoft.com/office/drawing/2014/main" id="{E1AE29F3-2B12-4136-8604-14DF3A742274}"/>
+                </a:ext>
+              </a:extLst>
+            </p:cNvPr>
+            <p:cNvSpPr/>
+            <p:nvPr/>
+          </p:nvSpPr>
+          <p:spPr>
+            <a:xfrm>
+              <a:off x="5984857" y="4124601"/>
+              <a:ext cx="337767" cy="624565"/>
+            </a:xfrm>
+            <a:prstGeom prst="leftBrace">
+              <a:avLst>
+                <a:gd name="adj1" fmla="val 32109"/>
+                <a:gd name="adj2" fmla="val 82288"/>
+              </a:avLst>
+            </a:prstGeom>
+            <a:ln w="28575">
+              <a:solidFill>
+                <a:schemeClr val="tx1"/>
+              </a:solidFill>
+            </a:ln>
+          </p:spPr>
+          <p:style>
+            <a:lnRef idx="1">
+              <a:schemeClr val="accent1"/>
+            </a:lnRef>
+            <a:fillRef idx="0">
+              <a:schemeClr val="accent1"/>
+            </a:fillRef>
+            <a:effectRef idx="0">
+              <a:schemeClr val="accent1"/>
+            </a:effectRef>
+            <a:fontRef idx="minor">
+              <a:schemeClr val="tx1"/>
+            </a:fontRef>
+          </p:style>
+          <p:txBody>
+            <a:bodyPr rtlCol="0" anchor="ctr"/>
+            <a:lstStyle/>
+            <a:p>
+              <a:pPr algn="ctr"/>
+              <a:endParaRPr lang="en-US" dirty="0"/>
+            </a:p>
+          </p:txBody>
+        </p:sp>
+        <p:sp>
+          <p:nvSpPr>
+            <p:cNvPr id="104" name="TextBox 103">
+              <a:extLst>
+                <a:ext uri="{FF2B5EF4-FFF2-40B4-BE49-F238E27FC236}">
+                  <a16:creationId xmlns:a16="http://schemas.microsoft.com/office/drawing/2014/main" id="{28EE5136-B0DE-40E1-BA7D-61BAC884AD98}"/>
+                </a:ext>
+              </a:extLst>
+            </p:cNvPr>
+            <p:cNvSpPr txBox="1"/>
+            <p:nvPr/>
+          </p:nvSpPr>
+          <p:spPr>
+            <a:xfrm>
+              <a:off x="4717694" y="4398533"/>
+              <a:ext cx="1436046" cy="861774"/>
+            </a:xfrm>
+            <a:prstGeom prst="rect">
+              <a:avLst/>
+            </a:prstGeom>
+            <a:noFill/>
+          </p:spPr>
+          <p:txBody>
+            <a:bodyPr wrap="square" rtlCol="0">
+              <a:spAutoFit/>
+            </a:bodyPr>
+            <a:lstStyle/>
+            <a:p>
+              <a:pPr algn="ctr"/>
+              <a:r>
+                <a:rPr lang="en-US" sz="2500" dirty="0">
+                  <a:latin typeface="Times New Roman" panose="02020603050405020304" pitchFamily="18" charset="0"/>
+                  <a:cs typeface="Times New Roman" panose="02020603050405020304" pitchFamily="18" charset="0"/>
+                </a:rPr>
+                <a:t>Pipe coupling</a:t>
+              </a:r>
+            </a:p>
+          </p:txBody>
+        </p:sp>
+      </p:grpSp>
+    </p:spTree>
+    <p:extLst>
+      <p:ext uri="{BB962C8B-B14F-4D97-AF65-F5344CB8AC3E}">
+        <p14:creationId xmlns:p14="http://schemas.microsoft.com/office/powerpoint/2010/main" val="42633239"/>
+      </p:ext>
+    </p:extLst>
+  </p:cSld>
+  <p:clrMapOvr>
+    <a:masterClrMapping/>
+  </p:clrMapOvr>
+</p:sld>
+</file>
+
+<file path=ppt/slides/slide6.xml><?xml version="1.0" encoding="utf-8"?>
 <p:sld xmlns:a="http://schemas.openxmlformats.org/drawingml/2006/main" xmlns:r="http://schemas.openxmlformats.org/officeDocument/2006/relationships" xmlns:p="http://schemas.openxmlformats.org/presentationml/2006/main">
   <p:cSld>
     <p:spTree>
@@ -11035,7 +12750,7 @@
 </p:sld>
 </file>
 
-<file path=ppt/slides/slide6.xml><?xml version="1.0" encoding="utf-8"?>
+<file path=ppt/slides/slide7.xml><?xml version="1.0" encoding="utf-8"?>
 <p:sld xmlns:a="http://schemas.openxmlformats.org/drawingml/2006/main" xmlns:r="http://schemas.openxmlformats.org/officeDocument/2006/relationships" xmlns:p="http://schemas.openxmlformats.org/presentationml/2006/main">
   <p:cSld>
     <p:spTree>

</xml_diff>

<commit_message>
beginning tank drain derivation sheet
</commit_message>
<xml_diff>
--- a/Summary Sheets/Diagrams.pptx
+++ b/Summary Sheets/Diagrams.pptx
@@ -10,8 +10,9 @@
     <p:sldId id="258" r:id="rId4"/>
     <p:sldId id="259" r:id="rId5"/>
     <p:sldId id="263" r:id="rId6"/>
-    <p:sldId id="261" r:id="rId7"/>
-    <p:sldId id="262" r:id="rId8"/>
+    <p:sldId id="264" r:id="rId7"/>
+    <p:sldId id="261" r:id="rId8"/>
+    <p:sldId id="262" r:id="rId9"/>
   </p:sldIdLst>
   <p:sldSz cx="12192000" cy="6858000"/>
   <p:notesSz cx="6858000" cy="9144000"/>
@@ -276,7 +277,7 @@
           <a:p>
             <a:fld id="{21D1E3DE-262E-49AD-8F92-4417FBCF3DA3}" type="datetimeFigureOut">
               <a:rPr lang="en-US" smtClean="0"/>
-              <a:t>4/23/2018</a:t>
+              <a:t>4/24/2018</a:t>
             </a:fld>
             <a:endParaRPr lang="en-US"/>
           </a:p>
@@ -474,7 +475,7 @@
           <a:p>
             <a:fld id="{21D1E3DE-262E-49AD-8F92-4417FBCF3DA3}" type="datetimeFigureOut">
               <a:rPr lang="en-US" smtClean="0"/>
-              <a:t>4/23/2018</a:t>
+              <a:t>4/24/2018</a:t>
             </a:fld>
             <a:endParaRPr lang="en-US"/>
           </a:p>
@@ -682,7 +683,7 @@
           <a:p>
             <a:fld id="{21D1E3DE-262E-49AD-8F92-4417FBCF3DA3}" type="datetimeFigureOut">
               <a:rPr lang="en-US" smtClean="0"/>
-              <a:t>4/23/2018</a:t>
+              <a:t>4/24/2018</a:t>
             </a:fld>
             <a:endParaRPr lang="en-US"/>
           </a:p>
@@ -880,7 +881,7 @@
           <a:p>
             <a:fld id="{21D1E3DE-262E-49AD-8F92-4417FBCF3DA3}" type="datetimeFigureOut">
               <a:rPr lang="en-US" smtClean="0"/>
-              <a:t>4/23/2018</a:t>
+              <a:t>4/24/2018</a:t>
             </a:fld>
             <a:endParaRPr lang="en-US"/>
           </a:p>
@@ -1155,7 +1156,7 @@
           <a:p>
             <a:fld id="{21D1E3DE-262E-49AD-8F92-4417FBCF3DA3}" type="datetimeFigureOut">
               <a:rPr lang="en-US" smtClean="0"/>
-              <a:t>4/23/2018</a:t>
+              <a:t>4/24/2018</a:t>
             </a:fld>
             <a:endParaRPr lang="en-US"/>
           </a:p>
@@ -1420,7 +1421,7 @@
           <a:p>
             <a:fld id="{21D1E3DE-262E-49AD-8F92-4417FBCF3DA3}" type="datetimeFigureOut">
               <a:rPr lang="en-US" smtClean="0"/>
-              <a:t>4/23/2018</a:t>
+              <a:t>4/24/2018</a:t>
             </a:fld>
             <a:endParaRPr lang="en-US"/>
           </a:p>
@@ -1832,7 +1833,7 @@
           <a:p>
             <a:fld id="{21D1E3DE-262E-49AD-8F92-4417FBCF3DA3}" type="datetimeFigureOut">
               <a:rPr lang="en-US" smtClean="0"/>
-              <a:t>4/23/2018</a:t>
+              <a:t>4/24/2018</a:t>
             </a:fld>
             <a:endParaRPr lang="en-US"/>
           </a:p>
@@ -1973,7 +1974,7 @@
           <a:p>
             <a:fld id="{21D1E3DE-262E-49AD-8F92-4417FBCF3DA3}" type="datetimeFigureOut">
               <a:rPr lang="en-US" smtClean="0"/>
-              <a:t>4/23/2018</a:t>
+              <a:t>4/24/2018</a:t>
             </a:fld>
             <a:endParaRPr lang="en-US"/>
           </a:p>
@@ -2086,7 +2087,7 @@
           <a:p>
             <a:fld id="{21D1E3DE-262E-49AD-8F92-4417FBCF3DA3}" type="datetimeFigureOut">
               <a:rPr lang="en-US" smtClean="0"/>
-              <a:t>4/23/2018</a:t>
+              <a:t>4/24/2018</a:t>
             </a:fld>
             <a:endParaRPr lang="en-US"/>
           </a:p>
@@ -2397,7 +2398,7 @@
           <a:p>
             <a:fld id="{21D1E3DE-262E-49AD-8F92-4417FBCF3DA3}" type="datetimeFigureOut">
               <a:rPr lang="en-US" smtClean="0"/>
-              <a:t>4/23/2018</a:t>
+              <a:t>4/24/2018</a:t>
             </a:fld>
             <a:endParaRPr lang="en-US"/>
           </a:p>
@@ -2685,7 +2686,7 @@
           <a:p>
             <a:fld id="{21D1E3DE-262E-49AD-8F92-4417FBCF3DA3}" type="datetimeFigureOut">
               <a:rPr lang="en-US" smtClean="0"/>
-              <a:t>4/23/2018</a:t>
+              <a:t>4/24/2018</a:t>
             </a:fld>
             <a:endParaRPr lang="en-US"/>
           </a:p>
@@ -2926,7 +2927,7 @@
           <a:p>
             <a:fld id="{21D1E3DE-262E-49AD-8F92-4417FBCF3DA3}" type="datetimeFigureOut">
               <a:rPr lang="en-US" smtClean="0"/>
-              <a:t>4/23/2018</a:t>
+              <a:t>4/24/2018</a:t>
             </a:fld>
             <a:endParaRPr lang="en-US"/>
           </a:p>
@@ -9462,10 +9463,10 @@
       </p:grpSpPr>
       <p:grpSp>
         <p:nvGrpSpPr>
-          <p:cNvPr id="105" name="Group 104">
+          <p:cNvPr id="5" name="Group 4">
             <a:extLst>
               <a:ext uri="{FF2B5EF4-FFF2-40B4-BE49-F238E27FC236}">
-                <a16:creationId xmlns:a16="http://schemas.microsoft.com/office/drawing/2014/main" id="{7B98496F-2218-43C9-AD47-E570F766DA4C}"/>
+                <a16:creationId xmlns:a16="http://schemas.microsoft.com/office/drawing/2014/main" id="{627C5546-6D67-4C82-B8EE-03C41BF4AC76}"/>
               </a:ext>
             </a:extLst>
           </p:cNvPr>
@@ -9474,18 +9475,97 @@
         </p:nvGrpSpPr>
         <p:grpSpPr>
           <a:xfrm>
-            <a:off x="555898" y="743331"/>
-            <a:ext cx="8025059" cy="4548752"/>
-            <a:chOff x="555898" y="743331"/>
-            <a:chExt cx="8025059" cy="4548752"/>
+            <a:off x="555898" y="438529"/>
+            <a:ext cx="8025059" cy="4853554"/>
+            <a:chOff x="555898" y="438529"/>
+            <a:chExt cx="8025059" cy="4853554"/>
           </a:xfrm>
         </p:grpSpPr>
+        <p:sp>
+          <p:nvSpPr>
+            <p:cNvPr id="4" name="Freeform 6">
+              <a:extLst>
+                <a:ext uri="{FF2B5EF4-FFF2-40B4-BE49-F238E27FC236}">
+                  <a16:creationId xmlns:a16="http://schemas.microsoft.com/office/drawing/2014/main" id="{57C7CB09-8C87-4DA8-BFE7-4720504CA68C}"/>
+                </a:ext>
+              </a:extLst>
+            </p:cNvPr>
+            <p:cNvSpPr>
+              <a:spLocks/>
+            </p:cNvSpPr>
+            <p:nvPr/>
+          </p:nvSpPr>
+          <p:spPr bwMode="auto">
+            <a:xfrm>
+              <a:off x="838200" y="1132840"/>
+              <a:ext cx="2971800" cy="2971800"/>
+            </a:xfrm>
+            <a:custGeom>
+              <a:avLst/>
+              <a:gdLst/>
+              <a:ahLst/>
+              <a:cxnLst>
+                <a:cxn ang="0">
+                  <a:pos x="0" y="0"/>
+                </a:cxn>
+                <a:cxn ang="0">
+                  <a:pos x="0" y="528"/>
+                </a:cxn>
+                <a:cxn ang="0">
+                  <a:pos x="3216" y="528"/>
+                </a:cxn>
+                <a:cxn ang="0">
+                  <a:pos x="3216" y="0"/>
+                </a:cxn>
+              </a:cxnLst>
+              <a:rect l="0" t="0" r="r" b="b"/>
+              <a:pathLst>
+                <a:path w="3216" h="528">
+                  <a:moveTo>
+                    <a:pt x="0" y="0"/>
+                  </a:moveTo>
+                  <a:lnTo>
+                    <a:pt x="0" y="528"/>
+                  </a:lnTo>
+                  <a:lnTo>
+                    <a:pt x="3216" y="528"/>
+                  </a:lnTo>
+                  <a:lnTo>
+                    <a:pt x="3216" y="0"/>
+                  </a:lnTo>
+                </a:path>
+              </a:pathLst>
+            </a:custGeom>
+            <a:solidFill>
+              <a:schemeClr val="hlink"/>
+            </a:solidFill>
+            <a:ln w="57150" cap="flat" cmpd="sng">
+              <a:solidFill>
+                <a:schemeClr val="tx1"/>
+              </a:solidFill>
+              <a:prstDash val="solid"/>
+              <a:round/>
+              <a:headEnd type="none" w="lg" len="med"/>
+              <a:tailEnd type="none" w="lg" len="med"/>
+            </a:ln>
+            <a:effectLst/>
+          </p:spPr>
+          <p:txBody>
+            <a:bodyPr wrap="square" anchor="ctr">
+              <a:spAutoFit/>
+            </a:bodyPr>
+            <a:lstStyle/>
+            <a:p>
+              <a:endParaRPr lang="en-US"/>
+            </a:p>
+          </p:txBody>
+        </p:sp>
         <p:grpSp>
           <p:nvGrpSpPr>
-            <p:cNvPr id="20" name="Group 19">
+            <p:cNvPr id="13" name="Group 12">
               <a:extLst>
                 <a:ext uri="{FF2B5EF4-FFF2-40B4-BE49-F238E27FC236}">
-                  <a16:creationId xmlns:a16="http://schemas.microsoft.com/office/drawing/2014/main" id="{7241BC69-5D4F-4425-BD63-1FC2FB66291A}"/>
+                  <a16:creationId xmlns:a16="http://schemas.microsoft.com/office/drawing/2014/main" id="{EA9E03FD-BCAA-462D-A6C4-B19647011DF4}"/>
                 </a:ext>
               </a:extLst>
             </p:cNvPr>
@@ -9494,449 +9574,50 @@
           </p:nvGrpSpPr>
           <p:grpSpPr>
             <a:xfrm>
-              <a:off x="555898" y="1237572"/>
-              <a:ext cx="3643288" cy="3952907"/>
-              <a:chOff x="555898" y="1237572"/>
-              <a:chExt cx="3643288" cy="3952907"/>
+              <a:off x="1100471" y="922612"/>
+              <a:ext cx="482269" cy="420455"/>
+              <a:chOff x="4446109" y="2103464"/>
+              <a:chExt cx="482269" cy="420455"/>
             </a:xfrm>
           </p:grpSpPr>
           <p:sp>
             <p:nvSpPr>
-              <p:cNvPr id="4" name="Freeform 6">
+              <p:cNvPr id="14" name="AutoShape 174">
                 <a:extLst>
                   <a:ext uri="{FF2B5EF4-FFF2-40B4-BE49-F238E27FC236}">
-                    <a16:creationId xmlns:a16="http://schemas.microsoft.com/office/drawing/2014/main" id="{57C7CB09-8C87-4DA8-BFE7-4720504CA68C}"/>
+                    <a16:creationId xmlns:a16="http://schemas.microsoft.com/office/drawing/2014/main" id="{56EFD6BF-292F-40DF-B258-F43A90D892CB}"/>
                   </a:ext>
                 </a:extLst>
               </p:cNvPr>
               <p:cNvSpPr>
-                <a:spLocks/>
+                <a:spLocks noChangeArrowheads="1"/>
               </p:cNvSpPr>
               <p:nvPr/>
             </p:nvSpPr>
             <p:spPr bwMode="auto">
-              <a:xfrm>
-                <a:off x="838200" y="1447800"/>
-                <a:ext cx="2971800" cy="2971800"/>
+              <a:xfrm flipV="1">
+                <a:off x="4506392" y="2103464"/>
+                <a:ext cx="361702" cy="228043"/>
               </a:xfrm>
-              <a:custGeom>
-                <a:avLst/>
-                <a:gdLst/>
-                <a:ahLst/>
-                <a:cxnLst>
-                  <a:cxn ang="0">
-                    <a:pos x="0" y="0"/>
-                  </a:cxn>
-                  <a:cxn ang="0">
-                    <a:pos x="0" y="528"/>
-                  </a:cxn>
-                  <a:cxn ang="0">
-                    <a:pos x="3216" y="528"/>
-                  </a:cxn>
-                  <a:cxn ang="0">
-                    <a:pos x="3216" y="0"/>
-                  </a:cxn>
-                </a:cxnLst>
-                <a:rect l="0" t="0" r="r" b="b"/>
-                <a:pathLst>
-                  <a:path w="3216" h="528">
-                    <a:moveTo>
-                      <a:pt x="0" y="0"/>
-                    </a:moveTo>
-                    <a:lnTo>
-                      <a:pt x="0" y="528"/>
-                    </a:lnTo>
-                    <a:lnTo>
-                      <a:pt x="3216" y="528"/>
-                    </a:lnTo>
-                    <a:lnTo>
-                      <a:pt x="3216" y="0"/>
-                    </a:lnTo>
-                  </a:path>
-                </a:pathLst>
-              </a:custGeom>
-              <a:solidFill>
-                <a:schemeClr val="hlink"/>
-              </a:solidFill>
-              <a:ln w="57150" cap="flat" cmpd="sng">
+              <a:prstGeom prst="triangle">
+                <a:avLst>
+                  <a:gd name="adj" fmla="val 50000"/>
+                </a:avLst>
+              </a:prstGeom>
+              <a:noFill/>
+              <a:ln w="12700">
                 <a:solidFill>
                   <a:schemeClr val="tx1"/>
                 </a:solidFill>
-                <a:prstDash val="solid"/>
-                <a:round/>
+                <a:miter lim="800000"/>
                 <a:headEnd type="none" w="lg" len="med"/>
                 <a:tailEnd type="none" w="lg" len="med"/>
               </a:ln>
               <a:effectLst/>
             </p:spPr>
             <p:txBody>
-              <a:bodyPr wrap="square" anchor="ctr">
+              <a:bodyPr anchor="ctr">
                 <a:spAutoFit/>
-              </a:bodyPr>
-              <a:lstStyle/>
-              <a:p>
-                <a:endParaRPr lang="en-US"/>
-              </a:p>
-            </p:txBody>
-          </p:sp>
-          <p:grpSp>
-            <p:nvGrpSpPr>
-              <p:cNvPr id="13" name="Group 12">
-                <a:extLst>
-                  <a:ext uri="{FF2B5EF4-FFF2-40B4-BE49-F238E27FC236}">
-                    <a16:creationId xmlns:a16="http://schemas.microsoft.com/office/drawing/2014/main" id="{EA9E03FD-BCAA-462D-A6C4-B19647011DF4}"/>
-                  </a:ext>
-                </a:extLst>
-              </p:cNvPr>
-              <p:cNvGrpSpPr/>
-              <p:nvPr/>
-            </p:nvGrpSpPr>
-            <p:grpSpPr>
-              <a:xfrm>
-                <a:off x="1100471" y="1237572"/>
-                <a:ext cx="482269" cy="420455"/>
-                <a:chOff x="4446109" y="2103464"/>
-                <a:chExt cx="482269" cy="420455"/>
-              </a:xfrm>
-            </p:grpSpPr>
-            <p:sp>
-              <p:nvSpPr>
-                <p:cNvPr id="14" name="AutoShape 174">
-                  <a:extLst>
-                    <a:ext uri="{FF2B5EF4-FFF2-40B4-BE49-F238E27FC236}">
-                      <a16:creationId xmlns:a16="http://schemas.microsoft.com/office/drawing/2014/main" id="{56EFD6BF-292F-40DF-B258-F43A90D892CB}"/>
-                    </a:ext>
-                  </a:extLst>
-                </p:cNvPr>
-                <p:cNvSpPr>
-                  <a:spLocks noChangeArrowheads="1"/>
-                </p:cNvSpPr>
-                <p:nvPr/>
-              </p:nvSpPr>
-              <p:spPr bwMode="auto">
-                <a:xfrm flipV="1">
-                  <a:off x="4506392" y="2103464"/>
-                  <a:ext cx="361702" cy="228043"/>
-                </a:xfrm>
-                <a:prstGeom prst="triangle">
-                  <a:avLst>
-                    <a:gd name="adj" fmla="val 50000"/>
-                  </a:avLst>
-                </a:prstGeom>
-                <a:noFill/>
-                <a:ln w="12700">
-                  <a:solidFill>
-                    <a:schemeClr val="tx1"/>
-                  </a:solidFill>
-                  <a:miter lim="800000"/>
-                  <a:headEnd type="none" w="lg" len="med"/>
-                  <a:tailEnd type="none" w="lg" len="med"/>
-                </a:ln>
-                <a:effectLst/>
-              </p:spPr>
-              <p:txBody>
-                <a:bodyPr anchor="ctr">
-                  <a:spAutoFit/>
-                </a:bodyPr>
-                <a:lstStyle/>
-                <a:p>
-                  <a:endParaRPr lang="en-US" dirty="0"/>
-                </a:p>
-              </p:txBody>
-            </p:sp>
-            <p:sp>
-              <p:nvSpPr>
-                <p:cNvPr id="15" name="Line 175">
-                  <a:extLst>
-                    <a:ext uri="{FF2B5EF4-FFF2-40B4-BE49-F238E27FC236}">
-                      <a16:creationId xmlns:a16="http://schemas.microsoft.com/office/drawing/2014/main" id="{D3B90883-7651-4669-9F16-25B26B0C4AB5}"/>
-                    </a:ext>
-                  </a:extLst>
-                </p:cNvPr>
-                <p:cNvSpPr>
-                  <a:spLocks noChangeShapeType="1"/>
-                </p:cNvSpPr>
-                <p:nvPr/>
-              </p:nvSpPr>
-              <p:spPr bwMode="auto">
-                <a:xfrm>
-                  <a:off x="4446109" y="2395643"/>
-                  <a:ext cx="482269" cy="0"/>
-                </a:xfrm>
-                <a:prstGeom prst="line">
-                  <a:avLst/>
-                </a:prstGeom>
-                <a:noFill/>
-                <a:ln w="12700">
-                  <a:solidFill>
-                    <a:schemeClr val="tx1"/>
-                  </a:solidFill>
-                  <a:round/>
-                  <a:headEnd type="none" w="lg" len="med"/>
-                  <a:tailEnd type="none" w="lg" len="med"/>
-                </a:ln>
-                <a:effectLst/>
-              </p:spPr>
-              <p:txBody>
-                <a:bodyPr anchor="ctr">
-                  <a:spAutoFit/>
-                </a:bodyPr>
-                <a:lstStyle/>
-                <a:p>
-                  <a:endParaRPr lang="en-US"/>
-                </a:p>
-              </p:txBody>
-            </p:sp>
-            <p:sp>
-              <p:nvSpPr>
-                <p:cNvPr id="16" name="Line 176">
-                  <a:extLst>
-                    <a:ext uri="{FF2B5EF4-FFF2-40B4-BE49-F238E27FC236}">
-                      <a16:creationId xmlns:a16="http://schemas.microsoft.com/office/drawing/2014/main" id="{01FA9449-E78B-4BF7-B218-7190FC3DED7C}"/>
-                    </a:ext>
-                  </a:extLst>
-                </p:cNvPr>
-                <p:cNvSpPr>
-                  <a:spLocks noChangeShapeType="1"/>
-                </p:cNvSpPr>
-                <p:nvPr/>
-              </p:nvSpPr>
-              <p:spPr bwMode="auto">
-                <a:xfrm>
-                  <a:off x="4506392" y="2459782"/>
-                  <a:ext cx="361702" cy="0"/>
-                </a:xfrm>
-                <a:prstGeom prst="line">
-                  <a:avLst/>
-                </a:prstGeom>
-                <a:noFill/>
-                <a:ln w="12700">
-                  <a:solidFill>
-                    <a:schemeClr val="tx1"/>
-                  </a:solidFill>
-                  <a:round/>
-                  <a:headEnd type="none" w="lg" len="med"/>
-                  <a:tailEnd type="none" w="lg" len="med"/>
-                </a:ln>
-                <a:effectLst/>
-              </p:spPr>
-              <p:txBody>
-                <a:bodyPr anchor="ctr">
-                  <a:spAutoFit/>
-                </a:bodyPr>
-                <a:lstStyle/>
-                <a:p>
-                  <a:endParaRPr lang="en-US"/>
-                </a:p>
-              </p:txBody>
-            </p:sp>
-            <p:sp>
-              <p:nvSpPr>
-                <p:cNvPr id="17" name="Line 177">
-                  <a:extLst>
-                    <a:ext uri="{FF2B5EF4-FFF2-40B4-BE49-F238E27FC236}">
-                      <a16:creationId xmlns:a16="http://schemas.microsoft.com/office/drawing/2014/main" id="{BE0340DA-996F-4A74-B664-787686F309E6}"/>
-                    </a:ext>
-                  </a:extLst>
-                </p:cNvPr>
-                <p:cNvSpPr>
-                  <a:spLocks noChangeShapeType="1"/>
-                </p:cNvSpPr>
-                <p:nvPr/>
-              </p:nvSpPr>
-              <p:spPr bwMode="auto">
-                <a:xfrm>
-                  <a:off x="4576723" y="2523919"/>
-                  <a:ext cx="218529" cy="0"/>
-                </a:xfrm>
-                <a:prstGeom prst="line">
-                  <a:avLst/>
-                </a:prstGeom>
-                <a:noFill/>
-                <a:ln w="12700">
-                  <a:solidFill>
-                    <a:schemeClr val="tx1"/>
-                  </a:solidFill>
-                  <a:round/>
-                  <a:headEnd type="none" w="lg" len="med"/>
-                  <a:tailEnd type="none" w="lg" len="med"/>
-                </a:ln>
-                <a:effectLst/>
-              </p:spPr>
-              <p:txBody>
-                <a:bodyPr anchor="ctr">
-                  <a:spAutoFit/>
-                </a:bodyPr>
-                <a:lstStyle/>
-                <a:p>
-                  <a:endParaRPr lang="en-US"/>
-                </a:p>
-              </p:txBody>
-            </p:sp>
-          </p:grpSp>
-          <p:sp>
-            <p:nvSpPr>
-              <p:cNvPr id="73" name="Freeform: Shape 72">
-                <a:extLst>
-                  <a:ext uri="{FF2B5EF4-FFF2-40B4-BE49-F238E27FC236}">
-                    <a16:creationId xmlns:a16="http://schemas.microsoft.com/office/drawing/2014/main" id="{FDB7BD84-8132-4086-957B-E575587CE082}"/>
-                  </a:ext>
-                </a:extLst>
-              </p:cNvPr>
-              <p:cNvSpPr/>
-              <p:nvPr/>
-            </p:nvSpPr>
-            <p:spPr>
-              <a:xfrm rot="10800000">
-                <a:off x="2202943" y="4857704"/>
-                <a:ext cx="337768" cy="332771"/>
-              </a:xfrm>
-              <a:custGeom>
-                <a:avLst/>
-                <a:gdLst>
-                  <a:gd name="connsiteX0" fmla="*/ 0 w 1607820"/>
-                  <a:gd name="connsiteY0" fmla="*/ 0 h 1651977"/>
-                  <a:gd name="connsiteX1" fmla="*/ 1607820 w 1607820"/>
-                  <a:gd name="connsiteY1" fmla="*/ 1651977 h 1651977"/>
-                  <a:gd name="connsiteX2" fmla="*/ 0 w 1607820"/>
-                  <a:gd name="connsiteY2" fmla="*/ 1651977 h 1651977"/>
-                </a:gdLst>
-                <a:ahLst/>
-                <a:cxnLst>
-                  <a:cxn ang="0">
-                    <a:pos x="connsiteX0" y="connsiteY0"/>
-                  </a:cxn>
-                  <a:cxn ang="0">
-                    <a:pos x="connsiteX1" y="connsiteY1"/>
-                  </a:cxn>
-                  <a:cxn ang="0">
-                    <a:pos x="connsiteX2" y="connsiteY2"/>
-                  </a:cxn>
-                </a:cxnLst>
-                <a:rect l="l" t="t" r="r" b="b"/>
-                <a:pathLst>
-                  <a:path w="1607820" h="1651977">
-                    <a:moveTo>
-                      <a:pt x="0" y="0"/>
-                    </a:moveTo>
-                    <a:cubicBezTo>
-                      <a:pt x="887974" y="0"/>
-                      <a:pt x="1607820" y="739615"/>
-                      <a:pt x="1607820" y="1651977"/>
-                    </a:cubicBezTo>
-                    <a:lnTo>
-                      <a:pt x="0" y="1651977"/>
-                    </a:lnTo>
-                    <a:close/>
-                  </a:path>
-                </a:pathLst>
-              </a:custGeom>
-              <a:solidFill>
-                <a:srgbClr val="0563C1"/>
-              </a:solidFill>
-              <a:ln w="57150">
-                <a:solidFill>
-                  <a:schemeClr val="tx1"/>
-                </a:solidFill>
-              </a:ln>
-            </p:spPr>
-            <p:style>
-              <a:lnRef idx="2">
-                <a:schemeClr val="accent1">
-                  <a:shade val="50000"/>
-                </a:schemeClr>
-              </a:lnRef>
-              <a:fillRef idx="1">
-                <a:schemeClr val="accent1"/>
-              </a:fillRef>
-              <a:effectRef idx="0">
-                <a:schemeClr val="accent1"/>
-              </a:effectRef>
-              <a:fontRef idx="minor">
-                <a:schemeClr val="lt1"/>
-              </a:fontRef>
-            </p:style>
-            <p:txBody>
-              <a:bodyPr rtlCol="0" anchor="ctr"/>
-              <a:lstStyle/>
-              <a:p>
-                <a:pPr algn="ctr"/>
-                <a:endParaRPr lang="en-US" dirty="0"/>
-              </a:p>
-            </p:txBody>
-          </p:sp>
-          <p:sp>
-            <p:nvSpPr>
-              <p:cNvPr id="81" name="Freeform 6">
-                <a:extLst>
-                  <a:ext uri="{FF2B5EF4-FFF2-40B4-BE49-F238E27FC236}">
-                    <a16:creationId xmlns:a16="http://schemas.microsoft.com/office/drawing/2014/main" id="{7B751F98-52F3-4976-A046-ECC629A487C1}"/>
-                  </a:ext>
-                </a:extLst>
-              </p:cNvPr>
-              <p:cNvSpPr>
-                <a:spLocks/>
-              </p:cNvSpPr>
-              <p:nvPr/>
-            </p:nvSpPr>
-            <p:spPr bwMode="auto">
-              <a:xfrm rot="10800000">
-                <a:off x="2202945" y="4100496"/>
-                <a:ext cx="337765" cy="805524"/>
-              </a:xfrm>
-              <a:custGeom>
-                <a:avLst/>
-                <a:gdLst/>
-                <a:ahLst/>
-                <a:cxnLst>
-                  <a:cxn ang="0">
-                    <a:pos x="0" y="0"/>
-                  </a:cxn>
-                  <a:cxn ang="0">
-                    <a:pos x="0" y="528"/>
-                  </a:cxn>
-                  <a:cxn ang="0">
-                    <a:pos x="3216" y="528"/>
-                  </a:cxn>
-                  <a:cxn ang="0">
-                    <a:pos x="3216" y="0"/>
-                  </a:cxn>
-                </a:cxnLst>
-                <a:rect l="0" t="0" r="r" b="b"/>
-                <a:pathLst>
-                  <a:path w="3216" h="528">
-                    <a:moveTo>
-                      <a:pt x="0" y="0"/>
-                    </a:moveTo>
-                    <a:lnTo>
-                      <a:pt x="0" y="528"/>
-                    </a:lnTo>
-                    <a:lnTo>
-                      <a:pt x="3216" y="528"/>
-                    </a:lnTo>
-                    <a:lnTo>
-                      <a:pt x="3216" y="0"/>
-                    </a:lnTo>
-                  </a:path>
-                </a:pathLst>
-              </a:custGeom>
-              <a:solidFill>
-                <a:schemeClr val="hlink"/>
-              </a:solidFill>
-              <a:ln w="57150" cap="flat" cmpd="sng">
-                <a:solidFill>
-                  <a:schemeClr val="tx1"/>
-                </a:solidFill>
-                <a:prstDash val="solid"/>
-                <a:round/>
-                <a:headEnd type="none" w="lg" len="med"/>
-                <a:tailEnd type="none" w="lg" len="med"/>
-              </a:ln>
-              <a:effectLst/>
-            </p:spPr>
-            <p:txBody>
-              <a:bodyPr wrap="square" anchor="ctr">
-                <a:noAutofit/>
               </a:bodyPr>
               <a:lstStyle/>
               <a:p>
@@ -9946,67 +9627,31 @@
           </p:sp>
           <p:sp>
             <p:nvSpPr>
-              <p:cNvPr id="82" name="Freeform 6">
+              <p:cNvPr id="15" name="Line 175">
                 <a:extLst>
                   <a:ext uri="{FF2B5EF4-FFF2-40B4-BE49-F238E27FC236}">
-                    <a16:creationId xmlns:a16="http://schemas.microsoft.com/office/drawing/2014/main" id="{9A71CA6B-FF7B-493E-98E3-C91CEFB37913}"/>
+                    <a16:creationId xmlns:a16="http://schemas.microsoft.com/office/drawing/2014/main" id="{D3B90883-7651-4669-9F16-25B26B0C4AB5}"/>
                   </a:ext>
                 </a:extLst>
               </p:cNvPr>
               <p:cNvSpPr>
-                <a:spLocks/>
+                <a:spLocks noChangeShapeType="1"/>
               </p:cNvSpPr>
               <p:nvPr/>
             </p:nvSpPr>
             <p:spPr bwMode="auto">
-              <a:xfrm rot="16200000">
-                <a:off x="2874558" y="4486679"/>
-                <a:ext cx="337765" cy="1069835"/>
+              <a:xfrm>
+                <a:off x="4446109" y="2395643"/>
+                <a:ext cx="482269" cy="0"/>
               </a:xfrm>
-              <a:custGeom>
+              <a:prstGeom prst="line">
                 <a:avLst/>
-                <a:gdLst/>
-                <a:ahLst/>
-                <a:cxnLst>
-                  <a:cxn ang="0">
-                    <a:pos x="0" y="0"/>
-                  </a:cxn>
-                  <a:cxn ang="0">
-                    <a:pos x="0" y="528"/>
-                  </a:cxn>
-                  <a:cxn ang="0">
-                    <a:pos x="3216" y="528"/>
-                  </a:cxn>
-                  <a:cxn ang="0">
-                    <a:pos x="3216" y="0"/>
-                  </a:cxn>
-                </a:cxnLst>
-                <a:rect l="0" t="0" r="r" b="b"/>
-                <a:pathLst>
-                  <a:path w="3216" h="528">
-                    <a:moveTo>
-                      <a:pt x="0" y="0"/>
-                    </a:moveTo>
-                    <a:lnTo>
-                      <a:pt x="0" y="528"/>
-                    </a:lnTo>
-                    <a:lnTo>
-                      <a:pt x="3216" y="528"/>
-                    </a:lnTo>
-                    <a:lnTo>
-                      <a:pt x="3216" y="0"/>
-                    </a:lnTo>
-                  </a:path>
-                </a:pathLst>
-              </a:custGeom>
-              <a:solidFill>
-                <a:schemeClr val="hlink"/>
-              </a:solidFill>
-              <a:ln w="57150" cap="flat" cmpd="sng">
+              </a:prstGeom>
+              <a:noFill/>
+              <a:ln w="12700">
                 <a:solidFill>
                   <a:schemeClr val="tx1"/>
                 </a:solidFill>
-                <a:prstDash val="solid"/>
                 <a:round/>
                 <a:headEnd type="none" w="lg" len="med"/>
                 <a:tailEnd type="none" w="lg" len="med"/>
@@ -10014,7 +9659,7 @@
               <a:effectLst/>
             </p:spPr>
             <p:txBody>
-              <a:bodyPr wrap="square" anchor="ctr">
+              <a:bodyPr anchor="ctr">
                 <a:spAutoFit/>
               </a:bodyPr>
               <a:lstStyle/>
@@ -10025,65 +9670,31 @@
           </p:sp>
           <p:sp>
             <p:nvSpPr>
-              <p:cNvPr id="83" name="Freeform 6">
+              <p:cNvPr id="16" name="Line 176">
                 <a:extLst>
                   <a:ext uri="{FF2B5EF4-FFF2-40B4-BE49-F238E27FC236}">
-                    <a16:creationId xmlns:a16="http://schemas.microsoft.com/office/drawing/2014/main" id="{F32E82B1-F14B-4EDA-8218-D6B73A05EEBF}"/>
+                    <a16:creationId xmlns:a16="http://schemas.microsoft.com/office/drawing/2014/main" id="{01FA9449-E78B-4BF7-B218-7190FC3DED7C}"/>
                   </a:ext>
                 </a:extLst>
               </p:cNvPr>
               <p:cNvSpPr>
-                <a:spLocks/>
+                <a:spLocks noChangeShapeType="1"/>
               </p:cNvSpPr>
               <p:nvPr/>
             </p:nvSpPr>
             <p:spPr bwMode="auto">
               <a:xfrm>
-                <a:off x="2233428" y="4021455"/>
-                <a:ext cx="289901" cy="864870"/>
+                <a:off x="4506392" y="2459782"/>
+                <a:ext cx="361702" cy="0"/>
               </a:xfrm>
-              <a:custGeom>
+              <a:prstGeom prst="line">
                 <a:avLst/>
-                <a:gdLst/>
-                <a:ahLst/>
-                <a:cxnLst>
-                  <a:cxn ang="0">
-                    <a:pos x="0" y="0"/>
-                  </a:cxn>
-                  <a:cxn ang="0">
-                    <a:pos x="0" y="528"/>
-                  </a:cxn>
-                  <a:cxn ang="0">
-                    <a:pos x="3216" y="528"/>
-                  </a:cxn>
-                  <a:cxn ang="0">
-                    <a:pos x="3216" y="0"/>
-                  </a:cxn>
-                </a:cxnLst>
-                <a:rect l="0" t="0" r="r" b="b"/>
-                <a:pathLst>
-                  <a:path w="3216" h="528">
-                    <a:moveTo>
-                      <a:pt x="0" y="0"/>
-                    </a:moveTo>
-                    <a:lnTo>
-                      <a:pt x="0" y="528"/>
-                    </a:lnTo>
-                    <a:lnTo>
-                      <a:pt x="3216" y="528"/>
-                    </a:lnTo>
-                    <a:lnTo>
-                      <a:pt x="3216" y="0"/>
-                    </a:lnTo>
-                  </a:path>
-                </a:pathLst>
-              </a:custGeom>
-              <a:solidFill>
-                <a:schemeClr val="hlink"/>
-              </a:solidFill>
-              <a:ln w="57150" cap="flat" cmpd="sng">
-                <a:noFill/>
-                <a:prstDash val="solid"/>
+              </a:prstGeom>
+              <a:noFill/>
+              <a:ln w="12700">
+                <a:solidFill>
+                  <a:schemeClr val="tx1"/>
+                </a:solidFill>
                 <a:round/>
                 <a:headEnd type="none" w="lg" len="med"/>
                 <a:tailEnd type="none" w="lg" len="med"/>
@@ -10091,8 +9702,624 @@
               <a:effectLst/>
             </p:spPr>
             <p:txBody>
-              <a:bodyPr wrap="square" anchor="ctr">
-                <a:noAutofit/>
+              <a:bodyPr anchor="ctr">
+                <a:spAutoFit/>
+              </a:bodyPr>
+              <a:lstStyle/>
+              <a:p>
+                <a:endParaRPr lang="en-US"/>
+              </a:p>
+            </p:txBody>
+          </p:sp>
+          <p:sp>
+            <p:nvSpPr>
+              <p:cNvPr id="17" name="Line 177">
+                <a:extLst>
+                  <a:ext uri="{FF2B5EF4-FFF2-40B4-BE49-F238E27FC236}">
+                    <a16:creationId xmlns:a16="http://schemas.microsoft.com/office/drawing/2014/main" id="{BE0340DA-996F-4A74-B664-787686F309E6}"/>
+                  </a:ext>
+                </a:extLst>
+              </p:cNvPr>
+              <p:cNvSpPr>
+                <a:spLocks noChangeShapeType="1"/>
+              </p:cNvSpPr>
+              <p:nvPr/>
+            </p:nvSpPr>
+            <p:spPr bwMode="auto">
+              <a:xfrm>
+                <a:off x="4576723" y="2523919"/>
+                <a:ext cx="218529" cy="0"/>
+              </a:xfrm>
+              <a:prstGeom prst="line">
+                <a:avLst/>
+              </a:prstGeom>
+              <a:noFill/>
+              <a:ln w="12700">
+                <a:solidFill>
+                  <a:schemeClr val="tx1"/>
+                </a:solidFill>
+                <a:round/>
+                <a:headEnd type="none" w="lg" len="med"/>
+                <a:tailEnd type="none" w="lg" len="med"/>
+              </a:ln>
+              <a:effectLst/>
+            </p:spPr>
+            <p:txBody>
+              <a:bodyPr anchor="ctr">
+                <a:spAutoFit/>
+              </a:bodyPr>
+              <a:lstStyle/>
+              <a:p>
+                <a:endParaRPr lang="en-US"/>
+              </a:p>
+            </p:txBody>
+          </p:sp>
+        </p:grpSp>
+        <p:sp>
+          <p:nvSpPr>
+            <p:cNvPr id="73" name="Freeform: Shape 72">
+              <a:extLst>
+                <a:ext uri="{FF2B5EF4-FFF2-40B4-BE49-F238E27FC236}">
+                  <a16:creationId xmlns:a16="http://schemas.microsoft.com/office/drawing/2014/main" id="{FDB7BD84-8132-4086-957B-E575587CE082}"/>
+                </a:ext>
+              </a:extLst>
+            </p:cNvPr>
+            <p:cNvSpPr/>
+            <p:nvPr/>
+          </p:nvSpPr>
+          <p:spPr>
+            <a:xfrm rot="10800000">
+              <a:off x="2202943" y="4857704"/>
+              <a:ext cx="337768" cy="332771"/>
+            </a:xfrm>
+            <a:custGeom>
+              <a:avLst/>
+              <a:gdLst>
+                <a:gd name="connsiteX0" fmla="*/ 0 w 1607820"/>
+                <a:gd name="connsiteY0" fmla="*/ 0 h 1651977"/>
+                <a:gd name="connsiteX1" fmla="*/ 1607820 w 1607820"/>
+                <a:gd name="connsiteY1" fmla="*/ 1651977 h 1651977"/>
+                <a:gd name="connsiteX2" fmla="*/ 0 w 1607820"/>
+                <a:gd name="connsiteY2" fmla="*/ 1651977 h 1651977"/>
+              </a:gdLst>
+              <a:ahLst/>
+              <a:cxnLst>
+                <a:cxn ang="0">
+                  <a:pos x="connsiteX0" y="connsiteY0"/>
+                </a:cxn>
+                <a:cxn ang="0">
+                  <a:pos x="connsiteX1" y="connsiteY1"/>
+                </a:cxn>
+                <a:cxn ang="0">
+                  <a:pos x="connsiteX2" y="connsiteY2"/>
+                </a:cxn>
+              </a:cxnLst>
+              <a:rect l="l" t="t" r="r" b="b"/>
+              <a:pathLst>
+                <a:path w="1607820" h="1651977">
+                  <a:moveTo>
+                    <a:pt x="0" y="0"/>
+                  </a:moveTo>
+                  <a:cubicBezTo>
+                    <a:pt x="887974" y="0"/>
+                    <a:pt x="1607820" y="739615"/>
+                    <a:pt x="1607820" y="1651977"/>
+                  </a:cubicBezTo>
+                  <a:lnTo>
+                    <a:pt x="0" y="1651977"/>
+                  </a:lnTo>
+                  <a:close/>
+                </a:path>
+              </a:pathLst>
+            </a:custGeom>
+            <a:solidFill>
+              <a:srgbClr val="0563C1"/>
+            </a:solidFill>
+            <a:ln w="57150">
+              <a:solidFill>
+                <a:schemeClr val="tx1"/>
+              </a:solidFill>
+            </a:ln>
+          </p:spPr>
+          <p:style>
+            <a:lnRef idx="2">
+              <a:schemeClr val="accent1">
+                <a:shade val="50000"/>
+              </a:schemeClr>
+            </a:lnRef>
+            <a:fillRef idx="1">
+              <a:schemeClr val="accent1"/>
+            </a:fillRef>
+            <a:effectRef idx="0">
+              <a:schemeClr val="accent1"/>
+            </a:effectRef>
+            <a:fontRef idx="minor">
+              <a:schemeClr val="lt1"/>
+            </a:fontRef>
+          </p:style>
+          <p:txBody>
+            <a:bodyPr rtlCol="0" anchor="ctr"/>
+            <a:lstStyle/>
+            <a:p>
+              <a:pPr algn="ctr"/>
+              <a:endParaRPr lang="en-US" dirty="0"/>
+            </a:p>
+          </p:txBody>
+        </p:sp>
+        <p:sp>
+          <p:nvSpPr>
+            <p:cNvPr id="81" name="Freeform 6">
+              <a:extLst>
+                <a:ext uri="{FF2B5EF4-FFF2-40B4-BE49-F238E27FC236}">
+                  <a16:creationId xmlns:a16="http://schemas.microsoft.com/office/drawing/2014/main" id="{7B751F98-52F3-4976-A046-ECC629A487C1}"/>
+                </a:ext>
+              </a:extLst>
+            </p:cNvPr>
+            <p:cNvSpPr>
+              <a:spLocks/>
+            </p:cNvSpPr>
+            <p:nvPr/>
+          </p:nvSpPr>
+          <p:spPr bwMode="auto">
+            <a:xfrm rot="10800000">
+              <a:off x="2202945" y="4100496"/>
+              <a:ext cx="337765" cy="805524"/>
+            </a:xfrm>
+            <a:custGeom>
+              <a:avLst/>
+              <a:gdLst/>
+              <a:ahLst/>
+              <a:cxnLst>
+                <a:cxn ang="0">
+                  <a:pos x="0" y="0"/>
+                </a:cxn>
+                <a:cxn ang="0">
+                  <a:pos x="0" y="528"/>
+                </a:cxn>
+                <a:cxn ang="0">
+                  <a:pos x="3216" y="528"/>
+                </a:cxn>
+                <a:cxn ang="0">
+                  <a:pos x="3216" y="0"/>
+                </a:cxn>
+              </a:cxnLst>
+              <a:rect l="0" t="0" r="r" b="b"/>
+              <a:pathLst>
+                <a:path w="3216" h="528">
+                  <a:moveTo>
+                    <a:pt x="0" y="0"/>
+                  </a:moveTo>
+                  <a:lnTo>
+                    <a:pt x="0" y="528"/>
+                  </a:lnTo>
+                  <a:lnTo>
+                    <a:pt x="3216" y="528"/>
+                  </a:lnTo>
+                  <a:lnTo>
+                    <a:pt x="3216" y="0"/>
+                  </a:lnTo>
+                </a:path>
+              </a:pathLst>
+            </a:custGeom>
+            <a:solidFill>
+              <a:schemeClr val="hlink"/>
+            </a:solidFill>
+            <a:ln w="57150" cap="flat" cmpd="sng">
+              <a:solidFill>
+                <a:schemeClr val="tx1"/>
+              </a:solidFill>
+              <a:prstDash val="solid"/>
+              <a:round/>
+              <a:headEnd type="none" w="lg" len="med"/>
+              <a:tailEnd type="none" w="lg" len="med"/>
+            </a:ln>
+            <a:effectLst/>
+          </p:spPr>
+          <p:txBody>
+            <a:bodyPr wrap="square" anchor="ctr">
+              <a:noAutofit/>
+            </a:bodyPr>
+            <a:lstStyle/>
+            <a:p>
+              <a:endParaRPr lang="en-US" dirty="0"/>
+            </a:p>
+          </p:txBody>
+        </p:sp>
+        <p:sp>
+          <p:nvSpPr>
+            <p:cNvPr id="82" name="Freeform 6">
+              <a:extLst>
+                <a:ext uri="{FF2B5EF4-FFF2-40B4-BE49-F238E27FC236}">
+                  <a16:creationId xmlns:a16="http://schemas.microsoft.com/office/drawing/2014/main" id="{9A71CA6B-FF7B-493E-98E3-C91CEFB37913}"/>
+                </a:ext>
+              </a:extLst>
+            </p:cNvPr>
+            <p:cNvSpPr>
+              <a:spLocks/>
+            </p:cNvSpPr>
+            <p:nvPr/>
+          </p:nvSpPr>
+          <p:spPr bwMode="auto">
+            <a:xfrm rot="16200000">
+              <a:off x="2874558" y="4486679"/>
+              <a:ext cx="337765" cy="1069835"/>
+            </a:xfrm>
+            <a:custGeom>
+              <a:avLst/>
+              <a:gdLst/>
+              <a:ahLst/>
+              <a:cxnLst>
+                <a:cxn ang="0">
+                  <a:pos x="0" y="0"/>
+                </a:cxn>
+                <a:cxn ang="0">
+                  <a:pos x="0" y="528"/>
+                </a:cxn>
+                <a:cxn ang="0">
+                  <a:pos x="3216" y="528"/>
+                </a:cxn>
+                <a:cxn ang="0">
+                  <a:pos x="3216" y="0"/>
+                </a:cxn>
+              </a:cxnLst>
+              <a:rect l="0" t="0" r="r" b="b"/>
+              <a:pathLst>
+                <a:path w="3216" h="528">
+                  <a:moveTo>
+                    <a:pt x="0" y="0"/>
+                  </a:moveTo>
+                  <a:lnTo>
+                    <a:pt x="0" y="528"/>
+                  </a:lnTo>
+                  <a:lnTo>
+                    <a:pt x="3216" y="528"/>
+                  </a:lnTo>
+                  <a:lnTo>
+                    <a:pt x="3216" y="0"/>
+                  </a:lnTo>
+                </a:path>
+              </a:pathLst>
+            </a:custGeom>
+            <a:solidFill>
+              <a:schemeClr val="hlink"/>
+            </a:solidFill>
+            <a:ln w="57150" cap="flat" cmpd="sng">
+              <a:solidFill>
+                <a:schemeClr val="tx1"/>
+              </a:solidFill>
+              <a:prstDash val="solid"/>
+              <a:round/>
+              <a:headEnd type="none" w="lg" len="med"/>
+              <a:tailEnd type="none" w="lg" len="med"/>
+            </a:ln>
+            <a:effectLst/>
+          </p:spPr>
+          <p:txBody>
+            <a:bodyPr wrap="square" anchor="ctr">
+              <a:spAutoFit/>
+            </a:bodyPr>
+            <a:lstStyle/>
+            <a:p>
+              <a:endParaRPr lang="en-US"/>
+            </a:p>
+          </p:txBody>
+        </p:sp>
+        <p:sp>
+          <p:nvSpPr>
+            <p:cNvPr id="83" name="Freeform 6">
+              <a:extLst>
+                <a:ext uri="{FF2B5EF4-FFF2-40B4-BE49-F238E27FC236}">
+                  <a16:creationId xmlns:a16="http://schemas.microsoft.com/office/drawing/2014/main" id="{F32E82B1-F14B-4EDA-8218-D6B73A05EEBF}"/>
+                </a:ext>
+              </a:extLst>
+            </p:cNvPr>
+            <p:cNvSpPr>
+              <a:spLocks/>
+            </p:cNvSpPr>
+            <p:nvPr/>
+          </p:nvSpPr>
+          <p:spPr bwMode="auto">
+            <a:xfrm>
+              <a:off x="2233428" y="4021455"/>
+              <a:ext cx="289901" cy="864870"/>
+            </a:xfrm>
+            <a:custGeom>
+              <a:avLst/>
+              <a:gdLst/>
+              <a:ahLst/>
+              <a:cxnLst>
+                <a:cxn ang="0">
+                  <a:pos x="0" y="0"/>
+                </a:cxn>
+                <a:cxn ang="0">
+                  <a:pos x="0" y="528"/>
+                </a:cxn>
+                <a:cxn ang="0">
+                  <a:pos x="3216" y="528"/>
+                </a:cxn>
+                <a:cxn ang="0">
+                  <a:pos x="3216" y="0"/>
+                </a:cxn>
+              </a:cxnLst>
+              <a:rect l="0" t="0" r="r" b="b"/>
+              <a:pathLst>
+                <a:path w="3216" h="528">
+                  <a:moveTo>
+                    <a:pt x="0" y="0"/>
+                  </a:moveTo>
+                  <a:lnTo>
+                    <a:pt x="0" y="528"/>
+                  </a:lnTo>
+                  <a:lnTo>
+                    <a:pt x="3216" y="528"/>
+                  </a:lnTo>
+                  <a:lnTo>
+                    <a:pt x="3216" y="0"/>
+                  </a:lnTo>
+                </a:path>
+              </a:pathLst>
+            </a:custGeom>
+            <a:solidFill>
+              <a:schemeClr val="hlink"/>
+            </a:solidFill>
+            <a:ln w="57150" cap="flat" cmpd="sng">
+              <a:noFill/>
+              <a:prstDash val="solid"/>
+              <a:round/>
+              <a:headEnd type="none" w="lg" len="med"/>
+              <a:tailEnd type="none" w="lg" len="med"/>
+            </a:ln>
+            <a:effectLst/>
+          </p:spPr>
+          <p:txBody>
+            <a:bodyPr wrap="square" anchor="ctr">
+              <a:noAutofit/>
+            </a:bodyPr>
+            <a:lstStyle/>
+            <a:p>
+              <a:endParaRPr lang="en-US" dirty="0"/>
+            </a:p>
+          </p:txBody>
+        </p:sp>
+        <p:sp>
+          <p:nvSpPr>
+            <p:cNvPr id="12" name="Arc 11">
+              <a:extLst>
+                <a:ext uri="{FF2B5EF4-FFF2-40B4-BE49-F238E27FC236}">
+                  <a16:creationId xmlns:a16="http://schemas.microsoft.com/office/drawing/2014/main" id="{C6451BFB-CAA6-456A-8990-C897C6436C7F}"/>
+                </a:ext>
+              </a:extLst>
+            </p:cNvPr>
+            <p:cNvSpPr/>
+            <p:nvPr/>
+          </p:nvSpPr>
+          <p:spPr>
+            <a:xfrm flipH="1">
+              <a:off x="2443538" y="3669480"/>
+              <a:ext cx="1755648" cy="1163421"/>
+            </a:xfrm>
+            <a:prstGeom prst="arc">
+              <a:avLst/>
+            </a:prstGeom>
+            <a:ln w="38100">
+              <a:solidFill>
+                <a:schemeClr val="tx1"/>
+              </a:solidFill>
+              <a:headEnd type="none"/>
+              <a:tailEnd type="triangle"/>
+            </a:ln>
+          </p:spPr>
+          <p:style>
+            <a:lnRef idx="1">
+              <a:schemeClr val="accent1"/>
+            </a:lnRef>
+            <a:fillRef idx="0">
+              <a:schemeClr val="accent1"/>
+            </a:fillRef>
+            <a:effectRef idx="0">
+              <a:schemeClr val="accent1"/>
+            </a:effectRef>
+            <a:fontRef idx="minor">
+              <a:schemeClr val="tx1"/>
+            </a:fontRef>
+          </p:style>
+          <p:txBody>
+            <a:bodyPr rtlCol="0" anchor="ctr"/>
+            <a:lstStyle/>
+            <a:p>
+              <a:pPr algn="ctr"/>
+              <a:endParaRPr lang="en-US"/>
+            </a:p>
+          </p:txBody>
+        </p:sp>
+        <p:sp>
+          <p:nvSpPr>
+            <p:cNvPr id="84" name="Arc 83">
+              <a:extLst>
+                <a:ext uri="{FF2B5EF4-FFF2-40B4-BE49-F238E27FC236}">
+                  <a16:creationId xmlns:a16="http://schemas.microsoft.com/office/drawing/2014/main" id="{71DF734D-5A0F-4A39-80B0-153C18B99726}"/>
+                </a:ext>
+              </a:extLst>
+            </p:cNvPr>
+            <p:cNvSpPr/>
+            <p:nvPr/>
+          </p:nvSpPr>
+          <p:spPr>
+            <a:xfrm>
+              <a:off x="555898" y="3665999"/>
+              <a:ext cx="1750978" cy="1163421"/>
+            </a:xfrm>
+            <a:prstGeom prst="arc">
+              <a:avLst/>
+            </a:prstGeom>
+            <a:ln w="38100">
+              <a:solidFill>
+                <a:schemeClr val="tx1"/>
+              </a:solidFill>
+              <a:headEnd type="none"/>
+              <a:tailEnd type="triangle"/>
+            </a:ln>
+          </p:spPr>
+          <p:style>
+            <a:lnRef idx="1">
+              <a:schemeClr val="accent1"/>
+            </a:lnRef>
+            <a:fillRef idx="0">
+              <a:schemeClr val="accent1"/>
+            </a:fillRef>
+            <a:effectRef idx="0">
+              <a:schemeClr val="accent1"/>
+            </a:effectRef>
+            <a:fontRef idx="minor">
+              <a:schemeClr val="tx1"/>
+            </a:fontRef>
+          </p:style>
+          <p:txBody>
+            <a:bodyPr rtlCol="0" anchor="ctr"/>
+            <a:lstStyle/>
+            <a:p>
+              <a:pPr algn="ctr"/>
+              <a:endParaRPr lang="en-US"/>
+            </a:p>
+          </p:txBody>
+        </p:sp>
+        <p:sp>
+          <p:nvSpPr>
+            <p:cNvPr id="86" name="Freeform 6">
+              <a:extLst>
+                <a:ext uri="{FF2B5EF4-FFF2-40B4-BE49-F238E27FC236}">
+                  <a16:creationId xmlns:a16="http://schemas.microsoft.com/office/drawing/2014/main" id="{63CD7D0A-761A-4A7E-B4F4-46AE9D6A5FE1}"/>
+                </a:ext>
+              </a:extLst>
+            </p:cNvPr>
+            <p:cNvSpPr>
+              <a:spLocks/>
+            </p:cNvSpPr>
+            <p:nvPr/>
+          </p:nvSpPr>
+          <p:spPr bwMode="auto">
+            <a:xfrm>
+              <a:off x="5025246" y="1143000"/>
+              <a:ext cx="2971800" cy="2971800"/>
+            </a:xfrm>
+            <a:custGeom>
+              <a:avLst/>
+              <a:gdLst/>
+              <a:ahLst/>
+              <a:cxnLst>
+                <a:cxn ang="0">
+                  <a:pos x="0" y="0"/>
+                </a:cxn>
+                <a:cxn ang="0">
+                  <a:pos x="0" y="528"/>
+                </a:cxn>
+                <a:cxn ang="0">
+                  <a:pos x="3216" y="528"/>
+                </a:cxn>
+                <a:cxn ang="0">
+                  <a:pos x="3216" y="0"/>
+                </a:cxn>
+              </a:cxnLst>
+              <a:rect l="0" t="0" r="r" b="b"/>
+              <a:pathLst>
+                <a:path w="3216" h="528">
+                  <a:moveTo>
+                    <a:pt x="0" y="0"/>
+                  </a:moveTo>
+                  <a:lnTo>
+                    <a:pt x="0" y="528"/>
+                  </a:lnTo>
+                  <a:lnTo>
+                    <a:pt x="3216" y="528"/>
+                  </a:lnTo>
+                  <a:lnTo>
+                    <a:pt x="3216" y="0"/>
+                  </a:lnTo>
+                </a:path>
+              </a:pathLst>
+            </a:custGeom>
+            <a:solidFill>
+              <a:schemeClr val="hlink"/>
+            </a:solidFill>
+            <a:ln w="57150" cap="flat" cmpd="sng">
+              <a:solidFill>
+                <a:schemeClr val="tx1"/>
+              </a:solidFill>
+              <a:prstDash val="solid"/>
+              <a:round/>
+              <a:headEnd type="none" w="lg" len="med"/>
+              <a:tailEnd type="none" w="lg" len="med"/>
+            </a:ln>
+            <a:effectLst/>
+          </p:spPr>
+          <p:txBody>
+            <a:bodyPr wrap="square" anchor="ctr">
+              <a:spAutoFit/>
+            </a:bodyPr>
+            <a:lstStyle/>
+            <a:p>
+              <a:endParaRPr lang="en-US"/>
+            </a:p>
+          </p:txBody>
+        </p:sp>
+        <p:grpSp>
+          <p:nvGrpSpPr>
+            <p:cNvPr id="87" name="Group 86">
+              <a:extLst>
+                <a:ext uri="{FF2B5EF4-FFF2-40B4-BE49-F238E27FC236}">
+                  <a16:creationId xmlns:a16="http://schemas.microsoft.com/office/drawing/2014/main" id="{929B1060-9895-4E6D-9B2F-6D401D0AEFEF}"/>
+                </a:ext>
+              </a:extLst>
+            </p:cNvPr>
+            <p:cNvGrpSpPr/>
+            <p:nvPr/>
+          </p:nvGrpSpPr>
+          <p:grpSpPr>
+            <a:xfrm>
+              <a:off x="5287517" y="932772"/>
+              <a:ext cx="482269" cy="420455"/>
+              <a:chOff x="4446109" y="2103464"/>
+              <a:chExt cx="482269" cy="420455"/>
+            </a:xfrm>
+          </p:grpSpPr>
+          <p:sp>
+            <p:nvSpPr>
+              <p:cNvPr id="94" name="AutoShape 174">
+                <a:extLst>
+                  <a:ext uri="{FF2B5EF4-FFF2-40B4-BE49-F238E27FC236}">
+                    <a16:creationId xmlns:a16="http://schemas.microsoft.com/office/drawing/2014/main" id="{23FB582D-21B0-4157-A485-1456DC2A6345}"/>
+                  </a:ext>
+                </a:extLst>
+              </p:cNvPr>
+              <p:cNvSpPr>
+                <a:spLocks noChangeArrowheads="1"/>
+              </p:cNvSpPr>
+              <p:nvPr/>
+            </p:nvSpPr>
+            <p:spPr bwMode="auto">
+              <a:xfrm flipV="1">
+                <a:off x="4506392" y="2103464"/>
+                <a:ext cx="361702" cy="228043"/>
+              </a:xfrm>
+              <a:prstGeom prst="triangle">
+                <a:avLst>
+                  <a:gd name="adj" fmla="val 50000"/>
+                </a:avLst>
+              </a:prstGeom>
+              <a:noFill/>
+              <a:ln w="12700">
+                <a:solidFill>
+                  <a:schemeClr val="tx1"/>
+                </a:solidFill>
+                <a:miter lim="800000"/>
+                <a:headEnd type="none" w="lg" len="med"/>
+                <a:tailEnd type="none" w="lg" len="med"/>
+              </a:ln>
+              <a:effectLst/>
+            </p:spPr>
+            <p:txBody>
+              <a:bodyPr anchor="ctr">
+                <a:spAutoFit/>
               </a:bodyPr>
               <a:lstStyle/>
               <a:p>
@@ -10102,190 +10329,31 @@
           </p:sp>
           <p:sp>
             <p:nvSpPr>
-              <p:cNvPr id="12" name="Arc 11">
+              <p:cNvPr id="95" name="Line 175">
                 <a:extLst>
                   <a:ext uri="{FF2B5EF4-FFF2-40B4-BE49-F238E27FC236}">
-                    <a16:creationId xmlns:a16="http://schemas.microsoft.com/office/drawing/2014/main" id="{C6451BFB-CAA6-456A-8990-C897C6436C7F}"/>
-                  </a:ext>
-                </a:extLst>
-              </p:cNvPr>
-              <p:cNvSpPr/>
-              <p:nvPr/>
-            </p:nvSpPr>
-            <p:spPr>
-              <a:xfrm flipH="1">
-                <a:off x="2443538" y="3669480"/>
-                <a:ext cx="1755648" cy="1163421"/>
-              </a:xfrm>
-              <a:prstGeom prst="arc">
-                <a:avLst/>
-              </a:prstGeom>
-              <a:ln w="38100">
-                <a:solidFill>
-                  <a:schemeClr val="tx1"/>
-                </a:solidFill>
-                <a:headEnd type="none"/>
-                <a:tailEnd type="triangle"/>
-              </a:ln>
-            </p:spPr>
-            <p:style>
-              <a:lnRef idx="1">
-                <a:schemeClr val="accent1"/>
-              </a:lnRef>
-              <a:fillRef idx="0">
-                <a:schemeClr val="accent1"/>
-              </a:fillRef>
-              <a:effectRef idx="0">
-                <a:schemeClr val="accent1"/>
-              </a:effectRef>
-              <a:fontRef idx="minor">
-                <a:schemeClr val="tx1"/>
-              </a:fontRef>
-            </p:style>
-            <p:txBody>
-              <a:bodyPr rtlCol="0" anchor="ctr"/>
-              <a:lstStyle/>
-              <a:p>
-                <a:pPr algn="ctr"/>
-                <a:endParaRPr lang="en-US"/>
-              </a:p>
-            </p:txBody>
-          </p:sp>
-          <p:sp>
-            <p:nvSpPr>
-              <p:cNvPr id="84" name="Arc 83">
-                <a:extLst>
-                  <a:ext uri="{FF2B5EF4-FFF2-40B4-BE49-F238E27FC236}">
-                    <a16:creationId xmlns:a16="http://schemas.microsoft.com/office/drawing/2014/main" id="{71DF734D-5A0F-4A39-80B0-153C18B99726}"/>
-                  </a:ext>
-                </a:extLst>
-              </p:cNvPr>
-              <p:cNvSpPr/>
-              <p:nvPr/>
-            </p:nvSpPr>
-            <p:spPr>
-              <a:xfrm>
-                <a:off x="555898" y="3665999"/>
-                <a:ext cx="1750978" cy="1163421"/>
-              </a:xfrm>
-              <a:prstGeom prst="arc">
-                <a:avLst/>
-              </a:prstGeom>
-              <a:ln w="38100">
-                <a:solidFill>
-                  <a:schemeClr val="tx1"/>
-                </a:solidFill>
-                <a:headEnd type="none"/>
-                <a:tailEnd type="triangle"/>
-              </a:ln>
-            </p:spPr>
-            <p:style>
-              <a:lnRef idx="1">
-                <a:schemeClr val="accent1"/>
-              </a:lnRef>
-              <a:fillRef idx="0">
-                <a:schemeClr val="accent1"/>
-              </a:fillRef>
-              <a:effectRef idx="0">
-                <a:schemeClr val="accent1"/>
-              </a:effectRef>
-              <a:fontRef idx="minor">
-                <a:schemeClr val="tx1"/>
-              </a:fontRef>
-            </p:style>
-            <p:txBody>
-              <a:bodyPr rtlCol="0" anchor="ctr"/>
-              <a:lstStyle/>
-              <a:p>
-                <a:pPr algn="ctr"/>
-                <a:endParaRPr lang="en-US"/>
-              </a:p>
-            </p:txBody>
-          </p:sp>
-        </p:grpSp>
-        <p:grpSp>
-          <p:nvGrpSpPr>
-            <p:cNvPr id="85" name="Group 84">
-              <a:extLst>
-                <a:ext uri="{FF2B5EF4-FFF2-40B4-BE49-F238E27FC236}">
-                  <a16:creationId xmlns:a16="http://schemas.microsoft.com/office/drawing/2014/main" id="{D06EF90B-2C25-4D69-9449-019C0BD35A85}"/>
-                </a:ext>
-              </a:extLst>
-            </p:cNvPr>
-            <p:cNvGrpSpPr/>
-            <p:nvPr/>
-          </p:nvGrpSpPr>
-          <p:grpSpPr>
-            <a:xfrm>
-              <a:off x="5025246" y="1237572"/>
-              <a:ext cx="2971800" cy="3952907"/>
-              <a:chOff x="838200" y="1237572"/>
-              <a:chExt cx="2971800" cy="3952907"/>
-            </a:xfrm>
-          </p:grpSpPr>
-          <p:sp>
-            <p:nvSpPr>
-              <p:cNvPr id="86" name="Freeform 6">
-                <a:extLst>
-                  <a:ext uri="{FF2B5EF4-FFF2-40B4-BE49-F238E27FC236}">
-                    <a16:creationId xmlns:a16="http://schemas.microsoft.com/office/drawing/2014/main" id="{63CD7D0A-761A-4A7E-B4F4-46AE9D6A5FE1}"/>
+                    <a16:creationId xmlns:a16="http://schemas.microsoft.com/office/drawing/2014/main" id="{7A1233CF-8AA0-49F0-85DA-2679D0A9C660}"/>
                   </a:ext>
                 </a:extLst>
               </p:cNvPr>
               <p:cNvSpPr>
-                <a:spLocks/>
+                <a:spLocks noChangeShapeType="1"/>
               </p:cNvSpPr>
               <p:nvPr/>
             </p:nvSpPr>
             <p:spPr bwMode="auto">
               <a:xfrm>
-                <a:off x="838200" y="1447800"/>
-                <a:ext cx="2971800" cy="2971800"/>
+                <a:off x="4446109" y="2395643"/>
+                <a:ext cx="482269" cy="0"/>
               </a:xfrm>
-              <a:custGeom>
+              <a:prstGeom prst="line">
                 <a:avLst/>
-                <a:gdLst/>
-                <a:ahLst/>
-                <a:cxnLst>
-                  <a:cxn ang="0">
-                    <a:pos x="0" y="0"/>
-                  </a:cxn>
-                  <a:cxn ang="0">
-                    <a:pos x="0" y="528"/>
-                  </a:cxn>
-                  <a:cxn ang="0">
-                    <a:pos x="3216" y="528"/>
-                  </a:cxn>
-                  <a:cxn ang="0">
-                    <a:pos x="3216" y="0"/>
-                  </a:cxn>
-                </a:cxnLst>
-                <a:rect l="0" t="0" r="r" b="b"/>
-                <a:pathLst>
-                  <a:path w="3216" h="528">
-                    <a:moveTo>
-                      <a:pt x="0" y="0"/>
-                    </a:moveTo>
-                    <a:lnTo>
-                      <a:pt x="0" y="528"/>
-                    </a:lnTo>
-                    <a:lnTo>
-                      <a:pt x="3216" y="528"/>
-                    </a:lnTo>
-                    <a:lnTo>
-                      <a:pt x="3216" y="0"/>
-                    </a:lnTo>
-                  </a:path>
-                </a:pathLst>
-              </a:custGeom>
-              <a:solidFill>
-                <a:schemeClr val="hlink"/>
-              </a:solidFill>
-              <a:ln w="57150" cap="flat" cmpd="sng">
+              </a:prstGeom>
+              <a:noFill/>
+              <a:ln w="12700">
                 <a:solidFill>
                   <a:schemeClr val="tx1"/>
                 </a:solidFill>
-                <a:prstDash val="solid"/>
                 <a:round/>
                 <a:headEnd type="none" w="lg" len="med"/>
                 <a:tailEnd type="none" w="lg" len="med"/>
@@ -10293,7 +10361,7 @@
               <a:effectLst/>
             </p:spPr>
             <p:txBody>
-              <a:bodyPr wrap="square" anchor="ctr">
+              <a:bodyPr anchor="ctr">
                 <a:spAutoFit/>
               </a:bodyPr>
               <a:lstStyle/>
@@ -10302,355 +10370,33 @@
               </a:p>
             </p:txBody>
           </p:sp>
-          <p:grpSp>
-            <p:nvGrpSpPr>
-              <p:cNvPr id="87" name="Group 86">
+          <p:sp>
+            <p:nvSpPr>
+              <p:cNvPr id="96" name="Line 176">
                 <a:extLst>
                   <a:ext uri="{FF2B5EF4-FFF2-40B4-BE49-F238E27FC236}">
-                    <a16:creationId xmlns:a16="http://schemas.microsoft.com/office/drawing/2014/main" id="{929B1060-9895-4E6D-9B2F-6D401D0AEFEF}"/>
-                  </a:ext>
-                </a:extLst>
-              </p:cNvPr>
-              <p:cNvGrpSpPr/>
-              <p:nvPr/>
-            </p:nvGrpSpPr>
-            <p:grpSpPr>
-              <a:xfrm>
-                <a:off x="1100471" y="1237572"/>
-                <a:ext cx="482269" cy="420455"/>
-                <a:chOff x="4446109" y="2103464"/>
-                <a:chExt cx="482269" cy="420455"/>
-              </a:xfrm>
-            </p:grpSpPr>
-            <p:sp>
-              <p:nvSpPr>
-                <p:cNvPr id="94" name="AutoShape 174">
-                  <a:extLst>
-                    <a:ext uri="{FF2B5EF4-FFF2-40B4-BE49-F238E27FC236}">
-                      <a16:creationId xmlns:a16="http://schemas.microsoft.com/office/drawing/2014/main" id="{23FB582D-21B0-4157-A485-1456DC2A6345}"/>
-                    </a:ext>
-                  </a:extLst>
-                </p:cNvPr>
-                <p:cNvSpPr>
-                  <a:spLocks noChangeArrowheads="1"/>
-                </p:cNvSpPr>
-                <p:nvPr/>
-              </p:nvSpPr>
-              <p:spPr bwMode="auto">
-                <a:xfrm flipV="1">
-                  <a:off x="4506392" y="2103464"/>
-                  <a:ext cx="361702" cy="228043"/>
-                </a:xfrm>
-                <a:prstGeom prst="triangle">
-                  <a:avLst>
-                    <a:gd name="adj" fmla="val 50000"/>
-                  </a:avLst>
-                </a:prstGeom>
-                <a:noFill/>
-                <a:ln w="12700">
-                  <a:solidFill>
-                    <a:schemeClr val="tx1"/>
-                  </a:solidFill>
-                  <a:miter lim="800000"/>
-                  <a:headEnd type="none" w="lg" len="med"/>
-                  <a:tailEnd type="none" w="lg" len="med"/>
-                </a:ln>
-                <a:effectLst/>
-              </p:spPr>
-              <p:txBody>
-                <a:bodyPr anchor="ctr">
-                  <a:spAutoFit/>
-                </a:bodyPr>
-                <a:lstStyle/>
-                <a:p>
-                  <a:endParaRPr lang="en-US" dirty="0"/>
-                </a:p>
-              </p:txBody>
-            </p:sp>
-            <p:sp>
-              <p:nvSpPr>
-                <p:cNvPr id="95" name="Line 175">
-                  <a:extLst>
-                    <a:ext uri="{FF2B5EF4-FFF2-40B4-BE49-F238E27FC236}">
-                      <a16:creationId xmlns:a16="http://schemas.microsoft.com/office/drawing/2014/main" id="{7A1233CF-8AA0-49F0-85DA-2679D0A9C660}"/>
-                    </a:ext>
-                  </a:extLst>
-                </p:cNvPr>
-                <p:cNvSpPr>
-                  <a:spLocks noChangeShapeType="1"/>
-                </p:cNvSpPr>
-                <p:nvPr/>
-              </p:nvSpPr>
-              <p:spPr bwMode="auto">
-                <a:xfrm>
-                  <a:off x="4446109" y="2395643"/>
-                  <a:ext cx="482269" cy="0"/>
-                </a:xfrm>
-                <a:prstGeom prst="line">
-                  <a:avLst/>
-                </a:prstGeom>
-                <a:noFill/>
-                <a:ln w="12700">
-                  <a:solidFill>
-                    <a:schemeClr val="tx1"/>
-                  </a:solidFill>
-                  <a:round/>
-                  <a:headEnd type="none" w="lg" len="med"/>
-                  <a:tailEnd type="none" w="lg" len="med"/>
-                </a:ln>
-                <a:effectLst/>
-              </p:spPr>
-              <p:txBody>
-                <a:bodyPr anchor="ctr">
-                  <a:spAutoFit/>
-                </a:bodyPr>
-                <a:lstStyle/>
-                <a:p>
-                  <a:endParaRPr lang="en-US"/>
-                </a:p>
-              </p:txBody>
-            </p:sp>
-            <p:sp>
-              <p:nvSpPr>
-                <p:cNvPr id="96" name="Line 176">
-                  <a:extLst>
-                    <a:ext uri="{FF2B5EF4-FFF2-40B4-BE49-F238E27FC236}">
-                      <a16:creationId xmlns:a16="http://schemas.microsoft.com/office/drawing/2014/main" id="{59CAEBE5-A3F1-4203-AF84-96C94A0323FD}"/>
-                    </a:ext>
-                  </a:extLst>
-                </p:cNvPr>
-                <p:cNvSpPr>
-                  <a:spLocks noChangeShapeType="1"/>
-                </p:cNvSpPr>
-                <p:nvPr/>
-              </p:nvSpPr>
-              <p:spPr bwMode="auto">
-                <a:xfrm>
-                  <a:off x="4506392" y="2459782"/>
-                  <a:ext cx="361702" cy="0"/>
-                </a:xfrm>
-                <a:prstGeom prst="line">
-                  <a:avLst/>
-                </a:prstGeom>
-                <a:noFill/>
-                <a:ln w="12700">
-                  <a:solidFill>
-                    <a:schemeClr val="tx1"/>
-                  </a:solidFill>
-                  <a:round/>
-                  <a:headEnd type="none" w="lg" len="med"/>
-                  <a:tailEnd type="none" w="lg" len="med"/>
-                </a:ln>
-                <a:effectLst/>
-              </p:spPr>
-              <p:txBody>
-                <a:bodyPr anchor="ctr">
-                  <a:spAutoFit/>
-                </a:bodyPr>
-                <a:lstStyle/>
-                <a:p>
-                  <a:endParaRPr lang="en-US"/>
-                </a:p>
-              </p:txBody>
-            </p:sp>
-            <p:sp>
-              <p:nvSpPr>
-                <p:cNvPr id="97" name="Line 177">
-                  <a:extLst>
-                    <a:ext uri="{FF2B5EF4-FFF2-40B4-BE49-F238E27FC236}">
-                      <a16:creationId xmlns:a16="http://schemas.microsoft.com/office/drawing/2014/main" id="{8EA50985-6C5E-4008-9BD0-16FB1E983D3C}"/>
-                    </a:ext>
-                  </a:extLst>
-                </p:cNvPr>
-                <p:cNvSpPr>
-                  <a:spLocks noChangeShapeType="1"/>
-                </p:cNvSpPr>
-                <p:nvPr/>
-              </p:nvSpPr>
-              <p:spPr bwMode="auto">
-                <a:xfrm>
-                  <a:off x="4576723" y="2523919"/>
-                  <a:ext cx="218529" cy="0"/>
-                </a:xfrm>
-                <a:prstGeom prst="line">
-                  <a:avLst/>
-                </a:prstGeom>
-                <a:noFill/>
-                <a:ln w="12700">
-                  <a:solidFill>
-                    <a:schemeClr val="tx1"/>
-                  </a:solidFill>
-                  <a:round/>
-                  <a:headEnd type="none" w="lg" len="med"/>
-                  <a:tailEnd type="none" w="lg" len="med"/>
-                </a:ln>
-                <a:effectLst/>
-              </p:spPr>
-              <p:txBody>
-                <a:bodyPr anchor="ctr">
-                  <a:spAutoFit/>
-                </a:bodyPr>
-                <a:lstStyle/>
-                <a:p>
-                  <a:endParaRPr lang="en-US"/>
-                </a:p>
-              </p:txBody>
-            </p:sp>
-          </p:grpSp>
-          <p:sp>
-            <p:nvSpPr>
-              <p:cNvPr id="88" name="Freeform: Shape 87">
-                <a:extLst>
-                  <a:ext uri="{FF2B5EF4-FFF2-40B4-BE49-F238E27FC236}">
-                    <a16:creationId xmlns:a16="http://schemas.microsoft.com/office/drawing/2014/main" id="{72A777ED-A07D-4B34-87F5-D5B53E8C675E}"/>
-                  </a:ext>
-                </a:extLst>
-              </p:cNvPr>
-              <p:cNvSpPr/>
-              <p:nvPr/>
-            </p:nvSpPr>
-            <p:spPr>
-              <a:xfrm rot="10800000">
-                <a:off x="2202943" y="4857704"/>
-                <a:ext cx="337768" cy="332771"/>
-              </a:xfrm>
-              <a:custGeom>
-                <a:avLst/>
-                <a:gdLst>
-                  <a:gd name="connsiteX0" fmla="*/ 0 w 1607820"/>
-                  <a:gd name="connsiteY0" fmla="*/ 0 h 1651977"/>
-                  <a:gd name="connsiteX1" fmla="*/ 1607820 w 1607820"/>
-                  <a:gd name="connsiteY1" fmla="*/ 1651977 h 1651977"/>
-                  <a:gd name="connsiteX2" fmla="*/ 0 w 1607820"/>
-                  <a:gd name="connsiteY2" fmla="*/ 1651977 h 1651977"/>
-                </a:gdLst>
-                <a:ahLst/>
-                <a:cxnLst>
-                  <a:cxn ang="0">
-                    <a:pos x="connsiteX0" y="connsiteY0"/>
-                  </a:cxn>
-                  <a:cxn ang="0">
-                    <a:pos x="connsiteX1" y="connsiteY1"/>
-                  </a:cxn>
-                  <a:cxn ang="0">
-                    <a:pos x="connsiteX2" y="connsiteY2"/>
-                  </a:cxn>
-                </a:cxnLst>
-                <a:rect l="l" t="t" r="r" b="b"/>
-                <a:pathLst>
-                  <a:path w="1607820" h="1651977">
-                    <a:moveTo>
-                      <a:pt x="0" y="0"/>
-                    </a:moveTo>
-                    <a:cubicBezTo>
-                      <a:pt x="887974" y="0"/>
-                      <a:pt x="1607820" y="739615"/>
-                      <a:pt x="1607820" y="1651977"/>
-                    </a:cubicBezTo>
-                    <a:lnTo>
-                      <a:pt x="0" y="1651977"/>
-                    </a:lnTo>
-                    <a:close/>
-                  </a:path>
-                </a:pathLst>
-              </a:custGeom>
-              <a:solidFill>
-                <a:schemeClr val="bg1"/>
-              </a:solidFill>
-              <a:ln w="57150">
-                <a:solidFill>
-                  <a:schemeClr val="tx1"/>
-                </a:solidFill>
-              </a:ln>
-            </p:spPr>
-            <p:style>
-              <a:lnRef idx="2">
-                <a:schemeClr val="accent1">
-                  <a:shade val="50000"/>
-                </a:schemeClr>
-              </a:lnRef>
-              <a:fillRef idx="1">
-                <a:schemeClr val="accent1"/>
-              </a:fillRef>
-              <a:effectRef idx="0">
-                <a:schemeClr val="accent1"/>
-              </a:effectRef>
-              <a:fontRef idx="minor">
-                <a:schemeClr val="lt1"/>
-              </a:fontRef>
-            </p:style>
-            <p:txBody>
-              <a:bodyPr rtlCol="0" anchor="ctr"/>
-              <a:lstStyle/>
-              <a:p>
-                <a:pPr algn="ctr"/>
-                <a:endParaRPr lang="en-US" dirty="0"/>
-              </a:p>
-            </p:txBody>
-          </p:sp>
-          <p:sp>
-            <p:nvSpPr>
-              <p:cNvPr id="89" name="Freeform 6">
-                <a:extLst>
-                  <a:ext uri="{FF2B5EF4-FFF2-40B4-BE49-F238E27FC236}">
-                    <a16:creationId xmlns:a16="http://schemas.microsoft.com/office/drawing/2014/main" id="{8CFC8880-E90E-4FAC-85FF-870A9B020C8E}"/>
+                    <a16:creationId xmlns:a16="http://schemas.microsoft.com/office/drawing/2014/main" id="{59CAEBE5-A3F1-4203-AF84-96C94A0323FD}"/>
                   </a:ext>
                 </a:extLst>
               </p:cNvPr>
               <p:cNvSpPr>
-                <a:spLocks/>
+                <a:spLocks noChangeShapeType="1"/>
               </p:cNvSpPr>
               <p:nvPr/>
             </p:nvSpPr>
             <p:spPr bwMode="auto">
-              <a:xfrm rot="10800000">
-                <a:off x="2202944" y="4100493"/>
-                <a:ext cx="337765" cy="805525"/>
+              <a:xfrm>
+                <a:off x="4506392" y="2459782"/>
+                <a:ext cx="361702" cy="0"/>
               </a:xfrm>
-              <a:custGeom>
+              <a:prstGeom prst="line">
                 <a:avLst/>
-                <a:gdLst/>
-                <a:ahLst/>
-                <a:cxnLst>
-                  <a:cxn ang="0">
-                    <a:pos x="0" y="0"/>
-                  </a:cxn>
-                  <a:cxn ang="0">
-                    <a:pos x="0" y="528"/>
-                  </a:cxn>
-                  <a:cxn ang="0">
-                    <a:pos x="3216" y="528"/>
-                  </a:cxn>
-                  <a:cxn ang="0">
-                    <a:pos x="3216" y="0"/>
-                  </a:cxn>
-                </a:cxnLst>
-                <a:rect l="0" t="0" r="r" b="b"/>
-                <a:pathLst>
-                  <a:path w="3216" h="528">
-                    <a:moveTo>
-                      <a:pt x="0" y="0"/>
-                    </a:moveTo>
-                    <a:lnTo>
-                      <a:pt x="0" y="528"/>
-                    </a:lnTo>
-                    <a:lnTo>
-                      <a:pt x="3216" y="528"/>
-                    </a:lnTo>
-                    <a:lnTo>
-                      <a:pt x="3216" y="0"/>
-                    </a:lnTo>
-                  </a:path>
-                </a:pathLst>
-              </a:custGeom>
-              <a:solidFill>
-                <a:schemeClr val="bg1"/>
-              </a:solidFill>
-              <a:ln w="57150" cap="flat" cmpd="sng">
+              </a:prstGeom>
+              <a:noFill/>
+              <a:ln w="12700">
                 <a:solidFill>
                   <a:schemeClr val="tx1"/>
                 </a:solidFill>
-                <a:prstDash val="solid"/>
                 <a:round/>
                 <a:headEnd type="none" w="lg" len="med"/>
                 <a:tailEnd type="none" w="lg" len="med"/>
@@ -10658,78 +10404,42 @@
               <a:effectLst/>
             </p:spPr>
             <p:txBody>
-              <a:bodyPr wrap="square" anchor="ctr">
-                <a:noAutofit/>
+              <a:bodyPr anchor="ctr">
+                <a:spAutoFit/>
               </a:bodyPr>
               <a:lstStyle/>
               <a:p>
-                <a:endParaRPr lang="en-US" dirty="0"/>
+                <a:endParaRPr lang="en-US"/>
               </a:p>
             </p:txBody>
           </p:sp>
           <p:sp>
             <p:nvSpPr>
-              <p:cNvPr id="90" name="Freeform 6">
+              <p:cNvPr id="97" name="Line 177">
                 <a:extLst>
                   <a:ext uri="{FF2B5EF4-FFF2-40B4-BE49-F238E27FC236}">
-                    <a16:creationId xmlns:a16="http://schemas.microsoft.com/office/drawing/2014/main" id="{139D53E3-273F-4D4E-A5E4-B1418A0779EA}"/>
+                    <a16:creationId xmlns:a16="http://schemas.microsoft.com/office/drawing/2014/main" id="{8EA50985-6C5E-4008-9BD0-16FB1E983D3C}"/>
                   </a:ext>
                 </a:extLst>
               </p:cNvPr>
               <p:cNvSpPr>
-                <a:spLocks/>
+                <a:spLocks noChangeShapeType="1"/>
               </p:cNvSpPr>
               <p:nvPr/>
             </p:nvSpPr>
             <p:spPr bwMode="auto">
-              <a:xfrm rot="16200000">
-                <a:off x="2874558" y="4486679"/>
-                <a:ext cx="337765" cy="1069835"/>
+              <a:xfrm>
+                <a:off x="4576723" y="2523919"/>
+                <a:ext cx="218529" cy="0"/>
               </a:xfrm>
-              <a:custGeom>
+              <a:prstGeom prst="line">
                 <a:avLst/>
-                <a:gdLst/>
-                <a:ahLst/>
-                <a:cxnLst>
-                  <a:cxn ang="0">
-                    <a:pos x="0" y="0"/>
-                  </a:cxn>
-                  <a:cxn ang="0">
-                    <a:pos x="0" y="528"/>
-                  </a:cxn>
-                  <a:cxn ang="0">
-                    <a:pos x="3216" y="528"/>
-                  </a:cxn>
-                  <a:cxn ang="0">
-                    <a:pos x="3216" y="0"/>
-                  </a:cxn>
-                </a:cxnLst>
-                <a:rect l="0" t="0" r="r" b="b"/>
-                <a:pathLst>
-                  <a:path w="3216" h="528">
-                    <a:moveTo>
-                      <a:pt x="0" y="0"/>
-                    </a:moveTo>
-                    <a:lnTo>
-                      <a:pt x="0" y="528"/>
-                    </a:lnTo>
-                    <a:lnTo>
-                      <a:pt x="3216" y="528"/>
-                    </a:lnTo>
-                    <a:lnTo>
-                      <a:pt x="3216" y="0"/>
-                    </a:lnTo>
-                  </a:path>
-                </a:pathLst>
-              </a:custGeom>
-              <a:solidFill>
-                <a:schemeClr val="bg1"/>
-              </a:solidFill>
-              <a:ln w="57150" cap="flat" cmpd="sng">
+              </a:prstGeom>
+              <a:noFill/>
+              <a:ln w="12700">
                 <a:solidFill>
                   <a:schemeClr val="tx1"/>
                 </a:solidFill>
-                <a:prstDash val="solid"/>
                 <a:round/>
                 <a:headEnd type="none" w="lg" len="med"/>
                 <a:tailEnd type="none" w="lg" len="med"/>
@@ -10737,7 +10447,7 @@
               <a:effectLst/>
             </p:spPr>
             <p:txBody>
-              <a:bodyPr wrap="square" anchor="ctr">
+              <a:bodyPr anchor="ctr">
                 <a:spAutoFit/>
               </a:bodyPr>
               <a:lstStyle/>
@@ -10747,6 +10457,255 @@
             </p:txBody>
           </p:sp>
         </p:grpSp>
+        <p:sp>
+          <p:nvSpPr>
+            <p:cNvPr id="88" name="Freeform: Shape 87">
+              <a:extLst>
+                <a:ext uri="{FF2B5EF4-FFF2-40B4-BE49-F238E27FC236}">
+                  <a16:creationId xmlns:a16="http://schemas.microsoft.com/office/drawing/2014/main" id="{72A777ED-A07D-4B34-87F5-D5B53E8C675E}"/>
+                </a:ext>
+              </a:extLst>
+            </p:cNvPr>
+            <p:cNvSpPr/>
+            <p:nvPr/>
+          </p:nvSpPr>
+          <p:spPr>
+            <a:xfrm rot="10800000">
+              <a:off x="6389989" y="4857704"/>
+              <a:ext cx="337768" cy="332771"/>
+            </a:xfrm>
+            <a:custGeom>
+              <a:avLst/>
+              <a:gdLst>
+                <a:gd name="connsiteX0" fmla="*/ 0 w 1607820"/>
+                <a:gd name="connsiteY0" fmla="*/ 0 h 1651977"/>
+                <a:gd name="connsiteX1" fmla="*/ 1607820 w 1607820"/>
+                <a:gd name="connsiteY1" fmla="*/ 1651977 h 1651977"/>
+                <a:gd name="connsiteX2" fmla="*/ 0 w 1607820"/>
+                <a:gd name="connsiteY2" fmla="*/ 1651977 h 1651977"/>
+              </a:gdLst>
+              <a:ahLst/>
+              <a:cxnLst>
+                <a:cxn ang="0">
+                  <a:pos x="connsiteX0" y="connsiteY0"/>
+                </a:cxn>
+                <a:cxn ang="0">
+                  <a:pos x="connsiteX1" y="connsiteY1"/>
+                </a:cxn>
+                <a:cxn ang="0">
+                  <a:pos x="connsiteX2" y="connsiteY2"/>
+                </a:cxn>
+              </a:cxnLst>
+              <a:rect l="l" t="t" r="r" b="b"/>
+              <a:pathLst>
+                <a:path w="1607820" h="1651977">
+                  <a:moveTo>
+                    <a:pt x="0" y="0"/>
+                  </a:moveTo>
+                  <a:cubicBezTo>
+                    <a:pt x="887974" y="0"/>
+                    <a:pt x="1607820" y="739615"/>
+                    <a:pt x="1607820" y="1651977"/>
+                  </a:cubicBezTo>
+                  <a:lnTo>
+                    <a:pt x="0" y="1651977"/>
+                  </a:lnTo>
+                  <a:close/>
+                </a:path>
+              </a:pathLst>
+            </a:custGeom>
+            <a:solidFill>
+              <a:schemeClr val="bg1"/>
+            </a:solidFill>
+            <a:ln w="57150">
+              <a:solidFill>
+                <a:schemeClr val="tx1"/>
+              </a:solidFill>
+            </a:ln>
+          </p:spPr>
+          <p:style>
+            <a:lnRef idx="2">
+              <a:schemeClr val="accent1">
+                <a:shade val="50000"/>
+              </a:schemeClr>
+            </a:lnRef>
+            <a:fillRef idx="1">
+              <a:schemeClr val="accent1"/>
+            </a:fillRef>
+            <a:effectRef idx="0">
+              <a:schemeClr val="accent1"/>
+            </a:effectRef>
+            <a:fontRef idx="minor">
+              <a:schemeClr val="lt1"/>
+            </a:fontRef>
+          </p:style>
+          <p:txBody>
+            <a:bodyPr rtlCol="0" anchor="ctr"/>
+            <a:lstStyle/>
+            <a:p>
+              <a:pPr algn="ctr"/>
+              <a:endParaRPr lang="en-US" dirty="0"/>
+            </a:p>
+          </p:txBody>
+        </p:sp>
+        <p:sp>
+          <p:nvSpPr>
+            <p:cNvPr id="89" name="Freeform 6">
+              <a:extLst>
+                <a:ext uri="{FF2B5EF4-FFF2-40B4-BE49-F238E27FC236}">
+                  <a16:creationId xmlns:a16="http://schemas.microsoft.com/office/drawing/2014/main" id="{8CFC8880-E90E-4FAC-85FF-870A9B020C8E}"/>
+                </a:ext>
+              </a:extLst>
+            </p:cNvPr>
+            <p:cNvSpPr>
+              <a:spLocks/>
+            </p:cNvSpPr>
+            <p:nvPr/>
+          </p:nvSpPr>
+          <p:spPr bwMode="auto">
+            <a:xfrm rot="10800000">
+              <a:off x="6389990" y="4100493"/>
+              <a:ext cx="337765" cy="805525"/>
+            </a:xfrm>
+            <a:custGeom>
+              <a:avLst/>
+              <a:gdLst/>
+              <a:ahLst/>
+              <a:cxnLst>
+                <a:cxn ang="0">
+                  <a:pos x="0" y="0"/>
+                </a:cxn>
+                <a:cxn ang="0">
+                  <a:pos x="0" y="528"/>
+                </a:cxn>
+                <a:cxn ang="0">
+                  <a:pos x="3216" y="528"/>
+                </a:cxn>
+                <a:cxn ang="0">
+                  <a:pos x="3216" y="0"/>
+                </a:cxn>
+              </a:cxnLst>
+              <a:rect l="0" t="0" r="r" b="b"/>
+              <a:pathLst>
+                <a:path w="3216" h="528">
+                  <a:moveTo>
+                    <a:pt x="0" y="0"/>
+                  </a:moveTo>
+                  <a:lnTo>
+                    <a:pt x="0" y="528"/>
+                  </a:lnTo>
+                  <a:lnTo>
+                    <a:pt x="3216" y="528"/>
+                  </a:lnTo>
+                  <a:lnTo>
+                    <a:pt x="3216" y="0"/>
+                  </a:lnTo>
+                </a:path>
+              </a:pathLst>
+            </a:custGeom>
+            <a:solidFill>
+              <a:schemeClr val="bg1"/>
+            </a:solidFill>
+            <a:ln w="57150" cap="flat" cmpd="sng">
+              <a:solidFill>
+                <a:schemeClr val="tx1"/>
+              </a:solidFill>
+              <a:prstDash val="solid"/>
+              <a:round/>
+              <a:headEnd type="none" w="lg" len="med"/>
+              <a:tailEnd type="none" w="lg" len="med"/>
+            </a:ln>
+            <a:effectLst/>
+          </p:spPr>
+          <p:txBody>
+            <a:bodyPr wrap="square" anchor="ctr">
+              <a:noAutofit/>
+            </a:bodyPr>
+            <a:lstStyle/>
+            <a:p>
+              <a:endParaRPr lang="en-US" dirty="0"/>
+            </a:p>
+          </p:txBody>
+        </p:sp>
+        <p:sp>
+          <p:nvSpPr>
+            <p:cNvPr id="90" name="Freeform 6">
+              <a:extLst>
+                <a:ext uri="{FF2B5EF4-FFF2-40B4-BE49-F238E27FC236}">
+                  <a16:creationId xmlns:a16="http://schemas.microsoft.com/office/drawing/2014/main" id="{139D53E3-273F-4D4E-A5E4-B1418A0779EA}"/>
+                </a:ext>
+              </a:extLst>
+            </p:cNvPr>
+            <p:cNvSpPr>
+              <a:spLocks/>
+            </p:cNvSpPr>
+            <p:nvPr/>
+          </p:nvSpPr>
+          <p:spPr bwMode="auto">
+            <a:xfrm rot="16200000">
+              <a:off x="7061604" y="4486679"/>
+              <a:ext cx="337765" cy="1069835"/>
+            </a:xfrm>
+            <a:custGeom>
+              <a:avLst/>
+              <a:gdLst/>
+              <a:ahLst/>
+              <a:cxnLst>
+                <a:cxn ang="0">
+                  <a:pos x="0" y="0"/>
+                </a:cxn>
+                <a:cxn ang="0">
+                  <a:pos x="0" y="528"/>
+                </a:cxn>
+                <a:cxn ang="0">
+                  <a:pos x="3216" y="528"/>
+                </a:cxn>
+                <a:cxn ang="0">
+                  <a:pos x="3216" y="0"/>
+                </a:cxn>
+              </a:cxnLst>
+              <a:rect l="0" t="0" r="r" b="b"/>
+              <a:pathLst>
+                <a:path w="3216" h="528">
+                  <a:moveTo>
+                    <a:pt x="0" y="0"/>
+                  </a:moveTo>
+                  <a:lnTo>
+                    <a:pt x="0" y="528"/>
+                  </a:lnTo>
+                  <a:lnTo>
+                    <a:pt x="3216" y="528"/>
+                  </a:lnTo>
+                  <a:lnTo>
+                    <a:pt x="3216" y="0"/>
+                  </a:lnTo>
+                </a:path>
+              </a:pathLst>
+            </a:custGeom>
+            <a:solidFill>
+              <a:schemeClr val="bg1"/>
+            </a:solidFill>
+            <a:ln w="57150" cap="flat" cmpd="sng">
+              <a:solidFill>
+                <a:schemeClr val="tx1"/>
+              </a:solidFill>
+              <a:prstDash val="solid"/>
+              <a:round/>
+              <a:headEnd type="none" w="lg" len="med"/>
+              <a:tailEnd type="none" w="lg" len="med"/>
+            </a:ln>
+            <a:effectLst/>
+          </p:spPr>
+          <p:txBody>
+            <a:bodyPr wrap="square" anchor="ctr">
+              <a:spAutoFit/>
+            </a:bodyPr>
+            <a:lstStyle/>
+            <a:p>
+              <a:endParaRPr lang="en-US"/>
+            </a:p>
+          </p:txBody>
+        </p:sp>
         <p:sp>
           <p:nvSpPr>
             <p:cNvPr id="98" name="Rectangle 97">
@@ -10807,8 +10766,8 @@
           </p:nvSpPr>
           <p:spPr bwMode="auto">
             <a:xfrm rot="10800000">
-              <a:off x="6413248" y="774198"/>
-              <a:ext cx="290826" cy="3497133"/>
+              <a:off x="6413248" y="469396"/>
+              <a:ext cx="290826" cy="3691119"/>
             </a:xfrm>
             <a:custGeom>
               <a:avLst/>
@@ -10884,7 +10843,7 @@
           </p:nvSpPr>
           <p:spPr bwMode="auto">
             <a:xfrm>
-              <a:off x="6448425" y="743331"/>
+              <a:off x="6448425" y="438531"/>
               <a:ext cx="219075" cy="91440"/>
             </a:xfrm>
             <a:prstGeom prst="rect">
@@ -10975,8 +10934,8 @@
           </p:nvSpPr>
           <p:spPr>
             <a:xfrm rot="10800000">
-              <a:off x="6767123" y="743331"/>
-              <a:ext cx="337767" cy="3504378"/>
+              <a:off x="6767121" y="438529"/>
+              <a:ext cx="337767" cy="3698765"/>
             </a:xfrm>
             <a:prstGeom prst="leftBrace">
               <a:avLst>
@@ -11027,7 +10986,7 @@
           </p:nvSpPr>
           <p:spPr>
             <a:xfrm>
-              <a:off x="7144911" y="834771"/>
+              <a:off x="7144911" y="529971"/>
               <a:ext cx="1436046" cy="477054"/>
             </a:xfrm>
             <a:prstGeom prst="rect">
@@ -11158,6 +11117,1122 @@
 </file>
 
 <file path=ppt/slides/slide6.xml><?xml version="1.0" encoding="utf-8"?>
+<p:sld xmlns:a="http://schemas.openxmlformats.org/drawingml/2006/main" xmlns:r="http://schemas.openxmlformats.org/officeDocument/2006/relationships" xmlns:p="http://schemas.openxmlformats.org/presentationml/2006/main">
+  <p:cSld>
+    <p:spTree>
+      <p:nvGrpSpPr>
+        <p:cNvPr id="1" name=""/>
+        <p:cNvGrpSpPr/>
+        <p:nvPr/>
+      </p:nvGrpSpPr>
+      <p:grpSpPr>
+        <a:xfrm>
+          <a:off x="0" y="0"/>
+          <a:ext cx="0" cy="0"/>
+          <a:chOff x="0" y="0"/>
+          <a:chExt cx="0" cy="0"/>
+        </a:xfrm>
+      </p:grpSpPr>
+      <p:grpSp>
+        <p:nvGrpSpPr>
+          <p:cNvPr id="35" name="Group 34">
+            <a:extLst>
+              <a:ext uri="{FF2B5EF4-FFF2-40B4-BE49-F238E27FC236}">
+                <a16:creationId xmlns:a16="http://schemas.microsoft.com/office/drawing/2014/main" id="{1795505B-CBE9-4891-BD71-C4BECFCF762A}"/>
+              </a:ext>
+            </a:extLst>
+          </p:cNvPr>
+          <p:cNvGrpSpPr/>
+          <p:nvPr/>
+        </p:nvGrpSpPr>
+        <p:grpSpPr>
+          <a:xfrm>
+            <a:off x="3026545" y="202972"/>
+            <a:ext cx="6828184" cy="5895905"/>
+            <a:chOff x="3026545" y="202972"/>
+            <a:chExt cx="6828184" cy="5895905"/>
+          </a:xfrm>
+        </p:grpSpPr>
+        <p:sp>
+          <p:nvSpPr>
+            <p:cNvPr id="4" name="Freeform 6 1">
+              <a:extLst>
+                <a:ext uri="{FF2B5EF4-FFF2-40B4-BE49-F238E27FC236}">
+                  <a16:creationId xmlns:a16="http://schemas.microsoft.com/office/drawing/2014/main" id="{57C7CB09-8C87-4DA8-BFE7-4720504CA68C}"/>
+                </a:ext>
+              </a:extLst>
+            </p:cNvPr>
+            <p:cNvSpPr>
+              <a:spLocks/>
+            </p:cNvSpPr>
+            <p:nvPr/>
+          </p:nvSpPr>
+          <p:spPr bwMode="auto">
+            <a:xfrm>
+              <a:off x="4455160" y="1132840"/>
+              <a:ext cx="2971800" cy="2971800"/>
+            </a:xfrm>
+            <a:custGeom>
+              <a:avLst/>
+              <a:gdLst/>
+              <a:ahLst/>
+              <a:cxnLst>
+                <a:cxn ang="0">
+                  <a:pos x="0" y="0"/>
+                </a:cxn>
+                <a:cxn ang="0">
+                  <a:pos x="0" y="528"/>
+                </a:cxn>
+                <a:cxn ang="0">
+                  <a:pos x="3216" y="528"/>
+                </a:cxn>
+                <a:cxn ang="0">
+                  <a:pos x="3216" y="0"/>
+                </a:cxn>
+              </a:cxnLst>
+              <a:rect l="0" t="0" r="r" b="b"/>
+              <a:pathLst>
+                <a:path w="3216" h="528">
+                  <a:moveTo>
+                    <a:pt x="0" y="0"/>
+                  </a:moveTo>
+                  <a:lnTo>
+                    <a:pt x="0" y="528"/>
+                  </a:lnTo>
+                  <a:lnTo>
+                    <a:pt x="3216" y="528"/>
+                  </a:lnTo>
+                  <a:lnTo>
+                    <a:pt x="3216" y="0"/>
+                  </a:lnTo>
+                </a:path>
+              </a:pathLst>
+            </a:custGeom>
+            <a:solidFill>
+              <a:schemeClr val="hlink"/>
+            </a:solidFill>
+            <a:ln w="57150" cap="flat" cmpd="sng">
+              <a:solidFill>
+                <a:schemeClr val="tx1"/>
+              </a:solidFill>
+              <a:prstDash val="solid"/>
+              <a:round/>
+              <a:headEnd type="none" w="lg" len="med"/>
+              <a:tailEnd type="none" w="lg" len="med"/>
+            </a:ln>
+            <a:effectLst/>
+          </p:spPr>
+          <p:txBody>
+            <a:bodyPr wrap="square" anchor="ctr">
+              <a:spAutoFit/>
+            </a:bodyPr>
+            <a:lstStyle/>
+            <a:p>
+              <a:endParaRPr lang="en-US"/>
+            </a:p>
+          </p:txBody>
+        </p:sp>
+        <p:grpSp>
+          <p:nvGrpSpPr>
+            <p:cNvPr id="13" name="Group 12">
+              <a:extLst>
+                <a:ext uri="{FF2B5EF4-FFF2-40B4-BE49-F238E27FC236}">
+                  <a16:creationId xmlns:a16="http://schemas.microsoft.com/office/drawing/2014/main" id="{EA9E03FD-BCAA-462D-A6C4-B19647011DF4}"/>
+                </a:ext>
+              </a:extLst>
+            </p:cNvPr>
+            <p:cNvGrpSpPr/>
+            <p:nvPr/>
+          </p:nvGrpSpPr>
+          <p:grpSpPr>
+            <a:xfrm>
+              <a:off x="4717431" y="922612"/>
+              <a:ext cx="482269" cy="420455"/>
+              <a:chOff x="4446109" y="2103464"/>
+              <a:chExt cx="482269" cy="420455"/>
+            </a:xfrm>
+          </p:grpSpPr>
+          <p:sp>
+            <p:nvSpPr>
+              <p:cNvPr id="14" name="AutoShape 174">
+                <a:extLst>
+                  <a:ext uri="{FF2B5EF4-FFF2-40B4-BE49-F238E27FC236}">
+                    <a16:creationId xmlns:a16="http://schemas.microsoft.com/office/drawing/2014/main" id="{56EFD6BF-292F-40DF-B258-F43A90D892CB}"/>
+                  </a:ext>
+                </a:extLst>
+              </p:cNvPr>
+              <p:cNvSpPr>
+                <a:spLocks noChangeArrowheads="1"/>
+              </p:cNvSpPr>
+              <p:nvPr/>
+            </p:nvSpPr>
+            <p:spPr bwMode="auto">
+              <a:xfrm flipV="1">
+                <a:off x="4506392" y="2103464"/>
+                <a:ext cx="361702" cy="228043"/>
+              </a:xfrm>
+              <a:prstGeom prst="triangle">
+                <a:avLst>
+                  <a:gd name="adj" fmla="val 50000"/>
+                </a:avLst>
+              </a:prstGeom>
+              <a:noFill/>
+              <a:ln w="12700">
+                <a:solidFill>
+                  <a:schemeClr val="tx1"/>
+                </a:solidFill>
+                <a:miter lim="800000"/>
+                <a:headEnd type="none" w="lg" len="med"/>
+                <a:tailEnd type="none" w="lg" len="med"/>
+              </a:ln>
+              <a:effectLst/>
+            </p:spPr>
+            <p:txBody>
+              <a:bodyPr anchor="ctr">
+                <a:spAutoFit/>
+              </a:bodyPr>
+              <a:lstStyle/>
+              <a:p>
+                <a:endParaRPr lang="en-US" dirty="0"/>
+              </a:p>
+            </p:txBody>
+          </p:sp>
+          <p:sp>
+            <p:nvSpPr>
+              <p:cNvPr id="15" name="Line 175">
+                <a:extLst>
+                  <a:ext uri="{FF2B5EF4-FFF2-40B4-BE49-F238E27FC236}">
+                    <a16:creationId xmlns:a16="http://schemas.microsoft.com/office/drawing/2014/main" id="{D3B90883-7651-4669-9F16-25B26B0C4AB5}"/>
+                  </a:ext>
+                </a:extLst>
+              </p:cNvPr>
+              <p:cNvSpPr>
+                <a:spLocks noChangeShapeType="1"/>
+              </p:cNvSpPr>
+              <p:nvPr/>
+            </p:nvSpPr>
+            <p:spPr bwMode="auto">
+              <a:xfrm>
+                <a:off x="4446109" y="2395643"/>
+                <a:ext cx="482269" cy="0"/>
+              </a:xfrm>
+              <a:prstGeom prst="line">
+                <a:avLst/>
+              </a:prstGeom>
+              <a:noFill/>
+              <a:ln w="12700">
+                <a:solidFill>
+                  <a:schemeClr val="tx1"/>
+                </a:solidFill>
+                <a:round/>
+                <a:headEnd type="none" w="lg" len="med"/>
+                <a:tailEnd type="none" w="lg" len="med"/>
+              </a:ln>
+              <a:effectLst/>
+            </p:spPr>
+            <p:txBody>
+              <a:bodyPr anchor="ctr">
+                <a:spAutoFit/>
+              </a:bodyPr>
+              <a:lstStyle/>
+              <a:p>
+                <a:endParaRPr lang="en-US"/>
+              </a:p>
+            </p:txBody>
+          </p:sp>
+          <p:sp>
+            <p:nvSpPr>
+              <p:cNvPr id="16" name="Line 176">
+                <a:extLst>
+                  <a:ext uri="{FF2B5EF4-FFF2-40B4-BE49-F238E27FC236}">
+                    <a16:creationId xmlns:a16="http://schemas.microsoft.com/office/drawing/2014/main" id="{01FA9449-E78B-4BF7-B218-7190FC3DED7C}"/>
+                  </a:ext>
+                </a:extLst>
+              </p:cNvPr>
+              <p:cNvSpPr>
+                <a:spLocks noChangeShapeType="1"/>
+              </p:cNvSpPr>
+              <p:nvPr/>
+            </p:nvSpPr>
+            <p:spPr bwMode="auto">
+              <a:xfrm>
+                <a:off x="4506392" y="2459782"/>
+                <a:ext cx="361702" cy="0"/>
+              </a:xfrm>
+              <a:prstGeom prst="line">
+                <a:avLst/>
+              </a:prstGeom>
+              <a:noFill/>
+              <a:ln w="12700">
+                <a:solidFill>
+                  <a:schemeClr val="tx1"/>
+                </a:solidFill>
+                <a:round/>
+                <a:headEnd type="none" w="lg" len="med"/>
+                <a:tailEnd type="none" w="lg" len="med"/>
+              </a:ln>
+              <a:effectLst/>
+            </p:spPr>
+            <p:txBody>
+              <a:bodyPr anchor="ctr">
+                <a:spAutoFit/>
+              </a:bodyPr>
+              <a:lstStyle/>
+              <a:p>
+                <a:endParaRPr lang="en-US"/>
+              </a:p>
+            </p:txBody>
+          </p:sp>
+          <p:sp>
+            <p:nvSpPr>
+              <p:cNvPr id="17" name="Line 177">
+                <a:extLst>
+                  <a:ext uri="{FF2B5EF4-FFF2-40B4-BE49-F238E27FC236}">
+                    <a16:creationId xmlns:a16="http://schemas.microsoft.com/office/drawing/2014/main" id="{BE0340DA-996F-4A74-B664-787686F309E6}"/>
+                  </a:ext>
+                </a:extLst>
+              </p:cNvPr>
+              <p:cNvSpPr>
+                <a:spLocks noChangeShapeType="1"/>
+              </p:cNvSpPr>
+              <p:nvPr/>
+            </p:nvSpPr>
+            <p:spPr bwMode="auto">
+              <a:xfrm>
+                <a:off x="4576723" y="2523919"/>
+                <a:ext cx="218529" cy="0"/>
+              </a:xfrm>
+              <a:prstGeom prst="line">
+                <a:avLst/>
+              </a:prstGeom>
+              <a:noFill/>
+              <a:ln w="12700">
+                <a:solidFill>
+                  <a:schemeClr val="tx1"/>
+                </a:solidFill>
+                <a:round/>
+                <a:headEnd type="none" w="lg" len="med"/>
+                <a:tailEnd type="none" w="lg" len="med"/>
+              </a:ln>
+              <a:effectLst/>
+            </p:spPr>
+            <p:txBody>
+              <a:bodyPr anchor="ctr">
+                <a:spAutoFit/>
+              </a:bodyPr>
+              <a:lstStyle/>
+              <a:p>
+                <a:endParaRPr lang="en-US"/>
+              </a:p>
+            </p:txBody>
+          </p:sp>
+        </p:grpSp>
+        <p:sp>
+          <p:nvSpPr>
+            <p:cNvPr id="73" name="Freeform: Shape 72">
+              <a:extLst>
+                <a:ext uri="{FF2B5EF4-FFF2-40B4-BE49-F238E27FC236}">
+                  <a16:creationId xmlns:a16="http://schemas.microsoft.com/office/drawing/2014/main" id="{FDB7BD84-8132-4086-957B-E575587CE082}"/>
+                </a:ext>
+              </a:extLst>
+            </p:cNvPr>
+            <p:cNvSpPr/>
+            <p:nvPr/>
+          </p:nvSpPr>
+          <p:spPr>
+            <a:xfrm rot="10800000">
+              <a:off x="5819903" y="4857704"/>
+              <a:ext cx="337768" cy="332771"/>
+            </a:xfrm>
+            <a:custGeom>
+              <a:avLst/>
+              <a:gdLst>
+                <a:gd name="connsiteX0" fmla="*/ 0 w 1607820"/>
+                <a:gd name="connsiteY0" fmla="*/ 0 h 1651977"/>
+                <a:gd name="connsiteX1" fmla="*/ 1607820 w 1607820"/>
+                <a:gd name="connsiteY1" fmla="*/ 1651977 h 1651977"/>
+                <a:gd name="connsiteX2" fmla="*/ 0 w 1607820"/>
+                <a:gd name="connsiteY2" fmla="*/ 1651977 h 1651977"/>
+              </a:gdLst>
+              <a:ahLst/>
+              <a:cxnLst>
+                <a:cxn ang="0">
+                  <a:pos x="connsiteX0" y="connsiteY0"/>
+                </a:cxn>
+                <a:cxn ang="0">
+                  <a:pos x="connsiteX1" y="connsiteY1"/>
+                </a:cxn>
+                <a:cxn ang="0">
+                  <a:pos x="connsiteX2" y="connsiteY2"/>
+                </a:cxn>
+              </a:cxnLst>
+              <a:rect l="l" t="t" r="r" b="b"/>
+              <a:pathLst>
+                <a:path w="1607820" h="1651977">
+                  <a:moveTo>
+                    <a:pt x="0" y="0"/>
+                  </a:moveTo>
+                  <a:cubicBezTo>
+                    <a:pt x="887974" y="0"/>
+                    <a:pt x="1607820" y="739615"/>
+                    <a:pt x="1607820" y="1651977"/>
+                  </a:cubicBezTo>
+                  <a:lnTo>
+                    <a:pt x="0" y="1651977"/>
+                  </a:lnTo>
+                  <a:close/>
+                </a:path>
+              </a:pathLst>
+            </a:custGeom>
+            <a:solidFill>
+              <a:srgbClr val="0563C1"/>
+            </a:solidFill>
+            <a:ln w="57150">
+              <a:solidFill>
+                <a:schemeClr val="tx1"/>
+              </a:solidFill>
+            </a:ln>
+          </p:spPr>
+          <p:style>
+            <a:lnRef idx="2">
+              <a:schemeClr val="accent1">
+                <a:shade val="50000"/>
+              </a:schemeClr>
+            </a:lnRef>
+            <a:fillRef idx="1">
+              <a:schemeClr val="accent1"/>
+            </a:fillRef>
+            <a:effectRef idx="0">
+              <a:schemeClr val="accent1"/>
+            </a:effectRef>
+            <a:fontRef idx="minor">
+              <a:schemeClr val="lt1"/>
+            </a:fontRef>
+          </p:style>
+          <p:txBody>
+            <a:bodyPr rtlCol="0" anchor="ctr"/>
+            <a:lstStyle/>
+            <a:p>
+              <a:pPr algn="ctr"/>
+              <a:endParaRPr lang="en-US" dirty="0"/>
+            </a:p>
+          </p:txBody>
+        </p:sp>
+        <p:sp>
+          <p:nvSpPr>
+            <p:cNvPr id="81" name="Freeform 6 2">
+              <a:extLst>
+                <a:ext uri="{FF2B5EF4-FFF2-40B4-BE49-F238E27FC236}">
+                  <a16:creationId xmlns:a16="http://schemas.microsoft.com/office/drawing/2014/main" id="{7B751F98-52F3-4976-A046-ECC629A487C1}"/>
+                </a:ext>
+              </a:extLst>
+            </p:cNvPr>
+            <p:cNvSpPr>
+              <a:spLocks/>
+            </p:cNvSpPr>
+            <p:nvPr/>
+          </p:nvSpPr>
+          <p:spPr bwMode="auto">
+            <a:xfrm rot="10800000">
+              <a:off x="5819905" y="4100496"/>
+              <a:ext cx="337765" cy="805524"/>
+            </a:xfrm>
+            <a:custGeom>
+              <a:avLst/>
+              <a:gdLst/>
+              <a:ahLst/>
+              <a:cxnLst>
+                <a:cxn ang="0">
+                  <a:pos x="0" y="0"/>
+                </a:cxn>
+                <a:cxn ang="0">
+                  <a:pos x="0" y="528"/>
+                </a:cxn>
+                <a:cxn ang="0">
+                  <a:pos x="3216" y="528"/>
+                </a:cxn>
+                <a:cxn ang="0">
+                  <a:pos x="3216" y="0"/>
+                </a:cxn>
+              </a:cxnLst>
+              <a:rect l="0" t="0" r="r" b="b"/>
+              <a:pathLst>
+                <a:path w="3216" h="528">
+                  <a:moveTo>
+                    <a:pt x="0" y="0"/>
+                  </a:moveTo>
+                  <a:lnTo>
+                    <a:pt x="0" y="528"/>
+                  </a:lnTo>
+                  <a:lnTo>
+                    <a:pt x="3216" y="528"/>
+                  </a:lnTo>
+                  <a:lnTo>
+                    <a:pt x="3216" y="0"/>
+                  </a:lnTo>
+                </a:path>
+              </a:pathLst>
+            </a:custGeom>
+            <a:solidFill>
+              <a:schemeClr val="hlink"/>
+            </a:solidFill>
+            <a:ln w="57150" cap="flat" cmpd="sng">
+              <a:solidFill>
+                <a:schemeClr val="tx1"/>
+              </a:solidFill>
+              <a:prstDash val="solid"/>
+              <a:round/>
+              <a:headEnd type="none" w="lg" len="med"/>
+              <a:tailEnd type="none" w="lg" len="med"/>
+            </a:ln>
+            <a:effectLst/>
+          </p:spPr>
+          <p:txBody>
+            <a:bodyPr wrap="square" anchor="ctr">
+              <a:noAutofit/>
+            </a:bodyPr>
+            <a:lstStyle/>
+            <a:p>
+              <a:endParaRPr lang="en-US" dirty="0"/>
+            </a:p>
+          </p:txBody>
+        </p:sp>
+        <p:sp>
+          <p:nvSpPr>
+            <p:cNvPr id="82" name="Freeform 6 3">
+              <a:extLst>
+                <a:ext uri="{FF2B5EF4-FFF2-40B4-BE49-F238E27FC236}">
+                  <a16:creationId xmlns:a16="http://schemas.microsoft.com/office/drawing/2014/main" id="{9A71CA6B-FF7B-493E-98E3-C91CEFB37913}"/>
+                </a:ext>
+              </a:extLst>
+            </p:cNvPr>
+            <p:cNvSpPr>
+              <a:spLocks/>
+            </p:cNvSpPr>
+            <p:nvPr/>
+          </p:nvSpPr>
+          <p:spPr bwMode="auto">
+            <a:xfrm rot="16200000">
+              <a:off x="6491518" y="4486679"/>
+              <a:ext cx="337765" cy="1069835"/>
+            </a:xfrm>
+            <a:custGeom>
+              <a:avLst/>
+              <a:gdLst/>
+              <a:ahLst/>
+              <a:cxnLst>
+                <a:cxn ang="0">
+                  <a:pos x="0" y="0"/>
+                </a:cxn>
+                <a:cxn ang="0">
+                  <a:pos x="0" y="528"/>
+                </a:cxn>
+                <a:cxn ang="0">
+                  <a:pos x="3216" y="528"/>
+                </a:cxn>
+                <a:cxn ang="0">
+                  <a:pos x="3216" y="0"/>
+                </a:cxn>
+              </a:cxnLst>
+              <a:rect l="0" t="0" r="r" b="b"/>
+              <a:pathLst>
+                <a:path w="3216" h="528">
+                  <a:moveTo>
+                    <a:pt x="0" y="0"/>
+                  </a:moveTo>
+                  <a:lnTo>
+                    <a:pt x="0" y="528"/>
+                  </a:lnTo>
+                  <a:lnTo>
+                    <a:pt x="3216" y="528"/>
+                  </a:lnTo>
+                  <a:lnTo>
+                    <a:pt x="3216" y="0"/>
+                  </a:lnTo>
+                </a:path>
+              </a:pathLst>
+            </a:custGeom>
+            <a:solidFill>
+              <a:schemeClr val="hlink"/>
+            </a:solidFill>
+            <a:ln w="57150" cap="flat" cmpd="sng">
+              <a:solidFill>
+                <a:schemeClr val="tx1"/>
+              </a:solidFill>
+              <a:prstDash val="solid"/>
+              <a:round/>
+              <a:headEnd type="none" w="lg" len="med"/>
+              <a:tailEnd type="none" w="lg" len="med"/>
+            </a:ln>
+            <a:effectLst/>
+          </p:spPr>
+          <p:txBody>
+            <a:bodyPr wrap="square" anchor="ctr">
+              <a:spAutoFit/>
+            </a:bodyPr>
+            <a:lstStyle/>
+            <a:p>
+              <a:endParaRPr lang="en-US"/>
+            </a:p>
+          </p:txBody>
+        </p:sp>
+        <p:sp>
+          <p:nvSpPr>
+            <p:cNvPr id="83" name="Freeform 6 4">
+              <a:extLst>
+                <a:ext uri="{FF2B5EF4-FFF2-40B4-BE49-F238E27FC236}">
+                  <a16:creationId xmlns:a16="http://schemas.microsoft.com/office/drawing/2014/main" id="{F32E82B1-F14B-4EDA-8218-D6B73A05EEBF}"/>
+                </a:ext>
+              </a:extLst>
+            </p:cNvPr>
+            <p:cNvSpPr>
+              <a:spLocks/>
+            </p:cNvSpPr>
+            <p:nvPr/>
+          </p:nvSpPr>
+          <p:spPr bwMode="auto">
+            <a:xfrm>
+              <a:off x="5850388" y="4021455"/>
+              <a:ext cx="289901" cy="864870"/>
+            </a:xfrm>
+            <a:custGeom>
+              <a:avLst/>
+              <a:gdLst/>
+              <a:ahLst/>
+              <a:cxnLst>
+                <a:cxn ang="0">
+                  <a:pos x="0" y="0"/>
+                </a:cxn>
+                <a:cxn ang="0">
+                  <a:pos x="0" y="528"/>
+                </a:cxn>
+                <a:cxn ang="0">
+                  <a:pos x="3216" y="528"/>
+                </a:cxn>
+                <a:cxn ang="0">
+                  <a:pos x="3216" y="0"/>
+                </a:cxn>
+              </a:cxnLst>
+              <a:rect l="0" t="0" r="r" b="b"/>
+              <a:pathLst>
+                <a:path w="3216" h="528">
+                  <a:moveTo>
+                    <a:pt x="0" y="0"/>
+                  </a:moveTo>
+                  <a:lnTo>
+                    <a:pt x="0" y="528"/>
+                  </a:lnTo>
+                  <a:lnTo>
+                    <a:pt x="3216" y="528"/>
+                  </a:lnTo>
+                  <a:lnTo>
+                    <a:pt x="3216" y="0"/>
+                  </a:lnTo>
+                </a:path>
+              </a:pathLst>
+            </a:custGeom>
+            <a:solidFill>
+              <a:schemeClr val="hlink"/>
+            </a:solidFill>
+            <a:ln w="57150" cap="flat" cmpd="sng">
+              <a:noFill/>
+              <a:prstDash val="solid"/>
+              <a:round/>
+              <a:headEnd type="none" w="lg" len="med"/>
+              <a:tailEnd type="none" w="lg" len="med"/>
+            </a:ln>
+            <a:effectLst/>
+          </p:spPr>
+          <p:txBody>
+            <a:bodyPr wrap="square" anchor="ctr">
+              <a:noAutofit/>
+            </a:bodyPr>
+            <a:lstStyle/>
+            <a:p>
+              <a:endParaRPr lang="en-US" dirty="0"/>
+            </a:p>
+          </p:txBody>
+        </p:sp>
+        <p:sp>
+          <p:nvSpPr>
+            <p:cNvPr id="12" name="Arc 11">
+              <a:extLst>
+                <a:ext uri="{FF2B5EF4-FFF2-40B4-BE49-F238E27FC236}">
+                  <a16:creationId xmlns:a16="http://schemas.microsoft.com/office/drawing/2014/main" id="{C6451BFB-CAA6-456A-8990-C897C6436C7F}"/>
+                </a:ext>
+              </a:extLst>
+            </p:cNvPr>
+            <p:cNvSpPr/>
+            <p:nvPr/>
+          </p:nvSpPr>
+          <p:spPr>
+            <a:xfrm flipH="1">
+              <a:off x="6060498" y="3669480"/>
+              <a:ext cx="1755648" cy="1163421"/>
+            </a:xfrm>
+            <a:prstGeom prst="arc">
+              <a:avLst/>
+            </a:prstGeom>
+            <a:ln w="38100">
+              <a:solidFill>
+                <a:schemeClr val="tx1"/>
+              </a:solidFill>
+              <a:headEnd type="none"/>
+              <a:tailEnd type="triangle"/>
+            </a:ln>
+          </p:spPr>
+          <p:style>
+            <a:lnRef idx="1">
+              <a:schemeClr val="accent1"/>
+            </a:lnRef>
+            <a:fillRef idx="0">
+              <a:schemeClr val="accent1"/>
+            </a:fillRef>
+            <a:effectRef idx="0">
+              <a:schemeClr val="accent1"/>
+            </a:effectRef>
+            <a:fontRef idx="minor">
+              <a:schemeClr val="tx1"/>
+            </a:fontRef>
+          </p:style>
+          <p:txBody>
+            <a:bodyPr rtlCol="0" anchor="ctr"/>
+            <a:lstStyle/>
+            <a:p>
+              <a:pPr algn="ctr"/>
+              <a:endParaRPr lang="en-US"/>
+            </a:p>
+          </p:txBody>
+        </p:sp>
+        <p:sp>
+          <p:nvSpPr>
+            <p:cNvPr id="84" name="Arc 83">
+              <a:extLst>
+                <a:ext uri="{FF2B5EF4-FFF2-40B4-BE49-F238E27FC236}">
+                  <a16:creationId xmlns:a16="http://schemas.microsoft.com/office/drawing/2014/main" id="{71DF734D-5A0F-4A39-80B0-153C18B99726}"/>
+                </a:ext>
+              </a:extLst>
+            </p:cNvPr>
+            <p:cNvSpPr/>
+            <p:nvPr/>
+          </p:nvSpPr>
+          <p:spPr>
+            <a:xfrm>
+              <a:off x="4172858" y="3665999"/>
+              <a:ext cx="1750978" cy="1163421"/>
+            </a:xfrm>
+            <a:prstGeom prst="arc">
+              <a:avLst/>
+            </a:prstGeom>
+            <a:ln w="38100">
+              <a:solidFill>
+                <a:schemeClr val="tx1"/>
+              </a:solidFill>
+              <a:headEnd type="none"/>
+              <a:tailEnd type="triangle"/>
+            </a:ln>
+          </p:spPr>
+          <p:style>
+            <a:lnRef idx="1">
+              <a:schemeClr val="accent1"/>
+            </a:lnRef>
+            <a:fillRef idx="0">
+              <a:schemeClr val="accent1"/>
+            </a:fillRef>
+            <a:effectRef idx="0">
+              <a:schemeClr val="accent1"/>
+            </a:effectRef>
+            <a:fontRef idx="minor">
+              <a:schemeClr val="tx1"/>
+            </a:fontRef>
+          </p:style>
+          <p:txBody>
+            <a:bodyPr rtlCol="0" anchor="ctr"/>
+            <a:lstStyle/>
+            <a:p>
+              <a:pPr algn="ctr"/>
+              <a:endParaRPr lang="en-US"/>
+            </a:p>
+          </p:txBody>
+        </p:sp>
+        <p:sp>
+          <p:nvSpPr>
+            <p:cNvPr id="24" name="Arrow: Right 23">
+              <a:extLst>
+                <a:ext uri="{FF2B5EF4-FFF2-40B4-BE49-F238E27FC236}">
+                  <a16:creationId xmlns:a16="http://schemas.microsoft.com/office/drawing/2014/main" id="{8C092474-DAC6-4CEB-A137-36BC6FB4AC79}"/>
+                </a:ext>
+              </a:extLst>
+            </p:cNvPr>
+            <p:cNvSpPr/>
+            <p:nvPr/>
+          </p:nvSpPr>
+          <p:spPr bwMode="auto">
+            <a:xfrm>
+              <a:off x="7161597" y="4749167"/>
+              <a:ext cx="1464243" cy="542916"/>
+            </a:xfrm>
+            <a:prstGeom prst="rightArrow">
+              <a:avLst>
+                <a:gd name="adj1" fmla="val 50000"/>
+                <a:gd name="adj2" fmla="val 55594"/>
+              </a:avLst>
+            </a:prstGeom>
+            <a:solidFill>
+              <a:srgbClr val="0563C1"/>
+            </a:solidFill>
+            <a:ln w="12700">
+              <a:solidFill>
+                <a:srgbClr val="0563C1"/>
+              </a:solidFill>
+              <a:miter lim="800000"/>
+              <a:headEnd type="none" w="lg" len="med"/>
+              <a:tailEnd type="none" w="lg" len="med"/>
+            </a:ln>
+            <a:effectLst/>
+          </p:spPr>
+          <p:txBody>
+            <a:bodyPr rtlCol="0" anchor="ctr">
+              <a:noAutofit/>
+            </a:bodyPr>
+            <a:lstStyle/>
+            <a:p>
+              <a:pPr algn="l"/>
+              <a:endParaRPr lang="en-US" dirty="0"/>
+            </a:p>
+          </p:txBody>
+        </p:sp>
+        <p:sp>
+          <p:nvSpPr>
+            <p:cNvPr id="34" name="Left Brace 33">
+              <a:extLst>
+                <a:ext uri="{FF2B5EF4-FFF2-40B4-BE49-F238E27FC236}">
+                  <a16:creationId xmlns:a16="http://schemas.microsoft.com/office/drawing/2014/main" id="{B8EF78AB-346D-4CF7-8EEB-E3057A374572}"/>
+                </a:ext>
+              </a:extLst>
+            </p:cNvPr>
+            <p:cNvSpPr/>
+            <p:nvPr/>
+          </p:nvSpPr>
+          <p:spPr>
+            <a:xfrm>
+              <a:off x="5699760" y="4890520"/>
+              <a:ext cx="697229" cy="268610"/>
+            </a:xfrm>
+            <a:prstGeom prst="leftBrace">
+              <a:avLst>
+                <a:gd name="adj1" fmla="val 32109"/>
+                <a:gd name="adj2" fmla="val 48502"/>
+              </a:avLst>
+            </a:prstGeom>
+            <a:ln w="28575">
+              <a:solidFill>
+                <a:schemeClr val="tx1"/>
+              </a:solidFill>
+            </a:ln>
+          </p:spPr>
+          <p:style>
+            <a:lnRef idx="1">
+              <a:schemeClr val="accent1"/>
+            </a:lnRef>
+            <a:fillRef idx="0">
+              <a:schemeClr val="accent1"/>
+            </a:fillRef>
+            <a:effectRef idx="0">
+              <a:schemeClr val="accent1"/>
+            </a:effectRef>
+            <a:fontRef idx="minor">
+              <a:schemeClr val="tx1"/>
+            </a:fontRef>
+          </p:style>
+          <p:txBody>
+            <a:bodyPr rtlCol="0" anchor="ctr"/>
+            <a:lstStyle/>
+            <a:p>
+              <a:pPr algn="ctr"/>
+              <a:endParaRPr lang="en-US" dirty="0"/>
+            </a:p>
+          </p:txBody>
+        </p:sp>
+        <p:pic>
+          <p:nvPicPr>
+            <p:cNvPr id="3" name="Picture 2">
+              <a:extLst>
+                <a:ext uri="{FF2B5EF4-FFF2-40B4-BE49-F238E27FC236}">
+                  <a16:creationId xmlns:a16="http://schemas.microsoft.com/office/drawing/2014/main" id="{2D3FA000-A957-4520-ADA1-905F80178913}"/>
+                </a:ext>
+              </a:extLst>
+            </p:cNvPr>
+            <p:cNvPicPr>
+              <a:picLocks noChangeAspect="1"/>
+            </p:cNvPicPr>
+            <p:nvPr>
+              <p:custDataLst>
+                <p:tags r:id="rId1"/>
+              </p:custDataLst>
+            </p:nvPr>
+          </p:nvPicPr>
+          <p:blipFill>
+            <a:blip r:embed="rId6">
+              <a:extLst>
+                <a:ext uri="{28A0092B-C50C-407E-A947-70E740481C1C}">
+                  <a14:useLocalDpi xmlns:a14="http://schemas.microsoft.com/office/drawing/2010/main" val="0"/>
+                </a:ext>
+              </a:extLst>
+            </a:blip>
+            <a:stretch>
+              <a:fillRect/>
+            </a:stretch>
+          </p:blipFill>
+          <p:spPr>
+            <a:xfrm>
+              <a:off x="4926780" y="4937124"/>
+              <a:ext cx="620190" cy="245333"/>
+            </a:xfrm>
+            <a:prstGeom prst="rect">
+              <a:avLst/>
+            </a:prstGeom>
+          </p:spPr>
+        </p:pic>
+        <p:sp>
+          <p:nvSpPr>
+            <p:cNvPr id="36" name="Left Brace 35">
+              <a:extLst>
+                <a:ext uri="{FF2B5EF4-FFF2-40B4-BE49-F238E27FC236}">
+                  <a16:creationId xmlns:a16="http://schemas.microsoft.com/office/drawing/2014/main" id="{34C00208-D46E-44FF-8D1A-28B6EEFBB41C}"/>
+                </a:ext>
+              </a:extLst>
+            </p:cNvPr>
+            <p:cNvSpPr/>
+            <p:nvPr/>
+          </p:nvSpPr>
+          <p:spPr>
+            <a:xfrm>
+              <a:off x="4010351" y="1150655"/>
+              <a:ext cx="337767" cy="2953985"/>
+            </a:xfrm>
+            <a:prstGeom prst="leftBrace">
+              <a:avLst>
+                <a:gd name="adj1" fmla="val 32109"/>
+                <a:gd name="adj2" fmla="val 48502"/>
+              </a:avLst>
+            </a:prstGeom>
+            <a:ln w="28575">
+              <a:solidFill>
+                <a:schemeClr val="tx1"/>
+              </a:solidFill>
+            </a:ln>
+          </p:spPr>
+          <p:style>
+            <a:lnRef idx="1">
+              <a:schemeClr val="accent1"/>
+            </a:lnRef>
+            <a:fillRef idx="0">
+              <a:schemeClr val="accent1"/>
+            </a:fillRef>
+            <a:effectRef idx="0">
+              <a:schemeClr val="accent1"/>
+            </a:effectRef>
+            <a:fontRef idx="minor">
+              <a:schemeClr val="tx1"/>
+            </a:fontRef>
+          </p:style>
+          <p:txBody>
+            <a:bodyPr rtlCol="0" anchor="ctr"/>
+            <a:lstStyle/>
+            <a:p>
+              <a:pPr algn="ctr"/>
+              <a:endParaRPr lang="en-US" dirty="0"/>
+            </a:p>
+          </p:txBody>
+        </p:sp>
+        <p:pic>
+          <p:nvPicPr>
+            <p:cNvPr id="5" name="Picture 4">
+              <a:extLst>
+                <a:ext uri="{FF2B5EF4-FFF2-40B4-BE49-F238E27FC236}">
+                  <a16:creationId xmlns:a16="http://schemas.microsoft.com/office/drawing/2014/main" id="{F811223B-1869-4658-93A7-78A406CDFA10}"/>
+                </a:ext>
+              </a:extLst>
+            </p:cNvPr>
+            <p:cNvPicPr>
+              <a:picLocks noChangeAspect="1"/>
+            </p:cNvPicPr>
+            <p:nvPr>
+              <p:custDataLst>
+                <p:tags r:id="rId2"/>
+              </p:custDataLst>
+            </p:nvPr>
+          </p:nvPicPr>
+          <p:blipFill>
+            <a:blip r:embed="rId7">
+              <a:extLst>
+                <a:ext uri="{28A0092B-C50C-407E-A947-70E740481C1C}">
+                  <a14:useLocalDpi xmlns:a14="http://schemas.microsoft.com/office/drawing/2010/main" val="0"/>
+                </a:ext>
+              </a:extLst>
+            </a:blip>
+            <a:stretch>
+              <a:fillRect/>
+            </a:stretch>
+          </p:blipFill>
+          <p:spPr>
+            <a:xfrm>
+              <a:off x="3026545" y="2373408"/>
+              <a:ext cx="682666" cy="210285"/>
+            </a:xfrm>
+            <a:prstGeom prst="rect">
+              <a:avLst/>
+            </a:prstGeom>
+          </p:spPr>
+        </p:pic>
+        <p:sp>
+          <p:nvSpPr>
+            <p:cNvPr id="40" name="Left Brace 39">
+              <a:extLst>
+                <a:ext uri="{FF2B5EF4-FFF2-40B4-BE49-F238E27FC236}">
+                  <a16:creationId xmlns:a16="http://schemas.microsoft.com/office/drawing/2014/main" id="{3C62ECCA-C254-43FB-B7FE-23AC3E40E10E}"/>
+                </a:ext>
+              </a:extLst>
+            </p:cNvPr>
+            <p:cNvSpPr/>
+            <p:nvPr/>
+          </p:nvSpPr>
+          <p:spPr>
+            <a:xfrm rot="5400000">
+              <a:off x="5772176" y="-715540"/>
+              <a:ext cx="337767" cy="2953985"/>
+            </a:xfrm>
+            <a:prstGeom prst="leftBrace">
+              <a:avLst>
+                <a:gd name="adj1" fmla="val 32109"/>
+                <a:gd name="adj2" fmla="val 48502"/>
+              </a:avLst>
+            </a:prstGeom>
+            <a:ln w="28575">
+              <a:solidFill>
+                <a:schemeClr val="tx1"/>
+              </a:solidFill>
+            </a:ln>
+          </p:spPr>
+          <p:style>
+            <a:lnRef idx="1">
+              <a:schemeClr val="accent1"/>
+            </a:lnRef>
+            <a:fillRef idx="0">
+              <a:schemeClr val="accent1"/>
+            </a:fillRef>
+            <a:effectRef idx="0">
+              <a:schemeClr val="accent1"/>
+            </a:effectRef>
+            <a:fontRef idx="minor">
+              <a:schemeClr val="tx1"/>
+            </a:fontRef>
+          </p:style>
+          <p:txBody>
+            <a:bodyPr rtlCol="0" anchor="ctr"/>
+            <a:lstStyle/>
+            <a:p>
+              <a:pPr algn="ctr"/>
+              <a:endParaRPr lang="en-US" dirty="0"/>
+            </a:p>
+          </p:txBody>
+        </p:sp>
+        <p:pic>
+          <p:nvPicPr>
+            <p:cNvPr id="7" name="Picture 6">
+              <a:extLst>
+                <a:ext uri="{FF2B5EF4-FFF2-40B4-BE49-F238E27FC236}">
+                  <a16:creationId xmlns:a16="http://schemas.microsoft.com/office/drawing/2014/main" id="{1E842E39-BE55-4729-BF85-4381FDA3F9C2}"/>
+                </a:ext>
+              </a:extLst>
+            </p:cNvPr>
+            <p:cNvPicPr>
+              <a:picLocks noChangeAspect="1"/>
+            </p:cNvPicPr>
+            <p:nvPr>
+              <p:custDataLst>
+                <p:tags r:id="rId3"/>
+              </p:custDataLst>
+            </p:nvPr>
+          </p:nvPicPr>
+          <p:blipFill>
+            <a:blip r:embed="rId8">
+              <a:extLst>
+                <a:ext uri="{28A0092B-C50C-407E-A947-70E740481C1C}">
+                  <a14:useLocalDpi xmlns:a14="http://schemas.microsoft.com/office/drawing/2010/main" val="0"/>
+                </a:ext>
+              </a:extLst>
+            </a:blip>
+            <a:stretch>
+              <a:fillRect/>
+            </a:stretch>
+          </p:blipFill>
+          <p:spPr>
+            <a:xfrm>
+              <a:off x="5647454" y="202972"/>
+              <a:ext cx="707047" cy="211809"/>
+            </a:xfrm>
+            <a:prstGeom prst="rect">
+              <a:avLst/>
+            </a:prstGeom>
+          </p:spPr>
+        </p:pic>
+        <p:pic>
+          <p:nvPicPr>
+            <p:cNvPr id="32" name="Picture 31">
+              <a:extLst>
+                <a:ext uri="{FF2B5EF4-FFF2-40B4-BE49-F238E27FC236}">
+                  <a16:creationId xmlns:a16="http://schemas.microsoft.com/office/drawing/2014/main" id="{97A8A8E5-51A5-470A-8B37-FAF3900F51CD}"/>
+                </a:ext>
+              </a:extLst>
+            </p:cNvPr>
+            <p:cNvPicPr>
+              <a:picLocks noChangeAspect="1"/>
+            </p:cNvPicPr>
+            <p:nvPr>
+              <p:custDataLst>
+                <p:tags r:id="rId4"/>
+              </p:custDataLst>
+            </p:nvPr>
+          </p:nvPicPr>
+          <p:blipFill>
+            <a:blip r:embed="rId9">
+              <a:extLst>
+                <a:ext uri="{28A0092B-C50C-407E-A947-70E740481C1C}">
+                  <a14:useLocalDpi xmlns:a14="http://schemas.microsoft.com/office/drawing/2010/main" val="0"/>
+                </a:ext>
+              </a:extLst>
+            </a:blip>
+            <a:stretch>
+              <a:fillRect/>
+            </a:stretch>
+          </p:blipFill>
+          <p:spPr>
+            <a:xfrm>
+              <a:off x="3026545" y="5414688"/>
+              <a:ext cx="6828184" cy="684189"/>
+            </a:xfrm>
+            <a:prstGeom prst="rect">
+              <a:avLst/>
+            </a:prstGeom>
+          </p:spPr>
+        </p:pic>
+      </p:grpSp>
+    </p:spTree>
+    <p:extLst>
+      <p:ext uri="{BB962C8B-B14F-4D97-AF65-F5344CB8AC3E}">
+        <p14:creationId xmlns:p14="http://schemas.microsoft.com/office/powerpoint/2010/main" val="2222237858"/>
+      </p:ext>
+    </p:extLst>
+  </p:cSld>
+  <p:clrMapOvr>
+    <a:masterClrMapping/>
+  </p:clrMapOvr>
+</p:sld>
+</file>
+
+<file path=ppt/slides/slide7.xml><?xml version="1.0" encoding="utf-8"?>
 <p:sld xmlns:a="http://schemas.openxmlformats.org/drawingml/2006/main" xmlns:r="http://schemas.openxmlformats.org/officeDocument/2006/relationships" xmlns:p="http://schemas.openxmlformats.org/presentationml/2006/main">
   <p:cSld>
     <p:spTree>
@@ -12750,7 +13825,7 @@
 </p:sld>
 </file>
 
-<file path=ppt/slides/slide7.xml><?xml version="1.0" encoding="utf-8"?>
+<file path=ppt/slides/slide8.xml><?xml version="1.0" encoding="utf-8"?>
 <p:sld xmlns:a="http://schemas.openxmlformats.org/drawingml/2006/main" xmlns:r="http://schemas.openxmlformats.org/officeDocument/2006/relationships" xmlns:p="http://schemas.openxmlformats.org/presentationml/2006/main">
   <p:cSld>
     <p:spTree>
@@ -23804,6 +24879,82 @@
 </p:tagLst>
 </file>
 
+<file path=ppt/tags/tag13.xml><?xml version="1.0" encoding="utf-8"?>
+<p:tagLst xmlns:a="http://schemas.openxmlformats.org/drawingml/2006/main" xmlns:r="http://schemas.openxmlformats.org/officeDocument/2006/relationships" xmlns:p="http://schemas.openxmlformats.org/presentationml/2006/main">
+  <p:tag name="OUTPUTDPI" val="1200"/>
+  <p:tag name="ORIGINALHEIGHT" val="260.2175"/>
+  <p:tag name="ORIGINALWIDTH" val="3640.045"/>
+  <p:tag name="LATEXADDIN" val="\documentclass{article}&#10;\usepackage{amsmath}&#10;\usepackage{xcolor}&#10;\pagestyle{empty}&#10;\begin{document}&#10;&#10;\definecolor{Monred}{RGB}{172,0,0}&#10;&#10;$t_{Design}$ = Time it would take to drain the tank if flow was held \\ constant at $Q_0$&#10;&#10;&#10;\end{document}"/>
+  <p:tag name="IGUANATEXSIZE" val="20"/>
+  <p:tag name="IGUANATEXCURSOR" val="208"/>
+  <p:tag name="TRANSPARENCY" val="True"/>
+  <p:tag name="FILENAME" val=""/>
+  <p:tag name="LATEXENGINEID" val="0"/>
+  <p:tag name="TEMPFOLDER" val="c:\temp\"/>
+  <p:tag name="LATEXFORMHEIGHT" val="312"/>
+  <p:tag name="LATEXFORMWIDTH" val="384"/>
+  <p:tag name="LATEXFORMWRAP" val="True"/>
+  <p:tag name="BITMAPVECTOR" val="0"/>
+</p:tagLst>
+</file>
+
+<file path=ppt/tags/tag14.xml><?xml version="1.0" encoding="utf-8"?>
+<p:tagLst xmlns:a="http://schemas.openxmlformats.org/drawingml/2006/main" xmlns:r="http://schemas.openxmlformats.org/officeDocument/2006/relationships" xmlns:p="http://schemas.openxmlformats.org/presentationml/2006/main">
+  <p:tag name="OUTPUTDPI" val="1200"/>
+  <p:tag name="ORIGINALHEIGHT" val="105.7368"/>
+  <p:tag name="ORIGINALWIDTH" val="302.2122"/>
+  <p:tag name="LATEXADDIN" val="\documentclass{article}&#10;\usepackage{amsmath}&#10;\usepackage{xcolor}&#10;\pagestyle{empty}&#10;\begin{document}&#10;&#10;\definecolor{Monred}{RGB}{172,0,0}&#10;&#10;$$h_{Tank}$$&#10;&#10;&#10;\end{document}"/>
+  <p:tag name="IGUANATEXSIZE" val="20"/>
+  <p:tag name="IGUANATEXCURSOR" val="147"/>
+  <p:tag name="TRANSPARENCY" val="True"/>
+  <p:tag name="FILENAME" val=""/>
+  <p:tag name="LATEXENGINEID" val="0"/>
+  <p:tag name="TEMPFOLDER" val="c:\temp\"/>
+  <p:tag name="LATEXFORMHEIGHT" val="312"/>
+  <p:tag name="LATEXFORMWIDTH" val="384"/>
+  <p:tag name="LATEXFORMWRAP" val="True"/>
+  <p:tag name="BITMAPVECTOR" val="0"/>
+</p:tagLst>
+</file>
+
+<file path=ppt/tags/tag15.xml><?xml version="1.0" encoding="utf-8"?>
+<p:tagLst xmlns:a="http://schemas.openxmlformats.org/drawingml/2006/main" xmlns:r="http://schemas.openxmlformats.org/officeDocument/2006/relationships" xmlns:p="http://schemas.openxmlformats.org/presentationml/2006/main">
+  <p:tag name="OUTPUTDPI" val="1200"/>
+  <p:tag name="ORIGINALHEIGHT" val="113.2358"/>
+  <p:tag name="ORIGINALWIDTH" val="3247.094"/>
+  <p:tag name="LATEXADDIN" val="\documentclass{article}&#10;\usepackage{amsmath}&#10;\usepackage{xcolor}&#10;\pagestyle{empty}&#10;\begin{document}&#10;&#10;\definecolor{Monred}{RGB}{172,0,0}&#10;&#10;$Q_0$ = Initial flow rate of hypochlorite solution at time $t = 0$&#10;&#10;&#10;\end{document}"/>
+  <p:tag name="IGUANATEXSIZE" val="20"/>
+  <p:tag name="IGUANATEXCURSOR" val="203"/>
+  <p:tag name="TRANSPARENCY" val="True"/>
+  <p:tag name="FILENAME" val=""/>
+  <p:tag name="LATEXENGINEID" val="0"/>
+  <p:tag name="TEMPFOLDER" val="c:\temp\"/>
+  <p:tag name="LATEXFORMHEIGHT" val="312"/>
+  <p:tag name="LATEXFORMWIDTH" val="384"/>
+  <p:tag name="LATEXFORMWRAP" val="True"/>
+  <p:tag name="BITMAPVECTOR" val="0"/>
+</p:tagLst>
+</file>
+
+<file path=ppt/tags/tag16.xml><?xml version="1.0" encoding="utf-8"?>
+<p:tagLst xmlns:a="http://schemas.openxmlformats.org/drawingml/2006/main" xmlns:r="http://schemas.openxmlformats.org/officeDocument/2006/relationships" xmlns:p="http://schemas.openxmlformats.org/presentationml/2006/main">
+  <p:tag name="OUTPUTDPI" val="1200"/>
+  <p:tag name="ORIGINALHEIGHT" val="106.4867"/>
+  <p:tag name="ORIGINALWIDTH" val="110.2362"/>
+  <p:tag name="LATEXADDIN" val="\documentclass{article}&#10;\usepackage{amsmath}&#10;\usepackage{xcolor}&#10;\pagestyle{empty}&#10;\begin{document}&#10;&#10;\definecolor{Monred}{RGB}{172,0,0}&#10;&#10;$$h_0$$&#10;&#10;&#10;\end{document}"/>
+  <p:tag name="IGUANATEXSIZE" val="20"/>
+  <p:tag name="IGUANATEXCURSOR" val="144"/>
+  <p:tag name="TRANSPARENCY" val="True"/>
+  <p:tag name="FILENAME" val=""/>
+  <p:tag name="LATEXENGINEID" val="0"/>
+  <p:tag name="TEMPFOLDER" val="c:\temp\"/>
+  <p:tag name="LATEXFORMHEIGHT" val="312"/>
+  <p:tag name="LATEXFORMWIDTH" val="384"/>
+  <p:tag name="LATEXFORMWRAP" val="True"/>
+  <p:tag name="BITMAPVECTOR" val="0"/>
+</p:tagLst>
+</file>
+
 <file path=ppt/tags/tag2.xml><?xml version="1.0" encoding="utf-8"?>
 <p:tagLst xmlns:a="http://schemas.openxmlformats.org/drawingml/2006/main" xmlns:r="http://schemas.openxmlformats.org/officeDocument/2006/relationships" xmlns:p="http://schemas.openxmlformats.org/presentationml/2006/main">
   <p:tag name="OUTPUTDPI" val="1200"/>
@@ -23864,11 +25015,11 @@
 <file path=ppt/tags/tag5.xml><?xml version="1.0" encoding="utf-8"?>
 <p:tagLst xmlns:a="http://schemas.openxmlformats.org/drawingml/2006/main" xmlns:r="http://schemas.openxmlformats.org/officeDocument/2006/relationships" xmlns:p="http://schemas.openxmlformats.org/presentationml/2006/main">
   <p:tag name="OUTPUTDPI" val="1200"/>
-  <p:tag name="ORIGINALHEIGHT" val="260.2175"/>
-  <p:tag name="ORIGINALWIDTH" val="3640.045"/>
-  <p:tag name="LATEXADDIN" val="\documentclass{article}&#10;\usepackage{amsmath}&#10;\usepackage{xcolor}&#10;\pagestyle{empty}&#10;\begin{document}&#10;&#10;\definecolor{Monred}{RGB}{172,0,0}&#10;&#10;$t_{Design}$ = Time it would take to drain the tank if flow was held \\ constant at $Q_0$&#10;&#10;&#10;\end{document}"/>
+  <p:tag name="ORIGINALHEIGHT" val="120.7349"/>
+  <p:tag name="ORIGINALWIDTH" val="305.2118"/>
+  <p:tag name="LATEXADDIN" val="\documentclass{article}&#10;\usepackage{amsmath}&#10;\usepackage{xcolor}&#10;\pagestyle{empty}&#10;\begin{document}&#10;&#10;\definecolor{Monred}{RGB}{172,0,0}&#10;&#10;&#10;$$D_{Pipe}$$&#10;&#10;\end{document}"/>
   <p:tag name="IGUANATEXSIZE" val="20"/>
-  <p:tag name="IGUANATEXCURSOR" val="208"/>
+  <p:tag name="IGUANATEXCURSOR" val="150"/>
   <p:tag name="TRANSPARENCY" val="True"/>
   <p:tag name="FILENAME" val=""/>
   <p:tag name="LATEXENGINEID" val="0"/>
@@ -23883,9 +25034,9 @@
 <file path=ppt/tags/tag6.xml><?xml version="1.0" encoding="utf-8"?>
 <p:tagLst xmlns:a="http://schemas.openxmlformats.org/drawingml/2006/main" xmlns:r="http://schemas.openxmlformats.org/officeDocument/2006/relationships" xmlns:p="http://schemas.openxmlformats.org/presentationml/2006/main">
   <p:tag name="OUTPUTDPI" val="1200"/>
-  <p:tag name="ORIGINALHEIGHT" val="105.7368"/>
-  <p:tag name="ORIGINALWIDTH" val="302.2122"/>
-  <p:tag name="LATEXADDIN" val="\documentclass{article}&#10;\usepackage{amsmath}&#10;\usepackage{xcolor}&#10;\pagestyle{empty}&#10;\begin{document}&#10;&#10;\definecolor{Monred}{RGB}{172,0,0}&#10;&#10;$$h_{Tank}$$&#10;&#10;&#10;\end{document}"/>
+  <p:tag name="ORIGINALHEIGHT" val="103.4871"/>
+  <p:tag name="ORIGINALWIDTH" val="335.958"/>
+  <p:tag name="LATEXADDIN" val="\documentclass{article}&#10;\usepackage{amsmath}&#10;\usepackage{xcolor}&#10;\pagestyle{empty}&#10;\begin{document}&#10;&#10;\definecolor{Monred}{RGB}{172,0,0}&#10;&#10;&#10;$$H_{Tank}$$&#10;&#10;\end{document}"/>
   <p:tag name="IGUANATEXSIZE" val="20"/>
   <p:tag name="IGUANATEXCURSOR" val="147"/>
   <p:tag name="TRANSPARENCY" val="True"/>
@@ -23902,11 +25053,11 @@
 <file path=ppt/tags/tag7.xml><?xml version="1.0" encoding="utf-8"?>
 <p:tagLst xmlns:a="http://schemas.openxmlformats.org/drawingml/2006/main" xmlns:r="http://schemas.openxmlformats.org/officeDocument/2006/relationships" xmlns:p="http://schemas.openxmlformats.org/presentationml/2006/main">
   <p:tag name="OUTPUTDPI" val="1200"/>
-  <p:tag name="ORIGINALHEIGHT" val="113.2358"/>
-  <p:tag name="ORIGINALWIDTH" val="3247.094"/>
-  <p:tag name="LATEXADDIN" val="\documentclass{article}&#10;\usepackage{amsmath}&#10;\usepackage{xcolor}&#10;\pagestyle{empty}&#10;\begin{document}&#10;&#10;\definecolor{Monred}{RGB}{172,0,0}&#10;&#10;$Q_0$ = Initial flow rate of hypochlorite solution at time $t = 0$&#10;&#10;&#10;\end{document}"/>
+  <p:tag name="ORIGINALHEIGHT" val="104.237"/>
+  <p:tag name="ORIGINALWIDTH" val="347.9565"/>
+  <p:tag name="LATEXADDIN" val="\documentclass{article}&#10;\usepackage{amsmath}&#10;\usepackage{xcolor}&#10;\pagestyle{empty}&#10;\begin{document}&#10;&#10;\definecolor{Monred}{RGB}{172,0,0}&#10;&#10;&#10;$$W_{Tank}$$&#10;&#10;\end{document}"/>
   <p:tag name="IGUANATEXSIZE" val="20"/>
-  <p:tag name="IGUANATEXCURSOR" val="203"/>
+  <p:tag name="IGUANATEXCURSOR" val="141"/>
   <p:tag name="TRANSPARENCY" val="True"/>
   <p:tag name="FILENAME" val=""/>
   <p:tag name="LATEXENGINEID" val="0"/>
@@ -23921,11 +25072,11 @@
 <file path=ppt/tags/tag8.xml><?xml version="1.0" encoding="utf-8"?>
 <p:tagLst xmlns:a="http://schemas.openxmlformats.org/drawingml/2006/main" xmlns:r="http://schemas.openxmlformats.org/officeDocument/2006/relationships" xmlns:p="http://schemas.openxmlformats.org/presentationml/2006/main">
   <p:tag name="OUTPUTDPI" val="1200"/>
-  <p:tag name="ORIGINALHEIGHT" val="106.4867"/>
-  <p:tag name="ORIGINALWIDTH" val="110.2362"/>
-  <p:tag name="LATEXADDIN" val="\documentclass{article}&#10;\usepackage{amsmath}&#10;\usepackage{xcolor}&#10;\pagestyle{empty}&#10;\begin{document}&#10;&#10;\definecolor{Monred}{RGB}{172,0,0}&#10;&#10;$$h_0$$&#10;&#10;&#10;\end{document}"/>
+  <p:tag name="ORIGINALHEIGHT" val="336.7079"/>
+  <p:tag name="ORIGINALWIDTH" val="3360.33"/>
+  <p:tag name="LATEXADDIN" val="\documentclass{article}&#10;\usepackage{amsmath}&#10;\usepackage{xcolor}&#10;\pagestyle{empty}&#10;\begin{document}&#10;&#10;\definecolor{Monred}{RGB}{172,0,0}&#10;&#10;&#10;$$L_{Tank} \,\, {\rm{is \,\, the \,\, length \,\, of \,\, the \,\, tank \,\, which \,\, goes \,\, into \,\, the \,\, page}}$$&#10;$$K_e \,\, {\rm{is \,\, the \,\, aggregate \,\, minor \,\, loss \,\, coefficient \,\, of \,\, the \,\, drain \,\, system.}}$$&#10;&#10;\end{document}"/>
   <p:tag name="IGUANATEXSIZE" val="20"/>
-  <p:tag name="IGUANATEXCURSOR" val="144"/>
+  <p:tag name="IGUANATEXCURSOR" val="263"/>
   <p:tag name="TRANSPARENCY" val="True"/>
   <p:tag name="FILENAME" val=""/>
   <p:tag name="LATEXENGINEID" val="0"/>

</xml_diff>

<commit_message>
beginning structural change of summary sheets to stop babying students
</commit_message>
<xml_diff>
--- a/Summary Sheets/Diagrams.pptx
+++ b/Summary Sheets/Diagrams.pptx
@@ -16,9 +16,11 @@
     <p:sldId id="264" r:id="rId10"/>
     <p:sldId id="265" r:id="rId11"/>
     <p:sldId id="267" r:id="rId12"/>
-    <p:sldId id="268" r:id="rId13"/>
-    <p:sldId id="261" r:id="rId14"/>
-    <p:sldId id="262" r:id="rId15"/>
+    <p:sldId id="271" r:id="rId13"/>
+    <p:sldId id="268" r:id="rId14"/>
+    <p:sldId id="261" r:id="rId15"/>
+    <p:sldId id="272" r:id="rId16"/>
+    <p:sldId id="262" r:id="rId17"/>
   </p:sldIdLst>
   <p:sldSz cx="12192000" cy="6858000"/>
   <p:notesSz cx="6858000" cy="9144000"/>
@@ -283,7 +285,7 @@
           <a:p>
             <a:fld id="{21D1E3DE-262E-49AD-8F92-4417FBCF3DA3}" type="datetimeFigureOut">
               <a:rPr lang="en-US" smtClean="0"/>
-              <a:t>4/26/2018</a:t>
+              <a:t>4/29/2018</a:t>
             </a:fld>
             <a:endParaRPr lang="en-US"/>
           </a:p>
@@ -481,7 +483,7 @@
           <a:p>
             <a:fld id="{21D1E3DE-262E-49AD-8F92-4417FBCF3DA3}" type="datetimeFigureOut">
               <a:rPr lang="en-US" smtClean="0"/>
-              <a:t>4/26/2018</a:t>
+              <a:t>4/29/2018</a:t>
             </a:fld>
             <a:endParaRPr lang="en-US"/>
           </a:p>
@@ -689,7 +691,7 @@
           <a:p>
             <a:fld id="{21D1E3DE-262E-49AD-8F92-4417FBCF3DA3}" type="datetimeFigureOut">
               <a:rPr lang="en-US" smtClean="0"/>
-              <a:t>4/26/2018</a:t>
+              <a:t>4/29/2018</a:t>
             </a:fld>
             <a:endParaRPr lang="en-US"/>
           </a:p>
@@ -887,7 +889,7 @@
           <a:p>
             <a:fld id="{21D1E3DE-262E-49AD-8F92-4417FBCF3DA3}" type="datetimeFigureOut">
               <a:rPr lang="en-US" smtClean="0"/>
-              <a:t>4/26/2018</a:t>
+              <a:t>4/29/2018</a:t>
             </a:fld>
             <a:endParaRPr lang="en-US"/>
           </a:p>
@@ -1162,7 +1164,7 @@
           <a:p>
             <a:fld id="{21D1E3DE-262E-49AD-8F92-4417FBCF3DA3}" type="datetimeFigureOut">
               <a:rPr lang="en-US" smtClean="0"/>
-              <a:t>4/26/2018</a:t>
+              <a:t>4/29/2018</a:t>
             </a:fld>
             <a:endParaRPr lang="en-US"/>
           </a:p>
@@ -1427,7 +1429,7 @@
           <a:p>
             <a:fld id="{21D1E3DE-262E-49AD-8F92-4417FBCF3DA3}" type="datetimeFigureOut">
               <a:rPr lang="en-US" smtClean="0"/>
-              <a:t>4/26/2018</a:t>
+              <a:t>4/29/2018</a:t>
             </a:fld>
             <a:endParaRPr lang="en-US"/>
           </a:p>
@@ -1839,7 +1841,7 @@
           <a:p>
             <a:fld id="{21D1E3DE-262E-49AD-8F92-4417FBCF3DA3}" type="datetimeFigureOut">
               <a:rPr lang="en-US" smtClean="0"/>
-              <a:t>4/26/2018</a:t>
+              <a:t>4/29/2018</a:t>
             </a:fld>
             <a:endParaRPr lang="en-US"/>
           </a:p>
@@ -1980,7 +1982,7 @@
           <a:p>
             <a:fld id="{21D1E3DE-262E-49AD-8F92-4417FBCF3DA3}" type="datetimeFigureOut">
               <a:rPr lang="en-US" smtClean="0"/>
-              <a:t>4/26/2018</a:t>
+              <a:t>4/29/2018</a:t>
             </a:fld>
             <a:endParaRPr lang="en-US"/>
           </a:p>
@@ -2093,7 +2095,7 @@
           <a:p>
             <a:fld id="{21D1E3DE-262E-49AD-8F92-4417FBCF3DA3}" type="datetimeFigureOut">
               <a:rPr lang="en-US" smtClean="0"/>
-              <a:t>4/26/2018</a:t>
+              <a:t>4/29/2018</a:t>
             </a:fld>
             <a:endParaRPr lang="en-US"/>
           </a:p>
@@ -2404,7 +2406,7 @@
           <a:p>
             <a:fld id="{21D1E3DE-262E-49AD-8F92-4417FBCF3DA3}" type="datetimeFigureOut">
               <a:rPr lang="en-US" smtClean="0"/>
-              <a:t>4/26/2018</a:t>
+              <a:t>4/29/2018</a:t>
             </a:fld>
             <a:endParaRPr lang="en-US"/>
           </a:p>
@@ -2692,7 +2694,7 @@
           <a:p>
             <a:fld id="{21D1E3DE-262E-49AD-8F92-4417FBCF3DA3}" type="datetimeFigureOut">
               <a:rPr lang="en-US" smtClean="0"/>
-              <a:t>4/26/2018</a:t>
+              <a:t>4/29/2018</a:t>
             </a:fld>
             <a:endParaRPr lang="en-US"/>
           </a:p>
@@ -2933,7 +2935,7 @@
           <a:p>
             <a:fld id="{21D1E3DE-262E-49AD-8F92-4417FBCF3DA3}" type="datetimeFigureOut">
               <a:rPr lang="en-US" smtClean="0"/>
-              <a:t>4/26/2018</a:t>
+              <a:t>4/29/2018</a:t>
             </a:fld>
             <a:endParaRPr lang="en-US"/>
           </a:p>
@@ -8093,10 +8095,10 @@
       </p:grpSpPr>
       <p:grpSp>
         <p:nvGrpSpPr>
-          <p:cNvPr id="12" name="Group 11">
+          <p:cNvPr id="7" name="Group 6">
             <a:extLst>
               <a:ext uri="{FF2B5EF4-FFF2-40B4-BE49-F238E27FC236}">
-                <a16:creationId xmlns:a16="http://schemas.microsoft.com/office/drawing/2014/main" id="{AD1ECE29-7C87-47EA-956B-8A86AAE1AD0A}"/>
+                <a16:creationId xmlns:a16="http://schemas.microsoft.com/office/drawing/2014/main" id="{2ECA0724-2E10-4E9D-AEEC-C9B9C9C090CE}"/>
               </a:ext>
             </a:extLst>
           </p:cNvPr>
@@ -8113,15 +8115,19 @@
         </p:grpSpPr>
         <p:grpSp>
           <p:nvGrpSpPr>
-            <p:cNvPr id="11" name="Group 10">
+            <p:cNvPr id="6" name="Group 5">
               <a:extLst>
                 <a:ext uri="{FF2B5EF4-FFF2-40B4-BE49-F238E27FC236}">
-                  <a16:creationId xmlns:a16="http://schemas.microsoft.com/office/drawing/2014/main" id="{452782FC-C771-46A2-8A77-110143475C5F}"/>
+                  <a16:creationId xmlns:a16="http://schemas.microsoft.com/office/drawing/2014/main" id="{0CB4C1FF-F235-40B5-8AC2-97F410D97E2B}"/>
                 </a:ext>
               </a:extLst>
             </p:cNvPr>
             <p:cNvGrpSpPr/>
-            <p:nvPr/>
+            <p:nvPr>
+              <p:custDataLst>
+                <p:tags r:id="rId1"/>
+              </p:custDataLst>
+            </p:nvPr>
           </p:nvGrpSpPr>
           <p:grpSpPr>
             <a:xfrm>
@@ -8643,7 +8649,7 @@
               <p:nvPr/>
             </p:nvSpPr>
             <p:spPr bwMode="auto">
-              <a:xfrm rot="-10800000" flipH="1" flipV="1">
+              <a:xfrm rot="10800000" flipH="1" flipV="1">
                 <a:off x="6479061" y="1551325"/>
                 <a:ext cx="520700" cy="292100"/>
               </a:xfrm>
@@ -8944,7 +8950,7 @@
               <p:nvPr/>
             </p:nvSpPr>
             <p:spPr bwMode="auto">
-              <a:xfrm rot="-10800000" flipH="1" flipV="1">
+              <a:xfrm rot="10800000" flipH="1" flipV="1">
                 <a:off x="4650261" y="5183525"/>
                 <a:ext cx="749300" cy="596900"/>
               </a:xfrm>
@@ -9163,10 +9169,10 @@
           </p:sp>
           <p:pic>
             <p:nvPicPr>
-              <p:cNvPr id="10" name="Picture 9">
+              <p:cNvPr id="5" name="Picture 4">
                 <a:extLst>
                   <a:ext uri="{FF2B5EF4-FFF2-40B4-BE49-F238E27FC236}">
-                    <a16:creationId xmlns:a16="http://schemas.microsoft.com/office/drawing/2014/main" id="{E1D855CF-7E82-48A3-AF3E-4E7839A70B1D}"/>
+                    <a16:creationId xmlns:a16="http://schemas.microsoft.com/office/drawing/2014/main" id="{E7C74D10-8274-4A99-901F-0EB03E7706F0}"/>
                   </a:ext>
                 </a:extLst>
               </p:cNvPr>
@@ -9175,12 +9181,12 @@
               </p:cNvPicPr>
               <p:nvPr>
                 <p:custDataLst>
-                  <p:tags r:id="rId1"/>
+                  <p:tags r:id="rId2"/>
                 </p:custDataLst>
               </p:nvPr>
             </p:nvPicPr>
             <p:blipFill>
-              <a:blip r:embed="rId3">
+              <a:blip r:embed="rId4">
                 <a:extLst>
                   <a:ext uri="{28A0092B-C50C-407E-A947-70E740481C1C}">
                     <a14:useLocalDpi xmlns:a14="http://schemas.microsoft.com/office/drawing/2010/main" val="0"/>
@@ -9193,8 +9199,8 @@
             </p:blipFill>
             <p:spPr>
               <a:xfrm>
-                <a:off x="5233224" y="3894781"/>
-                <a:ext cx="232837" cy="332220"/>
+                <a:off x="5022463" y="3835853"/>
+                <a:ext cx="630364" cy="343578"/>
               </a:xfrm>
               <a:prstGeom prst="rect">
                 <a:avLst/>
@@ -9721,6 +9727,547 @@
 </file>
 
 <file path=ppt/slides/slide12.xml><?xml version="1.0" encoding="utf-8"?>
+<p:sld xmlns:a="http://schemas.openxmlformats.org/drawingml/2006/main" xmlns:r="http://schemas.openxmlformats.org/officeDocument/2006/relationships" xmlns:p="http://schemas.openxmlformats.org/presentationml/2006/main">
+  <p:cSld>
+    <p:spTree>
+      <p:nvGrpSpPr>
+        <p:cNvPr id="1" name=""/>
+        <p:cNvGrpSpPr/>
+        <p:nvPr/>
+      </p:nvGrpSpPr>
+      <p:grpSpPr>
+        <a:xfrm>
+          <a:off x="0" y="0"/>
+          <a:ext cx="0" cy="0"/>
+          <a:chOff x="0" y="0"/>
+          <a:chExt cx="0" cy="0"/>
+        </a:xfrm>
+      </p:grpSpPr>
+      <p:pic>
+        <p:nvPicPr>
+          <p:cNvPr id="9" name="Picture 8">
+            <a:extLst>
+              <a:ext uri="{FF2B5EF4-FFF2-40B4-BE49-F238E27FC236}">
+                <a16:creationId xmlns:a16="http://schemas.microsoft.com/office/drawing/2014/main" id="{CC273DA2-8694-4812-9E58-590BA9F32842}"/>
+              </a:ext>
+            </a:extLst>
+          </p:cNvPr>
+          <p:cNvPicPr>
+            <a:picLocks noChangeAspect="1"/>
+          </p:cNvPicPr>
+          <p:nvPr>
+            <p:custDataLst>
+              <p:tags r:id="rId1"/>
+            </p:custDataLst>
+          </p:nvPr>
+        </p:nvPicPr>
+        <p:blipFill>
+          <a:blip r:embed="rId9">
+            <a:extLst>
+              <a:ext uri="{28A0092B-C50C-407E-A947-70E740481C1C}">
+                <a14:useLocalDpi xmlns:a14="http://schemas.microsoft.com/office/drawing/2010/main" val="0"/>
+              </a:ext>
+            </a:extLst>
+          </a:blip>
+          <a:stretch>
+            <a:fillRect/>
+          </a:stretch>
+        </p:blipFill>
+        <p:spPr>
+          <a:xfrm>
+            <a:off x="4311619" y="1220764"/>
+            <a:ext cx="1784381" cy="608000"/>
+          </a:xfrm>
+          <a:prstGeom prst="rect">
+            <a:avLst/>
+          </a:prstGeom>
+        </p:spPr>
+      </p:pic>
+      <p:pic>
+        <p:nvPicPr>
+          <p:cNvPr id="11" name="Picture 10">
+            <a:extLst>
+              <a:ext uri="{FF2B5EF4-FFF2-40B4-BE49-F238E27FC236}">
+                <a16:creationId xmlns:a16="http://schemas.microsoft.com/office/drawing/2014/main" id="{382A4370-E27E-4BF5-B4C4-5A746C15BF06}"/>
+              </a:ext>
+            </a:extLst>
+          </p:cNvPr>
+          <p:cNvPicPr>
+            <a:picLocks noChangeAspect="1"/>
+          </p:cNvPicPr>
+          <p:nvPr>
+            <p:custDataLst>
+              <p:tags r:id="rId2"/>
+            </p:custDataLst>
+          </p:nvPr>
+        </p:nvPicPr>
+        <p:blipFill>
+          <a:blip r:embed="rId10">
+            <a:extLst>
+              <a:ext uri="{28A0092B-C50C-407E-A947-70E740481C1C}">
+                <a14:useLocalDpi xmlns:a14="http://schemas.microsoft.com/office/drawing/2010/main" val="0"/>
+              </a:ext>
+            </a:extLst>
+          </a:blip>
+          <a:stretch>
+            <a:fillRect/>
+          </a:stretch>
+        </p:blipFill>
+        <p:spPr>
+          <a:xfrm>
+            <a:off x="4311619" y="1981163"/>
+            <a:ext cx="2326857" cy="608000"/>
+          </a:xfrm>
+          <a:prstGeom prst="rect">
+            <a:avLst/>
+          </a:prstGeom>
+        </p:spPr>
+      </p:pic>
+      <p:pic>
+        <p:nvPicPr>
+          <p:cNvPr id="17" name="Picture 16">
+            <a:extLst>
+              <a:ext uri="{FF2B5EF4-FFF2-40B4-BE49-F238E27FC236}">
+                <a16:creationId xmlns:a16="http://schemas.microsoft.com/office/drawing/2014/main" id="{C1DFFBB9-E736-401A-B6AC-4FE8344D1FEB}"/>
+              </a:ext>
+            </a:extLst>
+          </p:cNvPr>
+          <p:cNvPicPr>
+            <a:picLocks noChangeAspect="1"/>
+          </p:cNvPicPr>
+          <p:nvPr>
+            <p:custDataLst>
+              <p:tags r:id="rId3"/>
+            </p:custDataLst>
+          </p:nvPr>
+        </p:nvPicPr>
+        <p:blipFill>
+          <a:blip r:embed="rId11">
+            <a:extLst>
+              <a:ext uri="{28A0092B-C50C-407E-A947-70E740481C1C}">
+                <a14:useLocalDpi xmlns:a14="http://schemas.microsoft.com/office/drawing/2010/main" val="0"/>
+              </a:ext>
+            </a:extLst>
+          </a:blip>
+          <a:stretch>
+            <a:fillRect/>
+          </a:stretch>
+        </p:blipFill>
+        <p:spPr>
+          <a:xfrm>
+            <a:off x="4311620" y="2726739"/>
+            <a:ext cx="3574859" cy="608000"/>
+          </a:xfrm>
+          <a:prstGeom prst="rect">
+            <a:avLst/>
+          </a:prstGeom>
+        </p:spPr>
+      </p:pic>
+      <p:sp>
+        <p:nvSpPr>
+          <p:cNvPr id="18" name="Oval 17">
+            <a:extLst>
+              <a:ext uri="{FF2B5EF4-FFF2-40B4-BE49-F238E27FC236}">
+                <a16:creationId xmlns:a16="http://schemas.microsoft.com/office/drawing/2014/main" id="{60885CA0-A682-43B5-AB07-8C30646A7510}"/>
+              </a:ext>
+            </a:extLst>
+          </p:cNvPr>
+          <p:cNvSpPr/>
+          <p:nvPr/>
+        </p:nvSpPr>
+        <p:spPr bwMode="auto">
+          <a:xfrm>
+            <a:off x="4932485" y="2700923"/>
+            <a:ext cx="668215" cy="666531"/>
+          </a:xfrm>
+          <a:prstGeom prst="ellipse">
+            <a:avLst/>
+          </a:prstGeom>
+          <a:noFill/>
+          <a:ln w="38100">
+            <a:solidFill>
+              <a:srgbClr val="C00000"/>
+            </a:solidFill>
+            <a:miter lim="800000"/>
+            <a:headEnd type="none" w="lg" len="med"/>
+            <a:tailEnd type="none" w="lg" len="med"/>
+          </a:ln>
+          <a:effectLst/>
+        </p:spPr>
+        <p:txBody>
+          <a:bodyPr rtlCol="0" anchor="ctr">
+            <a:spAutoFit/>
+          </a:bodyPr>
+          <a:lstStyle/>
+          <a:p>
+            <a:pPr algn="l"/>
+            <a:endParaRPr lang="en-US" dirty="0"/>
+          </a:p>
+        </p:txBody>
+      </p:sp>
+      <p:sp>
+        <p:nvSpPr>
+          <p:cNvPr id="19" name="Arc 18">
+            <a:extLst>
+              <a:ext uri="{FF2B5EF4-FFF2-40B4-BE49-F238E27FC236}">
+                <a16:creationId xmlns:a16="http://schemas.microsoft.com/office/drawing/2014/main" id="{470C8923-86E9-47D3-BAAC-A80CA366AA58}"/>
+              </a:ext>
+            </a:extLst>
+          </p:cNvPr>
+          <p:cNvSpPr/>
+          <p:nvPr/>
+        </p:nvSpPr>
+        <p:spPr>
+          <a:xfrm>
+            <a:off x="5398476" y="3006969"/>
+            <a:ext cx="1002323" cy="516293"/>
+          </a:xfrm>
+          <a:prstGeom prst="arc">
+            <a:avLst>
+              <a:gd name="adj1" fmla="val 1659419"/>
+              <a:gd name="adj2" fmla="val 10109513"/>
+            </a:avLst>
+          </a:prstGeom>
+          <a:ln>
+            <a:solidFill>
+              <a:srgbClr val="C00000"/>
+            </a:solidFill>
+            <a:headEnd type="triangle"/>
+            <a:tailEnd type="none"/>
+          </a:ln>
+        </p:spPr>
+        <p:style>
+          <a:lnRef idx="1">
+            <a:schemeClr val="accent1"/>
+          </a:lnRef>
+          <a:fillRef idx="0">
+            <a:schemeClr val="accent1"/>
+          </a:fillRef>
+          <a:effectRef idx="0">
+            <a:schemeClr val="accent1"/>
+          </a:effectRef>
+          <a:fontRef idx="minor">
+            <a:schemeClr val="tx1"/>
+          </a:fontRef>
+        </p:style>
+        <p:txBody>
+          <a:bodyPr rtlCol="0" anchor="ctr"/>
+          <a:lstStyle/>
+          <a:p>
+            <a:pPr algn="ctr"/>
+            <a:endParaRPr lang="en-US"/>
+          </a:p>
+        </p:txBody>
+      </p:sp>
+      <p:sp>
+        <p:nvSpPr>
+          <p:cNvPr id="20" name="Left Brace 19">
+            <a:extLst>
+              <a:ext uri="{FF2B5EF4-FFF2-40B4-BE49-F238E27FC236}">
+                <a16:creationId xmlns:a16="http://schemas.microsoft.com/office/drawing/2014/main" id="{E2202866-C392-4C2A-AF1A-234DC65BFFFA}"/>
+              </a:ext>
+            </a:extLst>
+          </p:cNvPr>
+          <p:cNvSpPr/>
+          <p:nvPr/>
+        </p:nvSpPr>
+        <p:spPr>
+          <a:xfrm rot="16200000">
+            <a:off x="6186875" y="2928317"/>
+            <a:ext cx="182977" cy="818387"/>
+          </a:xfrm>
+          <a:prstGeom prst="leftBrace">
+            <a:avLst/>
+          </a:prstGeom>
+          <a:ln w="28575">
+            <a:solidFill>
+              <a:schemeClr val="tx1"/>
+            </a:solidFill>
+          </a:ln>
+        </p:spPr>
+        <p:style>
+          <a:lnRef idx="1">
+            <a:schemeClr val="accent1"/>
+          </a:lnRef>
+          <a:fillRef idx="0">
+            <a:schemeClr val="accent1"/>
+          </a:fillRef>
+          <a:effectRef idx="0">
+            <a:schemeClr val="accent1"/>
+          </a:effectRef>
+          <a:fontRef idx="minor">
+            <a:schemeClr val="tx1"/>
+          </a:fontRef>
+        </p:style>
+        <p:txBody>
+          <a:bodyPr rtlCol="0" anchor="ctr"/>
+          <a:lstStyle/>
+          <a:p>
+            <a:pPr algn="ctr"/>
+            <a:endParaRPr lang="en-US"/>
+          </a:p>
+        </p:txBody>
+      </p:sp>
+      <p:pic>
+        <p:nvPicPr>
+          <p:cNvPr id="22" name="Picture 21">
+            <a:extLst>
+              <a:ext uri="{FF2B5EF4-FFF2-40B4-BE49-F238E27FC236}">
+                <a16:creationId xmlns:a16="http://schemas.microsoft.com/office/drawing/2014/main" id="{64CA9C29-D83D-4889-A42A-DC7184B8616E}"/>
+              </a:ext>
+            </a:extLst>
+          </p:cNvPr>
+          <p:cNvPicPr>
+            <a:picLocks noChangeAspect="1"/>
+          </p:cNvPicPr>
+          <p:nvPr>
+            <p:custDataLst>
+              <p:tags r:id="rId4"/>
+            </p:custDataLst>
+          </p:nvPr>
+        </p:nvPicPr>
+        <p:blipFill>
+          <a:blip r:embed="rId12">
+            <a:extLst>
+              <a:ext uri="{28A0092B-C50C-407E-A947-70E740481C1C}">
+                <a14:useLocalDpi xmlns:a14="http://schemas.microsoft.com/office/drawing/2010/main" val="0"/>
+              </a:ext>
+            </a:extLst>
+          </a:blip>
+          <a:stretch>
+            <a:fillRect/>
+          </a:stretch>
+        </p:blipFill>
+        <p:spPr>
+          <a:xfrm>
+            <a:off x="4311619" y="3758814"/>
+            <a:ext cx="3184764" cy="608000"/>
+          </a:xfrm>
+          <a:prstGeom prst="rect">
+            <a:avLst/>
+          </a:prstGeom>
+        </p:spPr>
+      </p:pic>
+      <p:pic>
+        <p:nvPicPr>
+          <p:cNvPr id="24" name="Picture 23">
+            <a:extLst>
+              <a:ext uri="{FF2B5EF4-FFF2-40B4-BE49-F238E27FC236}">
+                <a16:creationId xmlns:a16="http://schemas.microsoft.com/office/drawing/2014/main" id="{A300E912-E973-4352-8A96-7877DE1ECBF7}"/>
+              </a:ext>
+            </a:extLst>
+          </p:cNvPr>
+          <p:cNvPicPr>
+            <a:picLocks noChangeAspect="1"/>
+          </p:cNvPicPr>
+          <p:nvPr>
+            <p:custDataLst>
+              <p:tags r:id="rId5"/>
+            </p:custDataLst>
+          </p:nvPr>
+        </p:nvPicPr>
+        <p:blipFill>
+          <a:blip r:embed="rId13">
+            <a:extLst>
+              <a:ext uri="{28A0092B-C50C-407E-A947-70E740481C1C}">
+                <a14:useLocalDpi xmlns:a14="http://schemas.microsoft.com/office/drawing/2010/main" val="0"/>
+              </a:ext>
+            </a:extLst>
+          </a:blip>
+          <a:stretch>
+            <a:fillRect/>
+          </a:stretch>
+        </p:blipFill>
+        <p:spPr>
+          <a:xfrm>
+            <a:off x="4311619" y="4420302"/>
+            <a:ext cx="2748954" cy="608000"/>
+          </a:xfrm>
+          <a:prstGeom prst="rect">
+            <a:avLst/>
+          </a:prstGeom>
+        </p:spPr>
+      </p:pic>
+      <p:pic>
+        <p:nvPicPr>
+          <p:cNvPr id="26" name="Picture 25">
+            <a:extLst>
+              <a:ext uri="{FF2B5EF4-FFF2-40B4-BE49-F238E27FC236}">
+                <a16:creationId xmlns:a16="http://schemas.microsoft.com/office/drawing/2014/main" id="{5BD85780-F3FD-4E7B-BB47-CB6FD6EC2116}"/>
+              </a:ext>
+            </a:extLst>
+          </p:cNvPr>
+          <p:cNvPicPr>
+            <a:picLocks noChangeAspect="1"/>
+          </p:cNvPicPr>
+          <p:nvPr>
+            <p:custDataLst>
+              <p:tags r:id="rId6"/>
+            </p:custDataLst>
+          </p:nvPr>
+        </p:nvPicPr>
+        <p:blipFill>
+          <a:blip r:embed="rId14">
+            <a:extLst>
+              <a:ext uri="{28A0092B-C50C-407E-A947-70E740481C1C}">
+                <a14:useLocalDpi xmlns:a14="http://schemas.microsoft.com/office/drawing/2010/main" val="0"/>
+              </a:ext>
+            </a:extLst>
+          </a:blip>
+          <a:stretch>
+            <a:fillRect/>
+          </a:stretch>
+        </p:blipFill>
+        <p:spPr>
+          <a:xfrm>
+            <a:off x="4311619" y="5245076"/>
+            <a:ext cx="1500953" cy="256000"/>
+          </a:xfrm>
+          <a:prstGeom prst="rect">
+            <a:avLst/>
+          </a:prstGeom>
+        </p:spPr>
+      </p:pic>
+      <p:pic>
+        <p:nvPicPr>
+          <p:cNvPr id="33" name="Picture 32">
+            <a:extLst>
+              <a:ext uri="{FF2B5EF4-FFF2-40B4-BE49-F238E27FC236}">
+                <a16:creationId xmlns:a16="http://schemas.microsoft.com/office/drawing/2014/main" id="{333C0F2D-DF4E-40F5-9CDE-1193E8AA7ACC}"/>
+              </a:ext>
+            </a:extLst>
+          </p:cNvPr>
+          <p:cNvPicPr>
+            <a:picLocks noChangeAspect="1"/>
+          </p:cNvPicPr>
+          <p:nvPr>
+            <p:custDataLst>
+              <p:tags r:id="rId7"/>
+            </p:custDataLst>
+          </p:nvPr>
+        </p:nvPicPr>
+        <p:blipFill>
+          <a:blip r:embed="rId15">
+            <a:extLst>
+              <a:ext uri="{28A0092B-C50C-407E-A947-70E740481C1C}">
+                <a14:useLocalDpi xmlns:a14="http://schemas.microsoft.com/office/drawing/2010/main" val="0"/>
+              </a:ext>
+            </a:extLst>
+          </a:blip>
+          <a:stretch>
+            <a:fillRect/>
+          </a:stretch>
+        </p:blipFill>
+        <p:spPr>
+          <a:xfrm>
+            <a:off x="4311618" y="5717850"/>
+            <a:ext cx="1569524" cy="219429"/>
+          </a:xfrm>
+          <a:prstGeom prst="rect">
+            <a:avLst/>
+          </a:prstGeom>
+        </p:spPr>
+      </p:pic>
+      <p:sp>
+        <p:nvSpPr>
+          <p:cNvPr id="29" name="TextBox 28">
+            <a:extLst>
+              <a:ext uri="{FF2B5EF4-FFF2-40B4-BE49-F238E27FC236}">
+                <a16:creationId xmlns:a16="http://schemas.microsoft.com/office/drawing/2014/main" id="{C45A3E52-50D4-4E05-9FDB-3F3BFB1570AA}"/>
+              </a:ext>
+            </a:extLst>
+          </p:cNvPr>
+          <p:cNvSpPr txBox="1"/>
+          <p:nvPr/>
+        </p:nvSpPr>
+        <p:spPr>
+          <a:xfrm>
+            <a:off x="2590121" y="1212018"/>
+            <a:ext cx="1721497" cy="646331"/>
+          </a:xfrm>
+          <a:prstGeom prst="rect">
+            <a:avLst/>
+          </a:prstGeom>
+          <a:noFill/>
+        </p:spPr>
+        <p:txBody>
+          <a:bodyPr wrap="none" rtlCol="0">
+            <a:spAutoFit/>
+          </a:bodyPr>
+          <a:lstStyle/>
+          <a:p>
+            <a:pPr algn="r"/>
+            <a:r>
+              <a:rPr lang="en-US" dirty="0"/>
+              <a:t>Simplified </a:t>
+            </a:r>
+          </a:p>
+          <a:p>
+            <a:pPr algn="r"/>
+            <a:r>
+              <a:rPr lang="en-US" dirty="0"/>
+              <a:t>energy equation</a:t>
+            </a:r>
+          </a:p>
+        </p:txBody>
+      </p:sp>
+      <p:sp>
+        <p:nvSpPr>
+          <p:cNvPr id="64" name="TextBox 63">
+            <a:extLst>
+              <a:ext uri="{FF2B5EF4-FFF2-40B4-BE49-F238E27FC236}">
+                <a16:creationId xmlns:a16="http://schemas.microsoft.com/office/drawing/2014/main" id="{D07EDC5E-3969-4041-8183-3AF2FCED7C95}"/>
+              </a:ext>
+            </a:extLst>
+          </p:cNvPr>
+          <p:cNvSpPr txBox="1"/>
+          <p:nvPr/>
+        </p:nvSpPr>
+        <p:spPr>
+          <a:xfrm>
+            <a:off x="2603137" y="4381971"/>
+            <a:ext cx="1708481" cy="646331"/>
+          </a:xfrm>
+          <a:prstGeom prst="rect">
+            <a:avLst/>
+          </a:prstGeom>
+          <a:noFill/>
+        </p:spPr>
+        <p:txBody>
+          <a:bodyPr wrap="none" rtlCol="0">
+            <a:spAutoFit/>
+          </a:bodyPr>
+          <a:lstStyle/>
+          <a:p>
+            <a:pPr algn="r"/>
+            <a:r>
+              <a:rPr lang="en-US" dirty="0"/>
+              <a:t>Just adding </a:t>
+            </a:r>
+          </a:p>
+          <a:p>
+            <a:pPr algn="r"/>
+            <a:r>
+              <a:rPr lang="en-US" dirty="0"/>
+              <a:t>K = 1 to the sum</a:t>
+            </a:r>
+          </a:p>
+        </p:txBody>
+      </p:sp>
+    </p:spTree>
+    <p:extLst>
+      <p:ext uri="{BB962C8B-B14F-4D97-AF65-F5344CB8AC3E}">
+        <p14:creationId xmlns:p14="http://schemas.microsoft.com/office/powerpoint/2010/main" val="2638637210"/>
+      </p:ext>
+    </p:extLst>
+  </p:cSld>
+  <p:clrMapOvr>
+    <a:masterClrMapping/>
+  </p:clrMapOvr>
+</p:sld>
+</file>
+
+<file path=ppt/slides/slide13.xml><?xml version="1.0" encoding="utf-8"?>
 <p:sld xmlns:a="http://schemas.openxmlformats.org/drawingml/2006/main" xmlns:r="http://schemas.openxmlformats.org/officeDocument/2006/relationships" xmlns:p="http://schemas.openxmlformats.org/presentationml/2006/main">
   <p:cSld>
     <p:spTree>
@@ -10295,7 +10842,7 @@
 </p:sld>
 </file>
 
-<file path=ppt/slides/slide13.xml><?xml version="1.0" encoding="utf-8"?>
+<file path=ppt/slides/slide14.xml><?xml version="1.0" encoding="utf-8"?>
 <p:sld xmlns:a="http://schemas.openxmlformats.org/drawingml/2006/main" xmlns:r="http://schemas.openxmlformats.org/officeDocument/2006/relationships" xmlns:p="http://schemas.openxmlformats.org/presentationml/2006/main">
   <p:cSld>
     <p:spTree>
@@ -11888,7 +12435,254 @@
 </p:sld>
 </file>
 
-<file path=ppt/slides/slide14.xml><?xml version="1.0" encoding="utf-8"?>
+<file path=ppt/slides/slide15.xml><?xml version="1.0" encoding="utf-8"?>
+<p:sld xmlns:a="http://schemas.openxmlformats.org/drawingml/2006/main" xmlns:r="http://schemas.openxmlformats.org/officeDocument/2006/relationships" xmlns:p="http://schemas.openxmlformats.org/presentationml/2006/main">
+  <p:cSld>
+    <p:spTree>
+      <p:nvGrpSpPr>
+        <p:cNvPr id="1" name=""/>
+        <p:cNvGrpSpPr/>
+        <p:nvPr/>
+      </p:nvGrpSpPr>
+      <p:grpSpPr>
+        <a:xfrm>
+          <a:off x="0" y="0"/>
+          <a:ext cx="0" cy="0"/>
+          <a:chOff x="0" y="0"/>
+          <a:chExt cx="0" cy="0"/>
+        </a:xfrm>
+      </p:grpSpPr>
+      <p:grpSp>
+        <p:nvGrpSpPr>
+          <p:cNvPr id="25" name="Group 24">
+            <a:extLst>
+              <a:ext uri="{FF2B5EF4-FFF2-40B4-BE49-F238E27FC236}">
+                <a16:creationId xmlns:a16="http://schemas.microsoft.com/office/drawing/2014/main" id="{5B0F5147-A6E5-47DA-9DA3-1B1FD1CB320C}"/>
+              </a:ext>
+            </a:extLst>
+          </p:cNvPr>
+          <p:cNvGrpSpPr/>
+          <p:nvPr/>
+        </p:nvGrpSpPr>
+        <p:grpSpPr>
+          <a:xfrm>
+            <a:off x="1887728" y="1491105"/>
+            <a:ext cx="7343648" cy="3075815"/>
+            <a:chOff x="3310128" y="1643505"/>
+            <a:chExt cx="7343648" cy="3075815"/>
+          </a:xfrm>
+        </p:grpSpPr>
+        <p:pic>
+          <p:nvPicPr>
+            <p:cNvPr id="4" name="Picture 3">
+              <a:extLst>
+                <a:ext uri="{FF2B5EF4-FFF2-40B4-BE49-F238E27FC236}">
+                  <a16:creationId xmlns:a16="http://schemas.microsoft.com/office/drawing/2014/main" id="{809F5E01-DA0F-4130-B3DB-FA212B581B68}"/>
+                </a:ext>
+              </a:extLst>
+            </p:cNvPr>
+            <p:cNvPicPr>
+              <a:picLocks noChangeAspect="1"/>
+            </p:cNvPicPr>
+            <p:nvPr/>
+          </p:nvPicPr>
+          <p:blipFill>
+            <a:blip r:embed="rId4">
+              <a:extLst>
+                <a:ext uri="{28A0092B-C50C-407E-A947-70E740481C1C}">
+                  <a14:useLocalDpi xmlns:a14="http://schemas.microsoft.com/office/drawing/2010/main" val="0"/>
+                </a:ext>
+              </a:extLst>
+            </a:blip>
+            <a:stretch>
+              <a:fillRect/>
+            </a:stretch>
+          </p:blipFill>
+          <p:spPr>
+            <a:xfrm>
+              <a:off x="6666992" y="1944206"/>
+              <a:ext cx="3986784" cy="2775114"/>
+            </a:xfrm>
+            <a:prstGeom prst="rect">
+              <a:avLst/>
+            </a:prstGeom>
+          </p:spPr>
+        </p:pic>
+        <p:pic>
+          <p:nvPicPr>
+            <p:cNvPr id="8" name="Picture 7">
+              <a:extLst>
+                <a:ext uri="{FF2B5EF4-FFF2-40B4-BE49-F238E27FC236}">
+                  <a16:creationId xmlns:a16="http://schemas.microsoft.com/office/drawing/2014/main" id="{A64FF3C1-A77C-400B-BFFE-4B2510EF2B6E}"/>
+                </a:ext>
+              </a:extLst>
+            </p:cNvPr>
+            <p:cNvPicPr>
+              <a:picLocks noChangeAspect="1"/>
+            </p:cNvPicPr>
+            <p:nvPr/>
+          </p:nvPicPr>
+          <p:blipFill>
+            <a:blip r:embed="rId5">
+              <a:extLst>
+                <a:ext uri="{28A0092B-C50C-407E-A947-70E740481C1C}">
+                  <a14:useLocalDpi xmlns:a14="http://schemas.microsoft.com/office/drawing/2010/main" val="0"/>
+                </a:ext>
+              </a:extLst>
+            </a:blip>
+            <a:stretch>
+              <a:fillRect/>
+            </a:stretch>
+          </p:blipFill>
+          <p:spPr>
+            <a:xfrm>
+              <a:off x="3310128" y="2139696"/>
+              <a:ext cx="3986784" cy="2542032"/>
+            </a:xfrm>
+            <a:prstGeom prst="rect">
+              <a:avLst/>
+            </a:prstGeom>
+          </p:spPr>
+        </p:pic>
+        <p:sp>
+          <p:nvSpPr>
+            <p:cNvPr id="12" name="Rectangle 11">
+              <a:extLst>
+                <a:ext uri="{FF2B5EF4-FFF2-40B4-BE49-F238E27FC236}">
+                  <a16:creationId xmlns:a16="http://schemas.microsoft.com/office/drawing/2014/main" id="{87BFC5C4-5874-45E1-A755-073AB1322611}"/>
+                </a:ext>
+              </a:extLst>
+            </p:cNvPr>
+            <p:cNvSpPr/>
+            <p:nvPr/>
+          </p:nvSpPr>
+          <p:spPr bwMode="auto">
+            <a:xfrm>
+              <a:off x="6868160" y="2377440"/>
+              <a:ext cx="314960" cy="1544320"/>
+            </a:xfrm>
+            <a:prstGeom prst="rect">
+              <a:avLst/>
+            </a:prstGeom>
+            <a:solidFill>
+              <a:schemeClr val="bg1"/>
+            </a:solidFill>
+            <a:ln w="12700">
+              <a:solidFill>
+                <a:schemeClr val="bg1"/>
+              </a:solidFill>
+              <a:miter lim="800000"/>
+              <a:headEnd type="none" w="lg" len="med"/>
+              <a:tailEnd type="none" w="lg" len="med"/>
+            </a:ln>
+            <a:effectLst/>
+          </p:spPr>
+          <p:txBody>
+            <a:bodyPr rtlCol="0" anchor="ctr">
+              <a:spAutoFit/>
+            </a:bodyPr>
+            <a:lstStyle/>
+            <a:p>
+              <a:pPr algn="l"/>
+              <a:endParaRPr lang="en-US" dirty="0"/>
+            </a:p>
+          </p:txBody>
+        </p:sp>
+        <p:pic>
+          <p:nvPicPr>
+            <p:cNvPr id="19" name="Picture 18">
+              <a:extLst>
+                <a:ext uri="{FF2B5EF4-FFF2-40B4-BE49-F238E27FC236}">
+                  <a16:creationId xmlns:a16="http://schemas.microsoft.com/office/drawing/2014/main" id="{4BECB641-A1E8-4B00-99A0-0A510B32D905}"/>
+                </a:ext>
+              </a:extLst>
+            </p:cNvPr>
+            <p:cNvPicPr>
+              <a:picLocks noChangeAspect="1"/>
+            </p:cNvPicPr>
+            <p:nvPr>
+              <p:custDataLst>
+                <p:tags r:id="rId1"/>
+              </p:custDataLst>
+            </p:nvPr>
+          </p:nvPicPr>
+          <p:blipFill>
+            <a:blip r:embed="rId6">
+              <a:extLst>
+                <a:ext uri="{28A0092B-C50C-407E-A947-70E740481C1C}">
+                  <a14:useLocalDpi xmlns:a14="http://schemas.microsoft.com/office/drawing/2010/main" val="0"/>
+                </a:ext>
+              </a:extLst>
+            </a:blip>
+            <a:stretch>
+              <a:fillRect/>
+            </a:stretch>
+          </p:blipFill>
+          <p:spPr>
+            <a:xfrm>
+              <a:off x="8328996" y="1643505"/>
+              <a:ext cx="1302856" cy="560762"/>
+            </a:xfrm>
+            <a:prstGeom prst="rect">
+              <a:avLst/>
+            </a:prstGeom>
+          </p:spPr>
+        </p:pic>
+        <p:pic>
+          <p:nvPicPr>
+            <p:cNvPr id="24" name="Picture 23">
+              <a:extLst>
+                <a:ext uri="{FF2B5EF4-FFF2-40B4-BE49-F238E27FC236}">
+                  <a16:creationId xmlns:a16="http://schemas.microsoft.com/office/drawing/2014/main" id="{4D81BBBD-7863-4B02-8780-C45512645B26}"/>
+                </a:ext>
+              </a:extLst>
+            </p:cNvPr>
+            <p:cNvPicPr>
+              <a:picLocks noChangeAspect="1"/>
+            </p:cNvPicPr>
+            <p:nvPr>
+              <p:custDataLst>
+                <p:tags r:id="rId2"/>
+              </p:custDataLst>
+            </p:nvPr>
+          </p:nvPicPr>
+          <p:blipFill>
+            <a:blip r:embed="rId7">
+              <a:extLst>
+                <a:ext uri="{28A0092B-C50C-407E-A947-70E740481C1C}">
+                  <a14:useLocalDpi xmlns:a14="http://schemas.microsoft.com/office/drawing/2010/main" val="0"/>
+                </a:ext>
+              </a:extLst>
+            </a:blip>
+            <a:stretch>
+              <a:fillRect/>
+            </a:stretch>
+          </p:blipFill>
+          <p:spPr>
+            <a:xfrm>
+              <a:off x="4740473" y="1707812"/>
+              <a:ext cx="1126094" cy="560762"/>
+            </a:xfrm>
+            <a:prstGeom prst="rect">
+              <a:avLst/>
+            </a:prstGeom>
+          </p:spPr>
+        </p:pic>
+      </p:grpSp>
+    </p:spTree>
+    <p:extLst>
+      <p:ext uri="{BB962C8B-B14F-4D97-AF65-F5344CB8AC3E}">
+        <p14:creationId xmlns:p14="http://schemas.microsoft.com/office/powerpoint/2010/main" val="2090249905"/>
+      </p:ext>
+    </p:extLst>
+  </p:cSld>
+  <p:clrMapOvr>
+    <a:masterClrMapping/>
+  </p:clrMapOvr>
+</p:sld>
+</file>
+
+<file path=ppt/slides/slide16.xml><?xml version="1.0" encoding="utf-8"?>
 <p:sld xmlns:a="http://schemas.openxmlformats.org/drawingml/2006/main" xmlns:r="http://schemas.openxmlformats.org/officeDocument/2006/relationships" xmlns:p="http://schemas.openxmlformats.org/presentationml/2006/main">
   <p:cSld>
     <p:spTree>
@@ -38162,31 +38956,19 @@
 
 <file path=ppt/tags/tag12.xml><?xml version="1.0" encoding="utf-8"?>
 <p:tagLst xmlns:a="http://schemas.openxmlformats.org/drawingml/2006/main" xmlns:r="http://schemas.openxmlformats.org/officeDocument/2006/relationships" xmlns:p="http://schemas.openxmlformats.org/presentationml/2006/main">
-  <p:tag name="OUTPUTDPI" val="1200"/>
-  <p:tag name="ORIGINALHEIGHT" val="87.73905"/>
-  <p:tag name="ORIGINALWIDTH" val="61.49228"/>
-  <p:tag name="LATEXADDIN" val="\documentclass{article}&#10;\usepackage{amsmath}&#10;\usepackage{xcolor}&#10;\pagestyle{empty}&#10;\begin{document}&#10;&#10;\definecolor{Monred}{RGB}{172,0,0}&#10;&#10;$$&#10;h&#10;$$&#10;&#10;&#10;\end{document}"/>
-  <p:tag name="IGUANATEXSIZE" val="20"/>
-  <p:tag name="IGUANATEXCURSOR" val="141"/>
-  <p:tag name="TRANSPARENCY" val="True"/>
-  <p:tag name="FILENAME" val=""/>
-  <p:tag name="LATEXENGINEID" val="0"/>
-  <p:tag name="TEMPFOLDER" val="c:\temp\"/>
-  <p:tag name="LATEXFORMHEIGHT" val="312"/>
-  <p:tag name="LATEXFORMWIDTH" val="384"/>
-  <p:tag name="LATEXFORMWRAP" val="True"/>
-  <p:tag name="BITMAPVECTOR" val="0"/>
+  <p:tag name="SELECTIONNAME" val="Group 5"/>
+  <p:tag name="LAYER" val="2"/>
 </p:tagLst>
 </file>
 
 <file path=ppt/tags/tag13.xml><?xml version="1.0" encoding="utf-8"?>
 <p:tagLst xmlns:a="http://schemas.openxmlformats.org/drawingml/2006/main" xmlns:r="http://schemas.openxmlformats.org/officeDocument/2006/relationships" xmlns:p="http://schemas.openxmlformats.org/presentationml/2006/main">
   <p:tag name="OUTPUTDPI" val="1200"/>
-  <p:tag name="ORIGINALHEIGHT" val="260.2175"/>
-  <p:tag name="ORIGINALWIDTH" val="3640.045"/>
-  <p:tag name="LATEXADDIN" val="\documentclass{article}&#10;\usepackage{amsmath}&#10;\usepackage{xcolor}&#10;\pagestyle{empty}&#10;\begin{document}&#10;&#10;\definecolor{Monred}{RGB}{172,0,0}&#10;&#10;$t_{Design}$ = Time it would take to drain the tank if flow was held \\ constant at $Q_0$&#10;&#10;&#10;\end{document}"/>
+  <p:tag name="ORIGINALHEIGHT" val="90.73866"/>
+  <p:tag name="ORIGINALWIDTH" val="166.4792"/>
+  <p:tag name="LATEXADDIN" val="\documentclass{article}&#10;\usepackage{amsmath}&#10;\usepackage{xcolor}&#10;\pagestyle{empty}&#10;\begin{document}&#10;&#10;\definecolor{Monred}{RGB}{172,0,0}&#10;&#10;$$&#10;\Delta h&#10;$$&#10;&#10;&#10;\end{document}"/>
   <p:tag name="IGUANATEXSIZE" val="20"/>
-  <p:tag name="IGUANATEXCURSOR" val="208"/>
+  <p:tag name="IGUANATEXCURSOR" val="147"/>
   <p:tag name="TRANSPARENCY" val="True"/>
   <p:tag name="FILENAME" val=""/>
   <p:tag name="LATEXENGINEID" val="0"/>
@@ -38201,11 +38983,11 @@
 <file path=ppt/tags/tag14.xml><?xml version="1.0" encoding="utf-8"?>
 <p:tagLst xmlns:a="http://schemas.openxmlformats.org/drawingml/2006/main" xmlns:r="http://schemas.openxmlformats.org/officeDocument/2006/relationships" xmlns:p="http://schemas.openxmlformats.org/presentationml/2006/main">
   <p:tag name="OUTPUTDPI" val="1200"/>
-  <p:tag name="ORIGINALHEIGHT" val="105.7368"/>
-  <p:tag name="ORIGINALWIDTH" val="302.2122"/>
-  <p:tag name="LATEXADDIN" val="\documentclass{article}&#10;\usepackage{amsmath}&#10;\usepackage{xcolor}&#10;\pagestyle{empty}&#10;\begin{document}&#10;&#10;\definecolor{Monred}{RGB}{172,0,0}&#10;&#10;$$h_{Tank}$$&#10;&#10;&#10;\end{document}"/>
+  <p:tag name="ORIGINALHEIGHT" val="299.2126"/>
+  <p:tag name="ORIGINALWIDTH" val="878.1403"/>
+  <p:tag name="LATEXADDIN" val="\documentclass{article}&#10;\usepackage{amsmath}&#10;\usepackage{xcolor}&#10;\pagestyle{empty}&#10;\begin{document}&#10;&#10;\definecolor{Monred}{RGB}{172,0,0}&#10;&#10;&#10;$$\Delta h = \frac{V_{out}^2}{2g} + h_L$$&#10;&#10;\end{document}"/>
   <p:tag name="IGUANATEXSIZE" val="20"/>
-  <p:tag name="IGUANATEXCURSOR" val="147"/>
+  <p:tag name="IGUANATEXCURSOR" val="164"/>
   <p:tag name="TRANSPARENCY" val="True"/>
   <p:tag name="FILENAME" val=""/>
   <p:tag name="LATEXENGINEID" val="0"/>
@@ -38220,11 +39002,11 @@
 <file path=ppt/tags/tag15.xml><?xml version="1.0" encoding="utf-8"?>
 <p:tagLst xmlns:a="http://schemas.openxmlformats.org/drawingml/2006/main" xmlns:r="http://schemas.openxmlformats.org/officeDocument/2006/relationships" xmlns:p="http://schemas.openxmlformats.org/presentationml/2006/main">
   <p:tag name="OUTPUTDPI" val="1200"/>
-  <p:tag name="ORIGINALHEIGHT" val="113.2358"/>
-  <p:tag name="ORIGINALWIDTH" val="3247.094"/>
-  <p:tag name="LATEXADDIN" val="\documentclass{article}&#10;\usepackage{amsmath}&#10;\usepackage{xcolor}&#10;\pagestyle{empty}&#10;\begin{document}&#10;&#10;\definecolor{Monred}{RGB}{172,0,0}&#10;&#10;$Q_0$ = Initial flow rate of hypochlorite solution at time $t = 0$&#10;&#10;&#10;\end{document}"/>
+  <p:tag name="ORIGINALHEIGHT" val="299.2126"/>
+  <p:tag name="ORIGINALWIDTH" val="1145.107"/>
+  <p:tag name="LATEXADDIN" val="\documentclass{article}&#10;\usepackage{amsmath}&#10;\usepackage{xcolor}&#10;\pagestyle{empty}&#10;\begin{document}&#10;&#10;\definecolor{Monred}{RGB}{172,0,0}&#10;&#10;&#10;$$\Delta h = \frac{V_{out}^2}{2g} + h_e + h_f$$&#10;&#10;\end{document}"/>
   <p:tag name="IGUANATEXSIZE" val="20"/>
-  <p:tag name="IGUANATEXCURSOR" val="203"/>
+  <p:tag name="IGUANATEXCURSOR" val="183"/>
   <p:tag name="TRANSPARENCY" val="True"/>
   <p:tag name="FILENAME" val=""/>
   <p:tag name="LATEXENGINEID" val="0"/>
@@ -38239,11 +39021,11 @@
 <file path=ppt/tags/tag16.xml><?xml version="1.0" encoding="utf-8"?>
 <p:tagLst xmlns:a="http://schemas.openxmlformats.org/drawingml/2006/main" xmlns:r="http://schemas.openxmlformats.org/officeDocument/2006/relationships" xmlns:p="http://schemas.openxmlformats.org/presentationml/2006/main">
   <p:tag name="OUTPUTDPI" val="1200"/>
-  <p:tag name="ORIGINALHEIGHT" val="106.4867"/>
-  <p:tag name="ORIGINALWIDTH" val="110.2362"/>
-  <p:tag name="LATEXADDIN" val="\documentclass{article}&#10;\usepackage{amsmath}&#10;\usepackage{xcolor}&#10;\pagestyle{empty}&#10;\begin{document}&#10;&#10;\definecolor{Monred}{RGB}{172,0,0}&#10;&#10;$$h_0$$&#10;&#10;&#10;\end{document}"/>
+  <p:tag name="ORIGINALHEIGHT" val="299.2126"/>
+  <p:tag name="ORIGINALWIDTH" val="1759.28"/>
+  <p:tag name="LATEXADDIN" val="\documentclass{article}&#10;\usepackage{amsmath}&#10;\usepackage{xcolor}&#10;\pagestyle{empty}&#10;\begin{document}&#10;&#10;\definecolor{Monred}{RGB}{172,0,0}&#10;&#10;&#10;$$\Delta h = \frac{V_{out}^2}{2g} + \left( \sum K \right) \frac{V_{out}^2}{2g} + h_f$$&#10;&#10;\end{document}"/>
   <p:tag name="IGUANATEXSIZE" val="20"/>
-  <p:tag name="IGUANATEXCURSOR" val="144"/>
+  <p:tag name="IGUANATEXCURSOR" val="196"/>
   <p:tag name="TRANSPARENCY" val="True"/>
   <p:tag name="FILENAME" val=""/>
   <p:tag name="LATEXENGINEID" val="0"/>
@@ -38258,11 +39040,11 @@
 <file path=ppt/tags/tag17.xml><?xml version="1.0" encoding="utf-8"?>
 <p:tagLst xmlns:a="http://schemas.openxmlformats.org/drawingml/2006/main" xmlns:r="http://schemas.openxmlformats.org/officeDocument/2006/relationships" xmlns:p="http://schemas.openxmlformats.org/presentationml/2006/main">
   <p:tag name="OUTPUTDPI" val="1200"/>
-  <p:tag name="ORIGINALHEIGHT" val="260.2175"/>
-  <p:tag name="ORIGINALWIDTH" val="3640.045"/>
-  <p:tag name="LATEXADDIN" val="\documentclass{article}&#10;\usepackage{amsmath}&#10;\usepackage{xcolor}&#10;\pagestyle{empty}&#10;\begin{document}&#10;&#10;\definecolor{Monred}{RGB}{172,0,0}&#10;&#10;$t_{Design}$ = Time it would take to drain the tank if flow was held \\ constant at $Q_0$&#10;&#10;&#10;\end{document}"/>
+  <p:tag name="ORIGINALHEIGHT" val="299.2126"/>
+  <p:tag name="ORIGINALWIDTH" val="1567.304"/>
+  <p:tag name="LATEXADDIN" val="\documentclass{article}&#10;\usepackage{amsmath}&#10;\usepackage{xcolor}&#10;\pagestyle{empty}&#10;\begin{document}&#10;&#10;\definecolor{Monred}{RGB}{172,0,0}&#10;&#10;&#10;$$\Delta h = \left( \sum K + 1 \right) \frac{V_{out}^2}{2g} + h_f$$&#10;&#10;\end{document}"/>
   <p:tag name="IGUANATEXSIZE" val="20"/>
-  <p:tag name="IGUANATEXCURSOR" val="208"/>
+  <p:tag name="IGUANATEXCURSOR" val="168"/>
   <p:tag name="TRANSPARENCY" val="True"/>
   <p:tag name="FILENAME" val=""/>
   <p:tag name="LATEXENGINEID" val="0"/>
@@ -38277,11 +39059,11 @@
 <file path=ppt/tags/tag18.xml><?xml version="1.0" encoding="utf-8"?>
 <p:tagLst xmlns:a="http://schemas.openxmlformats.org/drawingml/2006/main" xmlns:r="http://schemas.openxmlformats.org/officeDocument/2006/relationships" xmlns:p="http://schemas.openxmlformats.org/presentationml/2006/main">
   <p:tag name="OUTPUTDPI" val="1200"/>
-  <p:tag name="ORIGINALHEIGHT" val="105.7368"/>
-  <p:tag name="ORIGINALWIDTH" val="302.2122"/>
-  <p:tag name="LATEXADDIN" val="\documentclass{article}&#10;\usepackage{amsmath}&#10;\usepackage{xcolor}&#10;\pagestyle{empty}&#10;\begin{document}&#10;&#10;\definecolor{Monred}{RGB}{172,0,0}&#10;&#10;$$h_{Tank}$$&#10;&#10;&#10;\end{document}"/>
+  <p:tag name="ORIGINALHEIGHT" val="299.2126"/>
+  <p:tag name="ORIGINALWIDTH" val="1352.831"/>
+  <p:tag name="LATEXADDIN" val="\documentclass{article}&#10;\usepackage{amsmath}&#10;\usepackage{xcolor}&#10;\pagestyle{empty}&#10;\begin{document}&#10;&#10;\definecolor{Monred}{RGB}{172,0,0}&#10;&#10;&#10;$$\Delta h = \left( \sum K \right) \frac{V_{out}^2}{2g} + h_f$$&#10;&#10;\end{document}"/>
   <p:tag name="IGUANATEXSIZE" val="20"/>
-  <p:tag name="IGUANATEXCURSOR" val="147"/>
+  <p:tag name="IGUANATEXCURSOR" val="164"/>
   <p:tag name="TRANSPARENCY" val="True"/>
   <p:tag name="FILENAME" val=""/>
   <p:tag name="LATEXENGINEID" val="0"/>
@@ -38296,11 +39078,11 @@
 <file path=ppt/tags/tag19.xml><?xml version="1.0" encoding="utf-8"?>
 <p:tagLst xmlns:a="http://schemas.openxmlformats.org/drawingml/2006/main" xmlns:r="http://schemas.openxmlformats.org/officeDocument/2006/relationships" xmlns:p="http://schemas.openxmlformats.org/presentationml/2006/main">
   <p:tag name="OUTPUTDPI" val="1200"/>
-  <p:tag name="ORIGINALHEIGHT" val="113.2358"/>
-  <p:tag name="ORIGINALWIDTH" val="3247.094"/>
-  <p:tag name="LATEXADDIN" val="\documentclass{article}&#10;\usepackage{amsmath}&#10;\usepackage{xcolor}&#10;\pagestyle{empty}&#10;\begin{document}&#10;&#10;\definecolor{Monred}{RGB}{172,0,0}&#10;&#10;$Q_0$ = Initial flow rate of hypochlorite solution at time $t = 0$&#10;&#10;&#10;\end{document}"/>
+  <p:tag name="ORIGINALHEIGHT" val="125.9843"/>
+  <p:tag name="ORIGINALWIDTH" val="738.6577"/>
+  <p:tag name="LATEXADDIN" val="\documentclass{article}&#10;\usepackage{amsmath}&#10;\usepackage{xcolor}&#10;\pagestyle{empty}&#10;\begin{document}&#10;&#10;\definecolor{Monred}{RGB}{172,0,0}&#10;&#10;&#10;$$\Delta h = h_e + h_f$$&#10;&#10;\end{document}"/>
   <p:tag name="IGUANATEXSIZE" val="20"/>
-  <p:tag name="IGUANATEXCURSOR" val="203"/>
+  <p:tag name="IGUANATEXCURSOR" val="154"/>
   <p:tag name="TRANSPARENCY" val="True"/>
   <p:tag name="FILENAME" val=""/>
   <p:tag name="LATEXENGINEID" val="0"/>
@@ -38334,11 +39116,182 @@
 <file path=ppt/tags/tag20.xml><?xml version="1.0" encoding="utf-8"?>
 <p:tagLst xmlns:a="http://schemas.openxmlformats.org/drawingml/2006/main" xmlns:r="http://schemas.openxmlformats.org/officeDocument/2006/relationships" xmlns:p="http://schemas.openxmlformats.org/presentationml/2006/main">
   <p:tag name="OUTPUTDPI" val="1200"/>
+  <p:tag name="ORIGINALHEIGHT" val="107.9865"/>
+  <p:tag name="ORIGINALWIDTH" val="772.4034"/>
+  <p:tag name="LATEXADDIN" val="\documentclass{article}&#10;\usepackage{amsmath}&#10;\usepackage{xcolor}&#10;\pagestyle{empty}&#10;\begin{document}&#10;&#10;\definecolor{Monred}{RGB}{172,0,0}&#10;&#10;&#10;$$\Delta h = h_L \,\,\, ????$$&#10;&#10;\end{document}"/>
+  <p:tag name="IGUANATEXSIZE" val="20"/>
+  <p:tag name="IGUANATEXCURSOR" val="160"/>
+  <p:tag name="TRANSPARENCY" val="True"/>
+  <p:tag name="FILENAME" val=""/>
+  <p:tag name="LATEXENGINEID" val="0"/>
+  <p:tag name="TEMPFOLDER" val="c:\temp\"/>
+  <p:tag name="LATEXFORMHEIGHT" val="312"/>
+  <p:tag name="LATEXFORMWIDTH" val="384"/>
+  <p:tag name="LATEXFORMWRAP" val="True"/>
+  <p:tag name="BITMAPVECTOR" val="0"/>
+</p:tagLst>
+</file>
+
+<file path=ppt/tags/tag21.xml><?xml version="1.0" encoding="utf-8"?>
+<p:tagLst xmlns:a="http://schemas.openxmlformats.org/drawingml/2006/main" xmlns:r="http://schemas.openxmlformats.org/officeDocument/2006/relationships" xmlns:p="http://schemas.openxmlformats.org/presentationml/2006/main">
+  <p:tag name="OUTPUTDPI" val="1200"/>
+  <p:tag name="ORIGINALHEIGHT" val="275.9655"/>
+  <p:tag name="ORIGINALWIDTH" val="641.1699"/>
+  <p:tag name="LATEXADDIN" val="\documentclass{article}&#10;\usepackage{amsmath}&#10;\usepackage{xcolor}&#10;\pagestyle{empty}&#10;\begin{document}&#10;&#10;\definecolor{Monred}{RGB}{172,0,0}&#10;&#10;$$\frac{h_{Tank}}{h_0} = \frac{1}{50}$$&#10;&#10;&#10;\end{document}"/>
+  <p:tag name="IGUANATEXSIZE" val="20"/>
+  <p:tag name="IGUANATEXCURSOR" val="174"/>
+  <p:tag name="TRANSPARENCY" val="True"/>
+  <p:tag name="FILENAME" val=""/>
+  <p:tag name="LATEXENGINEID" val="0"/>
+  <p:tag name="TEMPFOLDER" val="c:\temp\"/>
+  <p:tag name="LATEXFORMHEIGHT" val="312"/>
+  <p:tag name="LATEXFORMWIDTH" val="384"/>
+  <p:tag name="LATEXFORMWRAP" val="True"/>
+  <p:tag name="BITMAPVECTOR" val="0"/>
+</p:tagLst>
+</file>
+
+<file path=ppt/tags/tag22.xml><?xml version="1.0" encoding="utf-8"?>
+<p:tagLst xmlns:a="http://schemas.openxmlformats.org/drawingml/2006/main" xmlns:r="http://schemas.openxmlformats.org/officeDocument/2006/relationships" xmlns:p="http://schemas.openxmlformats.org/presentationml/2006/main">
+  <p:tag name="OUTPUTDPI" val="1200"/>
+  <p:tag name="ORIGINALHEIGHT" val="275.9655"/>
+  <p:tag name="ORIGINALWIDTH" val="554.1807"/>
+  <p:tag name="LATEXADDIN" val="\documentclass{article}&#10;\usepackage{amsmath}&#10;\usepackage{xcolor}&#10;\pagestyle{empty}&#10;\begin{document}&#10;&#10;\definecolor{Monred}{RGB}{172,0,0}&#10;&#10;$$\frac{h_{Tank}}{h_0} = 1$$&#10;&#10;&#10;\end{document}"/>
+  <p:tag name="IGUANATEXSIZE" val="20"/>
+  <p:tag name="IGUANATEXCURSOR" val="163"/>
+  <p:tag name="TRANSPARENCY" val="True"/>
+  <p:tag name="FILENAME" val=""/>
+  <p:tag name="LATEXENGINEID" val="0"/>
+  <p:tag name="TEMPFOLDER" val="c:\temp\"/>
+  <p:tag name="LATEXFORMHEIGHT" val="312"/>
+  <p:tag name="LATEXFORMWIDTH" val="384"/>
+  <p:tag name="LATEXFORMWRAP" val="True"/>
+  <p:tag name="BITMAPVECTOR" val="0"/>
+</p:tagLst>
+</file>
+
+<file path=ppt/tags/tag23.xml><?xml version="1.0" encoding="utf-8"?>
+<p:tagLst xmlns:a="http://schemas.openxmlformats.org/drawingml/2006/main" xmlns:r="http://schemas.openxmlformats.org/officeDocument/2006/relationships" xmlns:p="http://schemas.openxmlformats.org/presentationml/2006/main">
+  <p:tag name="OUTPUTDPI" val="1200"/>
+  <p:tag name="ORIGINALHEIGHT" val="260.2175"/>
+  <p:tag name="ORIGINALWIDTH" val="3640.045"/>
+  <p:tag name="LATEXADDIN" val="\documentclass{article}&#10;\usepackage{amsmath}&#10;\usepackage{xcolor}&#10;\pagestyle{empty}&#10;\begin{document}&#10;&#10;\definecolor{Monred}{RGB}{172,0,0}&#10;&#10;$t_{Design}$ = Time it would take to drain the tank if flow was held \\ constant at $Q_0$&#10;&#10;&#10;\end{document}"/>
+  <p:tag name="IGUANATEXSIZE" val="20"/>
+  <p:tag name="IGUANATEXCURSOR" val="208"/>
+  <p:tag name="TRANSPARENCY" val="True"/>
+  <p:tag name="FILENAME" val=""/>
+  <p:tag name="LATEXENGINEID" val="0"/>
+  <p:tag name="TEMPFOLDER" val="c:\temp\"/>
+  <p:tag name="LATEXFORMHEIGHT" val="312"/>
+  <p:tag name="LATEXFORMWIDTH" val="384"/>
+  <p:tag name="LATEXFORMWRAP" val="True"/>
+  <p:tag name="BITMAPVECTOR" val="0"/>
+</p:tagLst>
+</file>
+
+<file path=ppt/tags/tag24.xml><?xml version="1.0" encoding="utf-8"?>
+<p:tagLst xmlns:a="http://schemas.openxmlformats.org/drawingml/2006/main" xmlns:r="http://schemas.openxmlformats.org/officeDocument/2006/relationships" xmlns:p="http://schemas.openxmlformats.org/presentationml/2006/main">
+  <p:tag name="OUTPUTDPI" val="1200"/>
+  <p:tag name="ORIGINALHEIGHT" val="105.7368"/>
+  <p:tag name="ORIGINALWIDTH" val="302.2122"/>
+  <p:tag name="LATEXADDIN" val="\documentclass{article}&#10;\usepackage{amsmath}&#10;\usepackage{xcolor}&#10;\pagestyle{empty}&#10;\begin{document}&#10;&#10;\definecolor{Monred}{RGB}{172,0,0}&#10;&#10;$$h_{Tank}$$&#10;&#10;&#10;\end{document}"/>
+  <p:tag name="IGUANATEXSIZE" val="20"/>
+  <p:tag name="IGUANATEXCURSOR" val="147"/>
+  <p:tag name="TRANSPARENCY" val="True"/>
+  <p:tag name="FILENAME" val=""/>
+  <p:tag name="LATEXENGINEID" val="0"/>
+  <p:tag name="TEMPFOLDER" val="c:\temp\"/>
+  <p:tag name="LATEXFORMHEIGHT" val="312"/>
+  <p:tag name="LATEXFORMWIDTH" val="384"/>
+  <p:tag name="LATEXFORMWRAP" val="True"/>
+  <p:tag name="BITMAPVECTOR" val="0"/>
+</p:tagLst>
+</file>
+
+<file path=ppt/tags/tag25.xml><?xml version="1.0" encoding="utf-8"?>
+<p:tagLst xmlns:a="http://schemas.openxmlformats.org/drawingml/2006/main" xmlns:r="http://schemas.openxmlformats.org/officeDocument/2006/relationships" xmlns:p="http://schemas.openxmlformats.org/presentationml/2006/main">
+  <p:tag name="OUTPUTDPI" val="1200"/>
+  <p:tag name="ORIGINALHEIGHT" val="113.2358"/>
+  <p:tag name="ORIGINALWIDTH" val="3247.094"/>
+  <p:tag name="LATEXADDIN" val="\documentclass{article}&#10;\usepackage{amsmath}&#10;\usepackage{xcolor}&#10;\pagestyle{empty}&#10;\begin{document}&#10;&#10;\definecolor{Monred}{RGB}{172,0,0}&#10;&#10;$Q_0$ = Initial flow rate of hypochlorite solution at time $t = 0$&#10;&#10;&#10;\end{document}"/>
+  <p:tag name="IGUANATEXSIZE" val="20"/>
+  <p:tag name="IGUANATEXCURSOR" val="203"/>
+  <p:tag name="TRANSPARENCY" val="True"/>
+  <p:tag name="FILENAME" val=""/>
+  <p:tag name="LATEXENGINEID" val="0"/>
+  <p:tag name="TEMPFOLDER" val="c:\temp\"/>
+  <p:tag name="LATEXFORMHEIGHT" val="312"/>
+  <p:tag name="LATEXFORMWIDTH" val="384"/>
+  <p:tag name="LATEXFORMWRAP" val="True"/>
+  <p:tag name="BITMAPVECTOR" val="0"/>
+</p:tagLst>
+</file>
+
+<file path=ppt/tags/tag26.xml><?xml version="1.0" encoding="utf-8"?>
+<p:tagLst xmlns:a="http://schemas.openxmlformats.org/drawingml/2006/main" xmlns:r="http://schemas.openxmlformats.org/officeDocument/2006/relationships" xmlns:p="http://schemas.openxmlformats.org/presentationml/2006/main">
+  <p:tag name="OUTPUTDPI" val="1200"/>
   <p:tag name="ORIGINALHEIGHT" val="106.4867"/>
   <p:tag name="ORIGINALWIDTH" val="110.2362"/>
   <p:tag name="LATEXADDIN" val="\documentclass{article}&#10;\usepackage{amsmath}&#10;\usepackage{xcolor}&#10;\pagestyle{empty}&#10;\begin{document}&#10;&#10;\definecolor{Monred}{RGB}{172,0,0}&#10;&#10;$$h_0$$&#10;&#10;&#10;\end{document}"/>
   <p:tag name="IGUANATEXSIZE" val="20"/>
   <p:tag name="IGUANATEXCURSOR" val="144"/>
+  <p:tag name="TRANSPARENCY" val="True"/>
+  <p:tag name="FILENAME" val=""/>
+  <p:tag name="LATEXENGINEID" val="0"/>
+  <p:tag name="TEMPFOLDER" val="c:\temp\"/>
+  <p:tag name="LATEXFORMHEIGHT" val="312"/>
+  <p:tag name="LATEXFORMWIDTH" val="384"/>
+  <p:tag name="LATEXFORMWRAP" val="True"/>
+  <p:tag name="BITMAPVECTOR" val="0"/>
+</p:tagLst>
+</file>
+
+<file path=ppt/tags/tag27.xml><?xml version="1.0" encoding="utf-8"?>
+<p:tagLst xmlns:a="http://schemas.openxmlformats.org/drawingml/2006/main" xmlns:r="http://schemas.openxmlformats.org/officeDocument/2006/relationships" xmlns:p="http://schemas.openxmlformats.org/presentationml/2006/main">
+  <p:tag name="OUTPUTDPI" val="1200"/>
+  <p:tag name="ORIGINALHEIGHT" val="260.2175"/>
+  <p:tag name="ORIGINALWIDTH" val="3640.045"/>
+  <p:tag name="LATEXADDIN" val="\documentclass{article}&#10;\usepackage{amsmath}&#10;\usepackage{xcolor}&#10;\pagestyle{empty}&#10;\begin{document}&#10;&#10;\definecolor{Monred}{RGB}{172,0,0}&#10;&#10;$t_{Design}$ = Time it would take to drain the tank if flow was held \\ constant at $Q_0$&#10;&#10;&#10;\end{document}"/>
+  <p:tag name="IGUANATEXSIZE" val="20"/>
+  <p:tag name="IGUANATEXCURSOR" val="208"/>
+  <p:tag name="TRANSPARENCY" val="True"/>
+  <p:tag name="FILENAME" val=""/>
+  <p:tag name="LATEXENGINEID" val="0"/>
+  <p:tag name="TEMPFOLDER" val="c:\temp\"/>
+  <p:tag name="LATEXFORMHEIGHT" val="312"/>
+  <p:tag name="LATEXFORMWIDTH" val="384"/>
+  <p:tag name="LATEXFORMWRAP" val="True"/>
+  <p:tag name="BITMAPVECTOR" val="0"/>
+</p:tagLst>
+</file>
+
+<file path=ppt/tags/tag28.xml><?xml version="1.0" encoding="utf-8"?>
+<p:tagLst xmlns:a="http://schemas.openxmlformats.org/drawingml/2006/main" xmlns:r="http://schemas.openxmlformats.org/officeDocument/2006/relationships" xmlns:p="http://schemas.openxmlformats.org/presentationml/2006/main">
+  <p:tag name="OUTPUTDPI" val="1200"/>
+  <p:tag name="ORIGINALHEIGHT" val="105.7368"/>
+  <p:tag name="ORIGINALWIDTH" val="302.2122"/>
+  <p:tag name="LATEXADDIN" val="\documentclass{article}&#10;\usepackage{amsmath}&#10;\usepackage{xcolor}&#10;\pagestyle{empty}&#10;\begin{document}&#10;&#10;\definecolor{Monred}{RGB}{172,0,0}&#10;&#10;$$h_{Tank}$$&#10;&#10;&#10;\end{document}"/>
+  <p:tag name="IGUANATEXSIZE" val="20"/>
+  <p:tag name="IGUANATEXCURSOR" val="147"/>
+  <p:tag name="TRANSPARENCY" val="True"/>
+  <p:tag name="FILENAME" val=""/>
+  <p:tag name="LATEXENGINEID" val="0"/>
+  <p:tag name="TEMPFOLDER" val="c:\temp\"/>
+  <p:tag name="LATEXFORMHEIGHT" val="312"/>
+  <p:tag name="LATEXFORMWIDTH" val="384"/>
+  <p:tag name="LATEXFORMWRAP" val="True"/>
+  <p:tag name="BITMAPVECTOR" val="0"/>
+</p:tagLst>
+</file>
+
+<file path=ppt/tags/tag29.xml><?xml version="1.0" encoding="utf-8"?>
+<p:tagLst xmlns:a="http://schemas.openxmlformats.org/drawingml/2006/main" xmlns:r="http://schemas.openxmlformats.org/officeDocument/2006/relationships" xmlns:p="http://schemas.openxmlformats.org/presentationml/2006/main">
+  <p:tag name="OUTPUTDPI" val="1200"/>
+  <p:tag name="ORIGINALHEIGHT" val="113.2358"/>
+  <p:tag name="ORIGINALWIDTH" val="3247.094"/>
+  <p:tag name="LATEXADDIN" val="\documentclass{article}&#10;\usepackage{amsmath}&#10;\usepackage{xcolor}&#10;\pagestyle{empty}&#10;\begin{document}&#10;&#10;\definecolor{Monred}{RGB}{172,0,0}&#10;&#10;$Q_0$ = Initial flow rate of hypochlorite solution at time $t = 0$&#10;&#10;&#10;\end{document}"/>
+  <p:tag name="IGUANATEXSIZE" val="20"/>
+  <p:tag name="IGUANATEXCURSOR" val="203"/>
   <p:tag name="TRANSPARENCY" val="True"/>
   <p:tag name="FILENAME" val=""/>
   <p:tag name="LATEXENGINEID" val="0"/>
@@ -38358,6 +39311,25 @@
   <p:tag name="LATEXADDIN" val="\documentclass{article}&#10;\usepackage{amsmath}&#10;\usepackage{xcolor}&#10;\pagestyle{empty}&#10;\begin{document}&#10;&#10;\definecolor{Monred}{RGB}{172,0,0}&#10;&#10;&#10;$$\Delta h$$&#10;&#10;\end{document}"/>
   <p:tag name="IGUANATEXSIZE" val="20"/>
   <p:tag name="IGUANATEXCURSOR" val="150"/>
+  <p:tag name="TRANSPARENCY" val="True"/>
+  <p:tag name="FILENAME" val=""/>
+  <p:tag name="LATEXENGINEID" val="0"/>
+  <p:tag name="TEMPFOLDER" val="c:\temp\"/>
+  <p:tag name="LATEXFORMHEIGHT" val="312"/>
+  <p:tag name="LATEXFORMWIDTH" val="384"/>
+  <p:tag name="LATEXFORMWRAP" val="True"/>
+  <p:tag name="BITMAPVECTOR" val="0"/>
+</p:tagLst>
+</file>
+
+<file path=ppt/tags/tag30.xml><?xml version="1.0" encoding="utf-8"?>
+<p:tagLst xmlns:a="http://schemas.openxmlformats.org/drawingml/2006/main" xmlns:r="http://schemas.openxmlformats.org/officeDocument/2006/relationships" xmlns:p="http://schemas.openxmlformats.org/presentationml/2006/main">
+  <p:tag name="OUTPUTDPI" val="1200"/>
+  <p:tag name="ORIGINALHEIGHT" val="106.4867"/>
+  <p:tag name="ORIGINALWIDTH" val="110.2362"/>
+  <p:tag name="LATEXADDIN" val="\documentclass{article}&#10;\usepackage{amsmath}&#10;\usepackage{xcolor}&#10;\pagestyle{empty}&#10;\begin{document}&#10;&#10;\definecolor{Monred}{RGB}{172,0,0}&#10;&#10;$$h_0$$&#10;&#10;&#10;\end{document}"/>
+  <p:tag name="IGUANATEXSIZE" val="20"/>
+  <p:tag name="IGUANATEXCURSOR" val="144"/>
   <p:tag name="TRANSPARENCY" val="True"/>
   <p:tag name="FILENAME" val=""/>
   <p:tag name="LATEXENGINEID" val="0"/>

</xml_diff>

<commit_message>
adding the head loss trick
</commit_message>
<xml_diff>
--- a/Summary Sheets/Diagrams.pptx
+++ b/Summary Sheets/Diagrams.pptx
@@ -28990,6 +28990,590 @@
           <a:chExt cx="0" cy="0"/>
         </a:xfrm>
       </p:grpSpPr>
+      <p:grpSp>
+        <p:nvGrpSpPr>
+          <p:cNvPr id="26" name="Group 25">
+            <a:extLst>
+              <a:ext uri="{FF2B5EF4-FFF2-40B4-BE49-F238E27FC236}">
+                <a16:creationId xmlns:a16="http://schemas.microsoft.com/office/drawing/2014/main" id="{5DF38276-C102-42BA-A873-0FF57E9BF05E}"/>
+              </a:ext>
+            </a:extLst>
+          </p:cNvPr>
+          <p:cNvGrpSpPr/>
+          <p:nvPr/>
+        </p:nvGrpSpPr>
+        <p:grpSpPr>
+          <a:xfrm>
+            <a:off x="4038600" y="2819400"/>
+            <a:ext cx="5105400" cy="2286000"/>
+            <a:chOff x="4038600" y="2819400"/>
+            <a:chExt cx="5105400" cy="2286000"/>
+          </a:xfrm>
+        </p:grpSpPr>
+        <p:sp>
+          <p:nvSpPr>
+            <p:cNvPr id="3" name="Rectangle 3">
+              <a:extLst>
+                <a:ext uri="{FF2B5EF4-FFF2-40B4-BE49-F238E27FC236}">
+                  <a16:creationId xmlns:a16="http://schemas.microsoft.com/office/drawing/2014/main" id="{F22B4D8D-5E15-4950-B0A2-59ED35A04DE9}"/>
+                </a:ext>
+              </a:extLst>
+            </p:cNvPr>
+            <p:cNvSpPr>
+              <a:spLocks noChangeArrowheads="1"/>
+            </p:cNvSpPr>
+            <p:nvPr/>
+          </p:nvSpPr>
+          <p:spPr bwMode="auto">
+            <a:xfrm>
+              <a:off x="4038600" y="3429000"/>
+              <a:ext cx="914400" cy="685800"/>
+            </a:xfrm>
+            <a:prstGeom prst="rect">
+              <a:avLst/>
+            </a:prstGeom>
+            <a:solidFill>
+              <a:schemeClr val="hlink"/>
+            </a:solidFill>
+            <a:ln w="9525">
+              <a:noFill/>
+              <a:miter lim="800000"/>
+              <a:headEnd/>
+              <a:tailEnd/>
+            </a:ln>
+            <a:effectLst/>
+          </p:spPr>
+          <p:txBody>
+            <a:bodyPr wrap="none" anchor="ctr"/>
+            <a:lstStyle/>
+            <a:p>
+              <a:endParaRPr lang="en-US"/>
+            </a:p>
+          </p:txBody>
+        </p:sp>
+        <p:sp>
+          <p:nvSpPr>
+            <p:cNvPr id="5" name="Oval 5">
+              <a:extLst>
+                <a:ext uri="{FF2B5EF4-FFF2-40B4-BE49-F238E27FC236}">
+                  <a16:creationId xmlns:a16="http://schemas.microsoft.com/office/drawing/2014/main" id="{33602F9C-4800-465A-AF40-A79D1441E5D7}"/>
+                </a:ext>
+              </a:extLst>
+            </p:cNvPr>
+            <p:cNvSpPr>
+              <a:spLocks noChangeArrowheads="1"/>
+            </p:cNvSpPr>
+            <p:nvPr/>
+          </p:nvSpPr>
+          <p:spPr bwMode="auto">
+            <a:xfrm>
+              <a:off x="4038600" y="4038600"/>
+              <a:ext cx="914400" cy="152400"/>
+            </a:xfrm>
+            <a:prstGeom prst="ellipse">
+              <a:avLst/>
+            </a:prstGeom>
+            <a:solidFill>
+              <a:schemeClr val="hlink"/>
+            </a:solidFill>
+            <a:ln w="9525">
+              <a:solidFill>
+                <a:schemeClr val="tx1"/>
+              </a:solidFill>
+              <a:round/>
+              <a:headEnd/>
+              <a:tailEnd/>
+            </a:ln>
+            <a:effectLst/>
+          </p:spPr>
+          <p:txBody>
+            <a:bodyPr wrap="none" anchor="ctr"/>
+            <a:lstStyle/>
+            <a:p>
+              <a:endParaRPr lang="en-US"/>
+            </a:p>
+          </p:txBody>
+        </p:sp>
+        <p:sp>
+          <p:nvSpPr>
+            <p:cNvPr id="6" name="Line 6">
+              <a:extLst>
+                <a:ext uri="{FF2B5EF4-FFF2-40B4-BE49-F238E27FC236}">
+                  <a16:creationId xmlns:a16="http://schemas.microsoft.com/office/drawing/2014/main" id="{38BEE0E9-8EE8-4DB9-9133-FB4919DBA155}"/>
+                </a:ext>
+              </a:extLst>
+            </p:cNvPr>
+            <p:cNvSpPr>
+              <a:spLocks noChangeShapeType="1"/>
+            </p:cNvSpPr>
+            <p:nvPr/>
+          </p:nvSpPr>
+          <p:spPr bwMode="auto">
+            <a:xfrm>
+              <a:off x="4038600" y="2819400"/>
+              <a:ext cx="1588" cy="1295400"/>
+            </a:xfrm>
+            <a:prstGeom prst="line">
+              <a:avLst/>
+            </a:prstGeom>
+            <a:noFill/>
+            <a:ln w="9525">
+              <a:solidFill>
+                <a:schemeClr val="tx1"/>
+              </a:solidFill>
+              <a:round/>
+              <a:headEnd/>
+              <a:tailEnd/>
+            </a:ln>
+            <a:effectLst/>
+          </p:spPr>
+          <p:txBody>
+            <a:bodyPr/>
+            <a:lstStyle/>
+            <a:p>
+              <a:endParaRPr lang="en-US"/>
+            </a:p>
+          </p:txBody>
+        </p:sp>
+        <p:sp>
+          <p:nvSpPr>
+            <p:cNvPr id="7" name="Line 7">
+              <a:extLst>
+                <a:ext uri="{FF2B5EF4-FFF2-40B4-BE49-F238E27FC236}">
+                  <a16:creationId xmlns:a16="http://schemas.microsoft.com/office/drawing/2014/main" id="{5CF7FA93-1FAC-4A80-9BFB-59AD12973687}"/>
+                </a:ext>
+              </a:extLst>
+            </p:cNvPr>
+            <p:cNvSpPr>
+              <a:spLocks noChangeShapeType="1"/>
+            </p:cNvSpPr>
+            <p:nvPr/>
+          </p:nvSpPr>
+          <p:spPr bwMode="auto">
+            <a:xfrm flipV="1">
+              <a:off x="4953000" y="2819400"/>
+              <a:ext cx="1588" cy="1295400"/>
+            </a:xfrm>
+            <a:prstGeom prst="line">
+              <a:avLst/>
+            </a:prstGeom>
+            <a:noFill/>
+            <a:ln w="9525">
+              <a:solidFill>
+                <a:schemeClr val="tx1"/>
+              </a:solidFill>
+              <a:round/>
+              <a:headEnd/>
+              <a:tailEnd/>
+            </a:ln>
+            <a:effectLst/>
+          </p:spPr>
+          <p:txBody>
+            <a:bodyPr/>
+            <a:lstStyle/>
+            <a:p>
+              <a:endParaRPr lang="en-US"/>
+            </a:p>
+          </p:txBody>
+        </p:sp>
+        <p:sp>
+          <p:nvSpPr>
+            <p:cNvPr id="14" name="Line 14">
+              <a:extLst>
+                <a:ext uri="{FF2B5EF4-FFF2-40B4-BE49-F238E27FC236}">
+                  <a16:creationId xmlns:a16="http://schemas.microsoft.com/office/drawing/2014/main" id="{0E04F28C-DA51-4763-B52F-6B3FEDEF4B48}"/>
+                </a:ext>
+              </a:extLst>
+            </p:cNvPr>
+            <p:cNvSpPr>
+              <a:spLocks noChangeShapeType="1"/>
+            </p:cNvSpPr>
+            <p:nvPr/>
+          </p:nvSpPr>
+          <p:spPr bwMode="auto">
+            <a:xfrm flipH="1">
+              <a:off x="6060556" y="4038600"/>
+              <a:ext cx="484196" cy="152399"/>
+            </a:xfrm>
+            <a:prstGeom prst="line">
+              <a:avLst/>
+            </a:prstGeom>
+            <a:noFill/>
+            <a:ln w="19050">
+              <a:solidFill>
+                <a:schemeClr val="tx1"/>
+              </a:solidFill>
+              <a:round/>
+              <a:headEnd/>
+              <a:tailEnd type="triangle" w="med" len="med"/>
+            </a:ln>
+            <a:effectLst/>
+          </p:spPr>
+          <p:txBody>
+            <a:bodyPr/>
+            <a:lstStyle/>
+            <a:p>
+              <a:endParaRPr lang="en-US"/>
+            </a:p>
+          </p:txBody>
+        </p:sp>
+        <p:sp>
+          <p:nvSpPr>
+            <p:cNvPr id="15" name="Text Box 15">
+              <a:extLst>
+                <a:ext uri="{FF2B5EF4-FFF2-40B4-BE49-F238E27FC236}">
+                  <a16:creationId xmlns:a16="http://schemas.microsoft.com/office/drawing/2014/main" id="{EB5F4CF1-5964-48AC-9408-64CD2575D84F}"/>
+                </a:ext>
+              </a:extLst>
+            </p:cNvPr>
+            <p:cNvSpPr txBox="1">
+              <a:spLocks noChangeArrowheads="1"/>
+            </p:cNvSpPr>
+            <p:nvPr/>
+          </p:nvSpPr>
+          <p:spPr bwMode="auto">
+            <a:xfrm>
+              <a:off x="6517055" y="3549551"/>
+              <a:ext cx="1147517" cy="923330"/>
+            </a:xfrm>
+            <a:prstGeom prst="rect">
+              <a:avLst/>
+            </a:prstGeom>
+            <a:noFill/>
+            <a:ln w="9525">
+              <a:noFill/>
+              <a:miter lim="800000"/>
+              <a:headEnd/>
+              <a:tailEnd/>
+            </a:ln>
+            <a:effectLst/>
+          </p:spPr>
+          <p:txBody>
+            <a:bodyPr wrap="square">
+              <a:spAutoFit/>
+            </a:bodyPr>
+            <a:lstStyle/>
+            <a:p>
+              <a:pPr eaLnBrk="1" hangingPunct="1"/>
+              <a:r>
+                <a:rPr lang="en-US" sz="1800" dirty="0">
+                  <a:latin typeface="Baskerville Old Face" pitchFamily="18" charset="0"/>
+                </a:rPr>
+                <a:t>Small diameter tubing</a:t>
+              </a:r>
+            </a:p>
+          </p:txBody>
+        </p:sp>
+        <p:sp>
+          <p:nvSpPr>
+            <p:cNvPr id="16" name="Freeform 17">
+              <a:extLst>
+                <a:ext uri="{FF2B5EF4-FFF2-40B4-BE49-F238E27FC236}">
+                  <a16:creationId xmlns:a16="http://schemas.microsoft.com/office/drawing/2014/main" id="{CBDAD897-3EBC-4A87-B9F2-6CCCA32C647E}"/>
+                </a:ext>
+              </a:extLst>
+            </p:cNvPr>
+            <p:cNvSpPr>
+              <a:spLocks/>
+            </p:cNvSpPr>
+            <p:nvPr/>
+          </p:nvSpPr>
+          <p:spPr bwMode="auto">
+            <a:xfrm>
+              <a:off x="4957763" y="4056063"/>
+              <a:ext cx="3233737" cy="1049337"/>
+            </a:xfrm>
+            <a:custGeom>
+              <a:avLst/>
+              <a:gdLst/>
+              <a:ahLst/>
+              <a:cxnLst>
+                <a:cxn ang="0">
+                  <a:pos x="0" y="0"/>
+                </a:cxn>
+                <a:cxn ang="0">
+                  <a:pos x="747" y="130"/>
+                </a:cxn>
+                <a:cxn ang="0">
+                  <a:pos x="909" y="593"/>
+                </a:cxn>
+                <a:cxn ang="0">
+                  <a:pos x="2037" y="536"/>
+                </a:cxn>
+              </a:cxnLst>
+              <a:rect l="0" t="0" r="r" b="b"/>
+              <a:pathLst>
+                <a:path w="2037" h="661">
+                  <a:moveTo>
+                    <a:pt x="0" y="0"/>
+                  </a:moveTo>
+                  <a:cubicBezTo>
+                    <a:pt x="298" y="15"/>
+                    <a:pt x="596" y="31"/>
+                    <a:pt x="747" y="130"/>
+                  </a:cubicBezTo>
+                  <a:cubicBezTo>
+                    <a:pt x="898" y="229"/>
+                    <a:pt x="694" y="525"/>
+                    <a:pt x="909" y="593"/>
+                  </a:cubicBezTo>
+                  <a:cubicBezTo>
+                    <a:pt x="1124" y="661"/>
+                    <a:pt x="1580" y="598"/>
+                    <a:pt x="2037" y="536"/>
+                  </a:cubicBezTo>
+                </a:path>
+              </a:pathLst>
+            </a:custGeom>
+            <a:noFill/>
+            <a:ln w="12700" cap="flat" cmpd="sng">
+              <a:solidFill>
+                <a:schemeClr val="tx1"/>
+              </a:solidFill>
+              <a:prstDash val="solid"/>
+              <a:round/>
+              <a:headEnd type="none" w="lg" len="med"/>
+              <a:tailEnd type="none" w="lg" len="med"/>
+            </a:ln>
+            <a:effectLst/>
+          </p:spPr>
+          <p:txBody>
+            <a:bodyPr wrap="none" anchor="ctr">
+              <a:spAutoFit/>
+            </a:bodyPr>
+            <a:lstStyle/>
+            <a:p>
+              <a:endParaRPr lang="en-US"/>
+            </a:p>
+          </p:txBody>
+        </p:sp>
+        <p:sp>
+          <p:nvSpPr>
+            <p:cNvPr id="17" name="Line 18">
+              <a:extLst>
+                <a:ext uri="{FF2B5EF4-FFF2-40B4-BE49-F238E27FC236}">
+                  <a16:creationId xmlns:a16="http://schemas.microsoft.com/office/drawing/2014/main" id="{378C8E85-6B15-440A-9B61-ECC9596EAF16}"/>
+                </a:ext>
+              </a:extLst>
+            </p:cNvPr>
+            <p:cNvSpPr>
+              <a:spLocks noChangeShapeType="1"/>
+            </p:cNvSpPr>
+            <p:nvPr/>
+          </p:nvSpPr>
+          <p:spPr bwMode="auto">
+            <a:xfrm>
+              <a:off x="4997450" y="3425825"/>
+              <a:ext cx="3270250" cy="0"/>
+            </a:xfrm>
+            <a:prstGeom prst="line">
+              <a:avLst/>
+            </a:prstGeom>
+            <a:noFill/>
+            <a:ln w="12700" cap="rnd">
+              <a:solidFill>
+                <a:schemeClr val="tx1"/>
+              </a:solidFill>
+              <a:prstDash val="sysDot"/>
+              <a:round/>
+              <a:headEnd type="none" w="lg" len="med"/>
+              <a:tailEnd type="none" w="lg" len="med"/>
+            </a:ln>
+            <a:effectLst/>
+          </p:spPr>
+          <p:txBody>
+            <a:bodyPr wrap="none" anchor="ctr">
+              <a:spAutoFit/>
+            </a:bodyPr>
+            <a:lstStyle/>
+            <a:p>
+              <a:endParaRPr lang="en-US"/>
+            </a:p>
+          </p:txBody>
+        </p:sp>
+        <p:sp>
+          <p:nvSpPr>
+            <p:cNvPr id="18" name="Line 19">
+              <a:extLst>
+                <a:ext uri="{FF2B5EF4-FFF2-40B4-BE49-F238E27FC236}">
+                  <a16:creationId xmlns:a16="http://schemas.microsoft.com/office/drawing/2014/main" id="{31244288-099C-4BDC-86FF-F906B0F585C3}"/>
+                </a:ext>
+              </a:extLst>
+            </p:cNvPr>
+            <p:cNvSpPr>
+              <a:spLocks noChangeShapeType="1"/>
+            </p:cNvSpPr>
+            <p:nvPr/>
+          </p:nvSpPr>
+          <p:spPr bwMode="auto">
+            <a:xfrm>
+              <a:off x="8174038" y="3425825"/>
+              <a:ext cx="0" cy="1468438"/>
+            </a:xfrm>
+            <a:prstGeom prst="line">
+              <a:avLst/>
+            </a:prstGeom>
+            <a:noFill/>
+            <a:ln w="12700">
+              <a:solidFill>
+                <a:schemeClr val="tx1"/>
+              </a:solidFill>
+              <a:round/>
+              <a:headEnd type="triangle" w="lg" len="med"/>
+              <a:tailEnd type="triangle" w="lg" len="med"/>
+            </a:ln>
+            <a:effectLst/>
+          </p:spPr>
+          <p:txBody>
+            <a:bodyPr wrap="none" anchor="ctr">
+              <a:spAutoFit/>
+            </a:bodyPr>
+            <a:lstStyle/>
+            <a:p>
+              <a:endParaRPr lang="en-US"/>
+            </a:p>
+          </p:txBody>
+        </p:sp>
+        <p:sp>
+          <p:nvSpPr>
+            <p:cNvPr id="19" name="Text Box 20">
+              <a:extLst>
+                <a:ext uri="{FF2B5EF4-FFF2-40B4-BE49-F238E27FC236}">
+                  <a16:creationId xmlns:a16="http://schemas.microsoft.com/office/drawing/2014/main" id="{38DF3E15-E190-4F96-B8E2-F3CAB55F487A}"/>
+                </a:ext>
+              </a:extLst>
+            </p:cNvPr>
+            <p:cNvSpPr txBox="1">
+              <a:spLocks noChangeArrowheads="1"/>
+            </p:cNvSpPr>
+            <p:nvPr/>
+          </p:nvSpPr>
+          <p:spPr bwMode="auto">
+            <a:xfrm>
+              <a:off x="7918450" y="3783013"/>
+              <a:ext cx="497252" cy="523220"/>
+            </a:xfrm>
+            <a:prstGeom prst="rect">
+              <a:avLst/>
+            </a:prstGeom>
+            <a:solidFill>
+              <a:schemeClr val="bg1"/>
+            </a:solidFill>
+            <a:ln w="12700">
+              <a:noFill/>
+              <a:miter lim="800000"/>
+              <a:headEnd type="none" w="lg" len="med"/>
+              <a:tailEnd type="none" w="lg" len="med"/>
+            </a:ln>
+            <a:effectLst/>
+          </p:spPr>
+          <p:txBody>
+            <a:bodyPr wrap="none">
+              <a:spAutoFit/>
+            </a:bodyPr>
+            <a:lstStyle/>
+            <a:p>
+              <a:r>
+                <a:rPr lang="en-US" i="1" dirty="0" err="1"/>
+                <a:t>h</a:t>
+              </a:r>
+              <a:r>
+                <a:rPr lang="en-US" i="1" baseline="-25000" dirty="0" err="1"/>
+                <a:t>L</a:t>
+              </a:r>
+              <a:endParaRPr lang="en-US" i="1" dirty="0"/>
+            </a:p>
+          </p:txBody>
+        </p:sp>
+        <p:sp>
+          <p:nvSpPr>
+            <p:cNvPr id="24" name="Line 29">
+              <a:extLst>
+                <a:ext uri="{FF2B5EF4-FFF2-40B4-BE49-F238E27FC236}">
+                  <a16:creationId xmlns:a16="http://schemas.microsoft.com/office/drawing/2014/main" id="{DA16F25F-FDE7-4A2E-A8D2-2493CF8C51F4}"/>
+                </a:ext>
+              </a:extLst>
+            </p:cNvPr>
+            <p:cNvSpPr>
+              <a:spLocks noChangeShapeType="1"/>
+            </p:cNvSpPr>
+            <p:nvPr/>
+          </p:nvSpPr>
+          <p:spPr bwMode="auto">
+            <a:xfrm>
+              <a:off x="4038600" y="3416300"/>
+              <a:ext cx="914400" cy="0"/>
+            </a:xfrm>
+            <a:prstGeom prst="line">
+              <a:avLst/>
+            </a:prstGeom>
+            <a:noFill/>
+            <a:ln w="38100">
+              <a:solidFill>
+                <a:schemeClr val="folHlink"/>
+              </a:solidFill>
+              <a:prstDash val="sysDot"/>
+              <a:round/>
+              <a:headEnd type="none" w="lg" len="med"/>
+              <a:tailEnd type="none" w="lg" len="med"/>
+            </a:ln>
+            <a:effectLst/>
+          </p:spPr>
+          <p:txBody>
+            <a:bodyPr wrap="none" anchor="ctr">
+              <a:spAutoFit/>
+            </a:bodyPr>
+            <a:lstStyle/>
+            <a:p>
+              <a:endParaRPr lang="en-US"/>
+            </a:p>
+          </p:txBody>
+        </p:sp>
+        <p:sp>
+          <p:nvSpPr>
+            <p:cNvPr id="25" name="Line 30">
+              <a:extLst>
+                <a:ext uri="{FF2B5EF4-FFF2-40B4-BE49-F238E27FC236}">
+                  <a16:creationId xmlns:a16="http://schemas.microsoft.com/office/drawing/2014/main" id="{EE0FDFB7-B779-40E1-9519-B5675E239AE3}"/>
+                </a:ext>
+              </a:extLst>
+            </p:cNvPr>
+            <p:cNvSpPr>
+              <a:spLocks noChangeShapeType="1"/>
+            </p:cNvSpPr>
+            <p:nvPr/>
+          </p:nvSpPr>
+          <p:spPr bwMode="auto">
+            <a:xfrm>
+              <a:off x="8229600" y="4902200"/>
+              <a:ext cx="914400" cy="0"/>
+            </a:xfrm>
+            <a:prstGeom prst="line">
+              <a:avLst/>
+            </a:prstGeom>
+            <a:noFill/>
+            <a:ln w="38100">
+              <a:solidFill>
+                <a:schemeClr val="folHlink"/>
+              </a:solidFill>
+              <a:prstDash val="sysDot"/>
+              <a:round/>
+              <a:headEnd type="none" w="lg" len="med"/>
+              <a:tailEnd type="none" w="lg" len="med"/>
+            </a:ln>
+            <a:effectLst/>
+          </p:spPr>
+          <p:txBody>
+            <a:bodyPr wrap="none" anchor="ctr">
+              <a:spAutoFit/>
+            </a:bodyPr>
+            <a:lstStyle/>
+            <a:p>
+              <a:endParaRPr lang="en-US"/>
+            </a:p>
+          </p:txBody>
+        </p:sp>
+      </p:grpSp>
     </p:spTree>
     <p:extLst>
       <p:ext uri="{BB962C8B-B14F-4D97-AF65-F5344CB8AC3E}">

</xml_diff>

<commit_message>
added head loss trick to fluids review and section summary
</commit_message>
<xml_diff>
--- a/Summary Sheets/Diagrams.pptx
+++ b/Summary Sheets/Diagrams.pptx
@@ -3985,7 +3985,7 @@
                           <a:buNone/>
                           <a:tabLst/>
                         </a:pPr>
-                        <a:endParaRPr kumimoji="0" lang="en-US" sz="1800" b="0" i="0" u="none" strike="noStrike" cap="none" normalizeH="0" baseline="0">
+                        <a:endParaRPr kumimoji="0" lang="en-US" sz="1800" b="0" i="0" u="none" strike="noStrike" cap="none" normalizeH="0" baseline="0" dirty="0">
                           <a:ln>
                             <a:noFill/>
                           </a:ln>
@@ -28992,10 +28992,10 @@
       </p:grpSpPr>
       <p:grpSp>
         <p:nvGrpSpPr>
-          <p:cNvPr id="26" name="Group 25">
+          <p:cNvPr id="10" name="Group 9">
             <a:extLst>
               <a:ext uri="{FF2B5EF4-FFF2-40B4-BE49-F238E27FC236}">
-                <a16:creationId xmlns:a16="http://schemas.microsoft.com/office/drawing/2014/main" id="{5DF38276-C102-42BA-A873-0FF57E9BF05E}"/>
+                <a16:creationId xmlns:a16="http://schemas.microsoft.com/office/drawing/2014/main" id="{27325882-7938-40AD-BDB6-711CF1344368}"/>
               </a:ext>
             </a:extLst>
           </p:cNvPr>
@@ -29005,330 +29005,590 @@
         <p:grpSpPr>
           <a:xfrm>
             <a:off x="4038600" y="2819400"/>
-            <a:ext cx="5105400" cy="2286000"/>
+            <a:ext cx="4451228" cy="2286000"/>
             <a:chOff x="4038600" y="2819400"/>
-            <a:chExt cx="5105400" cy="2286000"/>
+            <a:chExt cx="4451228" cy="2286000"/>
           </a:xfrm>
         </p:grpSpPr>
-        <p:sp>
-          <p:nvSpPr>
-            <p:cNvPr id="3" name="Rectangle 3">
+        <p:grpSp>
+          <p:nvGrpSpPr>
+            <p:cNvPr id="9" name="Group 8">
               <a:extLst>
                 <a:ext uri="{FF2B5EF4-FFF2-40B4-BE49-F238E27FC236}">
-                  <a16:creationId xmlns:a16="http://schemas.microsoft.com/office/drawing/2014/main" id="{F22B4D8D-5E15-4950-B0A2-59ED35A04DE9}"/>
+                  <a16:creationId xmlns:a16="http://schemas.microsoft.com/office/drawing/2014/main" id="{C8E6698E-ADAB-4AD4-9C79-815C5BB1F1F0}"/>
                 </a:ext>
               </a:extLst>
             </p:cNvPr>
-            <p:cNvSpPr>
-              <a:spLocks noChangeArrowheads="1"/>
-            </p:cNvSpPr>
+            <p:cNvGrpSpPr/>
+            <p:nvPr/>
+          </p:nvGrpSpPr>
+          <p:grpSpPr>
+            <a:xfrm>
+              <a:off x="4038600" y="2819400"/>
+              <a:ext cx="4451228" cy="2286000"/>
+              <a:chOff x="4038600" y="2819400"/>
+              <a:chExt cx="4451228" cy="2286000"/>
+            </a:xfrm>
+          </p:grpSpPr>
+          <p:grpSp>
+            <p:nvGrpSpPr>
+              <p:cNvPr id="26" name="Group 25">
+                <a:extLst>
+                  <a:ext uri="{FF2B5EF4-FFF2-40B4-BE49-F238E27FC236}">
+                    <a16:creationId xmlns:a16="http://schemas.microsoft.com/office/drawing/2014/main" id="{5DF38276-C102-42BA-A873-0FF57E9BF05E}"/>
+                  </a:ext>
+                </a:extLst>
+              </p:cNvPr>
+              <p:cNvGrpSpPr/>
+              <p:nvPr/>
+            </p:nvGrpSpPr>
+            <p:grpSpPr>
+              <a:xfrm>
+                <a:off x="4038600" y="2819400"/>
+                <a:ext cx="4229100" cy="2286000"/>
+                <a:chOff x="4038600" y="2819400"/>
+                <a:chExt cx="4229100" cy="2286000"/>
+              </a:xfrm>
+            </p:grpSpPr>
+            <p:sp>
+              <p:nvSpPr>
+                <p:cNvPr id="3" name="Rectangle 3">
+                  <a:extLst>
+                    <a:ext uri="{FF2B5EF4-FFF2-40B4-BE49-F238E27FC236}">
+                      <a16:creationId xmlns:a16="http://schemas.microsoft.com/office/drawing/2014/main" id="{F22B4D8D-5E15-4950-B0A2-59ED35A04DE9}"/>
+                    </a:ext>
+                  </a:extLst>
+                </p:cNvPr>
+                <p:cNvSpPr>
+                  <a:spLocks noChangeArrowheads="1"/>
+                </p:cNvSpPr>
+                <p:nvPr/>
+              </p:nvSpPr>
+              <p:spPr bwMode="auto">
+                <a:xfrm>
+                  <a:off x="4038600" y="3429000"/>
+                  <a:ext cx="914400" cy="685800"/>
+                </a:xfrm>
+                <a:prstGeom prst="rect">
+                  <a:avLst/>
+                </a:prstGeom>
+                <a:solidFill>
+                  <a:schemeClr val="hlink"/>
+                </a:solidFill>
+                <a:ln w="9525">
+                  <a:noFill/>
+                  <a:miter lim="800000"/>
+                  <a:headEnd/>
+                  <a:tailEnd/>
+                </a:ln>
+                <a:effectLst/>
+              </p:spPr>
+              <p:txBody>
+                <a:bodyPr wrap="none" anchor="ctr"/>
+                <a:lstStyle/>
+                <a:p>
+                  <a:endParaRPr lang="en-US"/>
+                </a:p>
+              </p:txBody>
+            </p:sp>
+            <p:sp>
+              <p:nvSpPr>
+                <p:cNvPr id="5" name="Oval 5">
+                  <a:extLst>
+                    <a:ext uri="{FF2B5EF4-FFF2-40B4-BE49-F238E27FC236}">
+                      <a16:creationId xmlns:a16="http://schemas.microsoft.com/office/drawing/2014/main" id="{33602F9C-4800-465A-AF40-A79D1441E5D7}"/>
+                    </a:ext>
+                  </a:extLst>
+                </p:cNvPr>
+                <p:cNvSpPr>
+                  <a:spLocks noChangeArrowheads="1"/>
+                </p:cNvSpPr>
+                <p:nvPr/>
+              </p:nvSpPr>
+              <p:spPr bwMode="auto">
+                <a:xfrm>
+                  <a:off x="4038600" y="4038600"/>
+                  <a:ext cx="914400" cy="152400"/>
+                </a:xfrm>
+                <a:prstGeom prst="ellipse">
+                  <a:avLst/>
+                </a:prstGeom>
+                <a:solidFill>
+                  <a:schemeClr val="hlink"/>
+                </a:solidFill>
+                <a:ln w="9525">
+                  <a:solidFill>
+                    <a:schemeClr val="tx1"/>
+                  </a:solidFill>
+                  <a:round/>
+                  <a:headEnd/>
+                  <a:tailEnd/>
+                </a:ln>
+                <a:effectLst/>
+              </p:spPr>
+              <p:txBody>
+                <a:bodyPr wrap="none" anchor="ctr"/>
+                <a:lstStyle/>
+                <a:p>
+                  <a:endParaRPr lang="en-US"/>
+                </a:p>
+              </p:txBody>
+            </p:sp>
+            <p:sp>
+              <p:nvSpPr>
+                <p:cNvPr id="6" name="Line 6">
+                  <a:extLst>
+                    <a:ext uri="{FF2B5EF4-FFF2-40B4-BE49-F238E27FC236}">
+                      <a16:creationId xmlns:a16="http://schemas.microsoft.com/office/drawing/2014/main" id="{38BEE0E9-8EE8-4DB9-9133-FB4919DBA155}"/>
+                    </a:ext>
+                  </a:extLst>
+                </p:cNvPr>
+                <p:cNvSpPr>
+                  <a:spLocks noChangeShapeType="1"/>
+                </p:cNvSpPr>
+                <p:nvPr/>
+              </p:nvSpPr>
+              <p:spPr bwMode="auto">
+                <a:xfrm>
+                  <a:off x="4038600" y="2819400"/>
+                  <a:ext cx="1588" cy="1295400"/>
+                </a:xfrm>
+                <a:prstGeom prst="line">
+                  <a:avLst/>
+                </a:prstGeom>
+                <a:noFill/>
+                <a:ln w="9525">
+                  <a:solidFill>
+                    <a:schemeClr val="tx1"/>
+                  </a:solidFill>
+                  <a:round/>
+                  <a:headEnd/>
+                  <a:tailEnd/>
+                </a:ln>
+                <a:effectLst/>
+              </p:spPr>
+              <p:txBody>
+                <a:bodyPr/>
+                <a:lstStyle/>
+                <a:p>
+                  <a:endParaRPr lang="en-US"/>
+                </a:p>
+              </p:txBody>
+            </p:sp>
+            <p:sp>
+              <p:nvSpPr>
+                <p:cNvPr id="7" name="Line 7">
+                  <a:extLst>
+                    <a:ext uri="{FF2B5EF4-FFF2-40B4-BE49-F238E27FC236}">
+                      <a16:creationId xmlns:a16="http://schemas.microsoft.com/office/drawing/2014/main" id="{5CF7FA93-1FAC-4A80-9BFB-59AD12973687}"/>
+                    </a:ext>
+                  </a:extLst>
+                </p:cNvPr>
+                <p:cNvSpPr>
+                  <a:spLocks noChangeShapeType="1"/>
+                </p:cNvSpPr>
+                <p:nvPr/>
+              </p:nvSpPr>
+              <p:spPr bwMode="auto">
+                <a:xfrm flipV="1">
+                  <a:off x="4953000" y="2819400"/>
+                  <a:ext cx="1588" cy="1295400"/>
+                </a:xfrm>
+                <a:prstGeom prst="line">
+                  <a:avLst/>
+                </a:prstGeom>
+                <a:noFill/>
+                <a:ln w="9525">
+                  <a:solidFill>
+                    <a:schemeClr val="tx1"/>
+                  </a:solidFill>
+                  <a:round/>
+                  <a:headEnd/>
+                  <a:tailEnd/>
+                </a:ln>
+                <a:effectLst/>
+              </p:spPr>
+              <p:txBody>
+                <a:bodyPr/>
+                <a:lstStyle/>
+                <a:p>
+                  <a:endParaRPr lang="en-US"/>
+                </a:p>
+              </p:txBody>
+            </p:sp>
+            <p:sp>
+              <p:nvSpPr>
+                <p:cNvPr id="14" name="Line 14">
+                  <a:extLst>
+                    <a:ext uri="{FF2B5EF4-FFF2-40B4-BE49-F238E27FC236}">
+                      <a16:creationId xmlns:a16="http://schemas.microsoft.com/office/drawing/2014/main" id="{0E04F28C-DA51-4763-B52F-6B3FEDEF4B48}"/>
+                    </a:ext>
+                  </a:extLst>
+                </p:cNvPr>
+                <p:cNvSpPr>
+                  <a:spLocks noChangeShapeType="1"/>
+                </p:cNvSpPr>
+                <p:nvPr/>
+              </p:nvSpPr>
+              <p:spPr bwMode="auto">
+                <a:xfrm flipH="1">
+                  <a:off x="6060556" y="4038600"/>
+                  <a:ext cx="484196" cy="152399"/>
+                </a:xfrm>
+                <a:prstGeom prst="line">
+                  <a:avLst/>
+                </a:prstGeom>
+                <a:noFill/>
+                <a:ln w="19050">
+                  <a:solidFill>
+                    <a:schemeClr val="tx1"/>
+                  </a:solidFill>
+                  <a:round/>
+                  <a:headEnd/>
+                  <a:tailEnd type="triangle" w="med" len="med"/>
+                </a:ln>
+                <a:effectLst/>
+              </p:spPr>
+              <p:txBody>
+                <a:bodyPr/>
+                <a:lstStyle/>
+                <a:p>
+                  <a:endParaRPr lang="en-US"/>
+                </a:p>
+              </p:txBody>
+            </p:sp>
+            <p:sp>
+              <p:nvSpPr>
+                <p:cNvPr id="15" name="Text Box 15">
+                  <a:extLst>
+                    <a:ext uri="{FF2B5EF4-FFF2-40B4-BE49-F238E27FC236}">
+                      <a16:creationId xmlns:a16="http://schemas.microsoft.com/office/drawing/2014/main" id="{EB5F4CF1-5964-48AC-9408-64CD2575D84F}"/>
+                    </a:ext>
+                  </a:extLst>
+                </p:cNvPr>
+                <p:cNvSpPr txBox="1">
+                  <a:spLocks noChangeArrowheads="1"/>
+                </p:cNvSpPr>
+                <p:nvPr/>
+              </p:nvSpPr>
+              <p:spPr bwMode="auto">
+                <a:xfrm>
+                  <a:off x="6517055" y="3549551"/>
+                  <a:ext cx="1147517" cy="923330"/>
+                </a:xfrm>
+                <a:prstGeom prst="rect">
+                  <a:avLst/>
+                </a:prstGeom>
+                <a:noFill/>
+                <a:ln w="9525">
+                  <a:noFill/>
+                  <a:miter lim="800000"/>
+                  <a:headEnd/>
+                  <a:tailEnd/>
+                </a:ln>
+                <a:effectLst/>
+              </p:spPr>
+              <p:txBody>
+                <a:bodyPr wrap="square">
+                  <a:spAutoFit/>
+                </a:bodyPr>
+                <a:lstStyle/>
+                <a:p>
+                  <a:pPr eaLnBrk="1" hangingPunct="1"/>
+                  <a:r>
+                    <a:rPr lang="en-US" sz="1800" dirty="0">
+                      <a:latin typeface="Baskerville Old Face" pitchFamily="18" charset="0"/>
+                    </a:rPr>
+                    <a:t>Small diameter tubing</a:t>
+                  </a:r>
+                </a:p>
+              </p:txBody>
+            </p:sp>
+            <p:sp>
+              <p:nvSpPr>
+                <p:cNvPr id="16" name="Freeform 17">
+                  <a:extLst>
+                    <a:ext uri="{FF2B5EF4-FFF2-40B4-BE49-F238E27FC236}">
+                      <a16:creationId xmlns:a16="http://schemas.microsoft.com/office/drawing/2014/main" id="{CBDAD897-3EBC-4A87-B9F2-6CCCA32C647E}"/>
+                    </a:ext>
+                  </a:extLst>
+                </p:cNvPr>
+                <p:cNvSpPr>
+                  <a:spLocks/>
+                </p:cNvSpPr>
+                <p:nvPr/>
+              </p:nvSpPr>
+              <p:spPr bwMode="auto">
+                <a:xfrm>
+                  <a:off x="4957763" y="4056063"/>
+                  <a:ext cx="3233737" cy="1049337"/>
+                </a:xfrm>
+                <a:custGeom>
+                  <a:avLst/>
+                  <a:gdLst/>
+                  <a:ahLst/>
+                  <a:cxnLst>
+                    <a:cxn ang="0">
+                      <a:pos x="0" y="0"/>
+                    </a:cxn>
+                    <a:cxn ang="0">
+                      <a:pos x="747" y="130"/>
+                    </a:cxn>
+                    <a:cxn ang="0">
+                      <a:pos x="909" y="593"/>
+                    </a:cxn>
+                    <a:cxn ang="0">
+                      <a:pos x="2037" y="536"/>
+                    </a:cxn>
+                  </a:cxnLst>
+                  <a:rect l="0" t="0" r="r" b="b"/>
+                  <a:pathLst>
+                    <a:path w="2037" h="661">
+                      <a:moveTo>
+                        <a:pt x="0" y="0"/>
+                      </a:moveTo>
+                      <a:cubicBezTo>
+                        <a:pt x="298" y="15"/>
+                        <a:pt x="596" y="31"/>
+                        <a:pt x="747" y="130"/>
+                      </a:cubicBezTo>
+                      <a:cubicBezTo>
+                        <a:pt x="898" y="229"/>
+                        <a:pt x="694" y="525"/>
+                        <a:pt x="909" y="593"/>
+                      </a:cubicBezTo>
+                      <a:cubicBezTo>
+                        <a:pt x="1124" y="661"/>
+                        <a:pt x="1580" y="598"/>
+                        <a:pt x="2037" y="536"/>
+                      </a:cubicBezTo>
+                    </a:path>
+                  </a:pathLst>
+                </a:custGeom>
+                <a:noFill/>
+                <a:ln w="12700" cap="flat" cmpd="sng">
+                  <a:solidFill>
+                    <a:schemeClr val="tx1"/>
+                  </a:solidFill>
+                  <a:prstDash val="solid"/>
+                  <a:round/>
+                  <a:headEnd type="none" w="lg" len="med"/>
+                  <a:tailEnd type="none" w="lg" len="med"/>
+                </a:ln>
+                <a:effectLst/>
+              </p:spPr>
+              <p:txBody>
+                <a:bodyPr wrap="none" anchor="ctr">
+                  <a:spAutoFit/>
+                </a:bodyPr>
+                <a:lstStyle/>
+                <a:p>
+                  <a:endParaRPr lang="en-US"/>
+                </a:p>
+              </p:txBody>
+            </p:sp>
+            <p:sp>
+              <p:nvSpPr>
+                <p:cNvPr id="17" name="Line 18">
+                  <a:extLst>
+                    <a:ext uri="{FF2B5EF4-FFF2-40B4-BE49-F238E27FC236}">
+                      <a16:creationId xmlns:a16="http://schemas.microsoft.com/office/drawing/2014/main" id="{378C8E85-6B15-440A-9B61-ECC9596EAF16}"/>
+                    </a:ext>
+                  </a:extLst>
+                </p:cNvPr>
+                <p:cNvSpPr>
+                  <a:spLocks noChangeShapeType="1"/>
+                </p:cNvSpPr>
+                <p:nvPr/>
+              </p:nvSpPr>
+              <p:spPr bwMode="auto">
+                <a:xfrm>
+                  <a:off x="4997450" y="3425825"/>
+                  <a:ext cx="3270250" cy="0"/>
+                </a:xfrm>
+                <a:prstGeom prst="line">
+                  <a:avLst/>
+                </a:prstGeom>
+                <a:noFill/>
+                <a:ln w="12700" cap="rnd">
+                  <a:solidFill>
+                    <a:schemeClr val="tx1"/>
+                  </a:solidFill>
+                  <a:prstDash val="sysDot"/>
+                  <a:round/>
+                  <a:headEnd type="none" w="lg" len="med"/>
+                  <a:tailEnd type="none" w="lg" len="med"/>
+                </a:ln>
+                <a:effectLst/>
+              </p:spPr>
+              <p:txBody>
+                <a:bodyPr wrap="none" anchor="ctr">
+                  <a:spAutoFit/>
+                </a:bodyPr>
+                <a:lstStyle/>
+                <a:p>
+                  <a:endParaRPr lang="en-US"/>
+                </a:p>
+              </p:txBody>
+            </p:sp>
+            <p:sp>
+              <p:nvSpPr>
+                <p:cNvPr id="18" name="Line 19">
+                  <a:extLst>
+                    <a:ext uri="{FF2B5EF4-FFF2-40B4-BE49-F238E27FC236}">
+                      <a16:creationId xmlns:a16="http://schemas.microsoft.com/office/drawing/2014/main" id="{31244288-099C-4BDC-86FF-F906B0F585C3}"/>
+                    </a:ext>
+                  </a:extLst>
+                </p:cNvPr>
+                <p:cNvSpPr>
+                  <a:spLocks noChangeShapeType="1"/>
+                </p:cNvSpPr>
+                <p:nvPr/>
+              </p:nvSpPr>
+              <p:spPr bwMode="auto">
+                <a:xfrm>
+                  <a:off x="8174038" y="3425825"/>
+                  <a:ext cx="0" cy="1468438"/>
+                </a:xfrm>
+                <a:prstGeom prst="line">
+                  <a:avLst/>
+                </a:prstGeom>
+                <a:noFill/>
+                <a:ln w="12700">
+                  <a:solidFill>
+                    <a:schemeClr val="tx1"/>
+                  </a:solidFill>
+                  <a:round/>
+                  <a:headEnd type="triangle" w="lg" len="med"/>
+                  <a:tailEnd type="triangle" w="lg" len="med"/>
+                </a:ln>
+                <a:effectLst/>
+              </p:spPr>
+              <p:txBody>
+                <a:bodyPr wrap="none" anchor="ctr">
+                  <a:spAutoFit/>
+                </a:bodyPr>
+                <a:lstStyle/>
+                <a:p>
+                  <a:endParaRPr lang="en-US"/>
+                </a:p>
+              </p:txBody>
+            </p:sp>
+          </p:grpSp>
+          <p:sp>
+            <p:nvSpPr>
+              <p:cNvPr id="2" name="Arrow: Right 1">
+                <a:extLst>
+                  <a:ext uri="{FF2B5EF4-FFF2-40B4-BE49-F238E27FC236}">
+                    <a16:creationId xmlns:a16="http://schemas.microsoft.com/office/drawing/2014/main" id="{72C0E2FC-1947-4BEB-8D57-17EF8811ABFE}"/>
+                  </a:ext>
+                </a:extLst>
+              </p:cNvPr>
+              <p:cNvSpPr/>
+              <p:nvPr/>
+            </p:nvSpPr>
+            <p:spPr bwMode="auto">
+              <a:xfrm>
+                <a:off x="8191500" y="4876800"/>
+                <a:ext cx="298328" cy="50800"/>
+              </a:xfrm>
+              <a:prstGeom prst="rightArrow">
+                <a:avLst/>
+              </a:prstGeom>
+              <a:solidFill>
+                <a:srgbClr val="0563C1"/>
+              </a:solidFill>
+              <a:ln w="12700">
+                <a:solidFill>
+                  <a:srgbClr val="0563C1"/>
+                </a:solidFill>
+                <a:miter lim="800000"/>
+                <a:headEnd type="none" w="lg" len="med"/>
+                <a:tailEnd type="none" w="lg" len="med"/>
+              </a:ln>
+              <a:effectLst/>
+            </p:spPr>
+            <p:txBody>
+              <a:bodyPr rtlCol="0" anchor="ctr">
+                <a:spAutoFit/>
+              </a:bodyPr>
+              <a:lstStyle/>
+              <a:p>
+                <a:pPr algn="l"/>
+                <a:endParaRPr lang="en-US" dirty="0"/>
+              </a:p>
+            </p:txBody>
+          </p:sp>
+          <p:pic>
+            <p:nvPicPr>
+              <p:cNvPr id="8" name="Picture 7">
+                <a:extLst>
+                  <a:ext uri="{FF2B5EF4-FFF2-40B4-BE49-F238E27FC236}">
+                    <a16:creationId xmlns:a16="http://schemas.microsoft.com/office/drawing/2014/main" id="{B7083162-B08D-4BA2-AB2D-AEFC696C63A0}"/>
+                  </a:ext>
+                </a:extLst>
+              </p:cNvPr>
+              <p:cNvPicPr>
+                <a:picLocks noChangeAspect="1"/>
+              </p:cNvPicPr>
+              <p:nvPr>
+                <p:custDataLst>
+                  <p:tags r:id="rId1"/>
+                </p:custDataLst>
+              </p:nvPr>
+            </p:nvPicPr>
+            <p:blipFill>
+              <a:blip r:embed="rId3">
+                <a:extLst>
+                  <a:ext uri="{28A0092B-C50C-407E-A947-70E740481C1C}">
+                    <a14:useLocalDpi xmlns:a14="http://schemas.microsoft.com/office/drawing/2010/main" val="0"/>
+                  </a:ext>
+                </a:extLst>
+              </a:blip>
+              <a:stretch>
+                <a:fillRect/>
+              </a:stretch>
+            </p:blipFill>
+            <p:spPr>
+              <a:xfrm>
+                <a:off x="8043752" y="3977666"/>
+                <a:ext cx="260571" cy="213333"/>
+              </a:xfrm>
+              <a:prstGeom prst="rect">
+                <a:avLst/>
+              </a:prstGeom>
+              <a:solidFill>
+                <a:schemeClr val="bg1"/>
+              </a:solidFill>
+            </p:spPr>
+          </p:pic>
+        </p:grpSp>
+        <p:sp>
+          <p:nvSpPr>
+            <p:cNvPr id="37" name="Oval 36">
+              <a:extLst>
+                <a:ext uri="{FF2B5EF4-FFF2-40B4-BE49-F238E27FC236}">
+                  <a16:creationId xmlns:a16="http://schemas.microsoft.com/office/drawing/2014/main" id="{E1F4F404-5FE9-4469-9603-8E686263D37F}"/>
+                </a:ext>
+              </a:extLst>
+            </p:cNvPr>
+            <p:cNvSpPr/>
             <p:nvPr/>
           </p:nvSpPr>
           <p:spPr bwMode="auto">
             <a:xfrm>
-              <a:off x="4038600" y="3429000"/>
-              <a:ext cx="914400" cy="685800"/>
-            </a:xfrm>
-            <a:prstGeom prst="rect">
-              <a:avLst/>
-            </a:prstGeom>
-            <a:solidFill>
-              <a:schemeClr val="hlink"/>
-            </a:solidFill>
-            <a:ln w="9525">
-              <a:noFill/>
-              <a:miter lim="800000"/>
-              <a:headEnd/>
-              <a:tailEnd/>
-            </a:ln>
-            <a:effectLst/>
-          </p:spPr>
-          <p:txBody>
-            <a:bodyPr wrap="none" anchor="ctr"/>
-            <a:lstStyle/>
-            <a:p>
-              <a:endParaRPr lang="en-US"/>
-            </a:p>
-          </p:txBody>
-        </p:sp>
-        <p:sp>
-          <p:nvSpPr>
-            <p:cNvPr id="5" name="Oval 5">
-              <a:extLst>
-                <a:ext uri="{FF2B5EF4-FFF2-40B4-BE49-F238E27FC236}">
-                  <a16:creationId xmlns:a16="http://schemas.microsoft.com/office/drawing/2014/main" id="{33602F9C-4800-465A-AF40-A79D1441E5D7}"/>
-                </a:ext>
-              </a:extLst>
-            </p:cNvPr>
-            <p:cNvSpPr>
-              <a:spLocks noChangeArrowheads="1"/>
-            </p:cNvSpPr>
-            <p:nvPr/>
-          </p:nvSpPr>
-          <p:spPr bwMode="auto">
-            <a:xfrm>
-              <a:off x="4038600" y="4038600"/>
-              <a:ext cx="914400" cy="152400"/>
+              <a:off x="4375330" y="3365193"/>
+              <a:ext cx="121264" cy="121264"/>
             </a:xfrm>
             <a:prstGeom prst="ellipse">
               <a:avLst/>
             </a:prstGeom>
             <a:solidFill>
-              <a:schemeClr val="hlink"/>
+              <a:srgbClr val="C00000"/>
             </a:solidFill>
-            <a:ln w="9525">
+            <a:ln w="12700" cap="flat" cmpd="sng" algn="ctr">
               <a:solidFill>
-                <a:schemeClr val="tx1"/>
-              </a:solidFill>
-              <a:round/>
-              <a:headEnd/>
-              <a:tailEnd/>
-            </a:ln>
-            <a:effectLst/>
-          </p:spPr>
-          <p:txBody>
-            <a:bodyPr wrap="none" anchor="ctr"/>
-            <a:lstStyle/>
-            <a:p>
-              <a:endParaRPr lang="en-US"/>
-            </a:p>
-          </p:txBody>
-        </p:sp>
-        <p:sp>
-          <p:nvSpPr>
-            <p:cNvPr id="6" name="Line 6">
-              <a:extLst>
-                <a:ext uri="{FF2B5EF4-FFF2-40B4-BE49-F238E27FC236}">
-                  <a16:creationId xmlns:a16="http://schemas.microsoft.com/office/drawing/2014/main" id="{38BEE0E9-8EE8-4DB9-9133-FB4919DBA155}"/>
-                </a:ext>
-              </a:extLst>
-            </p:cNvPr>
-            <p:cNvSpPr>
-              <a:spLocks noChangeShapeType="1"/>
-            </p:cNvSpPr>
-            <p:nvPr/>
-          </p:nvSpPr>
-          <p:spPr bwMode="auto">
-            <a:xfrm>
-              <a:off x="4038600" y="2819400"/>
-              <a:ext cx="1588" cy="1295400"/>
-            </a:xfrm>
-            <a:prstGeom prst="line">
-              <a:avLst/>
-            </a:prstGeom>
-            <a:noFill/>
-            <a:ln w="9525">
-              <a:solidFill>
-                <a:schemeClr val="tx1"/>
-              </a:solidFill>
-              <a:round/>
-              <a:headEnd/>
-              <a:tailEnd/>
-            </a:ln>
-            <a:effectLst/>
-          </p:spPr>
-          <p:txBody>
-            <a:bodyPr/>
-            <a:lstStyle/>
-            <a:p>
-              <a:endParaRPr lang="en-US"/>
-            </a:p>
-          </p:txBody>
-        </p:sp>
-        <p:sp>
-          <p:nvSpPr>
-            <p:cNvPr id="7" name="Line 7">
-              <a:extLst>
-                <a:ext uri="{FF2B5EF4-FFF2-40B4-BE49-F238E27FC236}">
-                  <a16:creationId xmlns:a16="http://schemas.microsoft.com/office/drawing/2014/main" id="{5CF7FA93-1FAC-4A80-9BFB-59AD12973687}"/>
-                </a:ext>
-              </a:extLst>
-            </p:cNvPr>
-            <p:cNvSpPr>
-              <a:spLocks noChangeShapeType="1"/>
-            </p:cNvSpPr>
-            <p:nvPr/>
-          </p:nvSpPr>
-          <p:spPr bwMode="auto">
-            <a:xfrm flipV="1">
-              <a:off x="4953000" y="2819400"/>
-              <a:ext cx="1588" cy="1295400"/>
-            </a:xfrm>
-            <a:prstGeom prst="line">
-              <a:avLst/>
-            </a:prstGeom>
-            <a:noFill/>
-            <a:ln w="9525">
-              <a:solidFill>
-                <a:schemeClr val="tx1"/>
-              </a:solidFill>
-              <a:round/>
-              <a:headEnd/>
-              <a:tailEnd/>
-            </a:ln>
-            <a:effectLst/>
-          </p:spPr>
-          <p:txBody>
-            <a:bodyPr/>
-            <a:lstStyle/>
-            <a:p>
-              <a:endParaRPr lang="en-US"/>
-            </a:p>
-          </p:txBody>
-        </p:sp>
-        <p:sp>
-          <p:nvSpPr>
-            <p:cNvPr id="14" name="Line 14">
-              <a:extLst>
-                <a:ext uri="{FF2B5EF4-FFF2-40B4-BE49-F238E27FC236}">
-                  <a16:creationId xmlns:a16="http://schemas.microsoft.com/office/drawing/2014/main" id="{0E04F28C-DA51-4763-B52F-6B3FEDEF4B48}"/>
-                </a:ext>
-              </a:extLst>
-            </p:cNvPr>
-            <p:cNvSpPr>
-              <a:spLocks noChangeShapeType="1"/>
-            </p:cNvSpPr>
-            <p:nvPr/>
-          </p:nvSpPr>
-          <p:spPr bwMode="auto">
-            <a:xfrm flipH="1">
-              <a:off x="6060556" y="4038600"/>
-              <a:ext cx="484196" cy="152399"/>
-            </a:xfrm>
-            <a:prstGeom prst="line">
-              <a:avLst/>
-            </a:prstGeom>
-            <a:noFill/>
-            <a:ln w="19050">
-              <a:solidFill>
-                <a:schemeClr val="tx1"/>
-              </a:solidFill>
-              <a:round/>
-              <a:headEnd/>
-              <a:tailEnd type="triangle" w="med" len="med"/>
-            </a:ln>
-            <a:effectLst/>
-          </p:spPr>
-          <p:txBody>
-            <a:bodyPr/>
-            <a:lstStyle/>
-            <a:p>
-              <a:endParaRPr lang="en-US"/>
-            </a:p>
-          </p:txBody>
-        </p:sp>
-        <p:sp>
-          <p:nvSpPr>
-            <p:cNvPr id="15" name="Text Box 15">
-              <a:extLst>
-                <a:ext uri="{FF2B5EF4-FFF2-40B4-BE49-F238E27FC236}">
-                  <a16:creationId xmlns:a16="http://schemas.microsoft.com/office/drawing/2014/main" id="{EB5F4CF1-5964-48AC-9408-64CD2575D84F}"/>
-                </a:ext>
-              </a:extLst>
-            </p:cNvPr>
-            <p:cNvSpPr txBox="1">
-              <a:spLocks noChangeArrowheads="1"/>
-            </p:cNvSpPr>
-            <p:nvPr/>
-          </p:nvSpPr>
-          <p:spPr bwMode="auto">
-            <a:xfrm>
-              <a:off x="6517055" y="3549551"/>
-              <a:ext cx="1147517" cy="923330"/>
-            </a:xfrm>
-            <a:prstGeom prst="rect">
-              <a:avLst/>
-            </a:prstGeom>
-            <a:noFill/>
-            <a:ln w="9525">
-              <a:noFill/>
-              <a:miter lim="800000"/>
-              <a:headEnd/>
-              <a:tailEnd/>
-            </a:ln>
-            <a:effectLst/>
-          </p:spPr>
-          <p:txBody>
-            <a:bodyPr wrap="square">
-              <a:spAutoFit/>
-            </a:bodyPr>
-            <a:lstStyle/>
-            <a:p>
-              <a:pPr eaLnBrk="1" hangingPunct="1"/>
-              <a:r>
-                <a:rPr lang="en-US" sz="1800" dirty="0">
-                  <a:latin typeface="Baskerville Old Face" pitchFamily="18" charset="0"/>
-                </a:rPr>
-                <a:t>Small diameter tubing</a:t>
-              </a:r>
-            </a:p>
-          </p:txBody>
-        </p:sp>
-        <p:sp>
-          <p:nvSpPr>
-            <p:cNvPr id="16" name="Freeform 17">
-              <a:extLst>
-                <a:ext uri="{FF2B5EF4-FFF2-40B4-BE49-F238E27FC236}">
-                  <a16:creationId xmlns:a16="http://schemas.microsoft.com/office/drawing/2014/main" id="{CBDAD897-3EBC-4A87-B9F2-6CCCA32C647E}"/>
-                </a:ext>
-              </a:extLst>
-            </p:cNvPr>
-            <p:cNvSpPr>
-              <a:spLocks/>
-            </p:cNvSpPr>
-            <p:nvPr/>
-          </p:nvSpPr>
-          <p:spPr bwMode="auto">
-            <a:xfrm>
-              <a:off x="4957763" y="4056063"/>
-              <a:ext cx="3233737" cy="1049337"/>
-            </a:xfrm>
-            <a:custGeom>
-              <a:avLst/>
-              <a:gdLst/>
-              <a:ahLst/>
-              <a:cxnLst>
-                <a:cxn ang="0">
-                  <a:pos x="0" y="0"/>
-                </a:cxn>
-                <a:cxn ang="0">
-                  <a:pos x="747" y="130"/>
-                </a:cxn>
-                <a:cxn ang="0">
-                  <a:pos x="909" y="593"/>
-                </a:cxn>
-                <a:cxn ang="0">
-                  <a:pos x="2037" y="536"/>
-                </a:cxn>
-              </a:cxnLst>
-              <a:rect l="0" t="0" r="r" b="b"/>
-              <a:pathLst>
-                <a:path w="2037" h="661">
-                  <a:moveTo>
-                    <a:pt x="0" y="0"/>
-                  </a:moveTo>
-                  <a:cubicBezTo>
-                    <a:pt x="298" y="15"/>
-                    <a:pt x="596" y="31"/>
-                    <a:pt x="747" y="130"/>
-                  </a:cubicBezTo>
-                  <a:cubicBezTo>
-                    <a:pt x="898" y="229"/>
-                    <a:pt x="694" y="525"/>
-                    <a:pt x="909" y="593"/>
-                  </a:cubicBezTo>
-                  <a:cubicBezTo>
-                    <a:pt x="1124" y="661"/>
-                    <a:pt x="1580" y="598"/>
-                    <a:pt x="2037" y="536"/>
-                  </a:cubicBezTo>
-                </a:path>
-              </a:pathLst>
-            </a:custGeom>
-            <a:noFill/>
-            <a:ln w="12700" cap="flat" cmpd="sng">
-              <a:solidFill>
-                <a:schemeClr val="tx1"/>
+                <a:srgbClr val="C00000"/>
               </a:solidFill>
               <a:prstDash val="solid"/>
               <a:round/>
@@ -29338,43 +29598,72 @@
             <a:effectLst/>
           </p:spPr>
           <p:txBody>
-            <a:bodyPr wrap="none" anchor="ctr">
+            <a:bodyPr vert="horz" wrap="square" lIns="91440" tIns="45720" rIns="91440" bIns="45720" numCol="1" rtlCol="0" anchor="ctr" anchorCtr="0" compatLnSpc="1">
+              <a:prstTxWarp prst="textNoShape">
+                <a:avLst/>
+              </a:prstTxWarp>
               <a:spAutoFit/>
             </a:bodyPr>
             <a:lstStyle/>
             <a:p>
-              <a:endParaRPr lang="en-US"/>
+              <a:pPr marL="0" marR="0" indent="0" algn="l" defTabSz="914400" rtl="0" eaLnBrk="1" fontAlgn="base" latinLnBrk="0" hangingPunct="1">
+                <a:lnSpc>
+                  <a:spcPct val="100000"/>
+                </a:lnSpc>
+                <a:spcBef>
+                  <a:spcPct val="0"/>
+                </a:spcBef>
+                <a:spcAft>
+                  <a:spcPct val="0"/>
+                </a:spcAft>
+                <a:buClrTx/>
+                <a:buSzTx/>
+                <a:buFontTx/>
+                <a:buNone/>
+                <a:tabLst/>
+              </a:pPr>
+              <a:endParaRPr kumimoji="0" lang="en-US" sz="1800" b="0" i="0" u="none" strike="noStrike" cap="none" normalizeH="0" baseline="0" dirty="0">
+                <a:ln>
+                  <a:noFill/>
+                </a:ln>
+                <a:solidFill>
+                  <a:schemeClr val="tx1"/>
+                </a:solidFill>
+                <a:effectLst/>
+                <a:latin typeface="Century Gothic" pitchFamily="34" charset="0"/>
+                <a:cs typeface="Arial" charset="0"/>
+              </a:endParaRPr>
             </a:p>
           </p:txBody>
         </p:sp>
         <p:sp>
           <p:nvSpPr>
-            <p:cNvPr id="17" name="Line 18">
+            <p:cNvPr id="38" name="Oval 37">
               <a:extLst>
                 <a:ext uri="{FF2B5EF4-FFF2-40B4-BE49-F238E27FC236}">
-                  <a16:creationId xmlns:a16="http://schemas.microsoft.com/office/drawing/2014/main" id="{378C8E85-6B15-440A-9B61-ECC9596EAF16}"/>
+                  <a16:creationId xmlns:a16="http://schemas.microsoft.com/office/drawing/2014/main" id="{792D880A-01CD-4E21-9F29-13D2A5B715DA}"/>
                 </a:ext>
               </a:extLst>
             </p:cNvPr>
-            <p:cNvSpPr>
-              <a:spLocks noChangeShapeType="1"/>
-            </p:cNvSpPr>
+            <p:cNvSpPr/>
             <p:nvPr/>
           </p:nvSpPr>
           <p:spPr bwMode="auto">
             <a:xfrm>
-              <a:off x="4997450" y="3425825"/>
-              <a:ext cx="3270250" cy="0"/>
+              <a:off x="8183059" y="4841568"/>
+              <a:ext cx="121264" cy="121264"/>
             </a:xfrm>
-            <a:prstGeom prst="line">
+            <a:prstGeom prst="ellipse">
               <a:avLst/>
             </a:prstGeom>
-            <a:noFill/>
-            <a:ln w="12700" cap="rnd">
+            <a:solidFill>
+              <a:srgbClr val="C00000"/>
+            </a:solidFill>
+            <a:ln w="12700" cap="flat" cmpd="sng" algn="ctr">
               <a:solidFill>
-                <a:schemeClr val="tx1"/>
+                <a:srgbClr val="C00000"/>
               </a:solidFill>
-              <a:prstDash val="sysDot"/>
+              <a:prstDash val="solid"/>
               <a:round/>
               <a:headEnd type="none" w="lg" len="med"/>
               <a:tailEnd type="none" w="lg" len="med"/>
@@ -29382,194 +29671,41 @@
             <a:effectLst/>
           </p:spPr>
           <p:txBody>
-            <a:bodyPr wrap="none" anchor="ctr">
+            <a:bodyPr vert="horz" wrap="square" lIns="91440" tIns="45720" rIns="91440" bIns="45720" numCol="1" rtlCol="0" anchor="ctr" anchorCtr="0" compatLnSpc="1">
+              <a:prstTxWarp prst="textNoShape">
+                <a:avLst/>
+              </a:prstTxWarp>
               <a:spAutoFit/>
             </a:bodyPr>
             <a:lstStyle/>
             <a:p>
-              <a:endParaRPr lang="en-US"/>
-            </a:p>
-          </p:txBody>
-        </p:sp>
-        <p:sp>
-          <p:nvSpPr>
-            <p:cNvPr id="18" name="Line 19">
-              <a:extLst>
-                <a:ext uri="{FF2B5EF4-FFF2-40B4-BE49-F238E27FC236}">
-                  <a16:creationId xmlns:a16="http://schemas.microsoft.com/office/drawing/2014/main" id="{31244288-099C-4BDC-86FF-F906B0F585C3}"/>
-                </a:ext>
-              </a:extLst>
-            </p:cNvPr>
-            <p:cNvSpPr>
-              <a:spLocks noChangeShapeType="1"/>
-            </p:cNvSpPr>
-            <p:nvPr/>
-          </p:nvSpPr>
-          <p:spPr bwMode="auto">
-            <a:xfrm>
-              <a:off x="8174038" y="3425825"/>
-              <a:ext cx="0" cy="1468438"/>
-            </a:xfrm>
-            <a:prstGeom prst="line">
-              <a:avLst/>
-            </a:prstGeom>
-            <a:noFill/>
-            <a:ln w="12700">
-              <a:solidFill>
-                <a:schemeClr val="tx1"/>
-              </a:solidFill>
-              <a:round/>
-              <a:headEnd type="triangle" w="lg" len="med"/>
-              <a:tailEnd type="triangle" w="lg" len="med"/>
-            </a:ln>
-            <a:effectLst/>
-          </p:spPr>
-          <p:txBody>
-            <a:bodyPr wrap="none" anchor="ctr">
-              <a:spAutoFit/>
-            </a:bodyPr>
-            <a:lstStyle/>
-            <a:p>
-              <a:endParaRPr lang="en-US"/>
-            </a:p>
-          </p:txBody>
-        </p:sp>
-        <p:sp>
-          <p:nvSpPr>
-            <p:cNvPr id="19" name="Text Box 20">
-              <a:extLst>
-                <a:ext uri="{FF2B5EF4-FFF2-40B4-BE49-F238E27FC236}">
-                  <a16:creationId xmlns:a16="http://schemas.microsoft.com/office/drawing/2014/main" id="{38DF3E15-E190-4F96-B8E2-F3CAB55F487A}"/>
-                </a:ext>
-              </a:extLst>
-            </p:cNvPr>
-            <p:cNvSpPr txBox="1">
-              <a:spLocks noChangeArrowheads="1"/>
-            </p:cNvSpPr>
-            <p:nvPr/>
-          </p:nvSpPr>
-          <p:spPr bwMode="auto">
-            <a:xfrm>
-              <a:off x="7918450" y="3783013"/>
-              <a:ext cx="497252" cy="523220"/>
-            </a:xfrm>
-            <a:prstGeom prst="rect">
-              <a:avLst/>
-            </a:prstGeom>
-            <a:solidFill>
-              <a:schemeClr val="bg1"/>
-            </a:solidFill>
-            <a:ln w="12700">
-              <a:noFill/>
-              <a:miter lim="800000"/>
-              <a:headEnd type="none" w="lg" len="med"/>
-              <a:tailEnd type="none" w="lg" len="med"/>
-            </a:ln>
-            <a:effectLst/>
-          </p:spPr>
-          <p:txBody>
-            <a:bodyPr wrap="none">
-              <a:spAutoFit/>
-            </a:bodyPr>
-            <a:lstStyle/>
-            <a:p>
-              <a:r>
-                <a:rPr lang="en-US" i="1" dirty="0" err="1"/>
-                <a:t>h</a:t>
-              </a:r>
-              <a:r>
-                <a:rPr lang="en-US" i="1" baseline="-25000" dirty="0" err="1"/>
-                <a:t>L</a:t>
-              </a:r>
-              <a:endParaRPr lang="en-US" i="1" dirty="0"/>
-            </a:p>
-          </p:txBody>
-        </p:sp>
-        <p:sp>
-          <p:nvSpPr>
-            <p:cNvPr id="24" name="Line 29">
-              <a:extLst>
-                <a:ext uri="{FF2B5EF4-FFF2-40B4-BE49-F238E27FC236}">
-                  <a16:creationId xmlns:a16="http://schemas.microsoft.com/office/drawing/2014/main" id="{DA16F25F-FDE7-4A2E-A8D2-2493CF8C51F4}"/>
-                </a:ext>
-              </a:extLst>
-            </p:cNvPr>
-            <p:cNvSpPr>
-              <a:spLocks noChangeShapeType="1"/>
-            </p:cNvSpPr>
-            <p:nvPr/>
-          </p:nvSpPr>
-          <p:spPr bwMode="auto">
-            <a:xfrm>
-              <a:off x="4038600" y="3416300"/>
-              <a:ext cx="914400" cy="0"/>
-            </a:xfrm>
-            <a:prstGeom prst="line">
-              <a:avLst/>
-            </a:prstGeom>
-            <a:noFill/>
-            <a:ln w="38100">
-              <a:solidFill>
-                <a:schemeClr val="folHlink"/>
-              </a:solidFill>
-              <a:prstDash val="sysDot"/>
-              <a:round/>
-              <a:headEnd type="none" w="lg" len="med"/>
-              <a:tailEnd type="none" w="lg" len="med"/>
-            </a:ln>
-            <a:effectLst/>
-          </p:spPr>
-          <p:txBody>
-            <a:bodyPr wrap="none" anchor="ctr">
-              <a:spAutoFit/>
-            </a:bodyPr>
-            <a:lstStyle/>
-            <a:p>
-              <a:endParaRPr lang="en-US"/>
-            </a:p>
-          </p:txBody>
-        </p:sp>
-        <p:sp>
-          <p:nvSpPr>
-            <p:cNvPr id="25" name="Line 30">
-              <a:extLst>
-                <a:ext uri="{FF2B5EF4-FFF2-40B4-BE49-F238E27FC236}">
-                  <a16:creationId xmlns:a16="http://schemas.microsoft.com/office/drawing/2014/main" id="{EE0FDFB7-B779-40E1-9519-B5675E239AE3}"/>
-                </a:ext>
-              </a:extLst>
-            </p:cNvPr>
-            <p:cNvSpPr>
-              <a:spLocks noChangeShapeType="1"/>
-            </p:cNvSpPr>
-            <p:nvPr/>
-          </p:nvSpPr>
-          <p:spPr bwMode="auto">
-            <a:xfrm>
-              <a:off x="8229600" y="4902200"/>
-              <a:ext cx="914400" cy="0"/>
-            </a:xfrm>
-            <a:prstGeom prst="line">
-              <a:avLst/>
-            </a:prstGeom>
-            <a:noFill/>
-            <a:ln w="38100">
-              <a:solidFill>
-                <a:schemeClr val="folHlink"/>
-              </a:solidFill>
-              <a:prstDash val="sysDot"/>
-              <a:round/>
-              <a:headEnd type="none" w="lg" len="med"/>
-              <a:tailEnd type="none" w="lg" len="med"/>
-            </a:ln>
-            <a:effectLst/>
-          </p:spPr>
-          <p:txBody>
-            <a:bodyPr wrap="none" anchor="ctr">
-              <a:spAutoFit/>
-            </a:bodyPr>
-            <a:lstStyle/>
-            <a:p>
-              <a:endParaRPr lang="en-US"/>
+              <a:pPr marL="0" marR="0" indent="0" algn="l" defTabSz="914400" rtl="0" eaLnBrk="1" fontAlgn="base" latinLnBrk="0" hangingPunct="1">
+                <a:lnSpc>
+                  <a:spcPct val="100000"/>
+                </a:lnSpc>
+                <a:spcBef>
+                  <a:spcPct val="0"/>
+                </a:spcBef>
+                <a:spcAft>
+                  <a:spcPct val="0"/>
+                </a:spcAft>
+                <a:buClrTx/>
+                <a:buSzTx/>
+                <a:buFontTx/>
+                <a:buNone/>
+                <a:tabLst/>
+              </a:pPr>
+              <a:endParaRPr kumimoji="0" lang="en-US" sz="1800" b="0" i="0" u="none" strike="noStrike" cap="none" normalizeH="0" baseline="0" dirty="0">
+                <a:ln>
+                  <a:noFill/>
+                </a:ln>
+                <a:solidFill>
+                  <a:schemeClr val="tx1"/>
+                </a:solidFill>
+                <a:effectLst/>
+                <a:latin typeface="Century Gothic" pitchFamily="34" charset="0"/>
+                <a:cs typeface="Arial" charset="0"/>
+              </a:endParaRPr>
             </a:p>
           </p:txBody>
         </p:sp>
@@ -43445,11 +43581,11 @@
 <file path=ppt/tags/tag1.xml><?xml version="1.0" encoding="utf-8"?>
 <p:tagLst xmlns:a="http://schemas.openxmlformats.org/drawingml/2006/main" xmlns:r="http://schemas.openxmlformats.org/officeDocument/2006/relationships" xmlns:p="http://schemas.openxmlformats.org/presentationml/2006/main">
   <p:tag name="OUTPUTDPI" val="1200"/>
-  <p:tag name="ORIGINALHEIGHT" val="122.9846"/>
-  <p:tag name="ORIGINALWIDTH" val="118.4852"/>
-  <p:tag name="LATEXADDIN" val="\documentclass{article}&#10;\usepackage{amsmath}&#10;\usepackage{xcolor}&#10;\pagestyle{empty}&#10;\begin{document}&#10;&#10;\definecolor{Monred}{RGB}{172,0,0}&#10;&#10;&#10;$$h_f$$&#10;&#10;\end{document}"/>
+  <p:tag name="ORIGINALHEIGHT" val="104.9868"/>
+  <p:tag name="ORIGINALWIDTH" val="128.2339"/>
+  <p:tag name="LATEXADDIN" val="\documentclass{article}&#10;\usepackage{amsmath}&#10;\usepackage{xcolor}&#10;\pagestyle{empty}&#10;\begin{document}&#10;&#10;\definecolor{Monred}{RGB}{172,0,0}&#10;&#10;$$h_L$$&#10;&#10;&#10;\end{document}"/>
   <p:tag name="IGUANATEXSIZE" val="20"/>
-  <p:tag name="IGUANATEXCURSOR" val="145"/>
+  <p:tag name="IGUANATEXCURSOR" val="144"/>
   <p:tag name="TRANSPARENCY" val="True"/>
   <p:tag name="FILENAME" val=""/>
   <p:tag name="LATEXENGINEID" val="0"/>
@@ -43462,6 +43598,25 @@
 </file>
 
 <file path=ppt/tags/tag10.xml><?xml version="1.0" encoding="utf-8"?>
+<p:tagLst xmlns:a="http://schemas.openxmlformats.org/drawingml/2006/main" xmlns:r="http://schemas.openxmlformats.org/officeDocument/2006/relationships" xmlns:p="http://schemas.openxmlformats.org/presentationml/2006/main">
+  <p:tag name="OUTPUTDPI" val="1200"/>
+  <p:tag name="ORIGINALHEIGHT" val="104.237"/>
+  <p:tag name="ORIGINALWIDTH" val="347.9565"/>
+  <p:tag name="LATEXADDIN" val="\documentclass{article}&#10;\usepackage{amsmath}&#10;\usepackage{xcolor}&#10;\pagestyle{empty}&#10;\begin{document}&#10;&#10;\definecolor{Monred}{RGB}{172,0,0}&#10;&#10;&#10;$$W_{Tank}$$&#10;&#10;\end{document}"/>
+  <p:tag name="IGUANATEXSIZE" val="20"/>
+  <p:tag name="IGUANATEXCURSOR" val="141"/>
+  <p:tag name="TRANSPARENCY" val="True"/>
+  <p:tag name="FILENAME" val=""/>
+  <p:tag name="LATEXENGINEID" val="0"/>
+  <p:tag name="TEMPFOLDER" val="c:\temp\"/>
+  <p:tag name="LATEXFORMHEIGHT" val="312"/>
+  <p:tag name="LATEXFORMWIDTH" val="384"/>
+  <p:tag name="LATEXFORMWRAP" val="True"/>
+  <p:tag name="BITMAPVECTOR" val="0"/>
+</p:tagLst>
+</file>
+
+<file path=ppt/tags/tag11.xml><?xml version="1.0" encoding="utf-8"?>
 <p:tagLst xmlns:a="http://schemas.openxmlformats.org/drawingml/2006/main" xmlns:r="http://schemas.openxmlformats.org/officeDocument/2006/relationships" xmlns:p="http://schemas.openxmlformats.org/presentationml/2006/main">
   <p:tag name="OUTPUTDPI" val="1200"/>
   <p:tag name="ORIGINALHEIGHT" val="336.7079"/>
@@ -43480,7 +43635,7 @@
 </p:tagLst>
 </file>
 
-<file path=ppt/tags/tag11.xml><?xml version="1.0" encoding="utf-8"?>
+<file path=ppt/tags/tag12.xml><?xml version="1.0" encoding="utf-8"?>
 <p:tagLst xmlns:a="http://schemas.openxmlformats.org/drawingml/2006/main" xmlns:r="http://schemas.openxmlformats.org/officeDocument/2006/relationships" xmlns:p="http://schemas.openxmlformats.org/presentationml/2006/main">
   <p:tag name="OUTPUTDPI" val="1200"/>
   <p:tag name="ORIGINALHEIGHT" val="90.73866"/>
@@ -43499,14 +43654,14 @@
 </p:tagLst>
 </file>
 
-<file path=ppt/tags/tag12.xml><?xml version="1.0" encoding="utf-8"?>
+<file path=ppt/tags/tag13.xml><?xml version="1.0" encoding="utf-8"?>
 <p:tagLst xmlns:a="http://schemas.openxmlformats.org/drawingml/2006/main" xmlns:r="http://schemas.openxmlformats.org/officeDocument/2006/relationships" xmlns:p="http://schemas.openxmlformats.org/presentationml/2006/main">
   <p:tag name="SELECTIONNAME" val="Group 5"/>
   <p:tag name="LAYER" val="2"/>
 </p:tagLst>
 </file>
 
-<file path=ppt/tags/tag13.xml><?xml version="1.0" encoding="utf-8"?>
+<file path=ppt/tags/tag14.xml><?xml version="1.0" encoding="utf-8"?>
 <p:tagLst xmlns:a="http://schemas.openxmlformats.org/drawingml/2006/main" xmlns:r="http://schemas.openxmlformats.org/officeDocument/2006/relationships" xmlns:p="http://schemas.openxmlformats.org/presentationml/2006/main">
   <p:tag name="OUTPUTDPI" val="1200"/>
   <p:tag name="ORIGINALHEIGHT" val="90.73866"/>
@@ -43525,7 +43680,7 @@
 </p:tagLst>
 </file>
 
-<file path=ppt/tags/tag14.xml><?xml version="1.0" encoding="utf-8"?>
+<file path=ppt/tags/tag15.xml><?xml version="1.0" encoding="utf-8"?>
 <p:tagLst xmlns:a="http://schemas.openxmlformats.org/drawingml/2006/main" xmlns:r="http://schemas.openxmlformats.org/officeDocument/2006/relationships" xmlns:p="http://schemas.openxmlformats.org/presentationml/2006/main">
   <p:tag name="OUTPUTDPI" val="1200"/>
   <p:tag name="ORIGINALHEIGHT" val="299.2126"/>
@@ -43544,7 +43699,7 @@
 </p:tagLst>
 </file>
 
-<file path=ppt/tags/tag15.xml><?xml version="1.0" encoding="utf-8"?>
+<file path=ppt/tags/tag16.xml><?xml version="1.0" encoding="utf-8"?>
 <p:tagLst xmlns:a="http://schemas.openxmlformats.org/drawingml/2006/main" xmlns:r="http://schemas.openxmlformats.org/officeDocument/2006/relationships" xmlns:p="http://schemas.openxmlformats.org/presentationml/2006/main">
   <p:tag name="OUTPUTDPI" val="1200"/>
   <p:tag name="ORIGINALHEIGHT" val="299.2126"/>
@@ -43563,7 +43718,7 @@
 </p:tagLst>
 </file>
 
-<file path=ppt/tags/tag16.xml><?xml version="1.0" encoding="utf-8"?>
+<file path=ppt/tags/tag17.xml><?xml version="1.0" encoding="utf-8"?>
 <p:tagLst xmlns:a="http://schemas.openxmlformats.org/drawingml/2006/main" xmlns:r="http://schemas.openxmlformats.org/officeDocument/2006/relationships" xmlns:p="http://schemas.openxmlformats.org/presentationml/2006/main">
   <p:tag name="OUTPUTDPI" val="1200"/>
   <p:tag name="ORIGINALHEIGHT" val="299.2126"/>
@@ -43582,7 +43737,7 @@
 </p:tagLst>
 </file>
 
-<file path=ppt/tags/tag17.xml><?xml version="1.0" encoding="utf-8"?>
+<file path=ppt/tags/tag18.xml><?xml version="1.0" encoding="utf-8"?>
 <p:tagLst xmlns:a="http://schemas.openxmlformats.org/drawingml/2006/main" xmlns:r="http://schemas.openxmlformats.org/officeDocument/2006/relationships" xmlns:p="http://schemas.openxmlformats.org/presentationml/2006/main">
   <p:tag name="OUTPUTDPI" val="1200"/>
   <p:tag name="ORIGINALHEIGHT" val="299.2126"/>
@@ -43601,7 +43756,7 @@
 </p:tagLst>
 </file>
 
-<file path=ppt/tags/tag18.xml><?xml version="1.0" encoding="utf-8"?>
+<file path=ppt/tags/tag19.xml><?xml version="1.0" encoding="utf-8"?>
 <p:tagLst xmlns:a="http://schemas.openxmlformats.org/drawingml/2006/main" xmlns:r="http://schemas.openxmlformats.org/officeDocument/2006/relationships" xmlns:p="http://schemas.openxmlformats.org/presentationml/2006/main">
   <p:tag name="OUTPUTDPI" val="1200"/>
   <p:tag name="ORIGINALHEIGHT" val="299.2126"/>
@@ -43620,7 +43775,26 @@
 </p:tagLst>
 </file>
 
-<file path=ppt/tags/tag19.xml><?xml version="1.0" encoding="utf-8"?>
+<file path=ppt/tags/tag2.xml><?xml version="1.0" encoding="utf-8"?>
+<p:tagLst xmlns:a="http://schemas.openxmlformats.org/drawingml/2006/main" xmlns:r="http://schemas.openxmlformats.org/officeDocument/2006/relationships" xmlns:p="http://schemas.openxmlformats.org/presentationml/2006/main">
+  <p:tag name="OUTPUTDPI" val="1200"/>
+  <p:tag name="ORIGINALHEIGHT" val="122.9846"/>
+  <p:tag name="ORIGINALWIDTH" val="118.4852"/>
+  <p:tag name="LATEXADDIN" val="\documentclass{article}&#10;\usepackage{amsmath}&#10;\usepackage{xcolor}&#10;\pagestyle{empty}&#10;\begin{document}&#10;&#10;\definecolor{Monred}{RGB}{172,0,0}&#10;&#10;&#10;$$h_f$$&#10;&#10;\end{document}"/>
+  <p:tag name="IGUANATEXSIZE" val="20"/>
+  <p:tag name="IGUANATEXCURSOR" val="145"/>
+  <p:tag name="TRANSPARENCY" val="True"/>
+  <p:tag name="FILENAME" val=""/>
+  <p:tag name="LATEXENGINEID" val="0"/>
+  <p:tag name="TEMPFOLDER" val="c:\temp\"/>
+  <p:tag name="LATEXFORMHEIGHT" val="312"/>
+  <p:tag name="LATEXFORMWIDTH" val="384"/>
+  <p:tag name="LATEXFORMWRAP" val="True"/>
+  <p:tag name="BITMAPVECTOR" val="0"/>
+</p:tagLst>
+</file>
+
+<file path=ppt/tags/tag20.xml><?xml version="1.0" encoding="utf-8"?>
 <p:tagLst xmlns:a="http://schemas.openxmlformats.org/drawingml/2006/main" xmlns:r="http://schemas.openxmlformats.org/officeDocument/2006/relationships" xmlns:p="http://schemas.openxmlformats.org/presentationml/2006/main">
   <p:tag name="OUTPUTDPI" val="1200"/>
   <p:tag name="ORIGINALHEIGHT" val="125.9843"/>
@@ -43639,26 +43813,7 @@
 </p:tagLst>
 </file>
 
-<file path=ppt/tags/tag2.xml><?xml version="1.0" encoding="utf-8"?>
-<p:tagLst xmlns:a="http://schemas.openxmlformats.org/drawingml/2006/main" xmlns:r="http://schemas.openxmlformats.org/officeDocument/2006/relationships" xmlns:p="http://schemas.openxmlformats.org/presentationml/2006/main">
-  <p:tag name="OUTPUTDPI" val="1200"/>
-  <p:tag name="ORIGINALHEIGHT" val="90.73866"/>
-  <p:tag name="ORIGINALWIDTH" val="166.4792"/>
-  <p:tag name="LATEXADDIN" val="\documentclass{article}&#10;\usepackage{amsmath}&#10;\usepackage{xcolor}&#10;\pagestyle{empty}&#10;\begin{document}&#10;&#10;\definecolor{Monred}{RGB}{172,0,0}&#10;&#10;&#10;$$\Delta h$$&#10;&#10;\end{document}"/>
-  <p:tag name="IGUANATEXSIZE" val="20"/>
-  <p:tag name="IGUANATEXCURSOR" val="150"/>
-  <p:tag name="TRANSPARENCY" val="True"/>
-  <p:tag name="FILENAME" val=""/>
-  <p:tag name="LATEXENGINEID" val="0"/>
-  <p:tag name="TEMPFOLDER" val="c:\temp\"/>
-  <p:tag name="LATEXFORMHEIGHT" val="312"/>
-  <p:tag name="LATEXFORMWIDTH" val="384"/>
-  <p:tag name="LATEXFORMWRAP" val="True"/>
-  <p:tag name="BITMAPVECTOR" val="0"/>
-</p:tagLst>
-</file>
-
-<file path=ppt/tags/tag20.xml><?xml version="1.0" encoding="utf-8"?>
+<file path=ppt/tags/tag21.xml><?xml version="1.0" encoding="utf-8"?>
 <p:tagLst xmlns:a="http://schemas.openxmlformats.org/drawingml/2006/main" xmlns:r="http://schemas.openxmlformats.org/officeDocument/2006/relationships" xmlns:p="http://schemas.openxmlformats.org/presentationml/2006/main">
   <p:tag name="OUTPUTDPI" val="1200"/>
   <p:tag name="ORIGINALHEIGHT" val="107.9865"/>
@@ -43677,7 +43832,7 @@
 </p:tagLst>
 </file>
 
-<file path=ppt/tags/tag21.xml><?xml version="1.0" encoding="utf-8"?>
+<file path=ppt/tags/tag22.xml><?xml version="1.0" encoding="utf-8"?>
 <p:tagLst xmlns:a="http://schemas.openxmlformats.org/drawingml/2006/main" xmlns:r="http://schemas.openxmlformats.org/officeDocument/2006/relationships" xmlns:p="http://schemas.openxmlformats.org/presentationml/2006/main">
   <p:tag name="OUTPUTDPI" val="1200"/>
   <p:tag name="ORIGINALHEIGHT" val="275.9655"/>
@@ -43696,7 +43851,7 @@
 </p:tagLst>
 </file>
 
-<file path=ppt/tags/tag22.xml><?xml version="1.0" encoding="utf-8"?>
+<file path=ppt/tags/tag23.xml><?xml version="1.0" encoding="utf-8"?>
 <p:tagLst xmlns:a="http://schemas.openxmlformats.org/drawingml/2006/main" xmlns:r="http://schemas.openxmlformats.org/officeDocument/2006/relationships" xmlns:p="http://schemas.openxmlformats.org/presentationml/2006/main">
   <p:tag name="OUTPUTDPI" val="1200"/>
   <p:tag name="ORIGINALHEIGHT" val="275.9655"/>
@@ -43715,7 +43870,7 @@
 </p:tagLst>
 </file>
 
-<file path=ppt/tags/tag23.xml><?xml version="1.0" encoding="utf-8"?>
+<file path=ppt/tags/tag24.xml><?xml version="1.0" encoding="utf-8"?>
 <p:tagLst xmlns:a="http://schemas.openxmlformats.org/drawingml/2006/main" xmlns:r="http://schemas.openxmlformats.org/officeDocument/2006/relationships" xmlns:p="http://schemas.openxmlformats.org/presentationml/2006/main">
   <p:tag name="OUTPUTDPI" val="1200"/>
   <p:tag name="ORIGINALHEIGHT" val="260.2175"/>
@@ -43734,7 +43889,7 @@
 </p:tagLst>
 </file>
 
-<file path=ppt/tags/tag24.xml><?xml version="1.0" encoding="utf-8"?>
+<file path=ppt/tags/tag25.xml><?xml version="1.0" encoding="utf-8"?>
 <p:tagLst xmlns:a="http://schemas.openxmlformats.org/drawingml/2006/main" xmlns:r="http://schemas.openxmlformats.org/officeDocument/2006/relationships" xmlns:p="http://schemas.openxmlformats.org/presentationml/2006/main">
   <p:tag name="OUTPUTDPI" val="1200"/>
   <p:tag name="ORIGINALHEIGHT" val="105.7368"/>
@@ -43753,7 +43908,7 @@
 </p:tagLst>
 </file>
 
-<file path=ppt/tags/tag25.xml><?xml version="1.0" encoding="utf-8"?>
+<file path=ppt/tags/tag26.xml><?xml version="1.0" encoding="utf-8"?>
 <p:tagLst xmlns:a="http://schemas.openxmlformats.org/drawingml/2006/main" xmlns:r="http://schemas.openxmlformats.org/officeDocument/2006/relationships" xmlns:p="http://schemas.openxmlformats.org/presentationml/2006/main">
   <p:tag name="OUTPUTDPI" val="1200"/>
   <p:tag name="ORIGINALHEIGHT" val="113.2358"/>
@@ -43772,7 +43927,7 @@
 </p:tagLst>
 </file>
 
-<file path=ppt/tags/tag26.xml><?xml version="1.0" encoding="utf-8"?>
+<file path=ppt/tags/tag27.xml><?xml version="1.0" encoding="utf-8"?>
 <p:tagLst xmlns:a="http://schemas.openxmlformats.org/drawingml/2006/main" xmlns:r="http://schemas.openxmlformats.org/officeDocument/2006/relationships" xmlns:p="http://schemas.openxmlformats.org/presentationml/2006/main">
   <p:tag name="OUTPUTDPI" val="1200"/>
   <p:tag name="ORIGINALHEIGHT" val="106.4867"/>
@@ -43791,7 +43946,7 @@
 </p:tagLst>
 </file>
 
-<file path=ppt/tags/tag27.xml><?xml version="1.0" encoding="utf-8"?>
+<file path=ppt/tags/tag28.xml><?xml version="1.0" encoding="utf-8"?>
 <p:tagLst xmlns:a="http://schemas.openxmlformats.org/drawingml/2006/main" xmlns:r="http://schemas.openxmlformats.org/officeDocument/2006/relationships" xmlns:p="http://schemas.openxmlformats.org/presentationml/2006/main">
   <p:tag name="OUTPUTDPI" val="1200"/>
   <p:tag name="ORIGINALHEIGHT" val="260.2175"/>
@@ -43810,7 +43965,7 @@
 </p:tagLst>
 </file>
 
-<file path=ppt/tags/tag28.xml><?xml version="1.0" encoding="utf-8"?>
+<file path=ppt/tags/tag29.xml><?xml version="1.0" encoding="utf-8"?>
 <p:tagLst xmlns:a="http://schemas.openxmlformats.org/drawingml/2006/main" xmlns:r="http://schemas.openxmlformats.org/officeDocument/2006/relationships" xmlns:p="http://schemas.openxmlformats.org/presentationml/2006/main">
   <p:tag name="OUTPUTDPI" val="1200"/>
   <p:tag name="ORIGINALHEIGHT" val="105.7368"/>
@@ -43818,25 +43973,6 @@
   <p:tag name="LATEXADDIN" val="\documentclass{article}&#10;\usepackage{amsmath}&#10;\usepackage{xcolor}&#10;\pagestyle{empty}&#10;\begin{document}&#10;&#10;\definecolor{Monred}{RGB}{172,0,0}&#10;&#10;$$h_{Tank}$$&#10;&#10;&#10;\end{document}"/>
   <p:tag name="IGUANATEXSIZE" val="20"/>
   <p:tag name="IGUANATEXCURSOR" val="147"/>
-  <p:tag name="TRANSPARENCY" val="True"/>
-  <p:tag name="FILENAME" val=""/>
-  <p:tag name="LATEXENGINEID" val="0"/>
-  <p:tag name="TEMPFOLDER" val="c:\temp\"/>
-  <p:tag name="LATEXFORMHEIGHT" val="312"/>
-  <p:tag name="LATEXFORMWIDTH" val="384"/>
-  <p:tag name="LATEXFORMWRAP" val="True"/>
-  <p:tag name="BITMAPVECTOR" val="0"/>
-</p:tagLst>
-</file>
-
-<file path=ppt/tags/tag29.xml><?xml version="1.0" encoding="utf-8"?>
-<p:tagLst xmlns:a="http://schemas.openxmlformats.org/drawingml/2006/main" xmlns:r="http://schemas.openxmlformats.org/officeDocument/2006/relationships" xmlns:p="http://schemas.openxmlformats.org/presentationml/2006/main">
-  <p:tag name="OUTPUTDPI" val="1200"/>
-  <p:tag name="ORIGINALHEIGHT" val="113.2358"/>
-  <p:tag name="ORIGINALWIDTH" val="3247.094"/>
-  <p:tag name="LATEXADDIN" val="\documentclass{article}&#10;\usepackage{amsmath}&#10;\usepackage{xcolor}&#10;\pagestyle{empty}&#10;\begin{document}&#10;&#10;\definecolor{Monred}{RGB}{172,0,0}&#10;&#10;$Q_0$ = Initial flow rate of hypochlorite solution at time $t = 0$&#10;&#10;&#10;\end{document}"/>
-  <p:tag name="IGUANATEXSIZE" val="20"/>
-  <p:tag name="IGUANATEXCURSOR" val="203"/>
   <p:tag name="TRANSPARENCY" val="True"/>
   <p:tag name="FILENAME" val=""/>
   <p:tag name="LATEXENGINEID" val="0"/>
@@ -43868,6 +44004,25 @@
 </file>
 
 <file path=ppt/tags/tag30.xml><?xml version="1.0" encoding="utf-8"?>
+<p:tagLst xmlns:a="http://schemas.openxmlformats.org/drawingml/2006/main" xmlns:r="http://schemas.openxmlformats.org/officeDocument/2006/relationships" xmlns:p="http://schemas.openxmlformats.org/presentationml/2006/main">
+  <p:tag name="OUTPUTDPI" val="1200"/>
+  <p:tag name="ORIGINALHEIGHT" val="113.2358"/>
+  <p:tag name="ORIGINALWIDTH" val="3247.094"/>
+  <p:tag name="LATEXADDIN" val="\documentclass{article}&#10;\usepackage{amsmath}&#10;\usepackage{xcolor}&#10;\pagestyle{empty}&#10;\begin{document}&#10;&#10;\definecolor{Monred}{RGB}{172,0,0}&#10;&#10;$Q_0$ = Initial flow rate of hypochlorite solution at time $t = 0$&#10;&#10;&#10;\end{document}"/>
+  <p:tag name="IGUANATEXSIZE" val="20"/>
+  <p:tag name="IGUANATEXCURSOR" val="203"/>
+  <p:tag name="TRANSPARENCY" val="True"/>
+  <p:tag name="FILENAME" val=""/>
+  <p:tag name="LATEXENGINEID" val="0"/>
+  <p:tag name="TEMPFOLDER" val="c:\temp\"/>
+  <p:tag name="LATEXFORMHEIGHT" val="312"/>
+  <p:tag name="LATEXFORMWIDTH" val="384"/>
+  <p:tag name="LATEXFORMWRAP" val="True"/>
+  <p:tag name="BITMAPVECTOR" val="0"/>
+</p:tagLst>
+</file>
+
+<file path=ppt/tags/tag31.xml><?xml version="1.0" encoding="utf-8"?>
 <p:tagLst xmlns:a="http://schemas.openxmlformats.org/drawingml/2006/main" xmlns:r="http://schemas.openxmlformats.org/officeDocument/2006/relationships" xmlns:p="http://schemas.openxmlformats.org/presentationml/2006/main">
   <p:tag name="OUTPUTDPI" val="1200"/>
   <p:tag name="ORIGINALHEIGHT" val="106.4867"/>
@@ -43908,6 +44063,25 @@
 <file path=ppt/tags/tag5.xml><?xml version="1.0" encoding="utf-8"?>
 <p:tagLst xmlns:a="http://schemas.openxmlformats.org/drawingml/2006/main" xmlns:r="http://schemas.openxmlformats.org/officeDocument/2006/relationships" xmlns:p="http://schemas.openxmlformats.org/presentationml/2006/main">
   <p:tag name="OUTPUTDPI" val="1200"/>
+  <p:tag name="ORIGINALHEIGHT" val="90.73866"/>
+  <p:tag name="ORIGINALWIDTH" val="166.4792"/>
+  <p:tag name="LATEXADDIN" val="\documentclass{article}&#10;\usepackage{amsmath}&#10;\usepackage{xcolor}&#10;\pagestyle{empty}&#10;\begin{document}&#10;&#10;\definecolor{Monred}{RGB}{172,0,0}&#10;&#10;&#10;$$\Delta h$$&#10;&#10;\end{document}"/>
+  <p:tag name="IGUANATEXSIZE" val="20"/>
+  <p:tag name="IGUANATEXCURSOR" val="150"/>
+  <p:tag name="TRANSPARENCY" val="True"/>
+  <p:tag name="FILENAME" val=""/>
+  <p:tag name="LATEXENGINEID" val="0"/>
+  <p:tag name="TEMPFOLDER" val="c:\temp\"/>
+  <p:tag name="LATEXFORMHEIGHT" val="312"/>
+  <p:tag name="LATEXFORMWIDTH" val="384"/>
+  <p:tag name="LATEXFORMWRAP" val="True"/>
+  <p:tag name="BITMAPVECTOR" val="0"/>
+</p:tagLst>
+</file>
+
+<file path=ppt/tags/tag6.xml><?xml version="1.0" encoding="utf-8"?>
+<p:tagLst xmlns:a="http://schemas.openxmlformats.org/drawingml/2006/main" xmlns:r="http://schemas.openxmlformats.org/officeDocument/2006/relationships" xmlns:p="http://schemas.openxmlformats.org/presentationml/2006/main">
+  <p:tag name="OUTPUTDPI" val="1200"/>
   <p:tag name="ORIGINALHEIGHT" val="121.4848"/>
   <p:tag name="ORIGINALWIDTH" val="413.1983"/>
   <p:tag name="LATEXADDIN" val="\documentclass{article}&#10;\usepackage{amsmath}&#10;\usepackage{xcolor}&#10;\pagestyle{empty}&#10;\begin{document}&#10;&#10;\definecolor{Monred}{RGB}{172,0,0}&#10;&#10;&#10;$$D_{orifice}$$&#10;&#10;\end{document}"/>
@@ -43924,7 +44098,7 @@
 </p:tagLst>
 </file>
 
-<file path=ppt/tags/tag6.xml><?xml version="1.0" encoding="utf-8"?>
+<file path=ppt/tags/tag7.xml><?xml version="1.0" encoding="utf-8"?>
 <p:tagLst xmlns:a="http://schemas.openxmlformats.org/drawingml/2006/main" xmlns:r="http://schemas.openxmlformats.org/officeDocument/2006/relationships" xmlns:p="http://schemas.openxmlformats.org/presentationml/2006/main">
   <p:tag name="OUTPUTDPI" val="1200"/>
   <p:tag name="ORIGINALHEIGHT" val="104.237"/>
@@ -43943,7 +44117,7 @@
 </p:tagLst>
 </file>
 
-<file path=ppt/tags/tag7.xml><?xml version="1.0" encoding="utf-8"?>
+<file path=ppt/tags/tag8.xml><?xml version="1.0" encoding="utf-8"?>
 <p:tagLst xmlns:a="http://schemas.openxmlformats.org/drawingml/2006/main" xmlns:r="http://schemas.openxmlformats.org/officeDocument/2006/relationships" xmlns:p="http://schemas.openxmlformats.org/presentationml/2006/main">
   <p:tag name="OUTPUTDPI" val="1200"/>
   <p:tag name="ORIGINALHEIGHT" val="120.7349"/>
@@ -43962,7 +44136,7 @@
 </p:tagLst>
 </file>
 
-<file path=ppt/tags/tag8.xml><?xml version="1.0" encoding="utf-8"?>
+<file path=ppt/tags/tag9.xml><?xml version="1.0" encoding="utf-8"?>
 <p:tagLst xmlns:a="http://schemas.openxmlformats.org/drawingml/2006/main" xmlns:r="http://schemas.openxmlformats.org/officeDocument/2006/relationships" xmlns:p="http://schemas.openxmlformats.org/presentationml/2006/main">
   <p:tag name="OUTPUTDPI" val="1200"/>
   <p:tag name="ORIGINALHEIGHT" val="103.4871"/>
@@ -43970,25 +44144,6 @@
   <p:tag name="LATEXADDIN" val="\documentclass{article}&#10;\usepackage{amsmath}&#10;\usepackage{xcolor}&#10;\pagestyle{empty}&#10;\begin{document}&#10;&#10;\definecolor{Monred}{RGB}{172,0,0}&#10;&#10;&#10;$$H_{Tank}$$&#10;&#10;\end{document}"/>
   <p:tag name="IGUANATEXSIZE" val="20"/>
   <p:tag name="IGUANATEXCURSOR" val="147"/>
-  <p:tag name="TRANSPARENCY" val="True"/>
-  <p:tag name="FILENAME" val=""/>
-  <p:tag name="LATEXENGINEID" val="0"/>
-  <p:tag name="TEMPFOLDER" val="c:\temp\"/>
-  <p:tag name="LATEXFORMHEIGHT" val="312"/>
-  <p:tag name="LATEXFORMWIDTH" val="384"/>
-  <p:tag name="LATEXFORMWRAP" val="True"/>
-  <p:tag name="BITMAPVECTOR" val="0"/>
-</p:tagLst>
-</file>
-
-<file path=ppt/tags/tag9.xml><?xml version="1.0" encoding="utf-8"?>
-<p:tagLst xmlns:a="http://schemas.openxmlformats.org/drawingml/2006/main" xmlns:r="http://schemas.openxmlformats.org/officeDocument/2006/relationships" xmlns:p="http://schemas.openxmlformats.org/presentationml/2006/main">
-  <p:tag name="OUTPUTDPI" val="1200"/>
-  <p:tag name="ORIGINALHEIGHT" val="104.237"/>
-  <p:tag name="ORIGINALWIDTH" val="347.9565"/>
-  <p:tag name="LATEXADDIN" val="\documentclass{article}&#10;\usepackage{amsmath}&#10;\usepackage{xcolor}&#10;\pagestyle{empty}&#10;\begin{document}&#10;&#10;\definecolor{Monred}{RGB}{172,0,0}&#10;&#10;&#10;$$W_{Tank}$$&#10;&#10;\end{document}"/>
-  <p:tag name="IGUANATEXSIZE" val="20"/>
-  <p:tag name="IGUANATEXCURSOR" val="141"/>
   <p:tag name="TRANSPARENCY" val="True"/>
   <p:tag name="FILENAME" val=""/>
   <p:tag name="LATEXENGINEID" val="0"/>

</xml_diff>

<commit_message>
FONT TEXT COLOR TEST OMG
</commit_message>
<xml_diff>
--- a/Summary Sheets/Diagrams.pptx
+++ b/Summary Sheets/Diagrams.pptx
@@ -287,7 +287,7 @@
           <a:p>
             <a:fld id="{21D1E3DE-262E-49AD-8F92-4417FBCF3DA3}" type="datetimeFigureOut">
               <a:rPr lang="en-US" smtClean="0"/>
-              <a:t>4/30/2018</a:t>
+              <a:t>5/1/2018</a:t>
             </a:fld>
             <a:endParaRPr lang="en-US"/>
           </a:p>
@@ -485,7 +485,7 @@
           <a:p>
             <a:fld id="{21D1E3DE-262E-49AD-8F92-4417FBCF3DA3}" type="datetimeFigureOut">
               <a:rPr lang="en-US" smtClean="0"/>
-              <a:t>4/30/2018</a:t>
+              <a:t>5/1/2018</a:t>
             </a:fld>
             <a:endParaRPr lang="en-US"/>
           </a:p>
@@ -693,7 +693,7 @@
           <a:p>
             <a:fld id="{21D1E3DE-262E-49AD-8F92-4417FBCF3DA3}" type="datetimeFigureOut">
               <a:rPr lang="en-US" smtClean="0"/>
-              <a:t>4/30/2018</a:t>
+              <a:t>5/1/2018</a:t>
             </a:fld>
             <a:endParaRPr lang="en-US"/>
           </a:p>
@@ -891,7 +891,7 @@
           <a:p>
             <a:fld id="{21D1E3DE-262E-49AD-8F92-4417FBCF3DA3}" type="datetimeFigureOut">
               <a:rPr lang="en-US" smtClean="0"/>
-              <a:t>4/30/2018</a:t>
+              <a:t>5/1/2018</a:t>
             </a:fld>
             <a:endParaRPr lang="en-US"/>
           </a:p>
@@ -1166,7 +1166,7 @@
           <a:p>
             <a:fld id="{21D1E3DE-262E-49AD-8F92-4417FBCF3DA3}" type="datetimeFigureOut">
               <a:rPr lang="en-US" smtClean="0"/>
-              <a:t>4/30/2018</a:t>
+              <a:t>5/1/2018</a:t>
             </a:fld>
             <a:endParaRPr lang="en-US"/>
           </a:p>
@@ -1431,7 +1431,7 @@
           <a:p>
             <a:fld id="{21D1E3DE-262E-49AD-8F92-4417FBCF3DA3}" type="datetimeFigureOut">
               <a:rPr lang="en-US" smtClean="0"/>
-              <a:t>4/30/2018</a:t>
+              <a:t>5/1/2018</a:t>
             </a:fld>
             <a:endParaRPr lang="en-US"/>
           </a:p>
@@ -1843,7 +1843,7 @@
           <a:p>
             <a:fld id="{21D1E3DE-262E-49AD-8F92-4417FBCF3DA3}" type="datetimeFigureOut">
               <a:rPr lang="en-US" smtClean="0"/>
-              <a:t>4/30/2018</a:t>
+              <a:t>5/1/2018</a:t>
             </a:fld>
             <a:endParaRPr lang="en-US"/>
           </a:p>
@@ -1984,7 +1984,7 @@
           <a:p>
             <a:fld id="{21D1E3DE-262E-49AD-8F92-4417FBCF3DA3}" type="datetimeFigureOut">
               <a:rPr lang="en-US" smtClean="0"/>
-              <a:t>4/30/2018</a:t>
+              <a:t>5/1/2018</a:t>
             </a:fld>
             <a:endParaRPr lang="en-US"/>
           </a:p>
@@ -2097,7 +2097,7 @@
           <a:p>
             <a:fld id="{21D1E3DE-262E-49AD-8F92-4417FBCF3DA3}" type="datetimeFigureOut">
               <a:rPr lang="en-US" smtClean="0"/>
-              <a:t>4/30/2018</a:t>
+              <a:t>5/1/2018</a:t>
             </a:fld>
             <a:endParaRPr lang="en-US"/>
           </a:p>
@@ -2408,7 +2408,7 @@
           <a:p>
             <a:fld id="{21D1E3DE-262E-49AD-8F92-4417FBCF3DA3}" type="datetimeFigureOut">
               <a:rPr lang="en-US" smtClean="0"/>
-              <a:t>4/30/2018</a:t>
+              <a:t>5/1/2018</a:t>
             </a:fld>
             <a:endParaRPr lang="en-US"/>
           </a:p>
@@ -2696,7 +2696,7 @@
           <a:p>
             <a:fld id="{21D1E3DE-262E-49AD-8F92-4417FBCF3DA3}" type="datetimeFigureOut">
               <a:rPr lang="en-US" smtClean="0"/>
-              <a:t>4/30/2018</a:t>
+              <a:t>5/1/2018</a:t>
             </a:fld>
             <a:endParaRPr lang="en-US"/>
           </a:p>
@@ -2937,7 +2937,7 @@
           <a:p>
             <a:fld id="{21D1E3DE-262E-49AD-8F92-4417FBCF3DA3}" type="datetimeFigureOut">
               <a:rPr lang="en-US" smtClean="0"/>
-              <a:t>4/30/2018</a:t>
+              <a:t>5/1/2018</a:t>
             </a:fld>
             <a:endParaRPr lang="en-US"/>
           </a:p>

</xml_diff>

<commit_message>
CDC design almost done! Very Excited!
</commit_message>
<xml_diff>
--- a/Summary Sheets/Diagrams.pptx
+++ b/Summary Sheets/Diagrams.pptx
@@ -8,22 +8,23 @@
     <p:sldId id="256" r:id="rId2"/>
     <p:sldId id="275" r:id="rId3"/>
     <p:sldId id="273" r:id="rId4"/>
-    <p:sldId id="274" r:id="rId5"/>
-    <p:sldId id="270" r:id="rId6"/>
-    <p:sldId id="257" r:id="rId7"/>
-    <p:sldId id="258" r:id="rId8"/>
-    <p:sldId id="266" r:id="rId9"/>
-    <p:sldId id="259" r:id="rId10"/>
-    <p:sldId id="263" r:id="rId11"/>
-    <p:sldId id="269" r:id="rId12"/>
-    <p:sldId id="264" r:id="rId13"/>
-    <p:sldId id="265" r:id="rId14"/>
-    <p:sldId id="267" r:id="rId15"/>
-    <p:sldId id="271" r:id="rId16"/>
-    <p:sldId id="268" r:id="rId17"/>
-    <p:sldId id="261" r:id="rId18"/>
-    <p:sldId id="272" r:id="rId19"/>
-    <p:sldId id="262" r:id="rId20"/>
+    <p:sldId id="276" r:id="rId5"/>
+    <p:sldId id="274" r:id="rId6"/>
+    <p:sldId id="270" r:id="rId7"/>
+    <p:sldId id="257" r:id="rId8"/>
+    <p:sldId id="258" r:id="rId9"/>
+    <p:sldId id="266" r:id="rId10"/>
+    <p:sldId id="259" r:id="rId11"/>
+    <p:sldId id="263" r:id="rId12"/>
+    <p:sldId id="269" r:id="rId13"/>
+    <p:sldId id="264" r:id="rId14"/>
+    <p:sldId id="265" r:id="rId15"/>
+    <p:sldId id="267" r:id="rId16"/>
+    <p:sldId id="271" r:id="rId17"/>
+    <p:sldId id="268" r:id="rId18"/>
+    <p:sldId id="261" r:id="rId19"/>
+    <p:sldId id="272" r:id="rId20"/>
+    <p:sldId id="262" r:id="rId21"/>
   </p:sldIdLst>
   <p:sldSz cx="12192000" cy="6858000"/>
   <p:notesSz cx="6858000" cy="9144000"/>
@@ -288,7 +289,7 @@
           <a:p>
             <a:fld id="{21D1E3DE-262E-49AD-8F92-4417FBCF3DA3}" type="datetimeFigureOut">
               <a:rPr lang="en-US" smtClean="0"/>
-              <a:t>5/1/2018</a:t>
+              <a:t>5/2/2018</a:t>
             </a:fld>
             <a:endParaRPr lang="en-US"/>
           </a:p>
@@ -486,7 +487,7 @@
           <a:p>
             <a:fld id="{21D1E3DE-262E-49AD-8F92-4417FBCF3DA3}" type="datetimeFigureOut">
               <a:rPr lang="en-US" smtClean="0"/>
-              <a:t>5/1/2018</a:t>
+              <a:t>5/2/2018</a:t>
             </a:fld>
             <a:endParaRPr lang="en-US"/>
           </a:p>
@@ -694,7 +695,7 @@
           <a:p>
             <a:fld id="{21D1E3DE-262E-49AD-8F92-4417FBCF3DA3}" type="datetimeFigureOut">
               <a:rPr lang="en-US" smtClean="0"/>
-              <a:t>5/1/2018</a:t>
+              <a:t>5/2/2018</a:t>
             </a:fld>
             <a:endParaRPr lang="en-US"/>
           </a:p>
@@ -892,7 +893,7 @@
           <a:p>
             <a:fld id="{21D1E3DE-262E-49AD-8F92-4417FBCF3DA3}" type="datetimeFigureOut">
               <a:rPr lang="en-US" smtClean="0"/>
-              <a:t>5/1/2018</a:t>
+              <a:t>5/2/2018</a:t>
             </a:fld>
             <a:endParaRPr lang="en-US"/>
           </a:p>
@@ -1167,7 +1168,7 @@
           <a:p>
             <a:fld id="{21D1E3DE-262E-49AD-8F92-4417FBCF3DA3}" type="datetimeFigureOut">
               <a:rPr lang="en-US" smtClean="0"/>
-              <a:t>5/1/2018</a:t>
+              <a:t>5/2/2018</a:t>
             </a:fld>
             <a:endParaRPr lang="en-US"/>
           </a:p>
@@ -1432,7 +1433,7 @@
           <a:p>
             <a:fld id="{21D1E3DE-262E-49AD-8F92-4417FBCF3DA3}" type="datetimeFigureOut">
               <a:rPr lang="en-US" smtClean="0"/>
-              <a:t>5/1/2018</a:t>
+              <a:t>5/2/2018</a:t>
             </a:fld>
             <a:endParaRPr lang="en-US"/>
           </a:p>
@@ -1844,7 +1845,7 @@
           <a:p>
             <a:fld id="{21D1E3DE-262E-49AD-8F92-4417FBCF3DA3}" type="datetimeFigureOut">
               <a:rPr lang="en-US" smtClean="0"/>
-              <a:t>5/1/2018</a:t>
+              <a:t>5/2/2018</a:t>
             </a:fld>
             <a:endParaRPr lang="en-US"/>
           </a:p>
@@ -1985,7 +1986,7 @@
           <a:p>
             <a:fld id="{21D1E3DE-262E-49AD-8F92-4417FBCF3DA3}" type="datetimeFigureOut">
               <a:rPr lang="en-US" smtClean="0"/>
-              <a:t>5/1/2018</a:t>
+              <a:t>5/2/2018</a:t>
             </a:fld>
             <a:endParaRPr lang="en-US"/>
           </a:p>
@@ -2098,7 +2099,7 @@
           <a:p>
             <a:fld id="{21D1E3DE-262E-49AD-8F92-4417FBCF3DA3}" type="datetimeFigureOut">
               <a:rPr lang="en-US" smtClean="0"/>
-              <a:t>5/1/2018</a:t>
+              <a:t>5/2/2018</a:t>
             </a:fld>
             <a:endParaRPr lang="en-US"/>
           </a:p>
@@ -2409,7 +2410,7 @@
           <a:p>
             <a:fld id="{21D1E3DE-262E-49AD-8F92-4417FBCF3DA3}" type="datetimeFigureOut">
               <a:rPr lang="en-US" smtClean="0"/>
-              <a:t>5/1/2018</a:t>
+              <a:t>5/2/2018</a:t>
             </a:fld>
             <a:endParaRPr lang="en-US"/>
           </a:p>
@@ -2697,7 +2698,7 @@
           <a:p>
             <a:fld id="{21D1E3DE-262E-49AD-8F92-4417FBCF3DA3}" type="datetimeFigureOut">
               <a:rPr lang="en-US" smtClean="0"/>
-              <a:t>5/1/2018</a:t>
+              <a:t>5/2/2018</a:t>
             </a:fld>
             <a:endParaRPr lang="en-US"/>
           </a:p>
@@ -2938,7 +2939,7 @@
           <a:p>
             <a:fld id="{21D1E3DE-262E-49AD-8F92-4417FBCF3DA3}" type="datetimeFigureOut">
               <a:rPr lang="en-US" smtClean="0"/>
-              <a:t>5/1/2018</a:t>
+              <a:t>5/2/2018</a:t>
             </a:fld>
             <a:endParaRPr lang="en-US"/>
           </a:p>
@@ -4928,6 +4929,1256 @@
       </p:grpSpPr>
       <p:grpSp>
         <p:nvGrpSpPr>
+          <p:cNvPr id="40" name="Group 39">
+            <a:extLst>
+              <a:ext uri="{FF2B5EF4-FFF2-40B4-BE49-F238E27FC236}">
+                <a16:creationId xmlns:a16="http://schemas.microsoft.com/office/drawing/2014/main" id="{D33025CC-DC65-4CA8-A9CB-66011752C1A2}"/>
+              </a:ext>
+            </a:extLst>
+          </p:cNvPr>
+          <p:cNvGrpSpPr/>
+          <p:nvPr/>
+        </p:nvGrpSpPr>
+        <p:grpSpPr>
+          <a:xfrm>
+            <a:off x="1960438" y="1127328"/>
+            <a:ext cx="5043487" cy="3597072"/>
+            <a:chOff x="1960438" y="1127328"/>
+            <a:chExt cx="5043487" cy="3597072"/>
+          </a:xfrm>
+        </p:grpSpPr>
+        <p:sp>
+          <p:nvSpPr>
+            <p:cNvPr id="4" name="Freeform 6">
+              <a:extLst>
+                <a:ext uri="{FF2B5EF4-FFF2-40B4-BE49-F238E27FC236}">
+                  <a16:creationId xmlns:a16="http://schemas.microsoft.com/office/drawing/2014/main" id="{57C7CB09-8C87-4DA8-BFE7-4720504CA68C}"/>
+                </a:ext>
+              </a:extLst>
+            </p:cNvPr>
+            <p:cNvSpPr>
+              <a:spLocks/>
+            </p:cNvSpPr>
+            <p:nvPr/>
+          </p:nvSpPr>
+          <p:spPr bwMode="auto">
+            <a:xfrm>
+              <a:off x="2362200" y="1524000"/>
+              <a:ext cx="2152192" cy="3200400"/>
+            </a:xfrm>
+            <a:custGeom>
+              <a:avLst/>
+              <a:gdLst/>
+              <a:ahLst/>
+              <a:cxnLst>
+                <a:cxn ang="0">
+                  <a:pos x="0" y="0"/>
+                </a:cxn>
+                <a:cxn ang="0">
+                  <a:pos x="0" y="528"/>
+                </a:cxn>
+                <a:cxn ang="0">
+                  <a:pos x="3216" y="528"/>
+                </a:cxn>
+                <a:cxn ang="0">
+                  <a:pos x="3216" y="0"/>
+                </a:cxn>
+              </a:cxnLst>
+              <a:rect l="0" t="0" r="r" b="b"/>
+              <a:pathLst>
+                <a:path w="3216" h="528">
+                  <a:moveTo>
+                    <a:pt x="0" y="0"/>
+                  </a:moveTo>
+                  <a:lnTo>
+                    <a:pt x="0" y="528"/>
+                  </a:lnTo>
+                  <a:lnTo>
+                    <a:pt x="3216" y="528"/>
+                  </a:lnTo>
+                  <a:lnTo>
+                    <a:pt x="3216" y="0"/>
+                  </a:lnTo>
+                </a:path>
+              </a:pathLst>
+            </a:custGeom>
+            <a:solidFill>
+              <a:schemeClr val="hlink"/>
+            </a:solidFill>
+            <a:ln w="57150" cap="flat" cmpd="sng">
+              <a:solidFill>
+                <a:schemeClr val="tx1"/>
+              </a:solidFill>
+              <a:prstDash val="solid"/>
+              <a:round/>
+              <a:headEnd type="none" w="lg" len="med"/>
+              <a:tailEnd type="none" w="lg" len="med"/>
+            </a:ln>
+            <a:effectLst/>
+          </p:spPr>
+          <p:txBody>
+            <a:bodyPr wrap="square" anchor="ctr">
+              <a:spAutoFit/>
+            </a:bodyPr>
+            <a:lstStyle/>
+            <a:p>
+              <a:endParaRPr lang="en-US" dirty="0"/>
+            </a:p>
+          </p:txBody>
+        </p:sp>
+        <p:sp>
+          <p:nvSpPr>
+            <p:cNvPr id="5" name="AutoShape 13">
+              <a:extLst>
+                <a:ext uri="{FF2B5EF4-FFF2-40B4-BE49-F238E27FC236}">
+                  <a16:creationId xmlns:a16="http://schemas.microsoft.com/office/drawing/2014/main" id="{E44A676A-D9DC-402C-BB38-49ADE6046E1D}"/>
+                </a:ext>
+              </a:extLst>
+            </p:cNvPr>
+            <p:cNvSpPr>
+              <a:spLocks noChangeArrowheads="1"/>
+            </p:cNvSpPr>
+            <p:nvPr/>
+          </p:nvSpPr>
+          <p:spPr bwMode="auto">
+            <a:xfrm rot="16200000">
+              <a:off x="4684776" y="2721695"/>
+              <a:ext cx="749808" cy="1280160"/>
+            </a:xfrm>
+            <a:custGeom>
+              <a:avLst/>
+              <a:gdLst>
+                <a:gd name="G0" fmla="+- 6871 0 0"/>
+                <a:gd name="G1" fmla="+- 21600 0 6871"/>
+                <a:gd name="G2" fmla="*/ 6871 1 2"/>
+                <a:gd name="G3" fmla="+- 21600 0 G2"/>
+                <a:gd name="G4" fmla="+/ 6871 21600 2"/>
+                <a:gd name="G5" fmla="+/ G1 0 2"/>
+                <a:gd name="G6" fmla="*/ 21600 21600 6871"/>
+                <a:gd name="G7" fmla="*/ G6 1 2"/>
+                <a:gd name="G8" fmla="+- 21600 0 G7"/>
+                <a:gd name="G9" fmla="*/ 21600 1 2"/>
+                <a:gd name="G10" fmla="+- 6871 0 G9"/>
+                <a:gd name="G11" fmla="?: G10 G8 0"/>
+                <a:gd name="G12" fmla="?: G10 G7 21600"/>
+                <a:gd name="T0" fmla="*/ 18164 w 21600"/>
+                <a:gd name="T1" fmla="*/ 10800 h 21600"/>
+                <a:gd name="T2" fmla="*/ 10800 w 21600"/>
+                <a:gd name="T3" fmla="*/ 21600 h 21600"/>
+                <a:gd name="T4" fmla="*/ 3436 w 21600"/>
+                <a:gd name="T5" fmla="*/ 10800 h 21600"/>
+                <a:gd name="T6" fmla="*/ 10800 w 21600"/>
+                <a:gd name="T7" fmla="*/ 0 h 21600"/>
+                <a:gd name="T8" fmla="*/ 5236 w 21600"/>
+                <a:gd name="T9" fmla="*/ 5236 h 21600"/>
+                <a:gd name="T10" fmla="*/ 16364 w 21600"/>
+                <a:gd name="T11" fmla="*/ 16364 h 21600"/>
+              </a:gdLst>
+              <a:ahLst/>
+              <a:cxnLst>
+                <a:cxn ang="0">
+                  <a:pos x="T0" y="T1"/>
+                </a:cxn>
+                <a:cxn ang="0">
+                  <a:pos x="T2" y="T3"/>
+                </a:cxn>
+                <a:cxn ang="0">
+                  <a:pos x="T4" y="T5"/>
+                </a:cxn>
+                <a:cxn ang="0">
+                  <a:pos x="T6" y="T7"/>
+                </a:cxn>
+              </a:cxnLst>
+              <a:rect l="T8" t="T9" r="T10" b="T11"/>
+              <a:pathLst>
+                <a:path w="21600" h="21600">
+                  <a:moveTo>
+                    <a:pt x="0" y="0"/>
+                  </a:moveTo>
+                  <a:lnTo>
+                    <a:pt x="6871" y="21600"/>
+                  </a:lnTo>
+                  <a:lnTo>
+                    <a:pt x="14729" y="21600"/>
+                  </a:lnTo>
+                  <a:lnTo>
+                    <a:pt x="21600" y="0"/>
+                  </a:lnTo>
+                  <a:close/>
+                </a:path>
+              </a:pathLst>
+            </a:custGeom>
+            <a:solidFill>
+              <a:schemeClr val="hlink"/>
+            </a:solidFill>
+            <a:ln w="12700">
+              <a:noFill/>
+              <a:miter lim="800000"/>
+              <a:headEnd type="none" w="lg" len="med"/>
+              <a:tailEnd type="none" w="lg" len="med"/>
+            </a:ln>
+            <a:effectLst/>
+          </p:spPr>
+          <p:txBody>
+            <a:bodyPr wrap="square" anchor="ctr">
+              <a:spAutoFit/>
+            </a:bodyPr>
+            <a:lstStyle/>
+            <a:p>
+              <a:endParaRPr lang="en-US"/>
+            </a:p>
+          </p:txBody>
+        </p:sp>
+        <p:grpSp>
+          <p:nvGrpSpPr>
+            <p:cNvPr id="6" name="Group 5">
+              <a:extLst>
+                <a:ext uri="{FF2B5EF4-FFF2-40B4-BE49-F238E27FC236}">
+                  <a16:creationId xmlns:a16="http://schemas.microsoft.com/office/drawing/2014/main" id="{4DA08D80-1A6A-442B-AB77-32A50E5443E3}"/>
+                </a:ext>
+              </a:extLst>
+            </p:cNvPr>
+            <p:cNvGrpSpPr>
+              <a:grpSpLocks/>
+            </p:cNvGrpSpPr>
+            <p:nvPr/>
+          </p:nvGrpSpPr>
+          <p:grpSpPr bwMode="auto">
+            <a:xfrm rot="16200000">
+              <a:off x="5087599" y="2392723"/>
+              <a:ext cx="740664" cy="1924262"/>
+              <a:chOff x="2480" y="2033"/>
+              <a:chExt cx="459" cy="1395"/>
+            </a:xfrm>
+          </p:grpSpPr>
+          <p:sp>
+            <p:nvSpPr>
+              <p:cNvPr id="7" name="Freeform 8">
+                <a:extLst>
+                  <a:ext uri="{FF2B5EF4-FFF2-40B4-BE49-F238E27FC236}">
+                    <a16:creationId xmlns:a16="http://schemas.microsoft.com/office/drawing/2014/main" id="{E003F3A7-1CE0-4A77-B1FC-E62855274BD7}"/>
+                  </a:ext>
+                </a:extLst>
+              </p:cNvPr>
+              <p:cNvSpPr>
+                <a:spLocks/>
+              </p:cNvSpPr>
+              <p:nvPr/>
+            </p:nvSpPr>
+            <p:spPr bwMode="auto">
+              <a:xfrm>
+                <a:off x="2480" y="2033"/>
+                <a:ext cx="147" cy="1395"/>
+              </a:xfrm>
+              <a:custGeom>
+                <a:avLst/>
+                <a:gdLst/>
+                <a:ahLst/>
+                <a:cxnLst>
+                  <a:cxn ang="0">
+                    <a:pos x="0" y="0"/>
+                  </a:cxn>
+                  <a:cxn ang="0">
+                    <a:pos x="111" y="232"/>
+                  </a:cxn>
+                  <a:cxn ang="0">
+                    <a:pos x="141" y="1395"/>
+                  </a:cxn>
+                </a:cxnLst>
+                <a:rect l="0" t="0" r="r" b="b"/>
+                <a:pathLst>
+                  <a:path w="147" h="1395">
+                    <a:moveTo>
+                      <a:pt x="0" y="0"/>
+                    </a:moveTo>
+                    <a:cubicBezTo>
+                      <a:pt x="87" y="0"/>
+                      <a:pt x="106" y="174"/>
+                      <a:pt x="111" y="232"/>
+                    </a:cubicBezTo>
+                    <a:cubicBezTo>
+                      <a:pt x="116" y="290"/>
+                      <a:pt x="147" y="1084"/>
+                      <a:pt x="141" y="1395"/>
+                    </a:cubicBezTo>
+                  </a:path>
+                </a:pathLst>
+              </a:custGeom>
+              <a:solidFill>
+                <a:schemeClr val="bg1"/>
+              </a:solidFill>
+              <a:ln w="12700" cap="flat" cmpd="sng">
+                <a:solidFill>
+                  <a:schemeClr val="hlink"/>
+                </a:solidFill>
+                <a:prstDash val="solid"/>
+                <a:round/>
+                <a:headEnd type="none" w="lg" len="med"/>
+                <a:tailEnd type="none" w="lg" len="med"/>
+              </a:ln>
+              <a:effectLst/>
+            </p:spPr>
+            <p:txBody>
+              <a:bodyPr wrap="none" anchor="ctr">
+                <a:spAutoFit/>
+              </a:bodyPr>
+              <a:lstStyle/>
+              <a:p>
+                <a:endParaRPr lang="en-US"/>
+              </a:p>
+            </p:txBody>
+          </p:sp>
+          <p:sp>
+            <p:nvSpPr>
+              <p:cNvPr id="8" name="Freeform 15">
+                <a:extLst>
+                  <a:ext uri="{FF2B5EF4-FFF2-40B4-BE49-F238E27FC236}">
+                    <a16:creationId xmlns:a16="http://schemas.microsoft.com/office/drawing/2014/main" id="{4D1E1D5E-7373-4D02-9C84-1740AE2E30B7}"/>
+                  </a:ext>
+                </a:extLst>
+              </p:cNvPr>
+              <p:cNvSpPr>
+                <a:spLocks/>
+              </p:cNvSpPr>
+              <p:nvPr/>
+            </p:nvSpPr>
+            <p:spPr bwMode="auto">
+              <a:xfrm flipH="1">
+                <a:off x="2792" y="2033"/>
+                <a:ext cx="147" cy="1395"/>
+              </a:xfrm>
+              <a:custGeom>
+                <a:avLst/>
+                <a:gdLst/>
+                <a:ahLst/>
+                <a:cxnLst>
+                  <a:cxn ang="0">
+                    <a:pos x="0" y="0"/>
+                  </a:cxn>
+                  <a:cxn ang="0">
+                    <a:pos x="111" y="232"/>
+                  </a:cxn>
+                  <a:cxn ang="0">
+                    <a:pos x="141" y="1395"/>
+                  </a:cxn>
+                </a:cxnLst>
+                <a:rect l="0" t="0" r="r" b="b"/>
+                <a:pathLst>
+                  <a:path w="147" h="1395">
+                    <a:moveTo>
+                      <a:pt x="0" y="0"/>
+                    </a:moveTo>
+                    <a:cubicBezTo>
+                      <a:pt x="87" y="0"/>
+                      <a:pt x="106" y="174"/>
+                      <a:pt x="111" y="232"/>
+                    </a:cubicBezTo>
+                    <a:cubicBezTo>
+                      <a:pt x="116" y="290"/>
+                      <a:pt x="147" y="1084"/>
+                      <a:pt x="141" y="1395"/>
+                    </a:cubicBezTo>
+                  </a:path>
+                </a:pathLst>
+              </a:custGeom>
+              <a:solidFill>
+                <a:schemeClr val="bg1"/>
+              </a:solidFill>
+              <a:ln w="12700" cap="flat" cmpd="sng">
+                <a:solidFill>
+                  <a:schemeClr val="hlink"/>
+                </a:solidFill>
+                <a:prstDash val="solid"/>
+                <a:round/>
+                <a:headEnd type="none" w="lg" len="med"/>
+                <a:tailEnd type="none" w="lg" len="med"/>
+              </a:ln>
+              <a:effectLst/>
+            </p:spPr>
+            <p:txBody>
+              <a:bodyPr wrap="none" anchor="ctr">
+                <a:spAutoFit/>
+              </a:bodyPr>
+              <a:lstStyle/>
+              <a:p>
+                <a:endParaRPr lang="en-US"/>
+              </a:p>
+            </p:txBody>
+          </p:sp>
+        </p:grpSp>
+        <p:sp>
+          <p:nvSpPr>
+            <p:cNvPr id="9" name="Rectangle 8">
+              <a:extLst>
+                <a:ext uri="{FF2B5EF4-FFF2-40B4-BE49-F238E27FC236}">
+                  <a16:creationId xmlns:a16="http://schemas.microsoft.com/office/drawing/2014/main" id="{F574AE4C-12A3-4433-9E2E-8244525C9549}"/>
+                </a:ext>
+              </a:extLst>
+            </p:cNvPr>
+            <p:cNvSpPr/>
+            <p:nvPr/>
+          </p:nvSpPr>
+          <p:spPr>
+            <a:xfrm>
+              <a:off x="5598350" y="3011376"/>
+              <a:ext cx="1405575" cy="508920"/>
+            </a:xfrm>
+            <a:prstGeom prst="rect">
+              <a:avLst/>
+            </a:prstGeom>
+            <a:solidFill>
+              <a:schemeClr val="bg1"/>
+            </a:solidFill>
+            <a:ln>
+              <a:solidFill>
+                <a:schemeClr val="bg1"/>
+              </a:solidFill>
+            </a:ln>
+          </p:spPr>
+          <p:style>
+            <a:lnRef idx="2">
+              <a:schemeClr val="accent1">
+                <a:shade val="50000"/>
+              </a:schemeClr>
+            </a:lnRef>
+            <a:fillRef idx="1">
+              <a:schemeClr val="accent1"/>
+            </a:fillRef>
+            <a:effectRef idx="0">
+              <a:schemeClr val="accent1"/>
+            </a:effectRef>
+            <a:fontRef idx="minor">
+              <a:schemeClr val="lt1"/>
+            </a:fontRef>
+          </p:style>
+          <p:txBody>
+            <a:bodyPr rtlCol="0" anchor="ctr"/>
+            <a:lstStyle/>
+            <a:p>
+              <a:pPr algn="ctr"/>
+              <a:endParaRPr lang="en-US">
+                <a:ln>
+                  <a:solidFill>
+                    <a:schemeClr val="bg1"/>
+                  </a:solidFill>
+                </a:ln>
+                <a:solidFill>
+                  <a:schemeClr val="bg1"/>
+                </a:solidFill>
+              </a:endParaRPr>
+            </a:p>
+          </p:txBody>
+        </p:sp>
+        <p:cxnSp>
+          <p:nvCxnSpPr>
+            <p:cNvPr id="10" name="Straight Arrow Connector 9">
+              <a:extLst>
+                <a:ext uri="{FF2B5EF4-FFF2-40B4-BE49-F238E27FC236}">
+                  <a16:creationId xmlns:a16="http://schemas.microsoft.com/office/drawing/2014/main" id="{E0C69688-DDD1-429C-B973-3EE6BC93FB7E}"/>
+                </a:ext>
+              </a:extLst>
+            </p:cNvPr>
+            <p:cNvCxnSpPr>
+              <a:cxnSpLocks/>
+            </p:cNvCxnSpPr>
+            <p:nvPr/>
+          </p:nvCxnSpPr>
+          <p:spPr>
+            <a:xfrm>
+              <a:off x="4895032" y="1524000"/>
+              <a:ext cx="0" cy="1804248"/>
+            </a:xfrm>
+            <a:prstGeom prst="straightConnector1">
+              <a:avLst/>
+            </a:prstGeom>
+            <a:ln w="19050">
+              <a:solidFill>
+                <a:schemeClr val="tx1"/>
+              </a:solidFill>
+              <a:headEnd type="triangle" w="lg" len="lg"/>
+              <a:tailEnd type="triangle" w="lg" len="lg"/>
+            </a:ln>
+          </p:spPr>
+          <p:style>
+            <a:lnRef idx="1">
+              <a:schemeClr val="accent1"/>
+            </a:lnRef>
+            <a:fillRef idx="0">
+              <a:schemeClr val="accent1"/>
+            </a:fillRef>
+            <a:effectRef idx="0">
+              <a:schemeClr val="accent1"/>
+            </a:effectRef>
+            <a:fontRef idx="minor">
+              <a:schemeClr val="tx1"/>
+            </a:fontRef>
+          </p:style>
+        </p:cxnSp>
+        <p:grpSp>
+          <p:nvGrpSpPr>
+            <p:cNvPr id="13" name="Group 12">
+              <a:extLst>
+                <a:ext uri="{FF2B5EF4-FFF2-40B4-BE49-F238E27FC236}">
+                  <a16:creationId xmlns:a16="http://schemas.microsoft.com/office/drawing/2014/main" id="{EA9E03FD-BCAA-462D-A6C4-B19647011DF4}"/>
+                </a:ext>
+              </a:extLst>
+            </p:cNvPr>
+            <p:cNvGrpSpPr/>
+            <p:nvPr/>
+          </p:nvGrpSpPr>
+          <p:grpSpPr>
+            <a:xfrm>
+              <a:off x="3406847" y="1292516"/>
+              <a:ext cx="482269" cy="420455"/>
+              <a:chOff x="4446109" y="2103464"/>
+              <a:chExt cx="482269" cy="420455"/>
+            </a:xfrm>
+          </p:grpSpPr>
+          <p:sp>
+            <p:nvSpPr>
+              <p:cNvPr id="14" name="AutoShape 174">
+                <a:extLst>
+                  <a:ext uri="{FF2B5EF4-FFF2-40B4-BE49-F238E27FC236}">
+                    <a16:creationId xmlns:a16="http://schemas.microsoft.com/office/drawing/2014/main" id="{56EFD6BF-292F-40DF-B258-F43A90D892CB}"/>
+                  </a:ext>
+                </a:extLst>
+              </p:cNvPr>
+              <p:cNvSpPr>
+                <a:spLocks noChangeArrowheads="1"/>
+              </p:cNvSpPr>
+              <p:nvPr/>
+            </p:nvSpPr>
+            <p:spPr bwMode="auto">
+              <a:xfrm flipV="1">
+                <a:off x="4506392" y="2103464"/>
+                <a:ext cx="361702" cy="228043"/>
+              </a:xfrm>
+              <a:prstGeom prst="triangle">
+                <a:avLst>
+                  <a:gd name="adj" fmla="val 50000"/>
+                </a:avLst>
+              </a:prstGeom>
+              <a:noFill/>
+              <a:ln w="12700">
+                <a:solidFill>
+                  <a:schemeClr val="tx1"/>
+                </a:solidFill>
+                <a:miter lim="800000"/>
+                <a:headEnd type="none" w="lg" len="med"/>
+                <a:tailEnd type="none" w="lg" len="med"/>
+              </a:ln>
+              <a:effectLst/>
+            </p:spPr>
+            <p:txBody>
+              <a:bodyPr anchor="ctr">
+                <a:spAutoFit/>
+              </a:bodyPr>
+              <a:lstStyle/>
+              <a:p>
+                <a:endParaRPr lang="en-US"/>
+              </a:p>
+            </p:txBody>
+          </p:sp>
+          <p:sp>
+            <p:nvSpPr>
+              <p:cNvPr id="15" name="Line 175">
+                <a:extLst>
+                  <a:ext uri="{FF2B5EF4-FFF2-40B4-BE49-F238E27FC236}">
+                    <a16:creationId xmlns:a16="http://schemas.microsoft.com/office/drawing/2014/main" id="{D3B90883-7651-4669-9F16-25B26B0C4AB5}"/>
+                  </a:ext>
+                </a:extLst>
+              </p:cNvPr>
+              <p:cNvSpPr>
+                <a:spLocks noChangeShapeType="1"/>
+              </p:cNvSpPr>
+              <p:nvPr/>
+            </p:nvSpPr>
+            <p:spPr bwMode="auto">
+              <a:xfrm>
+                <a:off x="4446109" y="2395643"/>
+                <a:ext cx="482269" cy="0"/>
+              </a:xfrm>
+              <a:prstGeom prst="line">
+                <a:avLst/>
+              </a:prstGeom>
+              <a:noFill/>
+              <a:ln w="12700">
+                <a:solidFill>
+                  <a:schemeClr val="tx1"/>
+                </a:solidFill>
+                <a:round/>
+                <a:headEnd type="none" w="lg" len="med"/>
+                <a:tailEnd type="none" w="lg" len="med"/>
+              </a:ln>
+              <a:effectLst/>
+            </p:spPr>
+            <p:txBody>
+              <a:bodyPr anchor="ctr">
+                <a:spAutoFit/>
+              </a:bodyPr>
+              <a:lstStyle/>
+              <a:p>
+                <a:endParaRPr lang="en-US"/>
+              </a:p>
+            </p:txBody>
+          </p:sp>
+          <p:sp>
+            <p:nvSpPr>
+              <p:cNvPr id="16" name="Line 176">
+                <a:extLst>
+                  <a:ext uri="{FF2B5EF4-FFF2-40B4-BE49-F238E27FC236}">
+                    <a16:creationId xmlns:a16="http://schemas.microsoft.com/office/drawing/2014/main" id="{01FA9449-E78B-4BF7-B218-7190FC3DED7C}"/>
+                  </a:ext>
+                </a:extLst>
+              </p:cNvPr>
+              <p:cNvSpPr>
+                <a:spLocks noChangeShapeType="1"/>
+              </p:cNvSpPr>
+              <p:nvPr/>
+            </p:nvSpPr>
+            <p:spPr bwMode="auto">
+              <a:xfrm>
+                <a:off x="4506392" y="2459782"/>
+                <a:ext cx="361702" cy="0"/>
+              </a:xfrm>
+              <a:prstGeom prst="line">
+                <a:avLst/>
+              </a:prstGeom>
+              <a:noFill/>
+              <a:ln w="12700">
+                <a:solidFill>
+                  <a:schemeClr val="tx1"/>
+                </a:solidFill>
+                <a:round/>
+                <a:headEnd type="none" w="lg" len="med"/>
+                <a:tailEnd type="none" w="lg" len="med"/>
+              </a:ln>
+              <a:effectLst/>
+            </p:spPr>
+            <p:txBody>
+              <a:bodyPr anchor="ctr">
+                <a:spAutoFit/>
+              </a:bodyPr>
+              <a:lstStyle/>
+              <a:p>
+                <a:endParaRPr lang="en-US"/>
+              </a:p>
+            </p:txBody>
+          </p:sp>
+          <p:sp>
+            <p:nvSpPr>
+              <p:cNvPr id="17" name="Line 177">
+                <a:extLst>
+                  <a:ext uri="{FF2B5EF4-FFF2-40B4-BE49-F238E27FC236}">
+                    <a16:creationId xmlns:a16="http://schemas.microsoft.com/office/drawing/2014/main" id="{BE0340DA-996F-4A74-B664-787686F309E6}"/>
+                  </a:ext>
+                </a:extLst>
+              </p:cNvPr>
+              <p:cNvSpPr>
+                <a:spLocks noChangeShapeType="1"/>
+              </p:cNvSpPr>
+              <p:nvPr/>
+            </p:nvSpPr>
+            <p:spPr bwMode="auto">
+              <a:xfrm>
+                <a:off x="4576723" y="2523919"/>
+                <a:ext cx="218529" cy="0"/>
+              </a:xfrm>
+              <a:prstGeom prst="line">
+                <a:avLst/>
+              </a:prstGeom>
+              <a:noFill/>
+              <a:ln w="12700">
+                <a:solidFill>
+                  <a:schemeClr val="tx1"/>
+                </a:solidFill>
+                <a:round/>
+                <a:headEnd type="none" w="lg" len="med"/>
+                <a:tailEnd type="none" w="lg" len="med"/>
+              </a:ln>
+              <a:effectLst/>
+            </p:spPr>
+            <p:txBody>
+              <a:bodyPr anchor="ctr">
+                <a:spAutoFit/>
+              </a:bodyPr>
+              <a:lstStyle/>
+              <a:p>
+                <a:endParaRPr lang="en-US"/>
+              </a:p>
+            </p:txBody>
+          </p:sp>
+        </p:grpSp>
+        <p:cxnSp>
+          <p:nvCxnSpPr>
+            <p:cNvPr id="18" name="Straight Connector 17">
+              <a:extLst>
+                <a:ext uri="{FF2B5EF4-FFF2-40B4-BE49-F238E27FC236}">
+                  <a16:creationId xmlns:a16="http://schemas.microsoft.com/office/drawing/2014/main" id="{139A2A25-BB33-4400-8532-774662A60B48}"/>
+                </a:ext>
+              </a:extLst>
+            </p:cNvPr>
+            <p:cNvCxnSpPr>
+              <a:cxnSpLocks/>
+            </p:cNvCxnSpPr>
+            <p:nvPr/>
+          </p:nvCxnSpPr>
+          <p:spPr>
+            <a:xfrm>
+              <a:off x="1968909" y="1520559"/>
+              <a:ext cx="3136491" cy="0"/>
+            </a:xfrm>
+            <a:prstGeom prst="line">
+              <a:avLst/>
+            </a:prstGeom>
+            <a:ln w="28575">
+              <a:solidFill>
+                <a:srgbClr val="C00000"/>
+              </a:solidFill>
+              <a:prstDash val="dash"/>
+            </a:ln>
+          </p:spPr>
+          <p:style>
+            <a:lnRef idx="1">
+              <a:schemeClr val="accent1"/>
+            </a:lnRef>
+            <a:fillRef idx="0">
+              <a:schemeClr val="accent1"/>
+            </a:fillRef>
+            <a:effectRef idx="0">
+              <a:schemeClr val="accent1"/>
+            </a:effectRef>
+            <a:fontRef idx="minor">
+              <a:schemeClr val="tx1"/>
+            </a:fontRef>
+          </p:style>
+        </p:cxnSp>
+        <p:cxnSp>
+          <p:nvCxnSpPr>
+            <p:cNvPr id="19" name="Straight Connector 18">
+              <a:extLst>
+                <a:ext uri="{FF2B5EF4-FFF2-40B4-BE49-F238E27FC236}">
+                  <a16:creationId xmlns:a16="http://schemas.microsoft.com/office/drawing/2014/main" id="{10A300E1-DA87-4A73-B804-ADDCD474C4D9}"/>
+                </a:ext>
+              </a:extLst>
+            </p:cNvPr>
+            <p:cNvCxnSpPr>
+              <a:cxnSpLocks/>
+            </p:cNvCxnSpPr>
+            <p:nvPr/>
+          </p:nvCxnSpPr>
+          <p:spPr>
+            <a:xfrm>
+              <a:off x="1960438" y="3340045"/>
+              <a:ext cx="3144962" cy="0"/>
+            </a:xfrm>
+            <a:prstGeom prst="line">
+              <a:avLst/>
+            </a:prstGeom>
+            <a:ln w="28575">
+              <a:solidFill>
+                <a:srgbClr val="C00000"/>
+              </a:solidFill>
+              <a:prstDash val="dash"/>
+            </a:ln>
+          </p:spPr>
+          <p:style>
+            <a:lnRef idx="1">
+              <a:schemeClr val="accent1"/>
+            </a:lnRef>
+            <a:fillRef idx="0">
+              <a:schemeClr val="accent1"/>
+            </a:fillRef>
+            <a:effectRef idx="0">
+              <a:schemeClr val="accent1"/>
+            </a:effectRef>
+            <a:fontRef idx="minor">
+              <a:schemeClr val="tx1"/>
+            </a:fontRef>
+          </p:style>
+        </p:cxnSp>
+        <p:sp>
+          <p:nvSpPr>
+            <p:cNvPr id="25" name="Left Brace 24">
+              <a:extLst>
+                <a:ext uri="{FF2B5EF4-FFF2-40B4-BE49-F238E27FC236}">
+                  <a16:creationId xmlns:a16="http://schemas.microsoft.com/office/drawing/2014/main" id="{6C94C8F7-1CAB-4725-A903-4153E8FD808A}"/>
+                </a:ext>
+              </a:extLst>
+            </p:cNvPr>
+            <p:cNvSpPr/>
+            <p:nvPr/>
+          </p:nvSpPr>
+          <p:spPr>
+            <a:xfrm>
+              <a:off x="4196657" y="2965141"/>
+              <a:ext cx="163714" cy="749808"/>
+            </a:xfrm>
+            <a:prstGeom prst="leftBrace">
+              <a:avLst>
+                <a:gd name="adj1" fmla="val 8333"/>
+                <a:gd name="adj2" fmla="val 70359"/>
+              </a:avLst>
+            </a:prstGeom>
+            <a:ln w="57150">
+              <a:solidFill>
+                <a:schemeClr val="tx1"/>
+              </a:solidFill>
+            </a:ln>
+          </p:spPr>
+          <p:style>
+            <a:lnRef idx="1">
+              <a:schemeClr val="accent1"/>
+            </a:lnRef>
+            <a:fillRef idx="0">
+              <a:schemeClr val="accent1"/>
+            </a:fillRef>
+            <a:effectRef idx="0">
+              <a:schemeClr val="accent1"/>
+            </a:effectRef>
+            <a:fontRef idx="minor">
+              <a:schemeClr val="tx1"/>
+            </a:fontRef>
+          </p:style>
+          <p:txBody>
+            <a:bodyPr rtlCol="0" anchor="ctr"/>
+            <a:lstStyle/>
+            <a:p>
+              <a:pPr algn="ctr"/>
+              <a:endParaRPr lang="en-US" dirty="0"/>
+            </a:p>
+          </p:txBody>
+        </p:sp>
+        <p:sp>
+          <p:nvSpPr>
+            <p:cNvPr id="26" name="Left Brace 25">
+              <a:extLst>
+                <a:ext uri="{FF2B5EF4-FFF2-40B4-BE49-F238E27FC236}">
+                  <a16:creationId xmlns:a16="http://schemas.microsoft.com/office/drawing/2014/main" id="{C0D793E5-915D-460F-9352-46FEFCA987F3}"/>
+                </a:ext>
+              </a:extLst>
+            </p:cNvPr>
+            <p:cNvSpPr/>
+            <p:nvPr/>
+          </p:nvSpPr>
+          <p:spPr>
+            <a:xfrm rot="10800000">
+              <a:off x="5776065" y="3194271"/>
+              <a:ext cx="163714" cy="323683"/>
+            </a:xfrm>
+            <a:prstGeom prst="leftBrace">
+              <a:avLst>
+                <a:gd name="adj1" fmla="val 8333"/>
+                <a:gd name="adj2" fmla="val 47728"/>
+              </a:avLst>
+            </a:prstGeom>
+            <a:ln w="57150">
+              <a:solidFill>
+                <a:schemeClr val="tx1"/>
+              </a:solidFill>
+            </a:ln>
+          </p:spPr>
+          <p:style>
+            <a:lnRef idx="1">
+              <a:schemeClr val="accent1"/>
+            </a:lnRef>
+            <a:fillRef idx="0">
+              <a:schemeClr val="accent1"/>
+            </a:fillRef>
+            <a:effectRef idx="0">
+              <a:schemeClr val="accent1"/>
+            </a:effectRef>
+            <a:fontRef idx="minor">
+              <a:schemeClr val="tx1"/>
+            </a:fontRef>
+          </p:style>
+          <p:txBody>
+            <a:bodyPr rtlCol="0" anchor="ctr"/>
+            <a:lstStyle/>
+            <a:p>
+              <a:pPr algn="ctr"/>
+              <a:endParaRPr lang="en-US" dirty="0"/>
+            </a:p>
+          </p:txBody>
+        </p:sp>
+        <p:pic>
+          <p:nvPicPr>
+            <p:cNvPr id="28" name="Picture 27">
+              <a:extLst>
+                <a:ext uri="{FF2B5EF4-FFF2-40B4-BE49-F238E27FC236}">
+                  <a16:creationId xmlns:a16="http://schemas.microsoft.com/office/drawing/2014/main" id="{974F2EE0-4D52-4CFC-8401-B2ABA73DB98B}"/>
+                </a:ext>
+              </a:extLst>
+            </p:cNvPr>
+            <p:cNvPicPr>
+              <a:picLocks noChangeAspect="1"/>
+            </p:cNvPicPr>
+            <p:nvPr>
+              <p:custDataLst>
+                <p:tags r:id="rId2"/>
+              </p:custDataLst>
+            </p:nvPr>
+          </p:nvPicPr>
+          <p:blipFill>
+            <a:blip r:embed="rId5">
+              <a:extLst>
+                <a:ext uri="{28A0092B-C50C-407E-A947-70E740481C1C}">
+                  <a14:useLocalDpi xmlns:a14="http://schemas.microsoft.com/office/drawing/2010/main" val="0"/>
+                </a:ext>
+              </a:extLst>
+            </a:blip>
+            <a:stretch>
+              <a:fillRect/>
+            </a:stretch>
+          </p:blipFill>
+          <p:spPr>
+            <a:xfrm>
+              <a:off x="3053417" y="3410743"/>
+              <a:ext cx="839619" cy="246857"/>
+            </a:xfrm>
+            <a:prstGeom prst="rect">
+              <a:avLst/>
+            </a:prstGeom>
+          </p:spPr>
+        </p:pic>
+        <p:pic>
+          <p:nvPicPr>
+            <p:cNvPr id="31" name="Picture 30">
+              <a:extLst>
+                <a:ext uri="{FF2B5EF4-FFF2-40B4-BE49-F238E27FC236}">
+                  <a16:creationId xmlns:a16="http://schemas.microsoft.com/office/drawing/2014/main" id="{508DF1B1-30CE-474A-AA8E-AC2FDAFA07B5}"/>
+                </a:ext>
+              </a:extLst>
+            </p:cNvPr>
+            <p:cNvPicPr>
+              <a:picLocks noChangeAspect="1"/>
+            </p:cNvPicPr>
+            <p:nvPr>
+              <p:custDataLst>
+                <p:tags r:id="rId3"/>
+              </p:custDataLst>
+            </p:nvPr>
+          </p:nvPicPr>
+          <p:blipFill>
+            <a:blip r:embed="rId6">
+              <a:extLst>
+                <a:ext uri="{28A0092B-C50C-407E-A947-70E740481C1C}">
+                  <a14:useLocalDpi xmlns:a14="http://schemas.microsoft.com/office/drawing/2010/main" val="0"/>
+                </a:ext>
+              </a:extLst>
+            </a:blip>
+            <a:stretch>
+              <a:fillRect/>
+            </a:stretch>
+          </p:blipFill>
+          <p:spPr>
+            <a:xfrm>
+              <a:off x="6233210" y="3293391"/>
+              <a:ext cx="396190" cy="211809"/>
+            </a:xfrm>
+            <a:prstGeom prst="rect">
+              <a:avLst/>
+            </a:prstGeom>
+          </p:spPr>
+        </p:pic>
+        <p:sp>
+          <p:nvSpPr>
+            <p:cNvPr id="32" name="Oval 31">
+              <a:extLst>
+                <a:ext uri="{FF2B5EF4-FFF2-40B4-BE49-F238E27FC236}">
+                  <a16:creationId xmlns:a16="http://schemas.microsoft.com/office/drawing/2014/main" id="{2E85CA06-1F90-41B0-A61A-B407B248C33B}"/>
+                </a:ext>
+              </a:extLst>
+            </p:cNvPr>
+            <p:cNvSpPr/>
+            <p:nvPr/>
+          </p:nvSpPr>
+          <p:spPr bwMode="auto">
+            <a:xfrm>
+              <a:off x="2757302" y="1459927"/>
+              <a:ext cx="121264" cy="121264"/>
+            </a:xfrm>
+            <a:prstGeom prst="ellipse">
+              <a:avLst/>
+            </a:prstGeom>
+            <a:solidFill>
+              <a:srgbClr val="C00000"/>
+            </a:solidFill>
+            <a:ln w="12700" cap="flat" cmpd="sng" algn="ctr">
+              <a:solidFill>
+                <a:srgbClr val="C00000"/>
+              </a:solidFill>
+              <a:prstDash val="solid"/>
+              <a:round/>
+              <a:headEnd type="none" w="lg" len="med"/>
+              <a:tailEnd type="none" w="lg" len="med"/>
+            </a:ln>
+            <a:effectLst/>
+          </p:spPr>
+          <p:txBody>
+            <a:bodyPr vert="horz" wrap="square" lIns="91440" tIns="45720" rIns="91440" bIns="45720" numCol="1" rtlCol="0" anchor="ctr" anchorCtr="0" compatLnSpc="1">
+              <a:prstTxWarp prst="textNoShape">
+                <a:avLst/>
+              </a:prstTxWarp>
+              <a:spAutoFit/>
+            </a:bodyPr>
+            <a:lstStyle/>
+            <a:p>
+              <a:pPr marL="0" marR="0" indent="0" algn="l" defTabSz="914400" rtl="0" eaLnBrk="1" fontAlgn="base" latinLnBrk="0" hangingPunct="1">
+                <a:lnSpc>
+                  <a:spcPct val="100000"/>
+                </a:lnSpc>
+                <a:spcBef>
+                  <a:spcPct val="0"/>
+                </a:spcBef>
+                <a:spcAft>
+                  <a:spcPct val="0"/>
+                </a:spcAft>
+                <a:buClrTx/>
+                <a:buSzTx/>
+                <a:buFontTx/>
+                <a:buNone/>
+                <a:tabLst/>
+              </a:pPr>
+              <a:endParaRPr kumimoji="0" lang="en-US" sz="1800" b="0" i="0" u="none" strike="noStrike" cap="none" normalizeH="0" baseline="0">
+                <a:ln>
+                  <a:noFill/>
+                </a:ln>
+                <a:solidFill>
+                  <a:schemeClr val="tx1"/>
+                </a:solidFill>
+                <a:effectLst/>
+                <a:latin typeface="Century Gothic" pitchFamily="34" charset="0"/>
+                <a:cs typeface="Arial" charset="0"/>
+              </a:endParaRPr>
+            </a:p>
+          </p:txBody>
+        </p:sp>
+        <p:sp>
+          <p:nvSpPr>
+            <p:cNvPr id="33" name="Oval 32">
+              <a:extLst>
+                <a:ext uri="{FF2B5EF4-FFF2-40B4-BE49-F238E27FC236}">
+                  <a16:creationId xmlns:a16="http://schemas.microsoft.com/office/drawing/2014/main" id="{33C1F4DB-A784-4924-8747-DC035D397677}"/>
+                </a:ext>
+              </a:extLst>
+            </p:cNvPr>
+            <p:cNvSpPr/>
+            <p:nvPr/>
+          </p:nvSpPr>
+          <p:spPr bwMode="auto">
+            <a:xfrm>
+              <a:off x="5536283" y="3307736"/>
+              <a:ext cx="121264" cy="121264"/>
+            </a:xfrm>
+            <a:prstGeom prst="ellipse">
+              <a:avLst/>
+            </a:prstGeom>
+            <a:solidFill>
+              <a:srgbClr val="C00000"/>
+            </a:solidFill>
+            <a:ln w="12700" cap="flat" cmpd="sng" algn="ctr">
+              <a:solidFill>
+                <a:srgbClr val="C00000"/>
+              </a:solidFill>
+              <a:prstDash val="solid"/>
+              <a:round/>
+              <a:headEnd type="none" w="lg" len="med"/>
+              <a:tailEnd type="none" w="lg" len="med"/>
+            </a:ln>
+            <a:effectLst/>
+          </p:spPr>
+          <p:txBody>
+            <a:bodyPr vert="horz" wrap="square" lIns="91440" tIns="45720" rIns="91440" bIns="45720" numCol="1" rtlCol="0" anchor="ctr" anchorCtr="0" compatLnSpc="1">
+              <a:prstTxWarp prst="textNoShape">
+                <a:avLst/>
+              </a:prstTxWarp>
+              <a:spAutoFit/>
+            </a:bodyPr>
+            <a:lstStyle/>
+            <a:p>
+              <a:pPr marL="0" marR="0" indent="0" algn="l" defTabSz="914400" rtl="0" eaLnBrk="1" fontAlgn="base" latinLnBrk="0" hangingPunct="1">
+                <a:lnSpc>
+                  <a:spcPct val="100000"/>
+                </a:lnSpc>
+                <a:spcBef>
+                  <a:spcPct val="0"/>
+                </a:spcBef>
+                <a:spcAft>
+                  <a:spcPct val="0"/>
+                </a:spcAft>
+                <a:buClrTx/>
+                <a:buSzTx/>
+                <a:buFontTx/>
+                <a:buNone/>
+                <a:tabLst/>
+              </a:pPr>
+              <a:endParaRPr kumimoji="0" lang="en-US" sz="1800" b="0" i="0" u="none" strike="noStrike" cap="none" normalizeH="0" baseline="0">
+                <a:ln>
+                  <a:noFill/>
+                </a:ln>
+                <a:solidFill>
+                  <a:schemeClr val="tx1"/>
+                </a:solidFill>
+                <a:effectLst/>
+                <a:latin typeface="Century Gothic" pitchFamily="34" charset="0"/>
+                <a:cs typeface="Arial" charset="0"/>
+              </a:endParaRPr>
+            </a:p>
+          </p:txBody>
+        </p:sp>
+        <p:sp>
+          <p:nvSpPr>
+            <p:cNvPr id="38" name="TextBox 37">
+              <a:extLst>
+                <a:ext uri="{FF2B5EF4-FFF2-40B4-BE49-F238E27FC236}">
+                  <a16:creationId xmlns:a16="http://schemas.microsoft.com/office/drawing/2014/main" id="{F0228B13-6CE8-4A92-8EC1-FB8D324DCD82}"/>
+                </a:ext>
+              </a:extLst>
+            </p:cNvPr>
+            <p:cNvSpPr txBox="1"/>
+            <p:nvPr/>
+          </p:nvSpPr>
+          <p:spPr>
+            <a:xfrm>
+              <a:off x="2667000" y="1127328"/>
+              <a:ext cx="351378" cy="369332"/>
+            </a:xfrm>
+            <a:prstGeom prst="rect">
+              <a:avLst/>
+            </a:prstGeom>
+            <a:noFill/>
+          </p:spPr>
+          <p:txBody>
+            <a:bodyPr wrap="none" rtlCol="0">
+              <a:spAutoFit/>
+            </a:bodyPr>
+            <a:lstStyle/>
+            <a:p>
+              <a:r>
+                <a:rPr lang="en-US" dirty="0">
+                  <a:latin typeface="Times New Roman" panose="02020603050405020304" pitchFamily="18" charset="0"/>
+                  <a:cs typeface="Times New Roman" panose="02020603050405020304" pitchFamily="18" charset="0"/>
+                </a:rPr>
+                <a:t>A</a:t>
+              </a:r>
+            </a:p>
+          </p:txBody>
+        </p:sp>
+        <p:sp>
+          <p:nvSpPr>
+            <p:cNvPr id="39" name="TextBox 38">
+              <a:extLst>
+                <a:ext uri="{FF2B5EF4-FFF2-40B4-BE49-F238E27FC236}">
+                  <a16:creationId xmlns:a16="http://schemas.microsoft.com/office/drawing/2014/main" id="{C49789DA-CDBA-4756-991D-066838BBDFA2}"/>
+                </a:ext>
+              </a:extLst>
+            </p:cNvPr>
+            <p:cNvSpPr txBox="1"/>
+            <p:nvPr/>
+          </p:nvSpPr>
+          <p:spPr>
+            <a:xfrm>
+              <a:off x="5404978" y="2754868"/>
+              <a:ext cx="338554" cy="369332"/>
+            </a:xfrm>
+            <a:prstGeom prst="rect">
+              <a:avLst/>
+            </a:prstGeom>
+            <a:noFill/>
+          </p:spPr>
+          <p:txBody>
+            <a:bodyPr wrap="none" rtlCol="0">
+              <a:spAutoFit/>
+            </a:bodyPr>
+            <a:lstStyle/>
+            <a:p>
+              <a:r>
+                <a:rPr lang="en-US" dirty="0">
+                  <a:latin typeface="Times New Roman" panose="02020603050405020304" pitchFamily="18" charset="0"/>
+                  <a:cs typeface="Times New Roman" panose="02020603050405020304" pitchFamily="18" charset="0"/>
+                </a:rPr>
+                <a:t>B</a:t>
+              </a:r>
+            </a:p>
+          </p:txBody>
+        </p:sp>
+      </p:grpSp>
+      <p:pic>
+        <p:nvPicPr>
+          <p:cNvPr id="27" name="Picture 26">
+            <a:extLst>
+              <a:ext uri="{FF2B5EF4-FFF2-40B4-BE49-F238E27FC236}">
+                <a16:creationId xmlns:a16="http://schemas.microsoft.com/office/drawing/2014/main" id="{0250D248-2B69-43F4-AE22-3708679C2C08}"/>
+              </a:ext>
+            </a:extLst>
+          </p:cNvPr>
+          <p:cNvPicPr>
+            <a:picLocks noChangeAspect="1"/>
+          </p:cNvPicPr>
+          <p:nvPr>
+            <p:custDataLst>
+              <p:tags r:id="rId1"/>
+            </p:custDataLst>
+          </p:nvPr>
+        </p:nvPicPr>
+        <p:blipFill>
+          <a:blip r:embed="rId7">
+            <a:extLst>
+              <a:ext uri="{28A0092B-C50C-407E-A947-70E740481C1C}">
+                <a14:useLocalDpi xmlns:a14="http://schemas.microsoft.com/office/drawing/2010/main" val="0"/>
+              </a:ext>
+            </a:extLst>
+          </a:blip>
+          <a:stretch>
+            <a:fillRect/>
+          </a:stretch>
+        </p:blipFill>
+        <p:spPr>
+          <a:xfrm>
+            <a:off x="4673854" y="2209800"/>
+            <a:ext cx="435207" cy="237207"/>
+          </a:xfrm>
+          <a:prstGeom prst="rect">
+            <a:avLst/>
+          </a:prstGeom>
+          <a:solidFill>
+            <a:schemeClr val="bg1"/>
+          </a:solidFill>
+        </p:spPr>
+      </p:pic>
+    </p:spTree>
+    <p:extLst>
+      <p:ext uri="{BB962C8B-B14F-4D97-AF65-F5344CB8AC3E}">
+        <p14:creationId xmlns:p14="http://schemas.microsoft.com/office/powerpoint/2010/main" val="4010751684"/>
+      </p:ext>
+    </p:extLst>
+  </p:cSld>
+  <p:clrMapOvr>
+    <a:masterClrMapping/>
+  </p:clrMapOvr>
+</p:sld>
+</file>
+
+<file path=ppt/slides/slide11.xml><?xml version="1.0" encoding="utf-8"?>
+<p:sld xmlns:a="http://schemas.openxmlformats.org/drawingml/2006/main" xmlns:r="http://schemas.openxmlformats.org/officeDocument/2006/relationships" xmlns:p="http://schemas.openxmlformats.org/presentationml/2006/main">
+  <p:cSld>
+    <p:spTree>
+      <p:nvGrpSpPr>
+        <p:cNvPr id="1" name=""/>
+        <p:cNvGrpSpPr/>
+        <p:nvPr/>
+      </p:nvGrpSpPr>
+      <p:grpSpPr>
+        <a:xfrm>
+          <a:off x="0" y="0"/>
+          <a:ext cx="0" cy="0"/>
+          <a:chOff x="0" y="0"/>
+          <a:chExt cx="0" cy="0"/>
+        </a:xfrm>
+      </p:grpSpPr>
+      <p:grpSp>
+        <p:nvGrpSpPr>
           <p:cNvPr id="8" name="Group 7">
             <a:extLst>
               <a:ext uri="{FF2B5EF4-FFF2-40B4-BE49-F238E27FC236}">
@@ -6727,7 +7978,7 @@
 </p:sld>
 </file>
 
-<file path=ppt/slides/slide11.xml><?xml version="1.0" encoding="utf-8"?>
+<file path=ppt/slides/slide12.xml><?xml version="1.0" encoding="utf-8"?>
 <p:sld xmlns:a="http://schemas.openxmlformats.org/drawingml/2006/main" xmlns:r="http://schemas.openxmlformats.org/officeDocument/2006/relationships" xmlns:p="http://schemas.openxmlformats.org/presentationml/2006/main">
   <p:cSld>
     <p:spTree>
@@ -6993,7 +8244,7 @@
 </p:sld>
 </file>
 
-<file path=ppt/slides/slide12.xml><?xml version="1.0" encoding="utf-8"?>
+<file path=ppt/slides/slide13.xml><?xml version="1.0" encoding="utf-8"?>
 <p:sld xmlns:a="http://schemas.openxmlformats.org/drawingml/2006/main" xmlns:r="http://schemas.openxmlformats.org/officeDocument/2006/relationships" xmlns:p="http://schemas.openxmlformats.org/presentationml/2006/main">
   <p:cSld>
     <p:spTree>
@@ -8109,7 +9360,7 @@
 </p:sld>
 </file>
 
-<file path=ppt/slides/slide13.xml><?xml version="1.0" encoding="utf-8"?>
+<file path=ppt/slides/slide14.xml><?xml version="1.0" encoding="utf-8"?>
 <p:sld xmlns:a="http://schemas.openxmlformats.org/drawingml/2006/main" xmlns:r="http://schemas.openxmlformats.org/officeDocument/2006/relationships" xmlns:p="http://schemas.openxmlformats.org/presentationml/2006/main">
   <p:cSld>
     <p:spTree>
@@ -11279,7 +12530,7 @@
 </p:sld>
 </file>
 
-<file path=ppt/slides/slide14.xml><?xml version="1.0" encoding="utf-8"?>
+<file path=ppt/slides/slide15.xml><?xml version="1.0" encoding="utf-8"?>
 <p:sld xmlns:a="http://schemas.openxmlformats.org/drawingml/2006/main" xmlns:r="http://schemas.openxmlformats.org/officeDocument/2006/relationships" xmlns:p="http://schemas.openxmlformats.org/presentationml/2006/main">
   <p:cSld>
     <p:spTree>
@@ -12929,7 +14180,7 @@
 </p:sld>
 </file>
 
-<file path=ppt/slides/slide15.xml><?xml version="1.0" encoding="utf-8"?>
+<file path=ppt/slides/slide16.xml><?xml version="1.0" encoding="utf-8"?>
 <p:sld xmlns:a="http://schemas.openxmlformats.org/drawingml/2006/main" xmlns:r="http://schemas.openxmlformats.org/officeDocument/2006/relationships" xmlns:p="http://schemas.openxmlformats.org/presentationml/2006/main">
   <p:cSld>
     <p:spTree>
@@ -13470,7 +14721,7 @@
 </p:sld>
 </file>
 
-<file path=ppt/slides/slide16.xml><?xml version="1.0" encoding="utf-8"?>
+<file path=ppt/slides/slide17.xml><?xml version="1.0" encoding="utf-8"?>
 <p:sld xmlns:a="http://schemas.openxmlformats.org/drawingml/2006/main" xmlns:r="http://schemas.openxmlformats.org/officeDocument/2006/relationships" xmlns:p="http://schemas.openxmlformats.org/presentationml/2006/main">
   <p:cSld>
     <p:spTree>
@@ -14045,7 +15296,7 @@
 </p:sld>
 </file>
 
-<file path=ppt/slides/slide17.xml><?xml version="1.0" encoding="utf-8"?>
+<file path=ppt/slides/slide18.xml><?xml version="1.0" encoding="utf-8"?>
 <p:sld xmlns:a="http://schemas.openxmlformats.org/drawingml/2006/main" xmlns:r="http://schemas.openxmlformats.org/officeDocument/2006/relationships" xmlns:p="http://schemas.openxmlformats.org/presentationml/2006/main">
   <p:cSld>
     <p:spTree>
@@ -15638,7 +16889,7 @@
 </p:sld>
 </file>
 
-<file path=ppt/slides/slide18.xml><?xml version="1.0" encoding="utf-8"?>
+<file path=ppt/slides/slide19.xml><?xml version="1.0" encoding="utf-8"?>
 <p:sld xmlns:a="http://schemas.openxmlformats.org/drawingml/2006/main" xmlns:r="http://schemas.openxmlformats.org/officeDocument/2006/relationships" xmlns:p="http://schemas.openxmlformats.org/presentationml/2006/main">
   <p:cSld>
     <p:spTree>
@@ -15885,7 +17136,257 @@
 </p:sld>
 </file>
 
-<file path=ppt/slides/slide19.xml><?xml version="1.0" encoding="utf-8"?>
+<file path=ppt/slides/slide2.xml><?xml version="1.0" encoding="utf-8"?>
+<p:sld xmlns:a="http://schemas.openxmlformats.org/drawingml/2006/main" xmlns:r="http://schemas.openxmlformats.org/officeDocument/2006/relationships" xmlns:p="http://schemas.openxmlformats.org/presentationml/2006/main">
+  <p:cSld>
+    <p:spTree>
+      <p:nvGrpSpPr>
+        <p:cNvPr id="1" name=""/>
+        <p:cNvGrpSpPr/>
+        <p:nvPr/>
+      </p:nvGrpSpPr>
+      <p:grpSpPr>
+        <a:xfrm>
+          <a:off x="0" y="0"/>
+          <a:ext cx="0" cy="0"/>
+          <a:chOff x="0" y="0"/>
+          <a:chExt cx="0" cy="0"/>
+        </a:xfrm>
+      </p:grpSpPr>
+      <p:grpSp>
+        <p:nvGrpSpPr>
+          <p:cNvPr id="39" name="Group 38">
+            <a:extLst>
+              <a:ext uri="{FF2B5EF4-FFF2-40B4-BE49-F238E27FC236}">
+                <a16:creationId xmlns:a16="http://schemas.microsoft.com/office/drawing/2014/main" id="{D497F467-7931-4C1D-B1F6-952FB7B632C3}"/>
+              </a:ext>
+            </a:extLst>
+          </p:cNvPr>
+          <p:cNvGrpSpPr/>
+          <p:nvPr/>
+        </p:nvGrpSpPr>
+        <p:grpSpPr>
+          <a:xfrm>
+            <a:off x="1389411" y="1151792"/>
+            <a:ext cx="7754589" cy="5706208"/>
+            <a:chOff x="4577999" y="3498112"/>
+            <a:chExt cx="4566001" cy="3359888"/>
+          </a:xfrm>
+        </p:grpSpPr>
+        <p:pic>
+          <p:nvPicPr>
+            <p:cNvPr id="53" name="Picture 10">
+              <a:extLst>
+                <a:ext uri="{FF2B5EF4-FFF2-40B4-BE49-F238E27FC236}">
+                  <a16:creationId xmlns:a16="http://schemas.microsoft.com/office/drawing/2014/main" id="{A7E1E977-894B-4500-B376-7D87B82B366F}"/>
+                </a:ext>
+              </a:extLst>
+            </p:cNvPr>
+            <p:cNvPicPr>
+              <a:picLocks noChangeAspect="1" noChangeArrowheads="1"/>
+            </p:cNvPicPr>
+            <p:nvPr/>
+          </p:nvPicPr>
+          <p:blipFill>
+            <a:blip r:embed="rId4" cstate="print"/>
+            <a:srcRect/>
+            <a:stretch>
+              <a:fillRect/>
+            </a:stretch>
+          </p:blipFill>
+          <p:spPr bwMode="auto">
+            <a:xfrm>
+              <a:off x="4577999" y="3498112"/>
+              <a:ext cx="4566001" cy="3359888"/>
+            </a:xfrm>
+            <a:prstGeom prst="rect">
+              <a:avLst/>
+            </a:prstGeom>
+            <a:noFill/>
+            <a:ln w="9525">
+              <a:noFill/>
+              <a:miter lim="800000"/>
+              <a:headEnd/>
+              <a:tailEnd/>
+            </a:ln>
+            <a:effectLst/>
+          </p:spPr>
+        </p:pic>
+        <p:sp>
+          <p:nvSpPr>
+            <p:cNvPr id="55" name="TextBox 54">
+              <a:extLst>
+                <a:ext uri="{FF2B5EF4-FFF2-40B4-BE49-F238E27FC236}">
+                  <a16:creationId xmlns:a16="http://schemas.microsoft.com/office/drawing/2014/main" id="{AB797F76-A35C-4397-9DD8-05A84436EBC5}"/>
+                </a:ext>
+              </a:extLst>
+            </p:cNvPr>
+            <p:cNvSpPr txBox="1"/>
+            <p:nvPr/>
+          </p:nvSpPr>
+          <p:spPr>
+            <a:xfrm>
+              <a:off x="6399716" y="3675457"/>
+              <a:ext cx="2191626" cy="369332"/>
+            </a:xfrm>
+            <a:prstGeom prst="rect">
+              <a:avLst/>
+            </a:prstGeom>
+            <a:noFill/>
+          </p:spPr>
+          <p:txBody>
+            <a:bodyPr wrap="none" rtlCol="0">
+              <a:spAutoFit/>
+            </a:bodyPr>
+            <a:lstStyle/>
+            <a:p>
+              <a:r>
+                <a:rPr lang="en-US" sz="1800" dirty="0"/>
+                <a:t>Calibrate at max flow</a:t>
+              </a:r>
+            </a:p>
+          </p:txBody>
+        </p:sp>
+        <p:cxnSp>
+          <p:nvCxnSpPr>
+            <p:cNvPr id="56" name="Straight Arrow Connector 55">
+              <a:extLst>
+                <a:ext uri="{FF2B5EF4-FFF2-40B4-BE49-F238E27FC236}">
+                  <a16:creationId xmlns:a16="http://schemas.microsoft.com/office/drawing/2014/main" id="{75D68BC6-29E9-4C3B-B84D-3A84EBFF1732}"/>
+                </a:ext>
+              </a:extLst>
+            </p:cNvPr>
+            <p:cNvCxnSpPr/>
+            <p:nvPr/>
+          </p:nvCxnSpPr>
+          <p:spPr bwMode="auto">
+            <a:xfrm flipV="1">
+              <a:off x="8506047" y="3668234"/>
+              <a:ext cx="414669" cy="170119"/>
+            </a:xfrm>
+            <a:prstGeom prst="straightConnector1">
+              <a:avLst/>
+            </a:prstGeom>
+            <a:solidFill>
+              <a:schemeClr val="accent1"/>
+            </a:solidFill>
+            <a:ln w="12700" cap="flat" cmpd="sng" algn="ctr">
+              <a:solidFill>
+                <a:schemeClr val="tx1"/>
+              </a:solidFill>
+              <a:prstDash val="solid"/>
+              <a:round/>
+              <a:headEnd type="none" w="lg" len="med"/>
+              <a:tailEnd type="arrow"/>
+            </a:ln>
+            <a:effectLst/>
+          </p:spPr>
+        </p:cxnSp>
+        <p:pic>
+          <p:nvPicPr>
+            <p:cNvPr id="57" name="Picture 56">
+              <a:extLst>
+                <a:ext uri="{FF2B5EF4-FFF2-40B4-BE49-F238E27FC236}">
+                  <a16:creationId xmlns:a16="http://schemas.microsoft.com/office/drawing/2014/main" id="{98F574C6-D6D3-438A-A215-BFFB1363DC5F}"/>
+                </a:ext>
+              </a:extLst>
+            </p:cNvPr>
+            <p:cNvPicPr>
+              <a:picLocks noChangeAspect="1"/>
+            </p:cNvPicPr>
+            <p:nvPr>
+              <p:custDataLst>
+                <p:tags r:id="rId1"/>
+              </p:custDataLst>
+            </p:nvPr>
+          </p:nvPicPr>
+          <p:blipFill>
+            <a:blip r:embed="rId5" cstate="print">
+              <a:extLst>
+                <a:ext uri="{28A0092B-C50C-407E-A947-70E740481C1C}">
+                  <a14:useLocalDpi xmlns:a14="http://schemas.microsoft.com/office/drawing/2010/main" val="0"/>
+                </a:ext>
+              </a:extLst>
+            </a:blip>
+            <a:stretch>
+              <a:fillRect/>
+            </a:stretch>
+          </p:blipFill>
+          <p:spPr>
+            <a:xfrm>
+              <a:off x="5192783" y="4277218"/>
+              <a:ext cx="1912971" cy="274165"/>
+            </a:xfrm>
+            <a:prstGeom prst="rect">
+              <a:avLst/>
+            </a:prstGeom>
+            <a:ln w="38100">
+              <a:solidFill>
+                <a:srgbClr val="0000FF"/>
+              </a:solidFill>
+            </a:ln>
+          </p:spPr>
+        </p:pic>
+        <p:pic>
+          <p:nvPicPr>
+            <p:cNvPr id="58" name="Picture 57">
+              <a:extLst>
+                <a:ext uri="{FF2B5EF4-FFF2-40B4-BE49-F238E27FC236}">
+                  <a16:creationId xmlns:a16="http://schemas.microsoft.com/office/drawing/2014/main" id="{0A1D9E0B-FB20-4D21-ABAF-CCC47760697D}"/>
+                </a:ext>
+              </a:extLst>
+            </p:cNvPr>
+            <p:cNvPicPr>
+              <a:picLocks noChangeAspect="1"/>
+            </p:cNvPicPr>
+            <p:nvPr>
+              <p:custDataLst>
+                <p:tags r:id="rId2"/>
+              </p:custDataLst>
+            </p:nvPr>
+          </p:nvPicPr>
+          <p:blipFill>
+            <a:blip r:embed="rId6" cstate="print">
+              <a:extLst>
+                <a:ext uri="{28A0092B-C50C-407E-A947-70E740481C1C}">
+                  <a14:useLocalDpi xmlns:a14="http://schemas.microsoft.com/office/drawing/2010/main" val="0"/>
+                </a:ext>
+              </a:extLst>
+            </a:blip>
+            <a:stretch>
+              <a:fillRect/>
+            </a:stretch>
+          </p:blipFill>
+          <p:spPr>
+            <a:xfrm>
+              <a:off x="6467912" y="5926856"/>
+              <a:ext cx="2432814" cy="309138"/>
+            </a:xfrm>
+            <a:prstGeom prst="rect">
+              <a:avLst/>
+            </a:prstGeom>
+            <a:ln w="38100">
+              <a:solidFill>
+                <a:srgbClr val="01FF01"/>
+              </a:solidFill>
+            </a:ln>
+          </p:spPr>
+        </p:pic>
+      </p:grpSp>
+    </p:spTree>
+    <p:extLst>
+      <p:ext uri="{BB962C8B-B14F-4D97-AF65-F5344CB8AC3E}">
+        <p14:creationId xmlns:p14="http://schemas.microsoft.com/office/powerpoint/2010/main" val="858243599"/>
+      </p:ext>
+    </p:extLst>
+  </p:cSld>
+  <p:clrMapOvr>
+    <a:masterClrMapping/>
+  </p:clrMapOvr>
+</p:sld>
+</file>
+
+<file path=ppt/slides/slide20.xml><?xml version="1.0" encoding="utf-8"?>
 <p:sld xmlns:a="http://schemas.openxmlformats.org/drawingml/2006/main" xmlns:r="http://schemas.openxmlformats.org/officeDocument/2006/relationships" xmlns:p="http://schemas.openxmlformats.org/presentationml/2006/main">
   <p:cSld>
     <p:spTree>
@@ -26863,256 +28364,6 @@
 </p:sld>
 </file>
 
-<file path=ppt/slides/slide2.xml><?xml version="1.0" encoding="utf-8"?>
-<p:sld xmlns:a="http://schemas.openxmlformats.org/drawingml/2006/main" xmlns:r="http://schemas.openxmlformats.org/officeDocument/2006/relationships" xmlns:p="http://schemas.openxmlformats.org/presentationml/2006/main">
-  <p:cSld>
-    <p:spTree>
-      <p:nvGrpSpPr>
-        <p:cNvPr id="1" name=""/>
-        <p:cNvGrpSpPr/>
-        <p:nvPr/>
-      </p:nvGrpSpPr>
-      <p:grpSpPr>
-        <a:xfrm>
-          <a:off x="0" y="0"/>
-          <a:ext cx="0" cy="0"/>
-          <a:chOff x="0" y="0"/>
-          <a:chExt cx="0" cy="0"/>
-        </a:xfrm>
-      </p:grpSpPr>
-      <p:grpSp>
-        <p:nvGrpSpPr>
-          <p:cNvPr id="39" name="Group 38">
-            <a:extLst>
-              <a:ext uri="{FF2B5EF4-FFF2-40B4-BE49-F238E27FC236}">
-                <a16:creationId xmlns:a16="http://schemas.microsoft.com/office/drawing/2014/main" id="{D497F467-7931-4C1D-B1F6-952FB7B632C3}"/>
-              </a:ext>
-            </a:extLst>
-          </p:cNvPr>
-          <p:cNvGrpSpPr/>
-          <p:nvPr/>
-        </p:nvGrpSpPr>
-        <p:grpSpPr>
-          <a:xfrm>
-            <a:off x="1389411" y="1151792"/>
-            <a:ext cx="7754589" cy="5706208"/>
-            <a:chOff x="4577999" y="3498112"/>
-            <a:chExt cx="4566001" cy="3359888"/>
-          </a:xfrm>
-        </p:grpSpPr>
-        <p:pic>
-          <p:nvPicPr>
-            <p:cNvPr id="53" name="Picture 10">
-              <a:extLst>
-                <a:ext uri="{FF2B5EF4-FFF2-40B4-BE49-F238E27FC236}">
-                  <a16:creationId xmlns:a16="http://schemas.microsoft.com/office/drawing/2014/main" id="{A7E1E977-894B-4500-B376-7D87B82B366F}"/>
-                </a:ext>
-              </a:extLst>
-            </p:cNvPr>
-            <p:cNvPicPr>
-              <a:picLocks noChangeAspect="1" noChangeArrowheads="1"/>
-            </p:cNvPicPr>
-            <p:nvPr/>
-          </p:nvPicPr>
-          <p:blipFill>
-            <a:blip r:embed="rId4" cstate="print"/>
-            <a:srcRect/>
-            <a:stretch>
-              <a:fillRect/>
-            </a:stretch>
-          </p:blipFill>
-          <p:spPr bwMode="auto">
-            <a:xfrm>
-              <a:off x="4577999" y="3498112"/>
-              <a:ext cx="4566001" cy="3359888"/>
-            </a:xfrm>
-            <a:prstGeom prst="rect">
-              <a:avLst/>
-            </a:prstGeom>
-            <a:noFill/>
-            <a:ln w="9525">
-              <a:noFill/>
-              <a:miter lim="800000"/>
-              <a:headEnd/>
-              <a:tailEnd/>
-            </a:ln>
-            <a:effectLst/>
-          </p:spPr>
-        </p:pic>
-        <p:sp>
-          <p:nvSpPr>
-            <p:cNvPr id="55" name="TextBox 54">
-              <a:extLst>
-                <a:ext uri="{FF2B5EF4-FFF2-40B4-BE49-F238E27FC236}">
-                  <a16:creationId xmlns:a16="http://schemas.microsoft.com/office/drawing/2014/main" id="{AB797F76-A35C-4397-9DD8-05A84436EBC5}"/>
-                </a:ext>
-              </a:extLst>
-            </p:cNvPr>
-            <p:cNvSpPr txBox="1"/>
-            <p:nvPr/>
-          </p:nvSpPr>
-          <p:spPr>
-            <a:xfrm>
-              <a:off x="6399716" y="3675457"/>
-              <a:ext cx="2191626" cy="369332"/>
-            </a:xfrm>
-            <a:prstGeom prst="rect">
-              <a:avLst/>
-            </a:prstGeom>
-            <a:noFill/>
-          </p:spPr>
-          <p:txBody>
-            <a:bodyPr wrap="none" rtlCol="0">
-              <a:spAutoFit/>
-            </a:bodyPr>
-            <a:lstStyle/>
-            <a:p>
-              <a:r>
-                <a:rPr lang="en-US" sz="1800" dirty="0"/>
-                <a:t>Calibrate at max flow</a:t>
-              </a:r>
-            </a:p>
-          </p:txBody>
-        </p:sp>
-        <p:cxnSp>
-          <p:nvCxnSpPr>
-            <p:cNvPr id="56" name="Straight Arrow Connector 55">
-              <a:extLst>
-                <a:ext uri="{FF2B5EF4-FFF2-40B4-BE49-F238E27FC236}">
-                  <a16:creationId xmlns:a16="http://schemas.microsoft.com/office/drawing/2014/main" id="{75D68BC6-29E9-4C3B-B84D-3A84EBFF1732}"/>
-                </a:ext>
-              </a:extLst>
-            </p:cNvPr>
-            <p:cNvCxnSpPr/>
-            <p:nvPr/>
-          </p:nvCxnSpPr>
-          <p:spPr bwMode="auto">
-            <a:xfrm flipV="1">
-              <a:off x="8506047" y="3668234"/>
-              <a:ext cx="414669" cy="170119"/>
-            </a:xfrm>
-            <a:prstGeom prst="straightConnector1">
-              <a:avLst/>
-            </a:prstGeom>
-            <a:solidFill>
-              <a:schemeClr val="accent1"/>
-            </a:solidFill>
-            <a:ln w="12700" cap="flat" cmpd="sng" algn="ctr">
-              <a:solidFill>
-                <a:schemeClr val="tx1"/>
-              </a:solidFill>
-              <a:prstDash val="solid"/>
-              <a:round/>
-              <a:headEnd type="none" w="lg" len="med"/>
-              <a:tailEnd type="arrow"/>
-            </a:ln>
-            <a:effectLst/>
-          </p:spPr>
-        </p:cxnSp>
-        <p:pic>
-          <p:nvPicPr>
-            <p:cNvPr id="57" name="Picture 56">
-              <a:extLst>
-                <a:ext uri="{FF2B5EF4-FFF2-40B4-BE49-F238E27FC236}">
-                  <a16:creationId xmlns:a16="http://schemas.microsoft.com/office/drawing/2014/main" id="{98F574C6-D6D3-438A-A215-BFFB1363DC5F}"/>
-                </a:ext>
-              </a:extLst>
-            </p:cNvPr>
-            <p:cNvPicPr>
-              <a:picLocks noChangeAspect="1"/>
-            </p:cNvPicPr>
-            <p:nvPr>
-              <p:custDataLst>
-                <p:tags r:id="rId1"/>
-              </p:custDataLst>
-            </p:nvPr>
-          </p:nvPicPr>
-          <p:blipFill>
-            <a:blip r:embed="rId5" cstate="print">
-              <a:extLst>
-                <a:ext uri="{28A0092B-C50C-407E-A947-70E740481C1C}">
-                  <a14:useLocalDpi xmlns:a14="http://schemas.microsoft.com/office/drawing/2010/main" val="0"/>
-                </a:ext>
-              </a:extLst>
-            </a:blip>
-            <a:stretch>
-              <a:fillRect/>
-            </a:stretch>
-          </p:blipFill>
-          <p:spPr>
-            <a:xfrm>
-              <a:off x="5192783" y="4277218"/>
-              <a:ext cx="1912971" cy="274165"/>
-            </a:xfrm>
-            <a:prstGeom prst="rect">
-              <a:avLst/>
-            </a:prstGeom>
-            <a:ln w="38100">
-              <a:solidFill>
-                <a:srgbClr val="0000FF"/>
-              </a:solidFill>
-            </a:ln>
-          </p:spPr>
-        </p:pic>
-        <p:pic>
-          <p:nvPicPr>
-            <p:cNvPr id="58" name="Picture 57">
-              <a:extLst>
-                <a:ext uri="{FF2B5EF4-FFF2-40B4-BE49-F238E27FC236}">
-                  <a16:creationId xmlns:a16="http://schemas.microsoft.com/office/drawing/2014/main" id="{0A1D9E0B-FB20-4D21-ABAF-CCC47760697D}"/>
-                </a:ext>
-              </a:extLst>
-            </p:cNvPr>
-            <p:cNvPicPr>
-              <a:picLocks noChangeAspect="1"/>
-            </p:cNvPicPr>
-            <p:nvPr>
-              <p:custDataLst>
-                <p:tags r:id="rId2"/>
-              </p:custDataLst>
-            </p:nvPr>
-          </p:nvPicPr>
-          <p:blipFill>
-            <a:blip r:embed="rId6" cstate="print">
-              <a:extLst>
-                <a:ext uri="{28A0092B-C50C-407E-A947-70E740481C1C}">
-                  <a14:useLocalDpi xmlns:a14="http://schemas.microsoft.com/office/drawing/2010/main" val="0"/>
-                </a:ext>
-              </a:extLst>
-            </a:blip>
-            <a:stretch>
-              <a:fillRect/>
-            </a:stretch>
-          </p:blipFill>
-          <p:spPr>
-            <a:xfrm>
-              <a:off x="6467912" y="5926856"/>
-              <a:ext cx="2432814" cy="309138"/>
-            </a:xfrm>
-            <a:prstGeom prst="rect">
-              <a:avLst/>
-            </a:prstGeom>
-            <a:ln w="38100">
-              <a:solidFill>
-                <a:srgbClr val="01FF01"/>
-              </a:solidFill>
-            </a:ln>
-          </p:spPr>
-        </p:pic>
-      </p:grpSp>
-    </p:spTree>
-    <p:extLst>
-      <p:ext uri="{BB962C8B-B14F-4D97-AF65-F5344CB8AC3E}">
-        <p14:creationId xmlns:p14="http://schemas.microsoft.com/office/powerpoint/2010/main" val="858243599"/>
-      </p:ext>
-    </p:extLst>
-  </p:cSld>
-  <p:clrMapOvr>
-    <a:masterClrMapping/>
-  </p:clrMapOvr>
-</p:sld>
-</file>
-
 <file path=ppt/slides/slide3.xml><?xml version="1.0" encoding="utf-8"?>
 <p:sld xmlns:a="http://schemas.openxmlformats.org/drawingml/2006/main" xmlns:r="http://schemas.openxmlformats.org/officeDocument/2006/relationships" xmlns:p="http://schemas.openxmlformats.org/presentationml/2006/main">
   <p:cSld>
@@ -31061,6 +32312,297 @@
       </p:grpSpPr>
       <p:grpSp>
         <p:nvGrpSpPr>
+          <p:cNvPr id="12" name="Group 11">
+            <a:extLst>
+              <a:ext uri="{FF2B5EF4-FFF2-40B4-BE49-F238E27FC236}">
+                <a16:creationId xmlns:a16="http://schemas.microsoft.com/office/drawing/2014/main" id="{58947A75-FB78-4F67-B9AC-2734389EEB3B}"/>
+              </a:ext>
+            </a:extLst>
+          </p:cNvPr>
+          <p:cNvGrpSpPr/>
+          <p:nvPr/>
+        </p:nvGrpSpPr>
+        <p:grpSpPr>
+          <a:xfrm>
+            <a:off x="1925610" y="1308427"/>
+            <a:ext cx="6082091" cy="3427099"/>
+            <a:chOff x="1925610" y="1308427"/>
+            <a:chExt cx="6082091" cy="3427099"/>
+          </a:xfrm>
+        </p:grpSpPr>
+        <p:pic>
+          <p:nvPicPr>
+            <p:cNvPr id="147" name="Picture 30">
+              <a:extLst>
+                <a:ext uri="{FF2B5EF4-FFF2-40B4-BE49-F238E27FC236}">
+                  <a16:creationId xmlns:a16="http://schemas.microsoft.com/office/drawing/2014/main" id="{820F294F-6D6C-45DF-BC7E-4E50215C1698}"/>
+                </a:ext>
+              </a:extLst>
+            </p:cNvPr>
+            <p:cNvPicPr>
+              <a:picLocks noChangeAspect="1" noChangeArrowheads="1"/>
+            </p:cNvPicPr>
+            <p:nvPr/>
+          </p:nvPicPr>
+          <p:blipFill>
+            <a:blip r:embed="rId6" cstate="print"/>
+            <a:srcRect/>
+            <a:stretch>
+              <a:fillRect/>
+            </a:stretch>
+          </p:blipFill>
+          <p:spPr bwMode="auto">
+            <a:xfrm>
+              <a:off x="1925610" y="1308427"/>
+              <a:ext cx="4114800" cy="3055763"/>
+            </a:xfrm>
+            <a:prstGeom prst="rect">
+              <a:avLst/>
+            </a:prstGeom>
+            <a:noFill/>
+            <a:ln w="9525">
+              <a:noFill/>
+              <a:miter lim="800000"/>
+              <a:headEnd/>
+              <a:tailEnd/>
+            </a:ln>
+            <a:effectLst/>
+          </p:spPr>
+        </p:pic>
+        <p:pic>
+          <p:nvPicPr>
+            <p:cNvPr id="148" name="Picture 34">
+              <a:extLst>
+                <a:ext uri="{FF2B5EF4-FFF2-40B4-BE49-F238E27FC236}">
+                  <a16:creationId xmlns:a16="http://schemas.microsoft.com/office/drawing/2014/main" id="{E1A2C123-BB7A-48E4-A5D5-91ED755FF83C}"/>
+                </a:ext>
+              </a:extLst>
+            </p:cNvPr>
+            <p:cNvPicPr>
+              <a:picLocks noChangeAspect="1" noChangeArrowheads="1"/>
+            </p:cNvPicPr>
+            <p:nvPr/>
+          </p:nvPicPr>
+          <p:blipFill>
+            <a:blip r:embed="rId7" cstate="print"/>
+            <a:srcRect/>
+            <a:stretch>
+              <a:fillRect/>
+            </a:stretch>
+          </p:blipFill>
+          <p:spPr bwMode="auto">
+            <a:xfrm>
+              <a:off x="5938733" y="3275524"/>
+              <a:ext cx="1764698" cy="1460002"/>
+            </a:xfrm>
+            <a:prstGeom prst="rect">
+              <a:avLst/>
+            </a:prstGeom>
+            <a:noFill/>
+            <a:ln w="22225">
+              <a:solidFill>
+                <a:srgbClr val="008000"/>
+              </a:solidFill>
+              <a:miter lim="800000"/>
+              <a:headEnd/>
+              <a:tailEnd/>
+            </a:ln>
+            <a:effectLst/>
+          </p:spPr>
+        </p:pic>
+        <p:pic>
+          <p:nvPicPr>
+            <p:cNvPr id="7" name="Picture 6">
+              <a:extLst>
+                <a:ext uri="{FF2B5EF4-FFF2-40B4-BE49-F238E27FC236}">
+                  <a16:creationId xmlns:a16="http://schemas.microsoft.com/office/drawing/2014/main" id="{440C3AEF-1F5A-411C-8A83-B8FB57C6A536}"/>
+                </a:ext>
+              </a:extLst>
+            </p:cNvPr>
+            <p:cNvPicPr>
+              <a:picLocks noChangeAspect="1"/>
+            </p:cNvPicPr>
+            <p:nvPr>
+              <p:custDataLst>
+                <p:tags r:id="rId1"/>
+              </p:custDataLst>
+            </p:nvPr>
+          </p:nvPicPr>
+          <p:blipFill>
+            <a:blip r:embed="rId8">
+              <a:extLst>
+                <a:ext uri="{28A0092B-C50C-407E-A947-70E740481C1C}">
+                  <a14:useLocalDpi xmlns:a14="http://schemas.microsoft.com/office/drawing/2010/main" val="0"/>
+                </a:ext>
+              </a:extLst>
+            </a:blip>
+            <a:stretch>
+              <a:fillRect/>
+            </a:stretch>
+          </p:blipFill>
+          <p:spPr>
+            <a:xfrm>
+              <a:off x="6578860" y="2547864"/>
+              <a:ext cx="1124571" cy="214857"/>
+            </a:xfrm>
+            <a:prstGeom prst="rect">
+              <a:avLst/>
+            </a:prstGeom>
+          </p:spPr>
+        </p:pic>
+        <p:pic>
+          <p:nvPicPr>
+            <p:cNvPr id="9" name="Picture 8">
+              <a:extLst>
+                <a:ext uri="{FF2B5EF4-FFF2-40B4-BE49-F238E27FC236}">
+                  <a16:creationId xmlns:a16="http://schemas.microsoft.com/office/drawing/2014/main" id="{11193E3B-D15E-4B59-A03E-514EAD3297E8}"/>
+                </a:ext>
+              </a:extLst>
+            </p:cNvPr>
+            <p:cNvPicPr>
+              <a:picLocks noChangeAspect="1"/>
+            </p:cNvPicPr>
+            <p:nvPr>
+              <p:custDataLst>
+                <p:tags r:id="rId2"/>
+              </p:custDataLst>
+            </p:nvPr>
+          </p:nvPicPr>
+          <p:blipFill>
+            <a:blip r:embed="rId9">
+              <a:extLst>
+                <a:ext uri="{28A0092B-C50C-407E-A947-70E740481C1C}">
+                  <a14:useLocalDpi xmlns:a14="http://schemas.microsoft.com/office/drawing/2010/main" val="0"/>
+                </a:ext>
+              </a:extLst>
+            </a:blip>
+            <a:stretch>
+              <a:fillRect/>
+            </a:stretch>
+          </p:blipFill>
+          <p:spPr>
+            <a:xfrm>
+              <a:off x="6040410" y="2913564"/>
+              <a:ext cx="1391238" cy="213333"/>
+            </a:xfrm>
+            <a:prstGeom prst="rect">
+              <a:avLst/>
+            </a:prstGeom>
+          </p:spPr>
+        </p:pic>
+        <p:pic>
+          <p:nvPicPr>
+            <p:cNvPr id="5" name="Picture 4">
+              <a:extLst>
+                <a:ext uri="{FF2B5EF4-FFF2-40B4-BE49-F238E27FC236}">
+                  <a16:creationId xmlns:a16="http://schemas.microsoft.com/office/drawing/2014/main" id="{87C764CC-94F3-4185-97D6-8A907A142D3E}"/>
+                </a:ext>
+              </a:extLst>
+            </p:cNvPr>
+            <p:cNvPicPr>
+              <a:picLocks noChangeAspect="1"/>
+            </p:cNvPicPr>
+            <p:nvPr>
+              <p:custDataLst>
+                <p:tags r:id="rId3"/>
+              </p:custDataLst>
+            </p:nvPr>
+          </p:nvPicPr>
+          <p:blipFill>
+            <a:blip r:embed="rId10">
+              <a:extLst>
+                <a:ext uri="{28A0092B-C50C-407E-A947-70E740481C1C}">
+                  <a14:useLocalDpi xmlns:a14="http://schemas.microsoft.com/office/drawing/2010/main" val="0"/>
+                </a:ext>
+              </a:extLst>
+            </a:blip>
+            <a:stretch>
+              <a:fillRect/>
+            </a:stretch>
+          </p:blipFill>
+          <p:spPr>
+            <a:xfrm>
+              <a:off x="6651511" y="1957564"/>
+              <a:ext cx="1356190" cy="559238"/>
+            </a:xfrm>
+            <a:prstGeom prst="rect">
+              <a:avLst/>
+            </a:prstGeom>
+          </p:spPr>
+        </p:pic>
+        <p:pic>
+          <p:nvPicPr>
+            <p:cNvPr id="11" name="Picture 10">
+              <a:extLst>
+                <a:ext uri="{FF2B5EF4-FFF2-40B4-BE49-F238E27FC236}">
+                  <a16:creationId xmlns:a16="http://schemas.microsoft.com/office/drawing/2014/main" id="{DFFC596D-06DC-4468-BD3B-D6CA0E134F42}"/>
+                </a:ext>
+              </a:extLst>
+            </p:cNvPr>
+            <p:cNvPicPr>
+              <a:picLocks noChangeAspect="1"/>
+            </p:cNvPicPr>
+            <p:nvPr>
+              <p:custDataLst>
+                <p:tags r:id="rId4"/>
+              </p:custDataLst>
+            </p:nvPr>
+          </p:nvPicPr>
+          <p:blipFill>
+            <a:blip r:embed="rId11">
+              <a:extLst>
+                <a:ext uri="{28A0092B-C50C-407E-A947-70E740481C1C}">
+                  <a14:useLocalDpi xmlns:a14="http://schemas.microsoft.com/office/drawing/2010/main" val="0"/>
+                </a:ext>
+              </a:extLst>
+            </a:blip>
+            <a:stretch>
+              <a:fillRect/>
+            </a:stretch>
+          </p:blipFill>
+          <p:spPr>
+            <a:xfrm>
+              <a:off x="6031789" y="1679888"/>
+              <a:ext cx="1168762" cy="355048"/>
+            </a:xfrm>
+            <a:prstGeom prst="rect">
+              <a:avLst/>
+            </a:prstGeom>
+          </p:spPr>
+        </p:pic>
+      </p:grpSp>
+    </p:spTree>
+    <p:extLst>
+      <p:ext uri="{BB962C8B-B14F-4D97-AF65-F5344CB8AC3E}">
+        <p14:creationId xmlns:p14="http://schemas.microsoft.com/office/powerpoint/2010/main" val="811308182"/>
+      </p:ext>
+    </p:extLst>
+  </p:cSld>
+  <p:clrMapOvr>
+    <a:masterClrMapping/>
+  </p:clrMapOvr>
+</p:sld>
+</file>
+
+<file path=ppt/slides/slide5.xml><?xml version="1.0" encoding="utf-8"?>
+<p:sld xmlns:a="http://schemas.openxmlformats.org/drawingml/2006/main" xmlns:r="http://schemas.openxmlformats.org/officeDocument/2006/relationships" xmlns:p="http://schemas.openxmlformats.org/presentationml/2006/main">
+  <p:cSld>
+    <p:spTree>
+      <p:nvGrpSpPr>
+        <p:cNvPr id="1" name=""/>
+        <p:cNvGrpSpPr/>
+        <p:nvPr/>
+      </p:nvGrpSpPr>
+      <p:grpSpPr>
+        <a:xfrm>
+          <a:off x="0" y="0"/>
+          <a:ext cx="0" cy="0"/>
+          <a:chOff x="0" y="0"/>
+          <a:chExt cx="0" cy="0"/>
+        </a:xfrm>
+      </p:grpSpPr>
+      <p:grpSp>
+        <p:nvGrpSpPr>
           <p:cNvPr id="10" name="Group 9">
             <a:extLst>
               <a:ext uri="{FF2B5EF4-FFF2-40B4-BE49-F238E27FC236}">
@@ -31792,7 +33334,7 @@
 </p:sld>
 </file>
 
-<file path=ppt/slides/slide5.xml><?xml version="1.0" encoding="utf-8"?>
+<file path=ppt/slides/slide6.xml><?xml version="1.0" encoding="utf-8"?>
 <p:sld xmlns:a="http://schemas.openxmlformats.org/drawingml/2006/main" xmlns:r="http://schemas.openxmlformats.org/officeDocument/2006/relationships" xmlns:p="http://schemas.openxmlformats.org/presentationml/2006/main">
   <p:cSld>
     <p:spTree>
@@ -37389,7 +38931,7 @@
 </p:sld>
 </file>
 
-<file path=ppt/slides/slide6.xml><?xml version="1.0" encoding="utf-8"?>
+<file path=ppt/slides/slide7.xml><?xml version="1.0" encoding="utf-8"?>
 <p:sld xmlns:a="http://schemas.openxmlformats.org/drawingml/2006/main" xmlns:r="http://schemas.openxmlformats.org/officeDocument/2006/relationships" xmlns:p="http://schemas.openxmlformats.org/presentationml/2006/main">
   <p:cSld>
     <p:spTree>
@@ -39205,7 +40747,7 @@
 </p:sld>
 </file>
 
-<file path=ppt/slides/slide7.xml><?xml version="1.0" encoding="utf-8"?>
+<file path=ppt/slides/slide8.xml><?xml version="1.0" encoding="utf-8"?>
 <p:sld xmlns:a="http://schemas.openxmlformats.org/drawingml/2006/main" xmlns:r="http://schemas.openxmlformats.org/officeDocument/2006/relationships" xmlns:p="http://schemas.openxmlformats.org/presentationml/2006/main">
   <p:cSld>
     <p:spTree>
@@ -40685,7 +42227,7 @@
 </p:sld>
 </file>
 
-<file path=ppt/slides/slide8.xml><?xml version="1.0" encoding="utf-8"?>
+<file path=ppt/slides/slide9.xml><?xml version="1.0" encoding="utf-8"?>
 <p:sld xmlns:a="http://schemas.openxmlformats.org/drawingml/2006/main" xmlns:r="http://schemas.openxmlformats.org/officeDocument/2006/relationships" xmlns:p="http://schemas.openxmlformats.org/presentationml/2006/main">
   <p:cSld>
     <p:spTree>
@@ -42579,1256 +44121,6 @@
 </p:sld>
 </file>
 
-<file path=ppt/slides/slide9.xml><?xml version="1.0" encoding="utf-8"?>
-<p:sld xmlns:a="http://schemas.openxmlformats.org/drawingml/2006/main" xmlns:r="http://schemas.openxmlformats.org/officeDocument/2006/relationships" xmlns:p="http://schemas.openxmlformats.org/presentationml/2006/main">
-  <p:cSld>
-    <p:spTree>
-      <p:nvGrpSpPr>
-        <p:cNvPr id="1" name=""/>
-        <p:cNvGrpSpPr/>
-        <p:nvPr/>
-      </p:nvGrpSpPr>
-      <p:grpSpPr>
-        <a:xfrm>
-          <a:off x="0" y="0"/>
-          <a:ext cx="0" cy="0"/>
-          <a:chOff x="0" y="0"/>
-          <a:chExt cx="0" cy="0"/>
-        </a:xfrm>
-      </p:grpSpPr>
-      <p:grpSp>
-        <p:nvGrpSpPr>
-          <p:cNvPr id="40" name="Group 39">
-            <a:extLst>
-              <a:ext uri="{FF2B5EF4-FFF2-40B4-BE49-F238E27FC236}">
-                <a16:creationId xmlns:a16="http://schemas.microsoft.com/office/drawing/2014/main" id="{D33025CC-DC65-4CA8-A9CB-66011752C1A2}"/>
-              </a:ext>
-            </a:extLst>
-          </p:cNvPr>
-          <p:cNvGrpSpPr/>
-          <p:nvPr/>
-        </p:nvGrpSpPr>
-        <p:grpSpPr>
-          <a:xfrm>
-            <a:off x="1960438" y="1127328"/>
-            <a:ext cx="5043487" cy="3597072"/>
-            <a:chOff x="1960438" y="1127328"/>
-            <a:chExt cx="5043487" cy="3597072"/>
-          </a:xfrm>
-        </p:grpSpPr>
-        <p:sp>
-          <p:nvSpPr>
-            <p:cNvPr id="4" name="Freeform 6">
-              <a:extLst>
-                <a:ext uri="{FF2B5EF4-FFF2-40B4-BE49-F238E27FC236}">
-                  <a16:creationId xmlns:a16="http://schemas.microsoft.com/office/drawing/2014/main" id="{57C7CB09-8C87-4DA8-BFE7-4720504CA68C}"/>
-                </a:ext>
-              </a:extLst>
-            </p:cNvPr>
-            <p:cNvSpPr>
-              <a:spLocks/>
-            </p:cNvSpPr>
-            <p:nvPr/>
-          </p:nvSpPr>
-          <p:spPr bwMode="auto">
-            <a:xfrm>
-              <a:off x="2362200" y="1524000"/>
-              <a:ext cx="2152192" cy="3200400"/>
-            </a:xfrm>
-            <a:custGeom>
-              <a:avLst/>
-              <a:gdLst/>
-              <a:ahLst/>
-              <a:cxnLst>
-                <a:cxn ang="0">
-                  <a:pos x="0" y="0"/>
-                </a:cxn>
-                <a:cxn ang="0">
-                  <a:pos x="0" y="528"/>
-                </a:cxn>
-                <a:cxn ang="0">
-                  <a:pos x="3216" y="528"/>
-                </a:cxn>
-                <a:cxn ang="0">
-                  <a:pos x="3216" y="0"/>
-                </a:cxn>
-              </a:cxnLst>
-              <a:rect l="0" t="0" r="r" b="b"/>
-              <a:pathLst>
-                <a:path w="3216" h="528">
-                  <a:moveTo>
-                    <a:pt x="0" y="0"/>
-                  </a:moveTo>
-                  <a:lnTo>
-                    <a:pt x="0" y="528"/>
-                  </a:lnTo>
-                  <a:lnTo>
-                    <a:pt x="3216" y="528"/>
-                  </a:lnTo>
-                  <a:lnTo>
-                    <a:pt x="3216" y="0"/>
-                  </a:lnTo>
-                </a:path>
-              </a:pathLst>
-            </a:custGeom>
-            <a:solidFill>
-              <a:schemeClr val="hlink"/>
-            </a:solidFill>
-            <a:ln w="57150" cap="flat" cmpd="sng">
-              <a:solidFill>
-                <a:schemeClr val="tx1"/>
-              </a:solidFill>
-              <a:prstDash val="solid"/>
-              <a:round/>
-              <a:headEnd type="none" w="lg" len="med"/>
-              <a:tailEnd type="none" w="lg" len="med"/>
-            </a:ln>
-            <a:effectLst/>
-          </p:spPr>
-          <p:txBody>
-            <a:bodyPr wrap="square" anchor="ctr">
-              <a:spAutoFit/>
-            </a:bodyPr>
-            <a:lstStyle/>
-            <a:p>
-              <a:endParaRPr lang="en-US" dirty="0"/>
-            </a:p>
-          </p:txBody>
-        </p:sp>
-        <p:sp>
-          <p:nvSpPr>
-            <p:cNvPr id="5" name="AutoShape 13">
-              <a:extLst>
-                <a:ext uri="{FF2B5EF4-FFF2-40B4-BE49-F238E27FC236}">
-                  <a16:creationId xmlns:a16="http://schemas.microsoft.com/office/drawing/2014/main" id="{E44A676A-D9DC-402C-BB38-49ADE6046E1D}"/>
-                </a:ext>
-              </a:extLst>
-            </p:cNvPr>
-            <p:cNvSpPr>
-              <a:spLocks noChangeArrowheads="1"/>
-            </p:cNvSpPr>
-            <p:nvPr/>
-          </p:nvSpPr>
-          <p:spPr bwMode="auto">
-            <a:xfrm rot="16200000">
-              <a:off x="4684776" y="2721695"/>
-              <a:ext cx="749808" cy="1280160"/>
-            </a:xfrm>
-            <a:custGeom>
-              <a:avLst/>
-              <a:gdLst>
-                <a:gd name="G0" fmla="+- 6871 0 0"/>
-                <a:gd name="G1" fmla="+- 21600 0 6871"/>
-                <a:gd name="G2" fmla="*/ 6871 1 2"/>
-                <a:gd name="G3" fmla="+- 21600 0 G2"/>
-                <a:gd name="G4" fmla="+/ 6871 21600 2"/>
-                <a:gd name="G5" fmla="+/ G1 0 2"/>
-                <a:gd name="G6" fmla="*/ 21600 21600 6871"/>
-                <a:gd name="G7" fmla="*/ G6 1 2"/>
-                <a:gd name="G8" fmla="+- 21600 0 G7"/>
-                <a:gd name="G9" fmla="*/ 21600 1 2"/>
-                <a:gd name="G10" fmla="+- 6871 0 G9"/>
-                <a:gd name="G11" fmla="?: G10 G8 0"/>
-                <a:gd name="G12" fmla="?: G10 G7 21600"/>
-                <a:gd name="T0" fmla="*/ 18164 w 21600"/>
-                <a:gd name="T1" fmla="*/ 10800 h 21600"/>
-                <a:gd name="T2" fmla="*/ 10800 w 21600"/>
-                <a:gd name="T3" fmla="*/ 21600 h 21600"/>
-                <a:gd name="T4" fmla="*/ 3436 w 21600"/>
-                <a:gd name="T5" fmla="*/ 10800 h 21600"/>
-                <a:gd name="T6" fmla="*/ 10800 w 21600"/>
-                <a:gd name="T7" fmla="*/ 0 h 21600"/>
-                <a:gd name="T8" fmla="*/ 5236 w 21600"/>
-                <a:gd name="T9" fmla="*/ 5236 h 21600"/>
-                <a:gd name="T10" fmla="*/ 16364 w 21600"/>
-                <a:gd name="T11" fmla="*/ 16364 h 21600"/>
-              </a:gdLst>
-              <a:ahLst/>
-              <a:cxnLst>
-                <a:cxn ang="0">
-                  <a:pos x="T0" y="T1"/>
-                </a:cxn>
-                <a:cxn ang="0">
-                  <a:pos x="T2" y="T3"/>
-                </a:cxn>
-                <a:cxn ang="0">
-                  <a:pos x="T4" y="T5"/>
-                </a:cxn>
-                <a:cxn ang="0">
-                  <a:pos x="T6" y="T7"/>
-                </a:cxn>
-              </a:cxnLst>
-              <a:rect l="T8" t="T9" r="T10" b="T11"/>
-              <a:pathLst>
-                <a:path w="21600" h="21600">
-                  <a:moveTo>
-                    <a:pt x="0" y="0"/>
-                  </a:moveTo>
-                  <a:lnTo>
-                    <a:pt x="6871" y="21600"/>
-                  </a:lnTo>
-                  <a:lnTo>
-                    <a:pt x="14729" y="21600"/>
-                  </a:lnTo>
-                  <a:lnTo>
-                    <a:pt x="21600" y="0"/>
-                  </a:lnTo>
-                  <a:close/>
-                </a:path>
-              </a:pathLst>
-            </a:custGeom>
-            <a:solidFill>
-              <a:schemeClr val="hlink"/>
-            </a:solidFill>
-            <a:ln w="12700">
-              <a:noFill/>
-              <a:miter lim="800000"/>
-              <a:headEnd type="none" w="lg" len="med"/>
-              <a:tailEnd type="none" w="lg" len="med"/>
-            </a:ln>
-            <a:effectLst/>
-          </p:spPr>
-          <p:txBody>
-            <a:bodyPr wrap="square" anchor="ctr">
-              <a:spAutoFit/>
-            </a:bodyPr>
-            <a:lstStyle/>
-            <a:p>
-              <a:endParaRPr lang="en-US"/>
-            </a:p>
-          </p:txBody>
-        </p:sp>
-        <p:grpSp>
-          <p:nvGrpSpPr>
-            <p:cNvPr id="6" name="Group 5">
-              <a:extLst>
-                <a:ext uri="{FF2B5EF4-FFF2-40B4-BE49-F238E27FC236}">
-                  <a16:creationId xmlns:a16="http://schemas.microsoft.com/office/drawing/2014/main" id="{4DA08D80-1A6A-442B-AB77-32A50E5443E3}"/>
-                </a:ext>
-              </a:extLst>
-            </p:cNvPr>
-            <p:cNvGrpSpPr>
-              <a:grpSpLocks/>
-            </p:cNvGrpSpPr>
-            <p:nvPr/>
-          </p:nvGrpSpPr>
-          <p:grpSpPr bwMode="auto">
-            <a:xfrm rot="16200000">
-              <a:off x="5087599" y="2392723"/>
-              <a:ext cx="740664" cy="1924262"/>
-              <a:chOff x="2480" y="2033"/>
-              <a:chExt cx="459" cy="1395"/>
-            </a:xfrm>
-          </p:grpSpPr>
-          <p:sp>
-            <p:nvSpPr>
-              <p:cNvPr id="7" name="Freeform 8">
-                <a:extLst>
-                  <a:ext uri="{FF2B5EF4-FFF2-40B4-BE49-F238E27FC236}">
-                    <a16:creationId xmlns:a16="http://schemas.microsoft.com/office/drawing/2014/main" id="{E003F3A7-1CE0-4A77-B1FC-E62855274BD7}"/>
-                  </a:ext>
-                </a:extLst>
-              </p:cNvPr>
-              <p:cNvSpPr>
-                <a:spLocks/>
-              </p:cNvSpPr>
-              <p:nvPr/>
-            </p:nvSpPr>
-            <p:spPr bwMode="auto">
-              <a:xfrm>
-                <a:off x="2480" y="2033"/>
-                <a:ext cx="147" cy="1395"/>
-              </a:xfrm>
-              <a:custGeom>
-                <a:avLst/>
-                <a:gdLst/>
-                <a:ahLst/>
-                <a:cxnLst>
-                  <a:cxn ang="0">
-                    <a:pos x="0" y="0"/>
-                  </a:cxn>
-                  <a:cxn ang="0">
-                    <a:pos x="111" y="232"/>
-                  </a:cxn>
-                  <a:cxn ang="0">
-                    <a:pos x="141" y="1395"/>
-                  </a:cxn>
-                </a:cxnLst>
-                <a:rect l="0" t="0" r="r" b="b"/>
-                <a:pathLst>
-                  <a:path w="147" h="1395">
-                    <a:moveTo>
-                      <a:pt x="0" y="0"/>
-                    </a:moveTo>
-                    <a:cubicBezTo>
-                      <a:pt x="87" y="0"/>
-                      <a:pt x="106" y="174"/>
-                      <a:pt x="111" y="232"/>
-                    </a:cubicBezTo>
-                    <a:cubicBezTo>
-                      <a:pt x="116" y="290"/>
-                      <a:pt x="147" y="1084"/>
-                      <a:pt x="141" y="1395"/>
-                    </a:cubicBezTo>
-                  </a:path>
-                </a:pathLst>
-              </a:custGeom>
-              <a:solidFill>
-                <a:schemeClr val="bg1"/>
-              </a:solidFill>
-              <a:ln w="12700" cap="flat" cmpd="sng">
-                <a:solidFill>
-                  <a:schemeClr val="hlink"/>
-                </a:solidFill>
-                <a:prstDash val="solid"/>
-                <a:round/>
-                <a:headEnd type="none" w="lg" len="med"/>
-                <a:tailEnd type="none" w="lg" len="med"/>
-              </a:ln>
-              <a:effectLst/>
-            </p:spPr>
-            <p:txBody>
-              <a:bodyPr wrap="none" anchor="ctr">
-                <a:spAutoFit/>
-              </a:bodyPr>
-              <a:lstStyle/>
-              <a:p>
-                <a:endParaRPr lang="en-US"/>
-              </a:p>
-            </p:txBody>
-          </p:sp>
-          <p:sp>
-            <p:nvSpPr>
-              <p:cNvPr id="8" name="Freeform 15">
-                <a:extLst>
-                  <a:ext uri="{FF2B5EF4-FFF2-40B4-BE49-F238E27FC236}">
-                    <a16:creationId xmlns:a16="http://schemas.microsoft.com/office/drawing/2014/main" id="{4D1E1D5E-7373-4D02-9C84-1740AE2E30B7}"/>
-                  </a:ext>
-                </a:extLst>
-              </p:cNvPr>
-              <p:cNvSpPr>
-                <a:spLocks/>
-              </p:cNvSpPr>
-              <p:nvPr/>
-            </p:nvSpPr>
-            <p:spPr bwMode="auto">
-              <a:xfrm flipH="1">
-                <a:off x="2792" y="2033"/>
-                <a:ext cx="147" cy="1395"/>
-              </a:xfrm>
-              <a:custGeom>
-                <a:avLst/>
-                <a:gdLst/>
-                <a:ahLst/>
-                <a:cxnLst>
-                  <a:cxn ang="0">
-                    <a:pos x="0" y="0"/>
-                  </a:cxn>
-                  <a:cxn ang="0">
-                    <a:pos x="111" y="232"/>
-                  </a:cxn>
-                  <a:cxn ang="0">
-                    <a:pos x="141" y="1395"/>
-                  </a:cxn>
-                </a:cxnLst>
-                <a:rect l="0" t="0" r="r" b="b"/>
-                <a:pathLst>
-                  <a:path w="147" h="1395">
-                    <a:moveTo>
-                      <a:pt x="0" y="0"/>
-                    </a:moveTo>
-                    <a:cubicBezTo>
-                      <a:pt x="87" y="0"/>
-                      <a:pt x="106" y="174"/>
-                      <a:pt x="111" y="232"/>
-                    </a:cubicBezTo>
-                    <a:cubicBezTo>
-                      <a:pt x="116" y="290"/>
-                      <a:pt x="147" y="1084"/>
-                      <a:pt x="141" y="1395"/>
-                    </a:cubicBezTo>
-                  </a:path>
-                </a:pathLst>
-              </a:custGeom>
-              <a:solidFill>
-                <a:schemeClr val="bg1"/>
-              </a:solidFill>
-              <a:ln w="12700" cap="flat" cmpd="sng">
-                <a:solidFill>
-                  <a:schemeClr val="hlink"/>
-                </a:solidFill>
-                <a:prstDash val="solid"/>
-                <a:round/>
-                <a:headEnd type="none" w="lg" len="med"/>
-                <a:tailEnd type="none" w="lg" len="med"/>
-              </a:ln>
-              <a:effectLst/>
-            </p:spPr>
-            <p:txBody>
-              <a:bodyPr wrap="none" anchor="ctr">
-                <a:spAutoFit/>
-              </a:bodyPr>
-              <a:lstStyle/>
-              <a:p>
-                <a:endParaRPr lang="en-US"/>
-              </a:p>
-            </p:txBody>
-          </p:sp>
-        </p:grpSp>
-        <p:sp>
-          <p:nvSpPr>
-            <p:cNvPr id="9" name="Rectangle 8">
-              <a:extLst>
-                <a:ext uri="{FF2B5EF4-FFF2-40B4-BE49-F238E27FC236}">
-                  <a16:creationId xmlns:a16="http://schemas.microsoft.com/office/drawing/2014/main" id="{F574AE4C-12A3-4433-9E2E-8244525C9549}"/>
-                </a:ext>
-              </a:extLst>
-            </p:cNvPr>
-            <p:cNvSpPr/>
-            <p:nvPr/>
-          </p:nvSpPr>
-          <p:spPr>
-            <a:xfrm>
-              <a:off x="5598350" y="3011376"/>
-              <a:ext cx="1405575" cy="508920"/>
-            </a:xfrm>
-            <a:prstGeom prst="rect">
-              <a:avLst/>
-            </a:prstGeom>
-            <a:solidFill>
-              <a:schemeClr val="bg1"/>
-            </a:solidFill>
-            <a:ln>
-              <a:solidFill>
-                <a:schemeClr val="bg1"/>
-              </a:solidFill>
-            </a:ln>
-          </p:spPr>
-          <p:style>
-            <a:lnRef idx="2">
-              <a:schemeClr val="accent1">
-                <a:shade val="50000"/>
-              </a:schemeClr>
-            </a:lnRef>
-            <a:fillRef idx="1">
-              <a:schemeClr val="accent1"/>
-            </a:fillRef>
-            <a:effectRef idx="0">
-              <a:schemeClr val="accent1"/>
-            </a:effectRef>
-            <a:fontRef idx="minor">
-              <a:schemeClr val="lt1"/>
-            </a:fontRef>
-          </p:style>
-          <p:txBody>
-            <a:bodyPr rtlCol="0" anchor="ctr"/>
-            <a:lstStyle/>
-            <a:p>
-              <a:pPr algn="ctr"/>
-              <a:endParaRPr lang="en-US">
-                <a:ln>
-                  <a:solidFill>
-                    <a:schemeClr val="bg1"/>
-                  </a:solidFill>
-                </a:ln>
-                <a:solidFill>
-                  <a:schemeClr val="bg1"/>
-                </a:solidFill>
-              </a:endParaRPr>
-            </a:p>
-          </p:txBody>
-        </p:sp>
-        <p:cxnSp>
-          <p:nvCxnSpPr>
-            <p:cNvPr id="10" name="Straight Arrow Connector 9">
-              <a:extLst>
-                <a:ext uri="{FF2B5EF4-FFF2-40B4-BE49-F238E27FC236}">
-                  <a16:creationId xmlns:a16="http://schemas.microsoft.com/office/drawing/2014/main" id="{E0C69688-DDD1-429C-B973-3EE6BC93FB7E}"/>
-                </a:ext>
-              </a:extLst>
-            </p:cNvPr>
-            <p:cNvCxnSpPr>
-              <a:cxnSpLocks/>
-            </p:cNvCxnSpPr>
-            <p:nvPr/>
-          </p:nvCxnSpPr>
-          <p:spPr>
-            <a:xfrm>
-              <a:off x="4895032" y="1524000"/>
-              <a:ext cx="0" cy="1804248"/>
-            </a:xfrm>
-            <a:prstGeom prst="straightConnector1">
-              <a:avLst/>
-            </a:prstGeom>
-            <a:ln w="19050">
-              <a:solidFill>
-                <a:schemeClr val="tx1"/>
-              </a:solidFill>
-              <a:headEnd type="triangle" w="lg" len="lg"/>
-              <a:tailEnd type="triangle" w="lg" len="lg"/>
-            </a:ln>
-          </p:spPr>
-          <p:style>
-            <a:lnRef idx="1">
-              <a:schemeClr val="accent1"/>
-            </a:lnRef>
-            <a:fillRef idx="0">
-              <a:schemeClr val="accent1"/>
-            </a:fillRef>
-            <a:effectRef idx="0">
-              <a:schemeClr val="accent1"/>
-            </a:effectRef>
-            <a:fontRef idx="minor">
-              <a:schemeClr val="tx1"/>
-            </a:fontRef>
-          </p:style>
-        </p:cxnSp>
-        <p:grpSp>
-          <p:nvGrpSpPr>
-            <p:cNvPr id="13" name="Group 12">
-              <a:extLst>
-                <a:ext uri="{FF2B5EF4-FFF2-40B4-BE49-F238E27FC236}">
-                  <a16:creationId xmlns:a16="http://schemas.microsoft.com/office/drawing/2014/main" id="{EA9E03FD-BCAA-462D-A6C4-B19647011DF4}"/>
-                </a:ext>
-              </a:extLst>
-            </p:cNvPr>
-            <p:cNvGrpSpPr/>
-            <p:nvPr/>
-          </p:nvGrpSpPr>
-          <p:grpSpPr>
-            <a:xfrm>
-              <a:off x="3406847" y="1292516"/>
-              <a:ext cx="482269" cy="420455"/>
-              <a:chOff x="4446109" y="2103464"/>
-              <a:chExt cx="482269" cy="420455"/>
-            </a:xfrm>
-          </p:grpSpPr>
-          <p:sp>
-            <p:nvSpPr>
-              <p:cNvPr id="14" name="AutoShape 174">
-                <a:extLst>
-                  <a:ext uri="{FF2B5EF4-FFF2-40B4-BE49-F238E27FC236}">
-                    <a16:creationId xmlns:a16="http://schemas.microsoft.com/office/drawing/2014/main" id="{56EFD6BF-292F-40DF-B258-F43A90D892CB}"/>
-                  </a:ext>
-                </a:extLst>
-              </p:cNvPr>
-              <p:cNvSpPr>
-                <a:spLocks noChangeArrowheads="1"/>
-              </p:cNvSpPr>
-              <p:nvPr/>
-            </p:nvSpPr>
-            <p:spPr bwMode="auto">
-              <a:xfrm flipV="1">
-                <a:off x="4506392" y="2103464"/>
-                <a:ext cx="361702" cy="228043"/>
-              </a:xfrm>
-              <a:prstGeom prst="triangle">
-                <a:avLst>
-                  <a:gd name="adj" fmla="val 50000"/>
-                </a:avLst>
-              </a:prstGeom>
-              <a:noFill/>
-              <a:ln w="12700">
-                <a:solidFill>
-                  <a:schemeClr val="tx1"/>
-                </a:solidFill>
-                <a:miter lim="800000"/>
-                <a:headEnd type="none" w="lg" len="med"/>
-                <a:tailEnd type="none" w="lg" len="med"/>
-              </a:ln>
-              <a:effectLst/>
-            </p:spPr>
-            <p:txBody>
-              <a:bodyPr anchor="ctr">
-                <a:spAutoFit/>
-              </a:bodyPr>
-              <a:lstStyle/>
-              <a:p>
-                <a:endParaRPr lang="en-US"/>
-              </a:p>
-            </p:txBody>
-          </p:sp>
-          <p:sp>
-            <p:nvSpPr>
-              <p:cNvPr id="15" name="Line 175">
-                <a:extLst>
-                  <a:ext uri="{FF2B5EF4-FFF2-40B4-BE49-F238E27FC236}">
-                    <a16:creationId xmlns:a16="http://schemas.microsoft.com/office/drawing/2014/main" id="{D3B90883-7651-4669-9F16-25B26B0C4AB5}"/>
-                  </a:ext>
-                </a:extLst>
-              </p:cNvPr>
-              <p:cNvSpPr>
-                <a:spLocks noChangeShapeType="1"/>
-              </p:cNvSpPr>
-              <p:nvPr/>
-            </p:nvSpPr>
-            <p:spPr bwMode="auto">
-              <a:xfrm>
-                <a:off x="4446109" y="2395643"/>
-                <a:ext cx="482269" cy="0"/>
-              </a:xfrm>
-              <a:prstGeom prst="line">
-                <a:avLst/>
-              </a:prstGeom>
-              <a:noFill/>
-              <a:ln w="12700">
-                <a:solidFill>
-                  <a:schemeClr val="tx1"/>
-                </a:solidFill>
-                <a:round/>
-                <a:headEnd type="none" w="lg" len="med"/>
-                <a:tailEnd type="none" w="lg" len="med"/>
-              </a:ln>
-              <a:effectLst/>
-            </p:spPr>
-            <p:txBody>
-              <a:bodyPr anchor="ctr">
-                <a:spAutoFit/>
-              </a:bodyPr>
-              <a:lstStyle/>
-              <a:p>
-                <a:endParaRPr lang="en-US"/>
-              </a:p>
-            </p:txBody>
-          </p:sp>
-          <p:sp>
-            <p:nvSpPr>
-              <p:cNvPr id="16" name="Line 176">
-                <a:extLst>
-                  <a:ext uri="{FF2B5EF4-FFF2-40B4-BE49-F238E27FC236}">
-                    <a16:creationId xmlns:a16="http://schemas.microsoft.com/office/drawing/2014/main" id="{01FA9449-E78B-4BF7-B218-7190FC3DED7C}"/>
-                  </a:ext>
-                </a:extLst>
-              </p:cNvPr>
-              <p:cNvSpPr>
-                <a:spLocks noChangeShapeType="1"/>
-              </p:cNvSpPr>
-              <p:nvPr/>
-            </p:nvSpPr>
-            <p:spPr bwMode="auto">
-              <a:xfrm>
-                <a:off x="4506392" y="2459782"/>
-                <a:ext cx="361702" cy="0"/>
-              </a:xfrm>
-              <a:prstGeom prst="line">
-                <a:avLst/>
-              </a:prstGeom>
-              <a:noFill/>
-              <a:ln w="12700">
-                <a:solidFill>
-                  <a:schemeClr val="tx1"/>
-                </a:solidFill>
-                <a:round/>
-                <a:headEnd type="none" w="lg" len="med"/>
-                <a:tailEnd type="none" w="lg" len="med"/>
-              </a:ln>
-              <a:effectLst/>
-            </p:spPr>
-            <p:txBody>
-              <a:bodyPr anchor="ctr">
-                <a:spAutoFit/>
-              </a:bodyPr>
-              <a:lstStyle/>
-              <a:p>
-                <a:endParaRPr lang="en-US"/>
-              </a:p>
-            </p:txBody>
-          </p:sp>
-          <p:sp>
-            <p:nvSpPr>
-              <p:cNvPr id="17" name="Line 177">
-                <a:extLst>
-                  <a:ext uri="{FF2B5EF4-FFF2-40B4-BE49-F238E27FC236}">
-                    <a16:creationId xmlns:a16="http://schemas.microsoft.com/office/drawing/2014/main" id="{BE0340DA-996F-4A74-B664-787686F309E6}"/>
-                  </a:ext>
-                </a:extLst>
-              </p:cNvPr>
-              <p:cNvSpPr>
-                <a:spLocks noChangeShapeType="1"/>
-              </p:cNvSpPr>
-              <p:nvPr/>
-            </p:nvSpPr>
-            <p:spPr bwMode="auto">
-              <a:xfrm>
-                <a:off x="4576723" y="2523919"/>
-                <a:ext cx="218529" cy="0"/>
-              </a:xfrm>
-              <a:prstGeom prst="line">
-                <a:avLst/>
-              </a:prstGeom>
-              <a:noFill/>
-              <a:ln w="12700">
-                <a:solidFill>
-                  <a:schemeClr val="tx1"/>
-                </a:solidFill>
-                <a:round/>
-                <a:headEnd type="none" w="lg" len="med"/>
-                <a:tailEnd type="none" w="lg" len="med"/>
-              </a:ln>
-              <a:effectLst/>
-            </p:spPr>
-            <p:txBody>
-              <a:bodyPr anchor="ctr">
-                <a:spAutoFit/>
-              </a:bodyPr>
-              <a:lstStyle/>
-              <a:p>
-                <a:endParaRPr lang="en-US"/>
-              </a:p>
-            </p:txBody>
-          </p:sp>
-        </p:grpSp>
-        <p:cxnSp>
-          <p:nvCxnSpPr>
-            <p:cNvPr id="18" name="Straight Connector 17">
-              <a:extLst>
-                <a:ext uri="{FF2B5EF4-FFF2-40B4-BE49-F238E27FC236}">
-                  <a16:creationId xmlns:a16="http://schemas.microsoft.com/office/drawing/2014/main" id="{139A2A25-BB33-4400-8532-774662A60B48}"/>
-                </a:ext>
-              </a:extLst>
-            </p:cNvPr>
-            <p:cNvCxnSpPr>
-              <a:cxnSpLocks/>
-            </p:cNvCxnSpPr>
-            <p:nvPr/>
-          </p:nvCxnSpPr>
-          <p:spPr>
-            <a:xfrm>
-              <a:off x="1968909" y="1520559"/>
-              <a:ext cx="3136491" cy="0"/>
-            </a:xfrm>
-            <a:prstGeom prst="line">
-              <a:avLst/>
-            </a:prstGeom>
-            <a:ln w="28575">
-              <a:solidFill>
-                <a:srgbClr val="C00000"/>
-              </a:solidFill>
-              <a:prstDash val="dash"/>
-            </a:ln>
-          </p:spPr>
-          <p:style>
-            <a:lnRef idx="1">
-              <a:schemeClr val="accent1"/>
-            </a:lnRef>
-            <a:fillRef idx="0">
-              <a:schemeClr val="accent1"/>
-            </a:fillRef>
-            <a:effectRef idx="0">
-              <a:schemeClr val="accent1"/>
-            </a:effectRef>
-            <a:fontRef idx="minor">
-              <a:schemeClr val="tx1"/>
-            </a:fontRef>
-          </p:style>
-        </p:cxnSp>
-        <p:cxnSp>
-          <p:nvCxnSpPr>
-            <p:cNvPr id="19" name="Straight Connector 18">
-              <a:extLst>
-                <a:ext uri="{FF2B5EF4-FFF2-40B4-BE49-F238E27FC236}">
-                  <a16:creationId xmlns:a16="http://schemas.microsoft.com/office/drawing/2014/main" id="{10A300E1-DA87-4A73-B804-ADDCD474C4D9}"/>
-                </a:ext>
-              </a:extLst>
-            </p:cNvPr>
-            <p:cNvCxnSpPr>
-              <a:cxnSpLocks/>
-            </p:cNvCxnSpPr>
-            <p:nvPr/>
-          </p:nvCxnSpPr>
-          <p:spPr>
-            <a:xfrm>
-              <a:off x="1960438" y="3340045"/>
-              <a:ext cx="3144962" cy="0"/>
-            </a:xfrm>
-            <a:prstGeom prst="line">
-              <a:avLst/>
-            </a:prstGeom>
-            <a:ln w="28575">
-              <a:solidFill>
-                <a:srgbClr val="C00000"/>
-              </a:solidFill>
-              <a:prstDash val="dash"/>
-            </a:ln>
-          </p:spPr>
-          <p:style>
-            <a:lnRef idx="1">
-              <a:schemeClr val="accent1"/>
-            </a:lnRef>
-            <a:fillRef idx="0">
-              <a:schemeClr val="accent1"/>
-            </a:fillRef>
-            <a:effectRef idx="0">
-              <a:schemeClr val="accent1"/>
-            </a:effectRef>
-            <a:fontRef idx="minor">
-              <a:schemeClr val="tx1"/>
-            </a:fontRef>
-          </p:style>
-        </p:cxnSp>
-        <p:sp>
-          <p:nvSpPr>
-            <p:cNvPr id="25" name="Left Brace 24">
-              <a:extLst>
-                <a:ext uri="{FF2B5EF4-FFF2-40B4-BE49-F238E27FC236}">
-                  <a16:creationId xmlns:a16="http://schemas.microsoft.com/office/drawing/2014/main" id="{6C94C8F7-1CAB-4725-A903-4153E8FD808A}"/>
-                </a:ext>
-              </a:extLst>
-            </p:cNvPr>
-            <p:cNvSpPr/>
-            <p:nvPr/>
-          </p:nvSpPr>
-          <p:spPr>
-            <a:xfrm>
-              <a:off x="4196657" y="2965141"/>
-              <a:ext cx="163714" cy="749808"/>
-            </a:xfrm>
-            <a:prstGeom prst="leftBrace">
-              <a:avLst>
-                <a:gd name="adj1" fmla="val 8333"/>
-                <a:gd name="adj2" fmla="val 70359"/>
-              </a:avLst>
-            </a:prstGeom>
-            <a:ln w="57150">
-              <a:solidFill>
-                <a:schemeClr val="tx1"/>
-              </a:solidFill>
-            </a:ln>
-          </p:spPr>
-          <p:style>
-            <a:lnRef idx="1">
-              <a:schemeClr val="accent1"/>
-            </a:lnRef>
-            <a:fillRef idx="0">
-              <a:schemeClr val="accent1"/>
-            </a:fillRef>
-            <a:effectRef idx="0">
-              <a:schemeClr val="accent1"/>
-            </a:effectRef>
-            <a:fontRef idx="minor">
-              <a:schemeClr val="tx1"/>
-            </a:fontRef>
-          </p:style>
-          <p:txBody>
-            <a:bodyPr rtlCol="0" anchor="ctr"/>
-            <a:lstStyle/>
-            <a:p>
-              <a:pPr algn="ctr"/>
-              <a:endParaRPr lang="en-US" dirty="0"/>
-            </a:p>
-          </p:txBody>
-        </p:sp>
-        <p:sp>
-          <p:nvSpPr>
-            <p:cNvPr id="26" name="Left Brace 25">
-              <a:extLst>
-                <a:ext uri="{FF2B5EF4-FFF2-40B4-BE49-F238E27FC236}">
-                  <a16:creationId xmlns:a16="http://schemas.microsoft.com/office/drawing/2014/main" id="{C0D793E5-915D-460F-9352-46FEFCA987F3}"/>
-                </a:ext>
-              </a:extLst>
-            </p:cNvPr>
-            <p:cNvSpPr/>
-            <p:nvPr/>
-          </p:nvSpPr>
-          <p:spPr>
-            <a:xfrm rot="10800000">
-              <a:off x="5776065" y="3194271"/>
-              <a:ext cx="163714" cy="323683"/>
-            </a:xfrm>
-            <a:prstGeom prst="leftBrace">
-              <a:avLst>
-                <a:gd name="adj1" fmla="val 8333"/>
-                <a:gd name="adj2" fmla="val 47728"/>
-              </a:avLst>
-            </a:prstGeom>
-            <a:ln w="57150">
-              <a:solidFill>
-                <a:schemeClr val="tx1"/>
-              </a:solidFill>
-            </a:ln>
-          </p:spPr>
-          <p:style>
-            <a:lnRef idx="1">
-              <a:schemeClr val="accent1"/>
-            </a:lnRef>
-            <a:fillRef idx="0">
-              <a:schemeClr val="accent1"/>
-            </a:fillRef>
-            <a:effectRef idx="0">
-              <a:schemeClr val="accent1"/>
-            </a:effectRef>
-            <a:fontRef idx="minor">
-              <a:schemeClr val="tx1"/>
-            </a:fontRef>
-          </p:style>
-          <p:txBody>
-            <a:bodyPr rtlCol="0" anchor="ctr"/>
-            <a:lstStyle/>
-            <a:p>
-              <a:pPr algn="ctr"/>
-              <a:endParaRPr lang="en-US" dirty="0"/>
-            </a:p>
-          </p:txBody>
-        </p:sp>
-        <p:pic>
-          <p:nvPicPr>
-            <p:cNvPr id="28" name="Picture 27">
-              <a:extLst>
-                <a:ext uri="{FF2B5EF4-FFF2-40B4-BE49-F238E27FC236}">
-                  <a16:creationId xmlns:a16="http://schemas.microsoft.com/office/drawing/2014/main" id="{974F2EE0-4D52-4CFC-8401-B2ABA73DB98B}"/>
-                </a:ext>
-              </a:extLst>
-            </p:cNvPr>
-            <p:cNvPicPr>
-              <a:picLocks noChangeAspect="1"/>
-            </p:cNvPicPr>
-            <p:nvPr>
-              <p:custDataLst>
-                <p:tags r:id="rId2"/>
-              </p:custDataLst>
-            </p:nvPr>
-          </p:nvPicPr>
-          <p:blipFill>
-            <a:blip r:embed="rId5">
-              <a:extLst>
-                <a:ext uri="{28A0092B-C50C-407E-A947-70E740481C1C}">
-                  <a14:useLocalDpi xmlns:a14="http://schemas.microsoft.com/office/drawing/2010/main" val="0"/>
-                </a:ext>
-              </a:extLst>
-            </a:blip>
-            <a:stretch>
-              <a:fillRect/>
-            </a:stretch>
-          </p:blipFill>
-          <p:spPr>
-            <a:xfrm>
-              <a:off x="3053417" y="3410743"/>
-              <a:ext cx="839619" cy="246857"/>
-            </a:xfrm>
-            <a:prstGeom prst="rect">
-              <a:avLst/>
-            </a:prstGeom>
-          </p:spPr>
-        </p:pic>
-        <p:pic>
-          <p:nvPicPr>
-            <p:cNvPr id="31" name="Picture 30">
-              <a:extLst>
-                <a:ext uri="{FF2B5EF4-FFF2-40B4-BE49-F238E27FC236}">
-                  <a16:creationId xmlns:a16="http://schemas.microsoft.com/office/drawing/2014/main" id="{508DF1B1-30CE-474A-AA8E-AC2FDAFA07B5}"/>
-                </a:ext>
-              </a:extLst>
-            </p:cNvPr>
-            <p:cNvPicPr>
-              <a:picLocks noChangeAspect="1"/>
-            </p:cNvPicPr>
-            <p:nvPr>
-              <p:custDataLst>
-                <p:tags r:id="rId3"/>
-              </p:custDataLst>
-            </p:nvPr>
-          </p:nvPicPr>
-          <p:blipFill>
-            <a:blip r:embed="rId6">
-              <a:extLst>
-                <a:ext uri="{28A0092B-C50C-407E-A947-70E740481C1C}">
-                  <a14:useLocalDpi xmlns:a14="http://schemas.microsoft.com/office/drawing/2010/main" val="0"/>
-                </a:ext>
-              </a:extLst>
-            </a:blip>
-            <a:stretch>
-              <a:fillRect/>
-            </a:stretch>
-          </p:blipFill>
-          <p:spPr>
-            <a:xfrm>
-              <a:off x="6233210" y="3293391"/>
-              <a:ext cx="396190" cy="211809"/>
-            </a:xfrm>
-            <a:prstGeom prst="rect">
-              <a:avLst/>
-            </a:prstGeom>
-          </p:spPr>
-        </p:pic>
-        <p:sp>
-          <p:nvSpPr>
-            <p:cNvPr id="32" name="Oval 31">
-              <a:extLst>
-                <a:ext uri="{FF2B5EF4-FFF2-40B4-BE49-F238E27FC236}">
-                  <a16:creationId xmlns:a16="http://schemas.microsoft.com/office/drawing/2014/main" id="{2E85CA06-1F90-41B0-A61A-B407B248C33B}"/>
-                </a:ext>
-              </a:extLst>
-            </p:cNvPr>
-            <p:cNvSpPr/>
-            <p:nvPr/>
-          </p:nvSpPr>
-          <p:spPr bwMode="auto">
-            <a:xfrm>
-              <a:off x="2757302" y="1459927"/>
-              <a:ext cx="121264" cy="121264"/>
-            </a:xfrm>
-            <a:prstGeom prst="ellipse">
-              <a:avLst/>
-            </a:prstGeom>
-            <a:solidFill>
-              <a:srgbClr val="C00000"/>
-            </a:solidFill>
-            <a:ln w="12700" cap="flat" cmpd="sng" algn="ctr">
-              <a:solidFill>
-                <a:srgbClr val="C00000"/>
-              </a:solidFill>
-              <a:prstDash val="solid"/>
-              <a:round/>
-              <a:headEnd type="none" w="lg" len="med"/>
-              <a:tailEnd type="none" w="lg" len="med"/>
-            </a:ln>
-            <a:effectLst/>
-          </p:spPr>
-          <p:txBody>
-            <a:bodyPr vert="horz" wrap="square" lIns="91440" tIns="45720" rIns="91440" bIns="45720" numCol="1" rtlCol="0" anchor="ctr" anchorCtr="0" compatLnSpc="1">
-              <a:prstTxWarp prst="textNoShape">
-                <a:avLst/>
-              </a:prstTxWarp>
-              <a:spAutoFit/>
-            </a:bodyPr>
-            <a:lstStyle/>
-            <a:p>
-              <a:pPr marL="0" marR="0" indent="0" algn="l" defTabSz="914400" rtl="0" eaLnBrk="1" fontAlgn="base" latinLnBrk="0" hangingPunct="1">
-                <a:lnSpc>
-                  <a:spcPct val="100000"/>
-                </a:lnSpc>
-                <a:spcBef>
-                  <a:spcPct val="0"/>
-                </a:spcBef>
-                <a:spcAft>
-                  <a:spcPct val="0"/>
-                </a:spcAft>
-                <a:buClrTx/>
-                <a:buSzTx/>
-                <a:buFontTx/>
-                <a:buNone/>
-                <a:tabLst/>
-              </a:pPr>
-              <a:endParaRPr kumimoji="0" lang="en-US" sz="1800" b="0" i="0" u="none" strike="noStrike" cap="none" normalizeH="0" baseline="0">
-                <a:ln>
-                  <a:noFill/>
-                </a:ln>
-                <a:solidFill>
-                  <a:schemeClr val="tx1"/>
-                </a:solidFill>
-                <a:effectLst/>
-                <a:latin typeface="Century Gothic" pitchFamily="34" charset="0"/>
-                <a:cs typeface="Arial" charset="0"/>
-              </a:endParaRPr>
-            </a:p>
-          </p:txBody>
-        </p:sp>
-        <p:sp>
-          <p:nvSpPr>
-            <p:cNvPr id="33" name="Oval 32">
-              <a:extLst>
-                <a:ext uri="{FF2B5EF4-FFF2-40B4-BE49-F238E27FC236}">
-                  <a16:creationId xmlns:a16="http://schemas.microsoft.com/office/drawing/2014/main" id="{33C1F4DB-A784-4924-8747-DC035D397677}"/>
-                </a:ext>
-              </a:extLst>
-            </p:cNvPr>
-            <p:cNvSpPr/>
-            <p:nvPr/>
-          </p:nvSpPr>
-          <p:spPr bwMode="auto">
-            <a:xfrm>
-              <a:off x="5536283" y="3307736"/>
-              <a:ext cx="121264" cy="121264"/>
-            </a:xfrm>
-            <a:prstGeom prst="ellipse">
-              <a:avLst/>
-            </a:prstGeom>
-            <a:solidFill>
-              <a:srgbClr val="C00000"/>
-            </a:solidFill>
-            <a:ln w="12700" cap="flat" cmpd="sng" algn="ctr">
-              <a:solidFill>
-                <a:srgbClr val="C00000"/>
-              </a:solidFill>
-              <a:prstDash val="solid"/>
-              <a:round/>
-              <a:headEnd type="none" w="lg" len="med"/>
-              <a:tailEnd type="none" w="lg" len="med"/>
-            </a:ln>
-            <a:effectLst/>
-          </p:spPr>
-          <p:txBody>
-            <a:bodyPr vert="horz" wrap="square" lIns="91440" tIns="45720" rIns="91440" bIns="45720" numCol="1" rtlCol="0" anchor="ctr" anchorCtr="0" compatLnSpc="1">
-              <a:prstTxWarp prst="textNoShape">
-                <a:avLst/>
-              </a:prstTxWarp>
-              <a:spAutoFit/>
-            </a:bodyPr>
-            <a:lstStyle/>
-            <a:p>
-              <a:pPr marL="0" marR="0" indent="0" algn="l" defTabSz="914400" rtl="0" eaLnBrk="1" fontAlgn="base" latinLnBrk="0" hangingPunct="1">
-                <a:lnSpc>
-                  <a:spcPct val="100000"/>
-                </a:lnSpc>
-                <a:spcBef>
-                  <a:spcPct val="0"/>
-                </a:spcBef>
-                <a:spcAft>
-                  <a:spcPct val="0"/>
-                </a:spcAft>
-                <a:buClrTx/>
-                <a:buSzTx/>
-                <a:buFontTx/>
-                <a:buNone/>
-                <a:tabLst/>
-              </a:pPr>
-              <a:endParaRPr kumimoji="0" lang="en-US" sz="1800" b="0" i="0" u="none" strike="noStrike" cap="none" normalizeH="0" baseline="0">
-                <a:ln>
-                  <a:noFill/>
-                </a:ln>
-                <a:solidFill>
-                  <a:schemeClr val="tx1"/>
-                </a:solidFill>
-                <a:effectLst/>
-                <a:latin typeface="Century Gothic" pitchFamily="34" charset="0"/>
-                <a:cs typeface="Arial" charset="0"/>
-              </a:endParaRPr>
-            </a:p>
-          </p:txBody>
-        </p:sp>
-        <p:sp>
-          <p:nvSpPr>
-            <p:cNvPr id="38" name="TextBox 37">
-              <a:extLst>
-                <a:ext uri="{FF2B5EF4-FFF2-40B4-BE49-F238E27FC236}">
-                  <a16:creationId xmlns:a16="http://schemas.microsoft.com/office/drawing/2014/main" id="{F0228B13-6CE8-4A92-8EC1-FB8D324DCD82}"/>
-                </a:ext>
-              </a:extLst>
-            </p:cNvPr>
-            <p:cNvSpPr txBox="1"/>
-            <p:nvPr/>
-          </p:nvSpPr>
-          <p:spPr>
-            <a:xfrm>
-              <a:off x="2667000" y="1127328"/>
-              <a:ext cx="351378" cy="369332"/>
-            </a:xfrm>
-            <a:prstGeom prst="rect">
-              <a:avLst/>
-            </a:prstGeom>
-            <a:noFill/>
-          </p:spPr>
-          <p:txBody>
-            <a:bodyPr wrap="none" rtlCol="0">
-              <a:spAutoFit/>
-            </a:bodyPr>
-            <a:lstStyle/>
-            <a:p>
-              <a:r>
-                <a:rPr lang="en-US" dirty="0">
-                  <a:latin typeface="Times New Roman" panose="02020603050405020304" pitchFamily="18" charset="0"/>
-                  <a:cs typeface="Times New Roman" panose="02020603050405020304" pitchFamily="18" charset="0"/>
-                </a:rPr>
-                <a:t>A</a:t>
-              </a:r>
-            </a:p>
-          </p:txBody>
-        </p:sp>
-        <p:sp>
-          <p:nvSpPr>
-            <p:cNvPr id="39" name="TextBox 38">
-              <a:extLst>
-                <a:ext uri="{FF2B5EF4-FFF2-40B4-BE49-F238E27FC236}">
-                  <a16:creationId xmlns:a16="http://schemas.microsoft.com/office/drawing/2014/main" id="{C49789DA-CDBA-4756-991D-066838BBDFA2}"/>
-                </a:ext>
-              </a:extLst>
-            </p:cNvPr>
-            <p:cNvSpPr txBox="1"/>
-            <p:nvPr/>
-          </p:nvSpPr>
-          <p:spPr>
-            <a:xfrm>
-              <a:off x="5404978" y="2754868"/>
-              <a:ext cx="338554" cy="369332"/>
-            </a:xfrm>
-            <a:prstGeom prst="rect">
-              <a:avLst/>
-            </a:prstGeom>
-            <a:noFill/>
-          </p:spPr>
-          <p:txBody>
-            <a:bodyPr wrap="none" rtlCol="0">
-              <a:spAutoFit/>
-            </a:bodyPr>
-            <a:lstStyle/>
-            <a:p>
-              <a:r>
-                <a:rPr lang="en-US" dirty="0">
-                  <a:latin typeface="Times New Roman" panose="02020603050405020304" pitchFamily="18" charset="0"/>
-                  <a:cs typeface="Times New Roman" panose="02020603050405020304" pitchFamily="18" charset="0"/>
-                </a:rPr>
-                <a:t>B</a:t>
-              </a:r>
-            </a:p>
-          </p:txBody>
-        </p:sp>
-      </p:grpSp>
-      <p:pic>
-        <p:nvPicPr>
-          <p:cNvPr id="27" name="Picture 26">
-            <a:extLst>
-              <a:ext uri="{FF2B5EF4-FFF2-40B4-BE49-F238E27FC236}">
-                <a16:creationId xmlns:a16="http://schemas.microsoft.com/office/drawing/2014/main" id="{0250D248-2B69-43F4-AE22-3708679C2C08}"/>
-              </a:ext>
-            </a:extLst>
-          </p:cNvPr>
-          <p:cNvPicPr>
-            <a:picLocks noChangeAspect="1"/>
-          </p:cNvPicPr>
-          <p:nvPr>
-            <p:custDataLst>
-              <p:tags r:id="rId1"/>
-            </p:custDataLst>
-          </p:nvPr>
-        </p:nvPicPr>
-        <p:blipFill>
-          <a:blip r:embed="rId7">
-            <a:extLst>
-              <a:ext uri="{28A0092B-C50C-407E-A947-70E740481C1C}">
-                <a14:useLocalDpi xmlns:a14="http://schemas.microsoft.com/office/drawing/2010/main" val="0"/>
-              </a:ext>
-            </a:extLst>
-          </a:blip>
-          <a:stretch>
-            <a:fillRect/>
-          </a:stretch>
-        </p:blipFill>
-        <p:spPr>
-          <a:xfrm>
-            <a:off x="4673854" y="2209800"/>
-            <a:ext cx="435207" cy="237207"/>
-          </a:xfrm>
-          <a:prstGeom prst="rect">
-            <a:avLst/>
-          </a:prstGeom>
-          <a:solidFill>
-            <a:schemeClr val="bg1"/>
-          </a:solidFill>
-        </p:spPr>
-      </p:pic>
-    </p:spTree>
-    <p:extLst>
-      <p:ext uri="{BB962C8B-B14F-4D97-AF65-F5344CB8AC3E}">
-        <p14:creationId xmlns:p14="http://schemas.microsoft.com/office/powerpoint/2010/main" val="4010751684"/>
-      </p:ext>
-    </p:extLst>
-  </p:cSld>
-  <p:clrMapOvr>
-    <a:masterClrMapping/>
-  </p:clrMapOvr>
-</p:sld>
-</file>
-
 <file path=ppt/tags/tag1.xml><?xml version="1.0" encoding="utf-8"?>
 <p:tagLst xmlns:a="http://schemas.openxmlformats.org/drawingml/2006/main" xmlns:r="http://schemas.openxmlformats.org/officeDocument/2006/relationships" xmlns:p="http://schemas.openxmlformats.org/presentationml/2006/main">
   <p:tag name="OUTPUTDPI" val="1200"/>
@@ -43851,6 +44143,82 @@
 <file path=ppt/tags/tag10.xml><?xml version="1.0" encoding="utf-8"?>
 <p:tagLst xmlns:a="http://schemas.openxmlformats.org/drawingml/2006/main" xmlns:r="http://schemas.openxmlformats.org/officeDocument/2006/relationships" xmlns:p="http://schemas.openxmlformats.org/presentationml/2006/main">
   <p:tag name="OUTPUTDPI" val="1200"/>
+  <p:tag name="ORIGINALHEIGHT" val="90.73866"/>
+  <p:tag name="ORIGINALWIDTH" val="166.4792"/>
+  <p:tag name="LATEXADDIN" val="\documentclass{article}&#10;\usepackage{amsmath}&#10;\usepackage{xcolor}&#10;\pagestyle{empty}&#10;\begin{document}&#10;&#10;\definecolor{Monred}{RGB}{172,0,0}&#10;&#10;&#10;$$\Delta h$$&#10;&#10;\end{document}"/>
+  <p:tag name="IGUANATEXSIZE" val="20"/>
+  <p:tag name="IGUANATEXCURSOR" val="150"/>
+  <p:tag name="TRANSPARENCY" val="True"/>
+  <p:tag name="FILENAME" val=""/>
+  <p:tag name="LATEXENGINEID" val="0"/>
+  <p:tag name="TEMPFOLDER" val="c:\temp\"/>
+  <p:tag name="LATEXFORMHEIGHT" val="312"/>
+  <p:tag name="LATEXFORMWIDTH" val="384"/>
+  <p:tag name="LATEXFORMWRAP" val="True"/>
+  <p:tag name="BITMAPVECTOR" val="0"/>
+</p:tagLst>
+</file>
+
+<file path=ppt/tags/tag11.xml><?xml version="1.0" encoding="utf-8"?>
+<p:tagLst xmlns:a="http://schemas.openxmlformats.org/drawingml/2006/main" xmlns:r="http://schemas.openxmlformats.org/officeDocument/2006/relationships" xmlns:p="http://schemas.openxmlformats.org/presentationml/2006/main">
+  <p:tag name="OUTPUTDPI" val="1200"/>
+  <p:tag name="ORIGINALHEIGHT" val="90.73866"/>
+  <p:tag name="ORIGINALWIDTH" val="166.4792"/>
+  <p:tag name="LATEXADDIN" val="\documentclass{article}&#10;\usepackage{amsmath}&#10;\usepackage{xcolor}&#10;\pagestyle{empty}&#10;\begin{document}&#10;&#10;\definecolor{Monred}{RGB}{172,0,0}&#10;&#10;&#10;$$\Delta h$$&#10;&#10;\end{document}"/>
+  <p:tag name="IGUANATEXSIZE" val="20"/>
+  <p:tag name="IGUANATEXCURSOR" val="150"/>
+  <p:tag name="TRANSPARENCY" val="True"/>
+  <p:tag name="FILENAME" val=""/>
+  <p:tag name="LATEXENGINEID" val="0"/>
+  <p:tag name="TEMPFOLDER" val="c:\temp\"/>
+  <p:tag name="LATEXFORMHEIGHT" val="312"/>
+  <p:tag name="LATEXFORMWIDTH" val="384"/>
+  <p:tag name="LATEXFORMWRAP" val="True"/>
+  <p:tag name="BITMAPVECTOR" val="0"/>
+</p:tagLst>
+</file>
+
+<file path=ppt/tags/tag12.xml><?xml version="1.0" encoding="utf-8"?>
+<p:tagLst xmlns:a="http://schemas.openxmlformats.org/drawingml/2006/main" xmlns:r="http://schemas.openxmlformats.org/officeDocument/2006/relationships" xmlns:p="http://schemas.openxmlformats.org/presentationml/2006/main">
+  <p:tag name="OUTPUTDPI" val="1200"/>
+  <p:tag name="ORIGINALHEIGHT" val="121.4848"/>
+  <p:tag name="ORIGINALWIDTH" val="413.1983"/>
+  <p:tag name="LATEXADDIN" val="\documentclass{article}&#10;\usepackage{amsmath}&#10;\usepackage{xcolor}&#10;\pagestyle{empty}&#10;\begin{document}&#10;&#10;\definecolor{Monred}{RGB}{172,0,0}&#10;&#10;&#10;$$D_{orifice}$$&#10;&#10;\end{document}"/>
+  <p:tag name="IGUANATEXSIZE" val="20"/>
+  <p:tag name="IGUANATEXCURSOR" val="151"/>
+  <p:tag name="TRANSPARENCY" val="True"/>
+  <p:tag name="FILENAME" val=""/>
+  <p:tag name="LATEXENGINEID" val="0"/>
+  <p:tag name="TEMPFOLDER" val="c:\temp\"/>
+  <p:tag name="LATEXFORMHEIGHT" val="312"/>
+  <p:tag name="LATEXFORMWIDTH" val="384"/>
+  <p:tag name="LATEXFORMWRAP" val="True"/>
+  <p:tag name="BITMAPVECTOR" val="0"/>
+</p:tagLst>
+</file>
+
+<file path=ppt/tags/tag13.xml><?xml version="1.0" encoding="utf-8"?>
+<p:tagLst xmlns:a="http://schemas.openxmlformats.org/drawingml/2006/main" xmlns:r="http://schemas.openxmlformats.org/officeDocument/2006/relationships" xmlns:p="http://schemas.openxmlformats.org/presentationml/2006/main">
+  <p:tag name="OUTPUTDPI" val="1200"/>
+  <p:tag name="ORIGINALHEIGHT" val="104.237"/>
+  <p:tag name="ORIGINALWIDTH" val="194.9756"/>
+  <p:tag name="LATEXADDIN" val="\documentclass{article}&#10;\usepackage{amsmath}&#10;\usepackage{xcolor}&#10;\pagestyle{empty}&#10;\begin{document}&#10;&#10;\definecolor{Monred}{RGB}{172,0,0}&#10;&#10;&#10;$$D_{vc}$$&#10;&#10;\end{document}"/>
+  <p:tag name="IGUANATEXSIZE" val="20"/>
+  <p:tag name="IGUANATEXCURSOR" val="145"/>
+  <p:tag name="TRANSPARENCY" val="True"/>
+  <p:tag name="FILENAME" val=""/>
+  <p:tag name="LATEXENGINEID" val="0"/>
+  <p:tag name="TEMPFOLDER" val="c:\temp\"/>
+  <p:tag name="LATEXFORMHEIGHT" val="312"/>
+  <p:tag name="LATEXFORMWIDTH" val="384"/>
+  <p:tag name="LATEXFORMWRAP" val="True"/>
+  <p:tag name="BITMAPVECTOR" val="0"/>
+</p:tagLst>
+</file>
+
+<file path=ppt/tags/tag14.xml><?xml version="1.0" encoding="utf-8"?>
+<p:tagLst xmlns:a="http://schemas.openxmlformats.org/drawingml/2006/main" xmlns:r="http://schemas.openxmlformats.org/officeDocument/2006/relationships" xmlns:p="http://schemas.openxmlformats.org/presentationml/2006/main">
+  <p:tag name="OUTPUTDPI" val="1200"/>
   <p:tag name="ORIGINALHEIGHT" val="120.7349"/>
   <p:tag name="ORIGINALWIDTH" val="305.2118"/>
   <p:tag name="LATEXADDIN" val="\documentclass{article}&#10;\usepackage{amsmath}&#10;\usepackage{xcolor}&#10;\pagestyle{empty}&#10;\begin{document}&#10;&#10;\definecolor{Monred}{RGB}{172,0,0}&#10;&#10;&#10;$$D_{Pipe}$$&#10;&#10;\end{document}"/>
@@ -43867,7 +44235,7 @@
 </p:tagLst>
 </file>
 
-<file path=ppt/tags/tag11.xml><?xml version="1.0" encoding="utf-8"?>
+<file path=ppt/tags/tag15.xml><?xml version="1.0" encoding="utf-8"?>
 <p:tagLst xmlns:a="http://schemas.openxmlformats.org/drawingml/2006/main" xmlns:r="http://schemas.openxmlformats.org/officeDocument/2006/relationships" xmlns:p="http://schemas.openxmlformats.org/presentationml/2006/main">
   <p:tag name="OUTPUTDPI" val="1200"/>
   <p:tag name="ORIGINALHEIGHT" val="103.4871"/>
@@ -43886,7 +44254,7 @@
 </p:tagLst>
 </file>
 
-<file path=ppt/tags/tag12.xml><?xml version="1.0" encoding="utf-8"?>
+<file path=ppt/tags/tag16.xml><?xml version="1.0" encoding="utf-8"?>
 <p:tagLst xmlns:a="http://schemas.openxmlformats.org/drawingml/2006/main" xmlns:r="http://schemas.openxmlformats.org/officeDocument/2006/relationships" xmlns:p="http://schemas.openxmlformats.org/presentationml/2006/main">
   <p:tag name="OUTPUTDPI" val="1200"/>
   <p:tag name="ORIGINALHEIGHT" val="104.237"/>
@@ -43905,7 +44273,7 @@
 </p:tagLst>
 </file>
 
-<file path=ppt/tags/tag13.xml><?xml version="1.0" encoding="utf-8"?>
+<file path=ppt/tags/tag17.xml><?xml version="1.0" encoding="utf-8"?>
 <p:tagLst xmlns:a="http://schemas.openxmlformats.org/drawingml/2006/main" xmlns:r="http://schemas.openxmlformats.org/officeDocument/2006/relationships" xmlns:p="http://schemas.openxmlformats.org/presentationml/2006/main">
   <p:tag name="OUTPUTDPI" val="1200"/>
   <p:tag name="ORIGINALHEIGHT" val="336.7079"/>
@@ -43924,7 +44292,7 @@
 </p:tagLst>
 </file>
 
-<file path=ppt/tags/tag14.xml><?xml version="1.0" encoding="utf-8"?>
+<file path=ppt/tags/tag18.xml><?xml version="1.0" encoding="utf-8"?>
 <p:tagLst xmlns:a="http://schemas.openxmlformats.org/drawingml/2006/main" xmlns:r="http://schemas.openxmlformats.org/officeDocument/2006/relationships" xmlns:p="http://schemas.openxmlformats.org/presentationml/2006/main">
   <p:tag name="OUTPUTDPI" val="1200"/>
   <p:tag name="ORIGINALHEIGHT" val="90.73866"/>
@@ -43943,86 +44311,10 @@
 </p:tagLst>
 </file>
 
-<file path=ppt/tags/tag15.xml><?xml version="1.0" encoding="utf-8"?>
+<file path=ppt/tags/tag19.xml><?xml version="1.0" encoding="utf-8"?>
 <p:tagLst xmlns:a="http://schemas.openxmlformats.org/drawingml/2006/main" xmlns:r="http://schemas.openxmlformats.org/officeDocument/2006/relationships" xmlns:p="http://schemas.openxmlformats.org/presentationml/2006/main">
   <p:tag name="SELECTIONNAME" val="Group 5"/>
   <p:tag name="LAYER" val="2"/>
-</p:tagLst>
-</file>
-
-<file path=ppt/tags/tag16.xml><?xml version="1.0" encoding="utf-8"?>
-<p:tagLst xmlns:a="http://schemas.openxmlformats.org/drawingml/2006/main" xmlns:r="http://schemas.openxmlformats.org/officeDocument/2006/relationships" xmlns:p="http://schemas.openxmlformats.org/presentationml/2006/main">
-  <p:tag name="OUTPUTDPI" val="1200"/>
-  <p:tag name="ORIGINALHEIGHT" val="90.73866"/>
-  <p:tag name="ORIGINALWIDTH" val="166.4792"/>
-  <p:tag name="LATEXADDIN" val="\documentclass{article}&#10;\usepackage{amsmath}&#10;\usepackage{xcolor}&#10;\pagestyle{empty}&#10;\begin{document}&#10;&#10;\definecolor{Monred}{RGB}{172,0,0}&#10;&#10;$$&#10;\Delta h&#10;$$&#10;&#10;&#10;\end{document}"/>
-  <p:tag name="IGUANATEXSIZE" val="20"/>
-  <p:tag name="IGUANATEXCURSOR" val="147"/>
-  <p:tag name="TRANSPARENCY" val="True"/>
-  <p:tag name="FILENAME" val=""/>
-  <p:tag name="LATEXENGINEID" val="0"/>
-  <p:tag name="TEMPFOLDER" val="c:\temp\"/>
-  <p:tag name="LATEXFORMHEIGHT" val="312"/>
-  <p:tag name="LATEXFORMWIDTH" val="384"/>
-  <p:tag name="LATEXFORMWRAP" val="True"/>
-  <p:tag name="BITMAPVECTOR" val="0"/>
-</p:tagLst>
-</file>
-
-<file path=ppt/tags/tag17.xml><?xml version="1.0" encoding="utf-8"?>
-<p:tagLst xmlns:a="http://schemas.openxmlformats.org/drawingml/2006/main" xmlns:r="http://schemas.openxmlformats.org/officeDocument/2006/relationships" xmlns:p="http://schemas.openxmlformats.org/presentationml/2006/main">
-  <p:tag name="OUTPUTDPI" val="1200"/>
-  <p:tag name="ORIGINALHEIGHT" val="299.2126"/>
-  <p:tag name="ORIGINALWIDTH" val="878.1403"/>
-  <p:tag name="LATEXADDIN" val="\documentclass{article}&#10;\usepackage{amsmath}&#10;\usepackage{xcolor}&#10;\pagestyle{empty}&#10;\begin{document}&#10;&#10;\definecolor{Monred}{RGB}{172,0,0}&#10;&#10;&#10;$$\Delta h = \frac{V_{out}^2}{2g} + h_L$$&#10;&#10;\end{document}"/>
-  <p:tag name="IGUANATEXSIZE" val="20"/>
-  <p:tag name="IGUANATEXCURSOR" val="164"/>
-  <p:tag name="TRANSPARENCY" val="True"/>
-  <p:tag name="FILENAME" val=""/>
-  <p:tag name="LATEXENGINEID" val="0"/>
-  <p:tag name="TEMPFOLDER" val="c:\temp\"/>
-  <p:tag name="LATEXFORMHEIGHT" val="312"/>
-  <p:tag name="LATEXFORMWIDTH" val="384"/>
-  <p:tag name="LATEXFORMWRAP" val="True"/>
-  <p:tag name="BITMAPVECTOR" val="0"/>
-</p:tagLst>
-</file>
-
-<file path=ppt/tags/tag18.xml><?xml version="1.0" encoding="utf-8"?>
-<p:tagLst xmlns:a="http://schemas.openxmlformats.org/drawingml/2006/main" xmlns:r="http://schemas.openxmlformats.org/officeDocument/2006/relationships" xmlns:p="http://schemas.openxmlformats.org/presentationml/2006/main">
-  <p:tag name="OUTPUTDPI" val="1200"/>
-  <p:tag name="ORIGINALHEIGHT" val="299.2126"/>
-  <p:tag name="ORIGINALWIDTH" val="1145.107"/>
-  <p:tag name="LATEXADDIN" val="\documentclass{article}&#10;\usepackage{amsmath}&#10;\usepackage{xcolor}&#10;\pagestyle{empty}&#10;\begin{document}&#10;&#10;\definecolor{Monred}{RGB}{172,0,0}&#10;&#10;&#10;$$\Delta h = \frac{V_{out}^2}{2g} + h_e + h_f$$&#10;&#10;\end{document}"/>
-  <p:tag name="IGUANATEXSIZE" val="20"/>
-  <p:tag name="IGUANATEXCURSOR" val="183"/>
-  <p:tag name="TRANSPARENCY" val="True"/>
-  <p:tag name="FILENAME" val=""/>
-  <p:tag name="LATEXENGINEID" val="0"/>
-  <p:tag name="TEMPFOLDER" val="c:\temp\"/>
-  <p:tag name="LATEXFORMHEIGHT" val="312"/>
-  <p:tag name="LATEXFORMWIDTH" val="384"/>
-  <p:tag name="LATEXFORMWRAP" val="True"/>
-  <p:tag name="BITMAPVECTOR" val="0"/>
-</p:tagLst>
-</file>
-
-<file path=ppt/tags/tag19.xml><?xml version="1.0" encoding="utf-8"?>
-<p:tagLst xmlns:a="http://schemas.openxmlformats.org/drawingml/2006/main" xmlns:r="http://schemas.openxmlformats.org/officeDocument/2006/relationships" xmlns:p="http://schemas.openxmlformats.org/presentationml/2006/main">
-  <p:tag name="OUTPUTDPI" val="1200"/>
-  <p:tag name="ORIGINALHEIGHT" val="299.2126"/>
-  <p:tag name="ORIGINALWIDTH" val="1759.28"/>
-  <p:tag name="LATEXADDIN" val="\documentclass{article}&#10;\usepackage{amsmath}&#10;\usepackage{xcolor}&#10;\pagestyle{empty}&#10;\begin{document}&#10;&#10;\definecolor{Monred}{RGB}{172,0,0}&#10;&#10;&#10;$$\Delta h = \frac{V_{out}^2}{2g} + \left( \sum K \right) \frac{V_{out}^2}{2g} + h_f$$&#10;&#10;\end{document}"/>
-  <p:tag name="IGUANATEXSIZE" val="20"/>
-  <p:tag name="IGUANATEXCURSOR" val="196"/>
-  <p:tag name="TRANSPARENCY" val="True"/>
-  <p:tag name="FILENAME" val=""/>
-  <p:tag name="LATEXENGINEID" val="0"/>
-  <p:tag name="TEMPFOLDER" val="c:\temp\"/>
-  <p:tag name="LATEXFORMHEIGHT" val="312"/>
-  <p:tag name="LATEXFORMWIDTH" val="384"/>
-  <p:tag name="LATEXFORMWRAP" val="True"/>
-  <p:tag name="BITMAPVECTOR" val="0"/>
 </p:tagLst>
 </file>
 
@@ -44048,6 +44340,82 @@
 <file path=ppt/tags/tag20.xml><?xml version="1.0" encoding="utf-8"?>
 <p:tagLst xmlns:a="http://schemas.openxmlformats.org/drawingml/2006/main" xmlns:r="http://schemas.openxmlformats.org/officeDocument/2006/relationships" xmlns:p="http://schemas.openxmlformats.org/presentationml/2006/main">
   <p:tag name="OUTPUTDPI" val="1200"/>
+  <p:tag name="ORIGINALHEIGHT" val="90.73866"/>
+  <p:tag name="ORIGINALWIDTH" val="166.4792"/>
+  <p:tag name="LATEXADDIN" val="\documentclass{article}&#10;\usepackage{amsmath}&#10;\usepackage{xcolor}&#10;\pagestyle{empty}&#10;\begin{document}&#10;&#10;\definecolor{Monred}{RGB}{172,0,0}&#10;&#10;$$&#10;\Delta h&#10;$$&#10;&#10;&#10;\end{document}"/>
+  <p:tag name="IGUANATEXSIZE" val="20"/>
+  <p:tag name="IGUANATEXCURSOR" val="147"/>
+  <p:tag name="TRANSPARENCY" val="True"/>
+  <p:tag name="FILENAME" val=""/>
+  <p:tag name="LATEXENGINEID" val="0"/>
+  <p:tag name="TEMPFOLDER" val="c:\temp\"/>
+  <p:tag name="LATEXFORMHEIGHT" val="312"/>
+  <p:tag name="LATEXFORMWIDTH" val="384"/>
+  <p:tag name="LATEXFORMWRAP" val="True"/>
+  <p:tag name="BITMAPVECTOR" val="0"/>
+</p:tagLst>
+</file>
+
+<file path=ppt/tags/tag21.xml><?xml version="1.0" encoding="utf-8"?>
+<p:tagLst xmlns:a="http://schemas.openxmlformats.org/drawingml/2006/main" xmlns:r="http://schemas.openxmlformats.org/officeDocument/2006/relationships" xmlns:p="http://schemas.openxmlformats.org/presentationml/2006/main">
+  <p:tag name="OUTPUTDPI" val="1200"/>
+  <p:tag name="ORIGINALHEIGHT" val="299.2126"/>
+  <p:tag name="ORIGINALWIDTH" val="878.1403"/>
+  <p:tag name="LATEXADDIN" val="\documentclass{article}&#10;\usepackage{amsmath}&#10;\usepackage{xcolor}&#10;\pagestyle{empty}&#10;\begin{document}&#10;&#10;\definecolor{Monred}{RGB}{172,0,0}&#10;&#10;&#10;$$\Delta h = \frac{V_{out}^2}{2g} + h_L$$&#10;&#10;\end{document}"/>
+  <p:tag name="IGUANATEXSIZE" val="20"/>
+  <p:tag name="IGUANATEXCURSOR" val="164"/>
+  <p:tag name="TRANSPARENCY" val="True"/>
+  <p:tag name="FILENAME" val=""/>
+  <p:tag name="LATEXENGINEID" val="0"/>
+  <p:tag name="TEMPFOLDER" val="c:\temp\"/>
+  <p:tag name="LATEXFORMHEIGHT" val="312"/>
+  <p:tag name="LATEXFORMWIDTH" val="384"/>
+  <p:tag name="LATEXFORMWRAP" val="True"/>
+  <p:tag name="BITMAPVECTOR" val="0"/>
+</p:tagLst>
+</file>
+
+<file path=ppt/tags/tag22.xml><?xml version="1.0" encoding="utf-8"?>
+<p:tagLst xmlns:a="http://schemas.openxmlformats.org/drawingml/2006/main" xmlns:r="http://schemas.openxmlformats.org/officeDocument/2006/relationships" xmlns:p="http://schemas.openxmlformats.org/presentationml/2006/main">
+  <p:tag name="OUTPUTDPI" val="1200"/>
+  <p:tag name="ORIGINALHEIGHT" val="299.2126"/>
+  <p:tag name="ORIGINALWIDTH" val="1145.107"/>
+  <p:tag name="LATEXADDIN" val="\documentclass{article}&#10;\usepackage{amsmath}&#10;\usepackage{xcolor}&#10;\pagestyle{empty}&#10;\begin{document}&#10;&#10;\definecolor{Monred}{RGB}{172,0,0}&#10;&#10;&#10;$$\Delta h = \frac{V_{out}^2}{2g} + h_e + h_f$$&#10;&#10;\end{document}"/>
+  <p:tag name="IGUANATEXSIZE" val="20"/>
+  <p:tag name="IGUANATEXCURSOR" val="183"/>
+  <p:tag name="TRANSPARENCY" val="True"/>
+  <p:tag name="FILENAME" val=""/>
+  <p:tag name="LATEXENGINEID" val="0"/>
+  <p:tag name="TEMPFOLDER" val="c:\temp\"/>
+  <p:tag name="LATEXFORMHEIGHT" val="312"/>
+  <p:tag name="LATEXFORMWIDTH" val="384"/>
+  <p:tag name="LATEXFORMWRAP" val="True"/>
+  <p:tag name="BITMAPVECTOR" val="0"/>
+</p:tagLst>
+</file>
+
+<file path=ppt/tags/tag23.xml><?xml version="1.0" encoding="utf-8"?>
+<p:tagLst xmlns:a="http://schemas.openxmlformats.org/drawingml/2006/main" xmlns:r="http://schemas.openxmlformats.org/officeDocument/2006/relationships" xmlns:p="http://schemas.openxmlformats.org/presentationml/2006/main">
+  <p:tag name="OUTPUTDPI" val="1200"/>
+  <p:tag name="ORIGINALHEIGHT" val="299.2126"/>
+  <p:tag name="ORIGINALWIDTH" val="1759.28"/>
+  <p:tag name="LATEXADDIN" val="\documentclass{article}&#10;\usepackage{amsmath}&#10;\usepackage{xcolor}&#10;\pagestyle{empty}&#10;\begin{document}&#10;&#10;\definecolor{Monred}{RGB}{172,0,0}&#10;&#10;&#10;$$\Delta h = \frac{V_{out}^2}{2g} + \left( \sum K \right) \frac{V_{out}^2}{2g} + h_f$$&#10;&#10;\end{document}"/>
+  <p:tag name="IGUANATEXSIZE" val="20"/>
+  <p:tag name="IGUANATEXCURSOR" val="196"/>
+  <p:tag name="TRANSPARENCY" val="True"/>
+  <p:tag name="FILENAME" val=""/>
+  <p:tag name="LATEXENGINEID" val="0"/>
+  <p:tag name="TEMPFOLDER" val="c:\temp\"/>
+  <p:tag name="LATEXFORMHEIGHT" val="312"/>
+  <p:tag name="LATEXFORMWIDTH" val="384"/>
+  <p:tag name="LATEXFORMWRAP" val="True"/>
+  <p:tag name="BITMAPVECTOR" val="0"/>
+</p:tagLst>
+</file>
+
+<file path=ppt/tags/tag24.xml><?xml version="1.0" encoding="utf-8"?>
+<p:tagLst xmlns:a="http://schemas.openxmlformats.org/drawingml/2006/main" xmlns:r="http://schemas.openxmlformats.org/officeDocument/2006/relationships" xmlns:p="http://schemas.openxmlformats.org/presentationml/2006/main">
+  <p:tag name="OUTPUTDPI" val="1200"/>
   <p:tag name="ORIGINALHEIGHT" val="299.2126"/>
   <p:tag name="ORIGINALWIDTH" val="1567.304"/>
   <p:tag name="LATEXADDIN" val="\documentclass{article}&#10;\usepackage{amsmath}&#10;\usepackage{xcolor}&#10;\pagestyle{empty}&#10;\begin{document}&#10;&#10;\definecolor{Monred}{RGB}{172,0,0}&#10;&#10;&#10;$$\Delta h = \left( \sum K + 1 \right) \frac{V_{out}^2}{2g} + h_f$$&#10;&#10;\end{document}"/>
@@ -44064,7 +44432,7 @@
 </p:tagLst>
 </file>
 
-<file path=ppt/tags/tag21.xml><?xml version="1.0" encoding="utf-8"?>
+<file path=ppt/tags/tag25.xml><?xml version="1.0" encoding="utf-8"?>
 <p:tagLst xmlns:a="http://schemas.openxmlformats.org/drawingml/2006/main" xmlns:r="http://schemas.openxmlformats.org/officeDocument/2006/relationships" xmlns:p="http://schemas.openxmlformats.org/presentationml/2006/main">
   <p:tag name="OUTPUTDPI" val="1200"/>
   <p:tag name="ORIGINALHEIGHT" val="299.2126"/>
@@ -44083,7 +44451,7 @@
 </p:tagLst>
 </file>
 
-<file path=ppt/tags/tag22.xml><?xml version="1.0" encoding="utf-8"?>
+<file path=ppt/tags/tag26.xml><?xml version="1.0" encoding="utf-8"?>
 <p:tagLst xmlns:a="http://schemas.openxmlformats.org/drawingml/2006/main" xmlns:r="http://schemas.openxmlformats.org/officeDocument/2006/relationships" xmlns:p="http://schemas.openxmlformats.org/presentationml/2006/main">
   <p:tag name="OUTPUTDPI" val="1200"/>
   <p:tag name="ORIGINALHEIGHT" val="125.9843"/>
@@ -44102,7 +44470,7 @@
 </p:tagLst>
 </file>
 
-<file path=ppt/tags/tag23.xml><?xml version="1.0" encoding="utf-8"?>
+<file path=ppt/tags/tag27.xml><?xml version="1.0" encoding="utf-8"?>
 <p:tagLst xmlns:a="http://schemas.openxmlformats.org/drawingml/2006/main" xmlns:r="http://schemas.openxmlformats.org/officeDocument/2006/relationships" xmlns:p="http://schemas.openxmlformats.org/presentationml/2006/main">
   <p:tag name="OUTPUTDPI" val="1200"/>
   <p:tag name="ORIGINALHEIGHT" val="107.9865"/>
@@ -44121,7 +44489,7 @@
 </p:tagLst>
 </file>
 
-<file path=ppt/tags/tag24.xml><?xml version="1.0" encoding="utf-8"?>
+<file path=ppt/tags/tag28.xml><?xml version="1.0" encoding="utf-8"?>
 <p:tagLst xmlns:a="http://schemas.openxmlformats.org/drawingml/2006/main" xmlns:r="http://schemas.openxmlformats.org/officeDocument/2006/relationships" xmlns:p="http://schemas.openxmlformats.org/presentationml/2006/main">
   <p:tag name="OUTPUTDPI" val="1200"/>
   <p:tag name="ORIGINALHEIGHT" val="275.9655"/>
@@ -44140,7 +44508,7 @@
 </p:tagLst>
 </file>
 
-<file path=ppt/tags/tag25.xml><?xml version="1.0" encoding="utf-8"?>
+<file path=ppt/tags/tag29.xml><?xml version="1.0" encoding="utf-8"?>
 <p:tagLst xmlns:a="http://schemas.openxmlformats.org/drawingml/2006/main" xmlns:r="http://schemas.openxmlformats.org/officeDocument/2006/relationships" xmlns:p="http://schemas.openxmlformats.org/presentationml/2006/main">
   <p:tag name="OUTPUTDPI" val="1200"/>
   <p:tag name="ORIGINALHEIGHT" val="275.9655"/>
@@ -44159,90 +44527,14 @@
 </p:tagLst>
 </file>
 
-<file path=ppt/tags/tag26.xml><?xml version="1.0" encoding="utf-8"?>
-<p:tagLst xmlns:a="http://schemas.openxmlformats.org/drawingml/2006/main" xmlns:r="http://schemas.openxmlformats.org/officeDocument/2006/relationships" xmlns:p="http://schemas.openxmlformats.org/presentationml/2006/main">
-  <p:tag name="OUTPUTDPI" val="1200"/>
-  <p:tag name="ORIGINALHEIGHT" val="260.2175"/>
-  <p:tag name="ORIGINALWIDTH" val="3640.045"/>
-  <p:tag name="LATEXADDIN" val="\documentclass{article}&#10;\usepackage{amsmath}&#10;\usepackage{xcolor}&#10;\pagestyle{empty}&#10;\begin{document}&#10;&#10;\definecolor{Monred}{RGB}{172,0,0}&#10;&#10;$t_{Design}$ = Time it would take to drain the tank if flow was held \\ constant at $Q_0$&#10;&#10;&#10;\end{document}"/>
-  <p:tag name="IGUANATEXSIZE" val="20"/>
-  <p:tag name="IGUANATEXCURSOR" val="208"/>
-  <p:tag name="TRANSPARENCY" val="True"/>
-  <p:tag name="FILENAME" val=""/>
-  <p:tag name="LATEXENGINEID" val="0"/>
-  <p:tag name="TEMPFOLDER" val="c:\temp\"/>
-  <p:tag name="LATEXFORMHEIGHT" val="312"/>
-  <p:tag name="LATEXFORMWIDTH" val="384"/>
-  <p:tag name="LATEXFORMWRAP" val="True"/>
-  <p:tag name="BITMAPVECTOR" val="0"/>
-</p:tagLst>
-</file>
-
-<file path=ppt/tags/tag27.xml><?xml version="1.0" encoding="utf-8"?>
+<file path=ppt/tags/tag3.xml><?xml version="1.0" encoding="utf-8"?>
 <p:tagLst xmlns:a="http://schemas.openxmlformats.org/drawingml/2006/main" xmlns:r="http://schemas.openxmlformats.org/officeDocument/2006/relationships" xmlns:p="http://schemas.openxmlformats.org/presentationml/2006/main">
   <p:tag name="OUTPUTDPI" val="1200"/>
   <p:tag name="ORIGINALHEIGHT" val="105.7368"/>
-  <p:tag name="ORIGINALWIDTH" val="302.2122"/>
-  <p:tag name="LATEXADDIN" val="\documentclass{article}&#10;\usepackage{amsmath}&#10;\usepackage{xcolor}&#10;\pagestyle{empty}&#10;\begin{document}&#10;&#10;\definecolor{Monred}{RGB}{172,0,0}&#10;&#10;$$h_{Tank}$$&#10;&#10;&#10;\end{document}"/>
+  <p:tag name="ORIGINALWIDTH" val="553.4308"/>
+  <p:tag name="LATEXADDIN" val="\documentclass{article}&#10;\usepackage{amsmath}&#10;\pagestyle{empty}&#10;\begin{document}&#10;&#10;&#10;$$h_l = 20cm$$&#10;&#10;\end{document}"/>
   <p:tag name="IGUANATEXSIZE" val="20"/>
-  <p:tag name="IGUANATEXCURSOR" val="147"/>
-  <p:tag name="TRANSPARENCY" val="True"/>
-  <p:tag name="FILENAME" val=""/>
-  <p:tag name="LATEXENGINEID" val="0"/>
-  <p:tag name="TEMPFOLDER" val="c:\temp\"/>
-  <p:tag name="LATEXFORMHEIGHT" val="312"/>
-  <p:tag name="LATEXFORMWIDTH" val="384"/>
-  <p:tag name="LATEXFORMWRAP" val="True"/>
-  <p:tag name="BITMAPVECTOR" val="0"/>
-</p:tagLst>
-</file>
-
-<file path=ppt/tags/tag28.xml><?xml version="1.0" encoding="utf-8"?>
-<p:tagLst xmlns:a="http://schemas.openxmlformats.org/drawingml/2006/main" xmlns:r="http://schemas.openxmlformats.org/officeDocument/2006/relationships" xmlns:p="http://schemas.openxmlformats.org/presentationml/2006/main">
-  <p:tag name="OUTPUTDPI" val="1200"/>
-  <p:tag name="ORIGINALHEIGHT" val="113.2358"/>
-  <p:tag name="ORIGINALWIDTH" val="3247.094"/>
-  <p:tag name="LATEXADDIN" val="\documentclass{article}&#10;\usepackage{amsmath}&#10;\usepackage{xcolor}&#10;\pagestyle{empty}&#10;\begin{document}&#10;&#10;\definecolor{Monred}{RGB}{172,0,0}&#10;&#10;$Q_0$ = Initial flow rate of hypochlorite solution at time $t = 0$&#10;&#10;&#10;\end{document}"/>
-  <p:tag name="IGUANATEXSIZE" val="20"/>
-  <p:tag name="IGUANATEXCURSOR" val="203"/>
-  <p:tag name="TRANSPARENCY" val="True"/>
-  <p:tag name="FILENAME" val=""/>
-  <p:tag name="LATEXENGINEID" val="0"/>
-  <p:tag name="TEMPFOLDER" val="c:\temp\"/>
-  <p:tag name="LATEXFORMHEIGHT" val="312"/>
-  <p:tag name="LATEXFORMWIDTH" val="384"/>
-  <p:tag name="LATEXFORMWRAP" val="True"/>
-  <p:tag name="BITMAPVECTOR" val="0"/>
-</p:tagLst>
-</file>
-
-<file path=ppt/tags/tag29.xml><?xml version="1.0" encoding="utf-8"?>
-<p:tagLst xmlns:a="http://schemas.openxmlformats.org/drawingml/2006/main" xmlns:r="http://schemas.openxmlformats.org/officeDocument/2006/relationships" xmlns:p="http://schemas.openxmlformats.org/presentationml/2006/main">
-  <p:tag name="OUTPUTDPI" val="1200"/>
-  <p:tag name="ORIGINALHEIGHT" val="106.4867"/>
-  <p:tag name="ORIGINALWIDTH" val="110.2362"/>
-  <p:tag name="LATEXADDIN" val="\documentclass{article}&#10;\usepackage{amsmath}&#10;\usepackage{xcolor}&#10;\pagestyle{empty}&#10;\begin{document}&#10;&#10;\definecolor{Monred}{RGB}{172,0,0}&#10;&#10;$$h_0$$&#10;&#10;&#10;\end{document}"/>
-  <p:tag name="IGUANATEXSIZE" val="20"/>
-  <p:tag name="IGUANATEXCURSOR" val="144"/>
-  <p:tag name="TRANSPARENCY" val="True"/>
-  <p:tag name="FILENAME" val=""/>
-  <p:tag name="LATEXENGINEID" val="0"/>
-  <p:tag name="TEMPFOLDER" val="c:\temp\"/>
-  <p:tag name="LATEXFORMHEIGHT" val="312"/>
-  <p:tag name="LATEXFORMWIDTH" val="384"/>
-  <p:tag name="LATEXFORMWRAP" val="True"/>
-  <p:tag name="BITMAPVECTOR" val="0"/>
-</p:tagLst>
-</file>
-
-<file path=ppt/tags/tag3.xml><?xml version="1.0" encoding="utf-8"?>
-<p:tagLst xmlns:a="http://schemas.openxmlformats.org/drawingml/2006/main" xmlns:r="http://schemas.openxmlformats.org/officeDocument/2006/relationships" xmlns:p="http://schemas.openxmlformats.org/presentationml/2006/main">
-  <p:tag name="OUTPUTDPI" val="1200"/>
-  <p:tag name="ORIGINALHEIGHT" val="104.9868"/>
-  <p:tag name="ORIGINALWIDTH" val="128.2339"/>
-  <p:tag name="LATEXADDIN" val="\documentclass{article}&#10;\usepackage{amsmath}&#10;\usepackage{xcolor}&#10;\pagestyle{empty}&#10;\begin{document}&#10;&#10;\definecolor{Monred}{RGB}{172,0,0}&#10;&#10;$$h_L$$&#10;&#10;&#10;\end{document}"/>
-  <p:tag name="IGUANATEXSIZE" val="20"/>
-  <p:tag name="IGUANATEXCURSOR" val="144"/>
+  <p:tag name="IGUANATEXCURSOR" val="96"/>
   <p:tag name="TRANSPARENCY" val="True"/>
   <p:tag name="FILENAME" val=""/>
   <p:tag name="LATEXENGINEID" val="0"/>
@@ -44330,7 +44622,159 @@
 </p:tagLst>
 </file>
 
+<file path=ppt/tags/tag34.xml><?xml version="1.0" encoding="utf-8"?>
+<p:tagLst xmlns:a="http://schemas.openxmlformats.org/drawingml/2006/main" xmlns:r="http://schemas.openxmlformats.org/officeDocument/2006/relationships" xmlns:p="http://schemas.openxmlformats.org/presentationml/2006/main">
+  <p:tag name="OUTPUTDPI" val="1200"/>
+  <p:tag name="ORIGINALHEIGHT" val="260.2175"/>
+  <p:tag name="ORIGINALWIDTH" val="3640.045"/>
+  <p:tag name="LATEXADDIN" val="\documentclass{article}&#10;\usepackage{amsmath}&#10;\usepackage{xcolor}&#10;\pagestyle{empty}&#10;\begin{document}&#10;&#10;\definecolor{Monred}{RGB}{172,0,0}&#10;&#10;$t_{Design}$ = Time it would take to drain the tank if flow was held \\ constant at $Q_0$&#10;&#10;&#10;\end{document}"/>
+  <p:tag name="IGUANATEXSIZE" val="20"/>
+  <p:tag name="IGUANATEXCURSOR" val="208"/>
+  <p:tag name="TRANSPARENCY" val="True"/>
+  <p:tag name="FILENAME" val=""/>
+  <p:tag name="LATEXENGINEID" val="0"/>
+  <p:tag name="TEMPFOLDER" val="c:\temp\"/>
+  <p:tag name="LATEXFORMHEIGHT" val="312"/>
+  <p:tag name="LATEXFORMWIDTH" val="384"/>
+  <p:tag name="LATEXFORMWRAP" val="True"/>
+  <p:tag name="BITMAPVECTOR" val="0"/>
+</p:tagLst>
+</file>
+
+<file path=ppt/tags/tag35.xml><?xml version="1.0" encoding="utf-8"?>
+<p:tagLst xmlns:a="http://schemas.openxmlformats.org/drawingml/2006/main" xmlns:r="http://schemas.openxmlformats.org/officeDocument/2006/relationships" xmlns:p="http://schemas.openxmlformats.org/presentationml/2006/main">
+  <p:tag name="OUTPUTDPI" val="1200"/>
+  <p:tag name="ORIGINALHEIGHT" val="105.7368"/>
+  <p:tag name="ORIGINALWIDTH" val="302.2122"/>
+  <p:tag name="LATEXADDIN" val="\documentclass{article}&#10;\usepackage{amsmath}&#10;\usepackage{xcolor}&#10;\pagestyle{empty}&#10;\begin{document}&#10;&#10;\definecolor{Monred}{RGB}{172,0,0}&#10;&#10;$$h_{Tank}$$&#10;&#10;&#10;\end{document}"/>
+  <p:tag name="IGUANATEXSIZE" val="20"/>
+  <p:tag name="IGUANATEXCURSOR" val="147"/>
+  <p:tag name="TRANSPARENCY" val="True"/>
+  <p:tag name="FILENAME" val=""/>
+  <p:tag name="LATEXENGINEID" val="0"/>
+  <p:tag name="TEMPFOLDER" val="c:\temp\"/>
+  <p:tag name="LATEXFORMHEIGHT" val="312"/>
+  <p:tag name="LATEXFORMWIDTH" val="384"/>
+  <p:tag name="LATEXFORMWRAP" val="True"/>
+  <p:tag name="BITMAPVECTOR" val="0"/>
+</p:tagLst>
+</file>
+
+<file path=ppt/tags/tag36.xml><?xml version="1.0" encoding="utf-8"?>
+<p:tagLst xmlns:a="http://schemas.openxmlformats.org/drawingml/2006/main" xmlns:r="http://schemas.openxmlformats.org/officeDocument/2006/relationships" xmlns:p="http://schemas.openxmlformats.org/presentationml/2006/main">
+  <p:tag name="OUTPUTDPI" val="1200"/>
+  <p:tag name="ORIGINALHEIGHT" val="113.2358"/>
+  <p:tag name="ORIGINALWIDTH" val="3247.094"/>
+  <p:tag name="LATEXADDIN" val="\documentclass{article}&#10;\usepackage{amsmath}&#10;\usepackage{xcolor}&#10;\pagestyle{empty}&#10;\begin{document}&#10;&#10;\definecolor{Monred}{RGB}{172,0,0}&#10;&#10;$Q_0$ = Initial flow rate of hypochlorite solution at time $t = 0$&#10;&#10;&#10;\end{document}"/>
+  <p:tag name="IGUANATEXSIZE" val="20"/>
+  <p:tag name="IGUANATEXCURSOR" val="203"/>
+  <p:tag name="TRANSPARENCY" val="True"/>
+  <p:tag name="FILENAME" val=""/>
+  <p:tag name="LATEXENGINEID" val="0"/>
+  <p:tag name="TEMPFOLDER" val="c:\temp\"/>
+  <p:tag name="LATEXFORMHEIGHT" val="312"/>
+  <p:tag name="LATEXFORMWIDTH" val="384"/>
+  <p:tag name="LATEXFORMWRAP" val="True"/>
+  <p:tag name="BITMAPVECTOR" val="0"/>
+</p:tagLst>
+</file>
+
+<file path=ppt/tags/tag37.xml><?xml version="1.0" encoding="utf-8"?>
+<p:tagLst xmlns:a="http://schemas.openxmlformats.org/drawingml/2006/main" xmlns:r="http://schemas.openxmlformats.org/officeDocument/2006/relationships" xmlns:p="http://schemas.openxmlformats.org/presentationml/2006/main">
+  <p:tag name="OUTPUTDPI" val="1200"/>
+  <p:tag name="ORIGINALHEIGHT" val="106.4867"/>
+  <p:tag name="ORIGINALWIDTH" val="110.2362"/>
+  <p:tag name="LATEXADDIN" val="\documentclass{article}&#10;\usepackage{amsmath}&#10;\usepackage{xcolor}&#10;\pagestyle{empty}&#10;\begin{document}&#10;&#10;\definecolor{Monred}{RGB}{172,0,0}&#10;&#10;$$h_0$$&#10;&#10;&#10;\end{document}"/>
+  <p:tag name="IGUANATEXSIZE" val="20"/>
+  <p:tag name="IGUANATEXCURSOR" val="144"/>
+  <p:tag name="TRANSPARENCY" val="True"/>
+  <p:tag name="FILENAME" val=""/>
+  <p:tag name="LATEXENGINEID" val="0"/>
+  <p:tag name="TEMPFOLDER" val="c:\temp\"/>
+  <p:tag name="LATEXFORMHEIGHT" val="312"/>
+  <p:tag name="LATEXFORMWIDTH" val="384"/>
+  <p:tag name="LATEXFORMWRAP" val="True"/>
+  <p:tag name="BITMAPVECTOR" val="0"/>
+</p:tagLst>
+</file>
+
 <file path=ppt/tags/tag4.xml><?xml version="1.0" encoding="utf-8"?>
+<p:tagLst xmlns:a="http://schemas.openxmlformats.org/drawingml/2006/main" xmlns:r="http://schemas.openxmlformats.org/officeDocument/2006/relationships" xmlns:p="http://schemas.openxmlformats.org/presentationml/2006/main">
+  <p:tag name="OUTPUTDPI" val="1200"/>
+  <p:tag name="ORIGINALHEIGHT" val="104.9868"/>
+  <p:tag name="ORIGINALWIDTH" val="684.6644"/>
+  <p:tag name="LATEXADDIN" val="\documentclass{article}&#10;\usepackage{amsmath}&#10;\pagestyle{empty}&#10;\begin{document}&#10;&#10;$$\Pi_{Error} = 0.1$$&#10;&#10;&#10;\end{document}"/>
+  <p:tag name="IGUANATEXSIZE" val="20"/>
+  <p:tag name="IGUANATEXCURSOR" val="102"/>
+  <p:tag name="TRANSPARENCY" val="True"/>
+  <p:tag name="FILENAME" val=""/>
+  <p:tag name="LATEXENGINEID" val="0"/>
+  <p:tag name="TEMPFOLDER" val="c:\temp\"/>
+  <p:tag name="LATEXFORMHEIGHT" val="312"/>
+  <p:tag name="LATEXFORMWIDTH" val="384"/>
+  <p:tag name="LATEXFORMWRAP" val="True"/>
+  <p:tag name="BITMAPVECTOR" val="0"/>
+</p:tagLst>
+</file>
+
+<file path=ppt/tags/tag5.xml><?xml version="1.0" encoding="utf-8"?>
+<p:tagLst xmlns:a="http://schemas.openxmlformats.org/drawingml/2006/main" xmlns:r="http://schemas.openxmlformats.org/officeDocument/2006/relationships" xmlns:p="http://schemas.openxmlformats.org/presentationml/2006/main">
+  <p:tag name="OUTPUTDPI" val="1200"/>
+  <p:tag name="ORIGINALHEIGHT" val="275.2156"/>
+  <p:tag name="ORIGINALWIDTH" val="667.4166"/>
+  <p:tag name="LATEXADDIN" val="\documentclass{article}&#10;\usepackage{amsmath}&#10;\usepackage{xcolor}&#10;\pagestyle{empty}&#10;\begin{document}&#10;&#10;\definecolor{Monred}{RGB}{172,0,0}&#10;&#10;$$\nu = 1.0 \rm{\frac{mm^2}{s}}$$&#10;&#10;&#10;&#10;\end{document}"/>
+  <p:tag name="IGUANATEXSIZE" val="20"/>
+  <p:tag name="IGUANATEXCURSOR" val="171"/>
+  <p:tag name="TRANSPARENCY" val="True"/>
+  <p:tag name="FILENAME" val=""/>
+  <p:tag name="LATEXENGINEID" val="0"/>
+  <p:tag name="TEMPFOLDER" val="c:\temp\"/>
+  <p:tag name="LATEXFORMHEIGHT" val="312"/>
+  <p:tag name="LATEXFORMWIDTH" val="384"/>
+  <p:tag name="LATEXFORMWRAP" val="True"/>
+  <p:tag name="BITMAPVECTOR" val="0"/>
+</p:tagLst>
+</file>
+
+<file path=ppt/tags/tag6.xml><?xml version="1.0" encoding="utf-8"?>
+<p:tagLst xmlns:a="http://schemas.openxmlformats.org/drawingml/2006/main" xmlns:r="http://schemas.openxmlformats.org/officeDocument/2006/relationships" xmlns:p="http://schemas.openxmlformats.org/presentationml/2006/main">
+  <p:tag name="OUTPUTDPI" val="1200"/>
+  <p:tag name="ORIGINALHEIGHT" val="174.7282"/>
+  <p:tag name="ORIGINALWIDTH" val="575.1781"/>
+  <p:tag name="LATEXADDIN" val="\documentclass{article}&#10;\usepackage{amsmath}&#10;\usepackage{xcolor}&#10;\pagestyle{empty}&#10;\begin{document}&#10;&#10;\definecolor{Monred}{RGB}{172,0,0}&#10;&#10;&#10;$$\sum K_e = 2$$&#10;&#10;\end{document}"/>
+  <p:tag name="IGUANATEXSIZE" val="20"/>
+  <p:tag name="IGUANATEXCURSOR" val="152"/>
+  <p:tag name="TRANSPARENCY" val="True"/>
+  <p:tag name="FILENAME" val=""/>
+  <p:tag name="LATEXENGINEID" val="0"/>
+  <p:tag name="TEMPFOLDER" val="c:\temp\"/>
+  <p:tag name="LATEXFORMHEIGHT" val="312"/>
+  <p:tag name="LATEXFORMWIDTH" val="384"/>
+  <p:tag name="LATEXFORMWRAP" val="True"/>
+  <p:tag name="BITMAPVECTOR" val="0"/>
+</p:tagLst>
+</file>
+
+<file path=ppt/tags/tag7.xml><?xml version="1.0" encoding="utf-8"?>
+<p:tagLst xmlns:a="http://schemas.openxmlformats.org/drawingml/2006/main" xmlns:r="http://schemas.openxmlformats.org/officeDocument/2006/relationships" xmlns:p="http://schemas.openxmlformats.org/presentationml/2006/main">
+  <p:tag name="OUTPUTDPI" val="1200"/>
+  <p:tag name="ORIGINALHEIGHT" val="104.9868"/>
+  <p:tag name="ORIGINALWIDTH" val="128.2339"/>
+  <p:tag name="LATEXADDIN" val="\documentclass{article}&#10;\usepackage{amsmath}&#10;\usepackage{xcolor}&#10;\pagestyle{empty}&#10;\begin{document}&#10;&#10;\definecolor{Monred}{RGB}{172,0,0}&#10;&#10;$$h_L$$&#10;&#10;&#10;\end{document}"/>
+  <p:tag name="IGUANATEXSIZE" val="20"/>
+  <p:tag name="IGUANATEXCURSOR" val="144"/>
+  <p:tag name="TRANSPARENCY" val="True"/>
+  <p:tag name="FILENAME" val=""/>
+  <p:tag name="LATEXENGINEID" val="0"/>
+  <p:tag name="TEMPFOLDER" val="c:\temp\"/>
+  <p:tag name="LATEXFORMHEIGHT" val="312"/>
+  <p:tag name="LATEXFORMWIDTH" val="384"/>
+  <p:tag name="LATEXFORMWRAP" val="True"/>
+  <p:tag name="BITMAPVECTOR" val="0"/>
+</p:tagLst>
+</file>
+
+<file path=ppt/tags/tag8.xml><?xml version="1.0" encoding="utf-8"?>
 <p:tagLst xmlns:a="http://schemas.openxmlformats.org/drawingml/2006/main" xmlns:r="http://schemas.openxmlformats.org/officeDocument/2006/relationships" xmlns:p="http://schemas.openxmlformats.org/presentationml/2006/main">
   <p:tag name="OUTPUTDPI" val="1200"/>
   <p:tag name="ORIGINALHEIGHT" val="122.9846"/>
@@ -44349,7 +44793,7 @@
 </p:tagLst>
 </file>
 
-<file path=ppt/tags/tag5.xml><?xml version="1.0" encoding="utf-8"?>
+<file path=ppt/tags/tag9.xml><?xml version="1.0" encoding="utf-8"?>
 <p:tagLst xmlns:a="http://schemas.openxmlformats.org/drawingml/2006/main" xmlns:r="http://schemas.openxmlformats.org/officeDocument/2006/relationships" xmlns:p="http://schemas.openxmlformats.org/presentationml/2006/main">
   <p:tag name="OUTPUTDPI" val="1200"/>
   <p:tag name="ORIGINALHEIGHT" val="90.73866"/>
@@ -44357,82 +44801,6 @@
   <p:tag name="LATEXADDIN" val="\documentclass{article}&#10;\usepackage{amsmath}&#10;\usepackage{xcolor}&#10;\pagestyle{empty}&#10;\begin{document}&#10;&#10;\definecolor{Monred}{RGB}{172,0,0}&#10;&#10;&#10;$$\Delta h$$&#10;&#10;\end{document}"/>
   <p:tag name="IGUANATEXSIZE" val="20"/>
   <p:tag name="IGUANATEXCURSOR" val="150"/>
-  <p:tag name="TRANSPARENCY" val="True"/>
-  <p:tag name="FILENAME" val=""/>
-  <p:tag name="LATEXENGINEID" val="0"/>
-  <p:tag name="TEMPFOLDER" val="c:\temp\"/>
-  <p:tag name="LATEXFORMHEIGHT" val="312"/>
-  <p:tag name="LATEXFORMWIDTH" val="384"/>
-  <p:tag name="LATEXFORMWRAP" val="True"/>
-  <p:tag name="BITMAPVECTOR" val="0"/>
-</p:tagLst>
-</file>
-
-<file path=ppt/tags/tag6.xml><?xml version="1.0" encoding="utf-8"?>
-<p:tagLst xmlns:a="http://schemas.openxmlformats.org/drawingml/2006/main" xmlns:r="http://schemas.openxmlformats.org/officeDocument/2006/relationships" xmlns:p="http://schemas.openxmlformats.org/presentationml/2006/main">
-  <p:tag name="OUTPUTDPI" val="1200"/>
-  <p:tag name="ORIGINALHEIGHT" val="90.73866"/>
-  <p:tag name="ORIGINALWIDTH" val="166.4792"/>
-  <p:tag name="LATEXADDIN" val="\documentclass{article}&#10;\usepackage{amsmath}&#10;\usepackage{xcolor}&#10;\pagestyle{empty}&#10;\begin{document}&#10;&#10;\definecolor{Monred}{RGB}{172,0,0}&#10;&#10;&#10;$$\Delta h$$&#10;&#10;\end{document}"/>
-  <p:tag name="IGUANATEXSIZE" val="20"/>
-  <p:tag name="IGUANATEXCURSOR" val="150"/>
-  <p:tag name="TRANSPARENCY" val="True"/>
-  <p:tag name="FILENAME" val=""/>
-  <p:tag name="LATEXENGINEID" val="0"/>
-  <p:tag name="TEMPFOLDER" val="c:\temp\"/>
-  <p:tag name="LATEXFORMHEIGHT" val="312"/>
-  <p:tag name="LATEXFORMWIDTH" val="384"/>
-  <p:tag name="LATEXFORMWRAP" val="True"/>
-  <p:tag name="BITMAPVECTOR" val="0"/>
-</p:tagLst>
-</file>
-
-<file path=ppt/tags/tag7.xml><?xml version="1.0" encoding="utf-8"?>
-<p:tagLst xmlns:a="http://schemas.openxmlformats.org/drawingml/2006/main" xmlns:r="http://schemas.openxmlformats.org/officeDocument/2006/relationships" xmlns:p="http://schemas.openxmlformats.org/presentationml/2006/main">
-  <p:tag name="OUTPUTDPI" val="1200"/>
-  <p:tag name="ORIGINALHEIGHT" val="90.73866"/>
-  <p:tag name="ORIGINALWIDTH" val="166.4792"/>
-  <p:tag name="LATEXADDIN" val="\documentclass{article}&#10;\usepackage{amsmath}&#10;\usepackage{xcolor}&#10;\pagestyle{empty}&#10;\begin{document}&#10;&#10;\definecolor{Monred}{RGB}{172,0,0}&#10;&#10;&#10;$$\Delta h$$&#10;&#10;\end{document}"/>
-  <p:tag name="IGUANATEXSIZE" val="20"/>
-  <p:tag name="IGUANATEXCURSOR" val="150"/>
-  <p:tag name="TRANSPARENCY" val="True"/>
-  <p:tag name="FILENAME" val=""/>
-  <p:tag name="LATEXENGINEID" val="0"/>
-  <p:tag name="TEMPFOLDER" val="c:\temp\"/>
-  <p:tag name="LATEXFORMHEIGHT" val="312"/>
-  <p:tag name="LATEXFORMWIDTH" val="384"/>
-  <p:tag name="LATEXFORMWRAP" val="True"/>
-  <p:tag name="BITMAPVECTOR" val="0"/>
-</p:tagLst>
-</file>
-
-<file path=ppt/tags/tag8.xml><?xml version="1.0" encoding="utf-8"?>
-<p:tagLst xmlns:a="http://schemas.openxmlformats.org/drawingml/2006/main" xmlns:r="http://schemas.openxmlformats.org/officeDocument/2006/relationships" xmlns:p="http://schemas.openxmlformats.org/presentationml/2006/main">
-  <p:tag name="OUTPUTDPI" val="1200"/>
-  <p:tag name="ORIGINALHEIGHT" val="121.4848"/>
-  <p:tag name="ORIGINALWIDTH" val="413.1983"/>
-  <p:tag name="LATEXADDIN" val="\documentclass{article}&#10;\usepackage{amsmath}&#10;\usepackage{xcolor}&#10;\pagestyle{empty}&#10;\begin{document}&#10;&#10;\definecolor{Monred}{RGB}{172,0,0}&#10;&#10;&#10;$$D_{orifice}$$&#10;&#10;\end{document}"/>
-  <p:tag name="IGUANATEXSIZE" val="20"/>
-  <p:tag name="IGUANATEXCURSOR" val="151"/>
-  <p:tag name="TRANSPARENCY" val="True"/>
-  <p:tag name="FILENAME" val=""/>
-  <p:tag name="LATEXENGINEID" val="0"/>
-  <p:tag name="TEMPFOLDER" val="c:\temp\"/>
-  <p:tag name="LATEXFORMHEIGHT" val="312"/>
-  <p:tag name="LATEXFORMWIDTH" val="384"/>
-  <p:tag name="LATEXFORMWRAP" val="True"/>
-  <p:tag name="BITMAPVECTOR" val="0"/>
-</p:tagLst>
-</file>
-
-<file path=ppt/tags/tag9.xml><?xml version="1.0" encoding="utf-8"?>
-<p:tagLst xmlns:a="http://schemas.openxmlformats.org/drawingml/2006/main" xmlns:r="http://schemas.openxmlformats.org/officeDocument/2006/relationships" xmlns:p="http://schemas.openxmlformats.org/presentationml/2006/main">
-  <p:tag name="OUTPUTDPI" val="1200"/>
-  <p:tag name="ORIGINALHEIGHT" val="104.237"/>
-  <p:tag name="ORIGINALWIDTH" val="194.9756"/>
-  <p:tag name="LATEXADDIN" val="\documentclass{article}&#10;\usepackage{amsmath}&#10;\usepackage{xcolor}&#10;\pagestyle{empty}&#10;\begin{document}&#10;&#10;\definecolor{Monred}{RGB}{172,0,0}&#10;&#10;&#10;$$D_{vc}$$&#10;&#10;\end{document}"/>
-  <p:tag name="IGUANATEXSIZE" val="20"/>
-  <p:tag name="IGUANATEXCURSOR" val="145"/>
   <p:tag name="TRANSPARENCY" val="True"/>
   <p:tag name="FILENAME" val=""/>
   <p:tag name="LATEXENGINEID" val="0"/>

</xml_diff>